<commit_message>
vanilla vs exotic, one-step binom tree explanation
</commit_message>
<xml_diff>
--- a/img/binom.pptx
+++ b/img/binom.pptx
@@ -259,7 +259,7 @@
           <a:p>
             <a:fld id="{43C63E5C-259F-4767-9F32-E9A25171A77E}" type="datetimeFigureOut">
               <a:rPr lang="en-US" smtClean="0"/>
-              <a:t>12/25/2020</a:t>
+              <a:t>12/27/2020</a:t>
             </a:fld>
             <a:endParaRPr lang="en-US"/>
           </a:p>
@@ -457,7 +457,7 @@
           <a:p>
             <a:fld id="{43C63E5C-259F-4767-9F32-E9A25171A77E}" type="datetimeFigureOut">
               <a:rPr lang="en-US" smtClean="0"/>
-              <a:t>12/25/2020</a:t>
+              <a:t>12/27/2020</a:t>
             </a:fld>
             <a:endParaRPr lang="en-US"/>
           </a:p>
@@ -665,7 +665,7 @@
           <a:p>
             <a:fld id="{43C63E5C-259F-4767-9F32-E9A25171A77E}" type="datetimeFigureOut">
               <a:rPr lang="en-US" smtClean="0"/>
-              <a:t>12/25/2020</a:t>
+              <a:t>12/27/2020</a:t>
             </a:fld>
             <a:endParaRPr lang="en-US"/>
           </a:p>
@@ -863,7 +863,7 @@
           <a:p>
             <a:fld id="{43C63E5C-259F-4767-9F32-E9A25171A77E}" type="datetimeFigureOut">
               <a:rPr lang="en-US" smtClean="0"/>
-              <a:t>12/25/2020</a:t>
+              <a:t>12/27/2020</a:t>
             </a:fld>
             <a:endParaRPr lang="en-US"/>
           </a:p>
@@ -1138,7 +1138,7 @@
           <a:p>
             <a:fld id="{43C63E5C-259F-4767-9F32-E9A25171A77E}" type="datetimeFigureOut">
               <a:rPr lang="en-US" smtClean="0"/>
-              <a:t>12/25/2020</a:t>
+              <a:t>12/27/2020</a:t>
             </a:fld>
             <a:endParaRPr lang="en-US"/>
           </a:p>
@@ -1403,7 +1403,7 @@
           <a:p>
             <a:fld id="{43C63E5C-259F-4767-9F32-E9A25171A77E}" type="datetimeFigureOut">
               <a:rPr lang="en-US" smtClean="0"/>
-              <a:t>12/25/2020</a:t>
+              <a:t>12/27/2020</a:t>
             </a:fld>
             <a:endParaRPr lang="en-US"/>
           </a:p>
@@ -1815,7 +1815,7 @@
           <a:p>
             <a:fld id="{43C63E5C-259F-4767-9F32-E9A25171A77E}" type="datetimeFigureOut">
               <a:rPr lang="en-US" smtClean="0"/>
-              <a:t>12/25/2020</a:t>
+              <a:t>12/27/2020</a:t>
             </a:fld>
             <a:endParaRPr lang="en-US"/>
           </a:p>
@@ -1956,7 +1956,7 @@
           <a:p>
             <a:fld id="{43C63E5C-259F-4767-9F32-E9A25171A77E}" type="datetimeFigureOut">
               <a:rPr lang="en-US" smtClean="0"/>
-              <a:t>12/25/2020</a:t>
+              <a:t>12/27/2020</a:t>
             </a:fld>
             <a:endParaRPr lang="en-US"/>
           </a:p>
@@ -2069,7 +2069,7 @@
           <a:p>
             <a:fld id="{43C63E5C-259F-4767-9F32-E9A25171A77E}" type="datetimeFigureOut">
               <a:rPr lang="en-US" smtClean="0"/>
-              <a:t>12/25/2020</a:t>
+              <a:t>12/27/2020</a:t>
             </a:fld>
             <a:endParaRPr lang="en-US"/>
           </a:p>
@@ -2380,7 +2380,7 @@
           <a:p>
             <a:fld id="{43C63E5C-259F-4767-9F32-E9A25171A77E}" type="datetimeFigureOut">
               <a:rPr lang="en-US" smtClean="0"/>
-              <a:t>12/25/2020</a:t>
+              <a:t>12/27/2020</a:t>
             </a:fld>
             <a:endParaRPr lang="en-US"/>
           </a:p>
@@ -2668,7 +2668,7 @@
           <a:p>
             <a:fld id="{43C63E5C-259F-4767-9F32-E9A25171A77E}" type="datetimeFigureOut">
               <a:rPr lang="en-US" smtClean="0"/>
-              <a:t>12/25/2020</a:t>
+              <a:t>12/27/2020</a:t>
             </a:fld>
             <a:endParaRPr lang="en-US"/>
           </a:p>
@@ -2909,7 +2909,7 @@
           <a:p>
             <a:fld id="{43C63E5C-259F-4767-9F32-E9A25171A77E}" type="datetimeFigureOut">
               <a:rPr lang="en-US" smtClean="0"/>
-              <a:t>12/25/2020</a:t>
+              <a:t>12/27/2020</a:t>
             </a:fld>
             <a:endParaRPr lang="en-US"/>
           </a:p>

</xml_diff>

<commit_message>
binom tree pricer 1-step and 2-step
</commit_message>
<xml_diff>
--- a/img/binom.pptx
+++ b/img/binom.pptx
@@ -6,6 +6,7 @@
   </p:sldMasterIdLst>
   <p:sldIdLst>
     <p:sldId id="256" r:id="rId2"/>
+    <p:sldId id="258" r:id="rId3"/>
   </p:sldIdLst>
   <p:sldSz cx="12192000" cy="6858000"/>
   <p:notesSz cx="6858000" cy="9144000"/>
@@ -259,7 +260,7 @@
           <a:p>
             <a:fld id="{43C63E5C-259F-4767-9F32-E9A25171A77E}" type="datetimeFigureOut">
               <a:rPr lang="en-US" smtClean="0"/>
-              <a:t>12/27/2020</a:t>
+              <a:t>12/29/2020</a:t>
             </a:fld>
             <a:endParaRPr lang="en-US"/>
           </a:p>
@@ -457,7 +458,7 @@
           <a:p>
             <a:fld id="{43C63E5C-259F-4767-9F32-E9A25171A77E}" type="datetimeFigureOut">
               <a:rPr lang="en-US" smtClean="0"/>
-              <a:t>12/27/2020</a:t>
+              <a:t>12/29/2020</a:t>
             </a:fld>
             <a:endParaRPr lang="en-US"/>
           </a:p>
@@ -665,7 +666,7 @@
           <a:p>
             <a:fld id="{43C63E5C-259F-4767-9F32-E9A25171A77E}" type="datetimeFigureOut">
               <a:rPr lang="en-US" smtClean="0"/>
-              <a:t>12/27/2020</a:t>
+              <a:t>12/29/2020</a:t>
             </a:fld>
             <a:endParaRPr lang="en-US"/>
           </a:p>
@@ -863,7 +864,7 @@
           <a:p>
             <a:fld id="{43C63E5C-259F-4767-9F32-E9A25171A77E}" type="datetimeFigureOut">
               <a:rPr lang="en-US" smtClean="0"/>
-              <a:t>12/27/2020</a:t>
+              <a:t>12/29/2020</a:t>
             </a:fld>
             <a:endParaRPr lang="en-US"/>
           </a:p>
@@ -1138,7 +1139,7 @@
           <a:p>
             <a:fld id="{43C63E5C-259F-4767-9F32-E9A25171A77E}" type="datetimeFigureOut">
               <a:rPr lang="en-US" smtClean="0"/>
-              <a:t>12/27/2020</a:t>
+              <a:t>12/29/2020</a:t>
             </a:fld>
             <a:endParaRPr lang="en-US"/>
           </a:p>
@@ -1403,7 +1404,7 @@
           <a:p>
             <a:fld id="{43C63E5C-259F-4767-9F32-E9A25171A77E}" type="datetimeFigureOut">
               <a:rPr lang="en-US" smtClean="0"/>
-              <a:t>12/27/2020</a:t>
+              <a:t>12/29/2020</a:t>
             </a:fld>
             <a:endParaRPr lang="en-US"/>
           </a:p>
@@ -1815,7 +1816,7 @@
           <a:p>
             <a:fld id="{43C63E5C-259F-4767-9F32-E9A25171A77E}" type="datetimeFigureOut">
               <a:rPr lang="en-US" smtClean="0"/>
-              <a:t>12/27/2020</a:t>
+              <a:t>12/29/2020</a:t>
             </a:fld>
             <a:endParaRPr lang="en-US"/>
           </a:p>
@@ -1956,7 +1957,7 @@
           <a:p>
             <a:fld id="{43C63E5C-259F-4767-9F32-E9A25171A77E}" type="datetimeFigureOut">
               <a:rPr lang="en-US" smtClean="0"/>
-              <a:t>12/27/2020</a:t>
+              <a:t>12/29/2020</a:t>
             </a:fld>
             <a:endParaRPr lang="en-US"/>
           </a:p>
@@ -2069,7 +2070,7 @@
           <a:p>
             <a:fld id="{43C63E5C-259F-4767-9F32-E9A25171A77E}" type="datetimeFigureOut">
               <a:rPr lang="en-US" smtClean="0"/>
-              <a:t>12/27/2020</a:t>
+              <a:t>12/29/2020</a:t>
             </a:fld>
             <a:endParaRPr lang="en-US"/>
           </a:p>
@@ -2380,7 +2381,7 @@
           <a:p>
             <a:fld id="{43C63E5C-259F-4767-9F32-E9A25171A77E}" type="datetimeFigureOut">
               <a:rPr lang="en-US" smtClean="0"/>
-              <a:t>12/27/2020</a:t>
+              <a:t>12/29/2020</a:t>
             </a:fld>
             <a:endParaRPr lang="en-US"/>
           </a:p>
@@ -2668,7 +2669,7 @@
           <a:p>
             <a:fld id="{43C63E5C-259F-4767-9F32-E9A25171A77E}" type="datetimeFigureOut">
               <a:rPr lang="en-US" smtClean="0"/>
-              <a:t>12/27/2020</a:t>
+              <a:t>12/29/2020</a:t>
             </a:fld>
             <a:endParaRPr lang="en-US"/>
           </a:p>
@@ -2909,7 +2910,7 @@
           <a:p>
             <a:fld id="{43C63E5C-259F-4767-9F32-E9A25171A77E}" type="datetimeFigureOut">
               <a:rPr lang="en-US" smtClean="0"/>
-              <a:t>12/27/2020</a:t>
+              <a:t>12/29/2020</a:t>
             </a:fld>
             <a:endParaRPr lang="en-US"/>
           </a:p>
@@ -3706,7 +3707,7 @@
         </p:nvSpPr>
         <p:spPr>
           <a:xfrm>
-            <a:off x="4340489" y="785867"/>
+            <a:off x="4340489" y="804721"/>
             <a:ext cx="894336" cy="584775"/>
           </a:xfrm>
           <a:prstGeom prst="rect">
@@ -3745,7 +3746,7 @@
         </p:nvSpPr>
         <p:spPr>
           <a:xfrm>
-            <a:off x="4340489" y="2790943"/>
+            <a:off x="4340489" y="2838078"/>
             <a:ext cx="894336" cy="584775"/>
           </a:xfrm>
           <a:prstGeom prst="rect">
@@ -4059,10 +4060,1818 @@
           </a:p>
         </p:txBody>
       </p:sp>
+      <p:sp>
+        <p:nvSpPr>
+          <p:cNvPr id="19" name="TextBox 18">
+            <a:extLst>
+              <a:ext uri="{FF2B5EF4-FFF2-40B4-BE49-F238E27FC236}">
+                <a16:creationId xmlns:a16="http://schemas.microsoft.com/office/drawing/2014/main" id="{AB61832B-E622-42C8-9D6B-A4555D244599}"/>
+              </a:ext>
+            </a:extLst>
+          </p:cNvPr>
+          <p:cNvSpPr txBox="1"/>
+          <p:nvPr/>
+        </p:nvSpPr>
+        <p:spPr>
+          <a:xfrm>
+            <a:off x="1286700" y="2457947"/>
+            <a:ext cx="703266" cy="584775"/>
+          </a:xfrm>
+          <a:prstGeom prst="rect">
+            <a:avLst/>
+          </a:prstGeom>
+          <a:noFill/>
+        </p:spPr>
+        <p:txBody>
+          <a:bodyPr wrap="square" rtlCol="0">
+            <a:spAutoFit/>
+          </a:bodyPr>
+          <a:lstStyle/>
+          <a:p>
+            <a:r>
+              <a:rPr lang="en-US" sz="3200" i="1" dirty="0"/>
+              <a:t>f</a:t>
+            </a:r>
+            <a:endParaRPr lang="en-US" sz="3200" i="1" baseline="-25000" dirty="0"/>
+          </a:p>
+        </p:txBody>
+      </p:sp>
+      <p:sp>
+        <p:nvSpPr>
+          <p:cNvPr id="20" name="TextBox 19">
+            <a:extLst>
+              <a:ext uri="{FF2B5EF4-FFF2-40B4-BE49-F238E27FC236}">
+                <a16:creationId xmlns:a16="http://schemas.microsoft.com/office/drawing/2014/main" id="{C3BBA264-0A22-4840-B81E-B13C296ED8F6}"/>
+              </a:ext>
+            </a:extLst>
+          </p:cNvPr>
+          <p:cNvSpPr txBox="1"/>
+          <p:nvPr/>
+        </p:nvSpPr>
+        <p:spPr>
+          <a:xfrm>
+            <a:off x="4396191" y="1344767"/>
+            <a:ext cx="703266" cy="584775"/>
+          </a:xfrm>
+          <a:prstGeom prst="rect">
+            <a:avLst/>
+          </a:prstGeom>
+          <a:noFill/>
+        </p:spPr>
+        <p:txBody>
+          <a:bodyPr wrap="square" rtlCol="0">
+            <a:spAutoFit/>
+          </a:bodyPr>
+          <a:lstStyle/>
+          <a:p>
+            <a:r>
+              <a:rPr lang="en-US" sz="3200" i="1" dirty="0"/>
+              <a:t>f</a:t>
+            </a:r>
+            <a:r>
+              <a:rPr lang="en-US" sz="3200" i="1" baseline="-25000" dirty="0"/>
+              <a:t>u</a:t>
+            </a:r>
+          </a:p>
+        </p:txBody>
+      </p:sp>
+      <p:sp>
+        <p:nvSpPr>
+          <p:cNvPr id="22" name="TextBox 21">
+            <a:extLst>
+              <a:ext uri="{FF2B5EF4-FFF2-40B4-BE49-F238E27FC236}">
+                <a16:creationId xmlns:a16="http://schemas.microsoft.com/office/drawing/2014/main" id="{A61CB3D9-2BD3-4624-84E5-3459F104A62A}"/>
+              </a:ext>
+            </a:extLst>
+          </p:cNvPr>
+          <p:cNvSpPr txBox="1"/>
+          <p:nvPr/>
+        </p:nvSpPr>
+        <p:spPr>
+          <a:xfrm>
+            <a:off x="4360099" y="3346111"/>
+            <a:ext cx="703266" cy="584775"/>
+          </a:xfrm>
+          <a:prstGeom prst="rect">
+            <a:avLst/>
+          </a:prstGeom>
+          <a:noFill/>
+        </p:spPr>
+        <p:txBody>
+          <a:bodyPr wrap="square" rtlCol="0">
+            <a:spAutoFit/>
+          </a:bodyPr>
+          <a:lstStyle/>
+          <a:p>
+            <a:r>
+              <a:rPr lang="en-US" sz="3200" i="1" dirty="0"/>
+              <a:t>f</a:t>
+            </a:r>
+            <a:r>
+              <a:rPr lang="en-US" sz="3200" i="1" baseline="-25000" dirty="0"/>
+              <a:t>d</a:t>
+            </a:r>
+          </a:p>
+        </p:txBody>
+      </p:sp>
     </p:spTree>
     <p:extLst>
       <p:ext uri="{BB962C8B-B14F-4D97-AF65-F5344CB8AC3E}">
         <p14:creationId xmlns:p14="http://schemas.microsoft.com/office/powerpoint/2010/main" val="3302960916"/>
+      </p:ext>
+    </p:extLst>
+  </p:cSld>
+  <p:clrMapOvr>
+    <a:masterClrMapping/>
+  </p:clrMapOvr>
+</p:sld>
+</file>
+
+<file path=ppt/slides/slide2.xml><?xml version="1.0" encoding="utf-8"?>
+<p:sld xmlns:a="http://schemas.openxmlformats.org/drawingml/2006/main" xmlns:r="http://schemas.openxmlformats.org/officeDocument/2006/relationships" xmlns:p="http://schemas.openxmlformats.org/presentationml/2006/main">
+  <p:cSld>
+    <p:spTree>
+      <p:nvGrpSpPr>
+        <p:cNvPr id="1" name=""/>
+        <p:cNvGrpSpPr/>
+        <p:nvPr/>
+      </p:nvGrpSpPr>
+      <p:grpSpPr>
+        <a:xfrm>
+          <a:off x="0" y="0"/>
+          <a:ext cx="0" cy="0"/>
+          <a:chOff x="0" y="0"/>
+          <a:chExt cx="0" cy="0"/>
+        </a:xfrm>
+      </p:grpSpPr>
+      <p:sp>
+        <p:nvSpPr>
+          <p:cNvPr id="29" name="Oval 28">
+            <a:extLst>
+              <a:ext uri="{FF2B5EF4-FFF2-40B4-BE49-F238E27FC236}">
+                <a16:creationId xmlns:a16="http://schemas.microsoft.com/office/drawing/2014/main" id="{DEF3BF9B-1E0C-4E74-BC38-2247721C774B}"/>
+              </a:ext>
+            </a:extLst>
+          </p:cNvPr>
+          <p:cNvSpPr/>
+          <p:nvPr/>
+        </p:nvSpPr>
+        <p:spPr>
+          <a:xfrm>
+            <a:off x="6868756" y="926789"/>
+            <a:ext cx="182880" cy="182880"/>
+          </a:xfrm>
+          <a:prstGeom prst="ellipse">
+            <a:avLst/>
+          </a:prstGeom>
+          <a:solidFill>
+            <a:srgbClr val="FF0000"/>
+          </a:solidFill>
+          <a:ln w="19050">
+            <a:solidFill>
+              <a:schemeClr val="tx1"/>
+            </a:solidFill>
+          </a:ln>
+        </p:spPr>
+        <p:style>
+          <a:lnRef idx="2">
+            <a:schemeClr val="accent1">
+              <a:shade val="50000"/>
+            </a:schemeClr>
+          </a:lnRef>
+          <a:fillRef idx="1">
+            <a:schemeClr val="accent1"/>
+          </a:fillRef>
+          <a:effectRef idx="0">
+            <a:schemeClr val="accent1"/>
+          </a:effectRef>
+          <a:fontRef idx="minor">
+            <a:schemeClr val="lt1"/>
+          </a:fontRef>
+        </p:style>
+        <p:txBody>
+          <a:bodyPr rtlCol="0" anchor="ctr"/>
+          <a:lstStyle/>
+          <a:p>
+            <a:pPr algn="ctr"/>
+            <a:endParaRPr lang="en-US"/>
+          </a:p>
+        </p:txBody>
+      </p:sp>
+      <p:sp>
+        <p:nvSpPr>
+          <p:cNvPr id="30" name="Oval 29">
+            <a:extLst>
+              <a:ext uri="{FF2B5EF4-FFF2-40B4-BE49-F238E27FC236}">
+                <a16:creationId xmlns:a16="http://schemas.microsoft.com/office/drawing/2014/main" id="{FB8EEC06-84EB-46C5-9659-FD3D740A95D0}"/>
+              </a:ext>
+            </a:extLst>
+          </p:cNvPr>
+          <p:cNvSpPr/>
+          <p:nvPr/>
+        </p:nvSpPr>
+        <p:spPr>
+          <a:xfrm>
+            <a:off x="6871868" y="2931865"/>
+            <a:ext cx="182880" cy="182880"/>
+          </a:xfrm>
+          <a:prstGeom prst="ellipse">
+            <a:avLst/>
+          </a:prstGeom>
+          <a:solidFill>
+            <a:srgbClr val="FF0000"/>
+          </a:solidFill>
+          <a:ln w="19050">
+            <a:solidFill>
+              <a:schemeClr val="tx1"/>
+            </a:solidFill>
+          </a:ln>
+        </p:spPr>
+        <p:style>
+          <a:lnRef idx="2">
+            <a:schemeClr val="accent1">
+              <a:shade val="50000"/>
+            </a:schemeClr>
+          </a:lnRef>
+          <a:fillRef idx="1">
+            <a:schemeClr val="accent1"/>
+          </a:fillRef>
+          <a:effectRef idx="0">
+            <a:schemeClr val="accent1"/>
+          </a:effectRef>
+          <a:fontRef idx="minor">
+            <a:schemeClr val="lt1"/>
+          </a:fontRef>
+        </p:style>
+        <p:txBody>
+          <a:bodyPr rtlCol="0" anchor="ctr"/>
+          <a:lstStyle/>
+          <a:p>
+            <a:pPr algn="ctr"/>
+            <a:endParaRPr lang="en-US"/>
+          </a:p>
+        </p:txBody>
+      </p:sp>
+      <p:cxnSp>
+        <p:nvCxnSpPr>
+          <p:cNvPr id="31" name="Straight Arrow Connector 30">
+            <a:extLst>
+              <a:ext uri="{FF2B5EF4-FFF2-40B4-BE49-F238E27FC236}">
+                <a16:creationId xmlns:a16="http://schemas.microsoft.com/office/drawing/2014/main" id="{4D1F27BA-99AF-432B-A37D-9E5D537A2F3C}"/>
+              </a:ext>
+            </a:extLst>
+          </p:cNvPr>
+          <p:cNvCxnSpPr/>
+          <p:nvPr/>
+        </p:nvCxnSpPr>
+        <p:spPr>
+          <a:xfrm flipV="1">
+            <a:off x="4774560" y="1044988"/>
+            <a:ext cx="2087809" cy="926192"/>
+          </a:xfrm>
+          <a:prstGeom prst="straightConnector1">
+            <a:avLst/>
+          </a:prstGeom>
+          <a:ln w="19050">
+            <a:solidFill>
+              <a:schemeClr val="tx1"/>
+            </a:solidFill>
+            <a:headEnd type="none"/>
+            <a:tailEnd type="stealth" w="lg" len="lg"/>
+          </a:ln>
+        </p:spPr>
+        <p:style>
+          <a:lnRef idx="1">
+            <a:schemeClr val="accent1"/>
+          </a:lnRef>
+          <a:fillRef idx="0">
+            <a:schemeClr val="accent1"/>
+          </a:fillRef>
+          <a:effectRef idx="0">
+            <a:schemeClr val="accent1"/>
+          </a:effectRef>
+          <a:fontRef idx="minor">
+            <a:schemeClr val="tx1"/>
+          </a:fontRef>
+        </p:style>
+      </p:cxnSp>
+      <p:cxnSp>
+        <p:nvCxnSpPr>
+          <p:cNvPr id="32" name="Straight Arrow Connector 31">
+            <a:extLst>
+              <a:ext uri="{FF2B5EF4-FFF2-40B4-BE49-F238E27FC236}">
+                <a16:creationId xmlns:a16="http://schemas.microsoft.com/office/drawing/2014/main" id="{AA7638EB-E0F3-4F60-8185-A5A8C1679512}"/>
+              </a:ext>
+            </a:extLst>
+          </p:cNvPr>
+          <p:cNvCxnSpPr>
+            <a:cxnSpLocks/>
+          </p:cNvCxnSpPr>
+          <p:nvPr/>
+        </p:nvCxnSpPr>
+        <p:spPr>
+          <a:xfrm>
+            <a:off x="4778750" y="2067506"/>
+            <a:ext cx="2087809" cy="926192"/>
+          </a:xfrm>
+          <a:prstGeom prst="straightConnector1">
+            <a:avLst/>
+          </a:prstGeom>
+          <a:ln w="19050">
+            <a:solidFill>
+              <a:schemeClr val="tx1"/>
+            </a:solidFill>
+            <a:headEnd type="none"/>
+            <a:tailEnd type="stealth" w="lg" len="lg"/>
+          </a:ln>
+        </p:spPr>
+        <p:style>
+          <a:lnRef idx="1">
+            <a:schemeClr val="accent1"/>
+          </a:lnRef>
+          <a:fillRef idx="0">
+            <a:schemeClr val="accent1"/>
+          </a:fillRef>
+          <a:effectRef idx="0">
+            <a:schemeClr val="accent1"/>
+          </a:effectRef>
+          <a:fontRef idx="minor">
+            <a:schemeClr val="tx1"/>
+          </a:fontRef>
+        </p:style>
+      </p:cxnSp>
+      <p:sp>
+        <p:nvSpPr>
+          <p:cNvPr id="4" name="Oval 3">
+            <a:extLst>
+              <a:ext uri="{FF2B5EF4-FFF2-40B4-BE49-F238E27FC236}">
+                <a16:creationId xmlns:a16="http://schemas.microsoft.com/office/drawing/2014/main" id="{26DCC042-A305-4636-848B-E860521205B4}"/>
+              </a:ext>
+            </a:extLst>
+          </p:cNvPr>
+          <p:cNvSpPr/>
+          <p:nvPr/>
+        </p:nvSpPr>
+        <p:spPr>
+          <a:xfrm>
+            <a:off x="2353088" y="2946779"/>
+            <a:ext cx="182880" cy="182880"/>
+          </a:xfrm>
+          <a:prstGeom prst="ellipse">
+            <a:avLst/>
+          </a:prstGeom>
+          <a:solidFill>
+            <a:srgbClr val="FF0000"/>
+          </a:solidFill>
+          <a:ln w="19050">
+            <a:solidFill>
+              <a:schemeClr val="tx1"/>
+            </a:solidFill>
+          </a:ln>
+        </p:spPr>
+        <p:style>
+          <a:lnRef idx="2">
+            <a:schemeClr val="accent1">
+              <a:shade val="50000"/>
+            </a:schemeClr>
+          </a:lnRef>
+          <a:fillRef idx="1">
+            <a:schemeClr val="accent1"/>
+          </a:fillRef>
+          <a:effectRef idx="0">
+            <a:schemeClr val="accent1"/>
+          </a:effectRef>
+          <a:fontRef idx="minor">
+            <a:schemeClr val="lt1"/>
+          </a:fontRef>
+        </p:style>
+        <p:txBody>
+          <a:bodyPr rtlCol="0" anchor="ctr"/>
+          <a:lstStyle/>
+          <a:p>
+            <a:pPr algn="ctr"/>
+            <a:r>
+              <a:rPr lang="en-US" dirty="0"/>
+              <a:t> </a:t>
+            </a:r>
+          </a:p>
+        </p:txBody>
+      </p:sp>
+      <p:sp>
+        <p:nvSpPr>
+          <p:cNvPr id="5" name="Oval 4">
+            <a:extLst>
+              <a:ext uri="{FF2B5EF4-FFF2-40B4-BE49-F238E27FC236}">
+                <a16:creationId xmlns:a16="http://schemas.microsoft.com/office/drawing/2014/main" id="{5B963A44-1212-4DA1-BAA9-60C5C6ACD120}"/>
+              </a:ext>
+            </a:extLst>
+          </p:cNvPr>
+          <p:cNvSpPr/>
+          <p:nvPr/>
+        </p:nvSpPr>
+        <p:spPr>
+          <a:xfrm>
+            <a:off x="4616734" y="1949110"/>
+            <a:ext cx="182880" cy="182880"/>
+          </a:xfrm>
+          <a:prstGeom prst="ellipse">
+            <a:avLst/>
+          </a:prstGeom>
+          <a:solidFill>
+            <a:srgbClr val="FF0000"/>
+          </a:solidFill>
+          <a:ln w="19050">
+            <a:solidFill>
+              <a:schemeClr val="tx1"/>
+            </a:solidFill>
+          </a:ln>
+        </p:spPr>
+        <p:style>
+          <a:lnRef idx="2">
+            <a:schemeClr val="accent1">
+              <a:shade val="50000"/>
+            </a:schemeClr>
+          </a:lnRef>
+          <a:fillRef idx="1">
+            <a:schemeClr val="accent1"/>
+          </a:fillRef>
+          <a:effectRef idx="0">
+            <a:schemeClr val="accent1"/>
+          </a:effectRef>
+          <a:fontRef idx="minor">
+            <a:schemeClr val="lt1"/>
+          </a:fontRef>
+        </p:style>
+        <p:txBody>
+          <a:bodyPr rtlCol="0" anchor="ctr"/>
+          <a:lstStyle/>
+          <a:p>
+            <a:pPr algn="ctr"/>
+            <a:endParaRPr lang="en-US"/>
+          </a:p>
+        </p:txBody>
+      </p:sp>
+      <p:sp>
+        <p:nvSpPr>
+          <p:cNvPr id="6" name="Oval 5">
+            <a:extLst>
+              <a:ext uri="{FF2B5EF4-FFF2-40B4-BE49-F238E27FC236}">
+                <a16:creationId xmlns:a16="http://schemas.microsoft.com/office/drawing/2014/main" id="{31B9E338-CD8D-4D22-84EE-0E20D9006755}"/>
+              </a:ext>
+            </a:extLst>
+          </p:cNvPr>
+          <p:cNvSpPr/>
+          <p:nvPr/>
+        </p:nvSpPr>
+        <p:spPr>
+          <a:xfrm>
+            <a:off x="4619846" y="3954186"/>
+            <a:ext cx="182880" cy="182880"/>
+          </a:xfrm>
+          <a:prstGeom prst="ellipse">
+            <a:avLst/>
+          </a:prstGeom>
+          <a:solidFill>
+            <a:srgbClr val="FF0000"/>
+          </a:solidFill>
+          <a:ln w="19050">
+            <a:solidFill>
+              <a:schemeClr val="tx1"/>
+            </a:solidFill>
+          </a:ln>
+        </p:spPr>
+        <p:style>
+          <a:lnRef idx="2">
+            <a:schemeClr val="accent1">
+              <a:shade val="50000"/>
+            </a:schemeClr>
+          </a:lnRef>
+          <a:fillRef idx="1">
+            <a:schemeClr val="accent1"/>
+          </a:fillRef>
+          <a:effectRef idx="0">
+            <a:schemeClr val="accent1"/>
+          </a:effectRef>
+          <a:fontRef idx="minor">
+            <a:schemeClr val="lt1"/>
+          </a:fontRef>
+        </p:style>
+        <p:txBody>
+          <a:bodyPr rtlCol="0" anchor="ctr"/>
+          <a:lstStyle/>
+          <a:p>
+            <a:pPr algn="ctr"/>
+            <a:endParaRPr lang="en-US"/>
+          </a:p>
+        </p:txBody>
+      </p:sp>
+      <p:cxnSp>
+        <p:nvCxnSpPr>
+          <p:cNvPr id="8" name="Straight Arrow Connector 7">
+            <a:extLst>
+              <a:ext uri="{FF2B5EF4-FFF2-40B4-BE49-F238E27FC236}">
+                <a16:creationId xmlns:a16="http://schemas.microsoft.com/office/drawing/2014/main" id="{5AF06C3D-F1E2-4D94-B80C-95EF03716846}"/>
+              </a:ext>
+            </a:extLst>
+          </p:cNvPr>
+          <p:cNvCxnSpPr/>
+          <p:nvPr/>
+        </p:nvCxnSpPr>
+        <p:spPr>
+          <a:xfrm flipV="1">
+            <a:off x="2522538" y="2067309"/>
+            <a:ext cx="2087809" cy="926192"/>
+          </a:xfrm>
+          <a:prstGeom prst="straightConnector1">
+            <a:avLst/>
+          </a:prstGeom>
+          <a:ln w="19050">
+            <a:solidFill>
+              <a:schemeClr val="tx1"/>
+            </a:solidFill>
+            <a:headEnd type="none"/>
+            <a:tailEnd type="stealth" w="lg" len="lg"/>
+          </a:ln>
+        </p:spPr>
+        <p:style>
+          <a:lnRef idx="1">
+            <a:schemeClr val="accent1"/>
+          </a:lnRef>
+          <a:fillRef idx="0">
+            <a:schemeClr val="accent1"/>
+          </a:fillRef>
+          <a:effectRef idx="0">
+            <a:schemeClr val="accent1"/>
+          </a:effectRef>
+          <a:fontRef idx="minor">
+            <a:schemeClr val="tx1"/>
+          </a:fontRef>
+        </p:style>
+      </p:cxnSp>
+      <p:cxnSp>
+        <p:nvCxnSpPr>
+          <p:cNvPr id="9" name="Straight Arrow Connector 8">
+            <a:extLst>
+              <a:ext uri="{FF2B5EF4-FFF2-40B4-BE49-F238E27FC236}">
+                <a16:creationId xmlns:a16="http://schemas.microsoft.com/office/drawing/2014/main" id="{CBECB769-6FE1-42B6-A7FC-4BEB19CA4BAC}"/>
+              </a:ext>
+            </a:extLst>
+          </p:cNvPr>
+          <p:cNvCxnSpPr>
+            <a:cxnSpLocks/>
+          </p:cNvCxnSpPr>
+          <p:nvPr/>
+        </p:nvCxnSpPr>
+        <p:spPr>
+          <a:xfrm>
+            <a:off x="2526728" y="3089827"/>
+            <a:ext cx="2087809" cy="926192"/>
+          </a:xfrm>
+          <a:prstGeom prst="straightConnector1">
+            <a:avLst/>
+          </a:prstGeom>
+          <a:ln w="19050">
+            <a:solidFill>
+              <a:schemeClr val="tx1"/>
+            </a:solidFill>
+            <a:headEnd type="none"/>
+            <a:tailEnd type="stealth" w="lg" len="lg"/>
+          </a:ln>
+        </p:spPr>
+        <p:style>
+          <a:lnRef idx="1">
+            <a:schemeClr val="accent1"/>
+          </a:lnRef>
+          <a:fillRef idx="0">
+            <a:schemeClr val="accent1"/>
+          </a:fillRef>
+          <a:effectRef idx="0">
+            <a:schemeClr val="accent1"/>
+          </a:effectRef>
+          <a:fontRef idx="minor">
+            <a:schemeClr val="tx1"/>
+          </a:fontRef>
+        </p:style>
+      </p:cxnSp>
+      <p:sp>
+        <p:nvSpPr>
+          <p:cNvPr id="10" name="TextBox 9">
+            <a:extLst>
+              <a:ext uri="{FF2B5EF4-FFF2-40B4-BE49-F238E27FC236}">
+                <a16:creationId xmlns:a16="http://schemas.microsoft.com/office/drawing/2014/main" id="{2B83E3E5-F830-4F84-BB4E-F3B9D410E086}"/>
+              </a:ext>
+            </a:extLst>
+          </p:cNvPr>
+          <p:cNvSpPr txBox="1"/>
+          <p:nvPr/>
+        </p:nvSpPr>
+        <p:spPr>
+          <a:xfrm>
+            <a:off x="3382786" y="1977740"/>
+            <a:ext cx="462709" cy="523220"/>
+          </a:xfrm>
+          <a:prstGeom prst="rect">
+            <a:avLst/>
+          </a:prstGeom>
+          <a:noFill/>
+        </p:spPr>
+        <p:txBody>
+          <a:bodyPr wrap="square" rtlCol="0">
+            <a:spAutoFit/>
+          </a:bodyPr>
+          <a:lstStyle/>
+          <a:p>
+            <a:r>
+              <a:rPr lang="en-US" sz="2800" i="1" dirty="0"/>
+              <a:t>p</a:t>
+            </a:r>
+          </a:p>
+        </p:txBody>
+      </p:sp>
+      <p:sp>
+        <p:nvSpPr>
+          <p:cNvPr id="11" name="TextBox 10">
+            <a:extLst>
+              <a:ext uri="{FF2B5EF4-FFF2-40B4-BE49-F238E27FC236}">
+                <a16:creationId xmlns:a16="http://schemas.microsoft.com/office/drawing/2014/main" id="{AE8592DA-879C-438B-A610-3803C46291D1}"/>
+              </a:ext>
+            </a:extLst>
+          </p:cNvPr>
+          <p:cNvSpPr txBox="1"/>
+          <p:nvPr/>
+        </p:nvSpPr>
+        <p:spPr>
+          <a:xfrm>
+            <a:off x="3335087" y="3015967"/>
+            <a:ext cx="1050293" cy="523220"/>
+          </a:xfrm>
+          <a:prstGeom prst="rect">
+            <a:avLst/>
+          </a:prstGeom>
+          <a:noFill/>
+        </p:spPr>
+        <p:txBody>
+          <a:bodyPr wrap="square" rtlCol="0">
+            <a:spAutoFit/>
+          </a:bodyPr>
+          <a:lstStyle/>
+          <a:p>
+            <a:r>
+              <a:rPr lang="en-US" sz="2800" dirty="0"/>
+              <a:t>1 −</a:t>
+            </a:r>
+            <a:r>
+              <a:rPr lang="en-US" sz="2800" i="1" dirty="0"/>
+              <a:t> p</a:t>
+            </a:r>
+          </a:p>
+        </p:txBody>
+      </p:sp>
+      <p:sp>
+        <p:nvSpPr>
+          <p:cNvPr id="12" name="TextBox 11">
+            <a:extLst>
+              <a:ext uri="{FF2B5EF4-FFF2-40B4-BE49-F238E27FC236}">
+                <a16:creationId xmlns:a16="http://schemas.microsoft.com/office/drawing/2014/main" id="{69DCA2B6-52F4-4BB3-AC0A-1329552CA5CD}"/>
+              </a:ext>
+            </a:extLst>
+          </p:cNvPr>
+          <p:cNvSpPr txBox="1"/>
+          <p:nvPr/>
+        </p:nvSpPr>
+        <p:spPr>
+          <a:xfrm>
+            <a:off x="1816618" y="2451558"/>
+            <a:ext cx="703266" cy="523220"/>
+          </a:xfrm>
+          <a:prstGeom prst="rect">
+            <a:avLst/>
+          </a:prstGeom>
+          <a:noFill/>
+        </p:spPr>
+        <p:txBody>
+          <a:bodyPr wrap="square" rtlCol="0">
+            <a:spAutoFit/>
+          </a:bodyPr>
+          <a:lstStyle/>
+          <a:p>
+            <a:r>
+              <a:rPr lang="en-US" sz="2800" i="1" dirty="0"/>
+              <a:t>S</a:t>
+            </a:r>
+            <a:r>
+              <a:rPr lang="en-US" sz="2800" i="1" baseline="-25000" dirty="0"/>
+              <a:t>0</a:t>
+            </a:r>
+          </a:p>
+        </p:txBody>
+      </p:sp>
+      <p:sp>
+        <p:nvSpPr>
+          <p:cNvPr id="13" name="TextBox 12">
+            <a:extLst>
+              <a:ext uri="{FF2B5EF4-FFF2-40B4-BE49-F238E27FC236}">
+                <a16:creationId xmlns:a16="http://schemas.microsoft.com/office/drawing/2014/main" id="{D6E0DE43-25DE-4766-8D1F-18C60F12911E}"/>
+              </a:ext>
+            </a:extLst>
+          </p:cNvPr>
+          <p:cNvSpPr txBox="1"/>
+          <p:nvPr/>
+        </p:nvSpPr>
+        <p:spPr>
+          <a:xfrm>
+            <a:off x="4064907" y="1096316"/>
+            <a:ext cx="894336" cy="523220"/>
+          </a:xfrm>
+          <a:prstGeom prst="rect">
+            <a:avLst/>
+          </a:prstGeom>
+          <a:noFill/>
+        </p:spPr>
+        <p:txBody>
+          <a:bodyPr wrap="square" rtlCol="0">
+            <a:spAutoFit/>
+          </a:bodyPr>
+          <a:lstStyle/>
+          <a:p>
+            <a:r>
+              <a:rPr lang="en-US" sz="2800" i="1" dirty="0"/>
+              <a:t>u S</a:t>
+            </a:r>
+            <a:r>
+              <a:rPr lang="en-US" sz="2800" i="1" baseline="-25000" dirty="0"/>
+              <a:t>0</a:t>
+            </a:r>
+          </a:p>
+        </p:txBody>
+      </p:sp>
+      <p:sp>
+        <p:nvSpPr>
+          <p:cNvPr id="14" name="TextBox 13">
+            <a:extLst>
+              <a:ext uri="{FF2B5EF4-FFF2-40B4-BE49-F238E27FC236}">
+                <a16:creationId xmlns:a16="http://schemas.microsoft.com/office/drawing/2014/main" id="{A916305F-C31C-4F03-A299-4D6DDE322FD5}"/>
+              </a:ext>
+            </a:extLst>
+          </p:cNvPr>
+          <p:cNvSpPr txBox="1"/>
+          <p:nvPr/>
+        </p:nvSpPr>
+        <p:spPr>
+          <a:xfrm>
+            <a:off x="4174405" y="4175870"/>
+            <a:ext cx="894336" cy="523220"/>
+          </a:xfrm>
+          <a:prstGeom prst="rect">
+            <a:avLst/>
+          </a:prstGeom>
+          <a:noFill/>
+        </p:spPr>
+        <p:txBody>
+          <a:bodyPr wrap="square" rtlCol="0">
+            <a:spAutoFit/>
+          </a:bodyPr>
+          <a:lstStyle/>
+          <a:p>
+            <a:r>
+              <a:rPr lang="en-US" sz="2800" i="1" dirty="0"/>
+              <a:t>d S</a:t>
+            </a:r>
+            <a:r>
+              <a:rPr lang="en-US" sz="2800" i="1" baseline="-25000" dirty="0"/>
+              <a:t>0</a:t>
+            </a:r>
+          </a:p>
+        </p:txBody>
+      </p:sp>
+      <p:cxnSp>
+        <p:nvCxnSpPr>
+          <p:cNvPr id="15" name="Straight Arrow Connector 14">
+            <a:extLst>
+              <a:ext uri="{FF2B5EF4-FFF2-40B4-BE49-F238E27FC236}">
+                <a16:creationId xmlns:a16="http://schemas.microsoft.com/office/drawing/2014/main" id="{AD981B75-5837-4F9B-8688-108E3B5FD4D1}"/>
+              </a:ext>
+            </a:extLst>
+          </p:cNvPr>
+          <p:cNvCxnSpPr>
+            <a:cxnSpLocks/>
+          </p:cNvCxnSpPr>
+          <p:nvPr/>
+        </p:nvCxnSpPr>
+        <p:spPr>
+          <a:xfrm>
+            <a:off x="1512141" y="5792572"/>
+            <a:ext cx="6766560" cy="0"/>
+          </a:xfrm>
+          <a:prstGeom prst="straightConnector1">
+            <a:avLst/>
+          </a:prstGeom>
+          <a:ln w="19050">
+            <a:solidFill>
+              <a:schemeClr val="tx1"/>
+            </a:solidFill>
+            <a:prstDash val="solid"/>
+            <a:headEnd type="none"/>
+            <a:tailEnd type="stealth" w="lg" len="lg"/>
+          </a:ln>
+        </p:spPr>
+        <p:style>
+          <a:lnRef idx="1">
+            <a:schemeClr val="accent1"/>
+          </a:lnRef>
+          <a:fillRef idx="0">
+            <a:schemeClr val="accent1"/>
+          </a:fillRef>
+          <a:effectRef idx="0">
+            <a:schemeClr val="accent1"/>
+          </a:effectRef>
+          <a:fontRef idx="minor">
+            <a:schemeClr val="tx1"/>
+          </a:fontRef>
+        </p:style>
+      </p:cxnSp>
+      <p:cxnSp>
+        <p:nvCxnSpPr>
+          <p:cNvPr id="18" name="Straight Arrow Connector 17">
+            <a:extLst>
+              <a:ext uri="{FF2B5EF4-FFF2-40B4-BE49-F238E27FC236}">
+                <a16:creationId xmlns:a16="http://schemas.microsoft.com/office/drawing/2014/main" id="{E0158F23-E0AA-4CB1-BC65-ADE8F238313D}"/>
+              </a:ext>
+            </a:extLst>
+          </p:cNvPr>
+          <p:cNvCxnSpPr>
+            <a:cxnSpLocks/>
+          </p:cNvCxnSpPr>
+          <p:nvPr/>
+        </p:nvCxnSpPr>
+        <p:spPr>
+          <a:xfrm>
+            <a:off x="2455478" y="5712146"/>
+            <a:ext cx="0" cy="163430"/>
+          </a:xfrm>
+          <a:prstGeom prst="straightConnector1">
+            <a:avLst/>
+          </a:prstGeom>
+          <a:ln w="19050">
+            <a:solidFill>
+              <a:schemeClr val="tx1"/>
+            </a:solidFill>
+            <a:headEnd type="none"/>
+            <a:tailEnd type="none" w="lg" len="lg"/>
+          </a:ln>
+        </p:spPr>
+        <p:style>
+          <a:lnRef idx="1">
+            <a:schemeClr val="accent1"/>
+          </a:lnRef>
+          <a:fillRef idx="0">
+            <a:schemeClr val="accent1"/>
+          </a:fillRef>
+          <a:effectRef idx="0">
+            <a:schemeClr val="accent1"/>
+          </a:effectRef>
+          <a:fontRef idx="minor">
+            <a:schemeClr val="tx1"/>
+          </a:fontRef>
+        </p:style>
+      </p:cxnSp>
+      <p:cxnSp>
+        <p:nvCxnSpPr>
+          <p:cNvPr id="21" name="Straight Arrow Connector 20">
+            <a:extLst>
+              <a:ext uri="{FF2B5EF4-FFF2-40B4-BE49-F238E27FC236}">
+                <a16:creationId xmlns:a16="http://schemas.microsoft.com/office/drawing/2014/main" id="{CD00731D-758B-4644-BED7-984A84B92606}"/>
+              </a:ext>
+            </a:extLst>
+          </p:cNvPr>
+          <p:cNvCxnSpPr>
+            <a:cxnSpLocks/>
+          </p:cNvCxnSpPr>
+          <p:nvPr/>
+        </p:nvCxnSpPr>
+        <p:spPr>
+          <a:xfrm>
+            <a:off x="4709639" y="5710857"/>
+            <a:ext cx="0" cy="163430"/>
+          </a:xfrm>
+          <a:prstGeom prst="straightConnector1">
+            <a:avLst/>
+          </a:prstGeom>
+          <a:ln w="19050">
+            <a:solidFill>
+              <a:schemeClr val="tx1"/>
+            </a:solidFill>
+            <a:headEnd type="none"/>
+            <a:tailEnd type="none" w="lg" len="lg"/>
+          </a:ln>
+        </p:spPr>
+        <p:style>
+          <a:lnRef idx="1">
+            <a:schemeClr val="accent1"/>
+          </a:lnRef>
+          <a:fillRef idx="0">
+            <a:schemeClr val="accent1"/>
+          </a:fillRef>
+          <a:effectRef idx="0">
+            <a:schemeClr val="accent1"/>
+          </a:effectRef>
+          <a:fontRef idx="minor">
+            <a:schemeClr val="tx1"/>
+          </a:fontRef>
+        </p:style>
+      </p:cxnSp>
+      <p:sp>
+        <p:nvSpPr>
+          <p:cNvPr id="23" name="TextBox 22">
+            <a:extLst>
+              <a:ext uri="{FF2B5EF4-FFF2-40B4-BE49-F238E27FC236}">
+                <a16:creationId xmlns:a16="http://schemas.microsoft.com/office/drawing/2014/main" id="{167C3F28-D31A-4453-9BAE-C7BBFB7D9BFB}"/>
+              </a:ext>
+            </a:extLst>
+          </p:cNvPr>
+          <p:cNvSpPr txBox="1"/>
+          <p:nvPr/>
+        </p:nvSpPr>
+        <p:spPr>
+          <a:xfrm>
+            <a:off x="1939366" y="5893209"/>
+            <a:ext cx="1010324" cy="584775"/>
+          </a:xfrm>
+          <a:prstGeom prst="rect">
+            <a:avLst/>
+          </a:prstGeom>
+          <a:noFill/>
+        </p:spPr>
+        <p:txBody>
+          <a:bodyPr wrap="square" rtlCol="0">
+            <a:spAutoFit/>
+          </a:bodyPr>
+          <a:lstStyle/>
+          <a:p>
+            <a:pPr algn="ctr"/>
+            <a:r>
+              <a:rPr lang="en-US" sz="3200" i="1" dirty="0"/>
+              <a:t>t = 0</a:t>
+            </a:r>
+          </a:p>
+        </p:txBody>
+      </p:sp>
+      <p:sp>
+        <p:nvSpPr>
+          <p:cNvPr id="24" name="TextBox 23">
+            <a:extLst>
+              <a:ext uri="{FF2B5EF4-FFF2-40B4-BE49-F238E27FC236}">
+                <a16:creationId xmlns:a16="http://schemas.microsoft.com/office/drawing/2014/main" id="{2A68E3AE-C810-4D1B-9C33-09C763706D19}"/>
+              </a:ext>
+            </a:extLst>
+          </p:cNvPr>
+          <p:cNvSpPr txBox="1"/>
+          <p:nvPr/>
+        </p:nvSpPr>
+        <p:spPr>
+          <a:xfrm>
+            <a:off x="4203012" y="5893208"/>
+            <a:ext cx="1010324" cy="584775"/>
+          </a:xfrm>
+          <a:prstGeom prst="rect">
+            <a:avLst/>
+          </a:prstGeom>
+          <a:noFill/>
+        </p:spPr>
+        <p:txBody>
+          <a:bodyPr wrap="square" rtlCol="0">
+            <a:spAutoFit/>
+          </a:bodyPr>
+          <a:lstStyle/>
+          <a:p>
+            <a:pPr algn="ctr"/>
+            <a:r>
+              <a:rPr lang="en-US" sz="3200" i="1" dirty="0"/>
+              <a:t>T / 2</a:t>
+            </a:r>
+          </a:p>
+        </p:txBody>
+      </p:sp>
+      <p:cxnSp>
+        <p:nvCxnSpPr>
+          <p:cNvPr id="25" name="Straight Arrow Connector 24">
+            <a:extLst>
+              <a:ext uri="{FF2B5EF4-FFF2-40B4-BE49-F238E27FC236}">
+                <a16:creationId xmlns:a16="http://schemas.microsoft.com/office/drawing/2014/main" id="{031A609E-1C85-4C8F-89AA-71C8AC4C0308}"/>
+              </a:ext>
+            </a:extLst>
+          </p:cNvPr>
+          <p:cNvCxnSpPr>
+            <a:cxnSpLocks/>
+          </p:cNvCxnSpPr>
+          <p:nvPr/>
+        </p:nvCxnSpPr>
+        <p:spPr>
+          <a:xfrm flipH="1" flipV="1">
+            <a:off x="1516389" y="756082"/>
+            <a:ext cx="0" cy="5029200"/>
+          </a:xfrm>
+          <a:prstGeom prst="straightConnector1">
+            <a:avLst/>
+          </a:prstGeom>
+          <a:ln w="19050">
+            <a:solidFill>
+              <a:schemeClr val="tx1"/>
+            </a:solidFill>
+            <a:prstDash val="solid"/>
+            <a:headEnd type="none"/>
+            <a:tailEnd type="stealth" w="lg" len="lg"/>
+          </a:ln>
+        </p:spPr>
+        <p:style>
+          <a:lnRef idx="1">
+            <a:schemeClr val="accent1"/>
+          </a:lnRef>
+          <a:fillRef idx="0">
+            <a:schemeClr val="accent1"/>
+          </a:fillRef>
+          <a:effectRef idx="0">
+            <a:schemeClr val="accent1"/>
+          </a:effectRef>
+          <a:fontRef idx="minor">
+            <a:schemeClr val="tx1"/>
+          </a:fontRef>
+        </p:style>
+      </p:cxnSp>
+      <p:sp>
+        <p:nvSpPr>
+          <p:cNvPr id="28" name="TextBox 27">
+            <a:extLst>
+              <a:ext uri="{FF2B5EF4-FFF2-40B4-BE49-F238E27FC236}">
+                <a16:creationId xmlns:a16="http://schemas.microsoft.com/office/drawing/2014/main" id="{D89A6F3F-9209-4B4D-8169-EADE784BDC67}"/>
+              </a:ext>
+            </a:extLst>
+          </p:cNvPr>
+          <p:cNvSpPr txBox="1"/>
+          <p:nvPr/>
+        </p:nvSpPr>
+        <p:spPr>
+          <a:xfrm>
+            <a:off x="930359" y="534147"/>
+            <a:ext cx="462708" cy="584775"/>
+          </a:xfrm>
+          <a:prstGeom prst="rect">
+            <a:avLst/>
+          </a:prstGeom>
+          <a:noFill/>
+        </p:spPr>
+        <p:txBody>
+          <a:bodyPr wrap="square" rtlCol="0">
+            <a:spAutoFit/>
+          </a:bodyPr>
+          <a:lstStyle/>
+          <a:p>
+            <a:r>
+              <a:rPr lang="en-US" sz="3200" i="1" dirty="0"/>
+              <a:t>S</a:t>
+            </a:r>
+          </a:p>
+        </p:txBody>
+      </p:sp>
+      <p:cxnSp>
+        <p:nvCxnSpPr>
+          <p:cNvPr id="20" name="Straight Arrow Connector 19">
+            <a:extLst>
+              <a:ext uri="{FF2B5EF4-FFF2-40B4-BE49-F238E27FC236}">
+                <a16:creationId xmlns:a16="http://schemas.microsoft.com/office/drawing/2014/main" id="{506BE813-689C-49FE-A5A2-800D9F510320}"/>
+              </a:ext>
+            </a:extLst>
+          </p:cNvPr>
+          <p:cNvCxnSpPr>
+            <a:cxnSpLocks/>
+          </p:cNvCxnSpPr>
+          <p:nvPr/>
+        </p:nvCxnSpPr>
+        <p:spPr>
+          <a:xfrm>
+            <a:off x="6964211" y="5703003"/>
+            <a:ext cx="0" cy="163430"/>
+          </a:xfrm>
+          <a:prstGeom prst="straightConnector1">
+            <a:avLst/>
+          </a:prstGeom>
+          <a:ln w="19050">
+            <a:solidFill>
+              <a:schemeClr val="tx1"/>
+            </a:solidFill>
+            <a:headEnd type="none"/>
+            <a:tailEnd type="none" w="lg" len="lg"/>
+          </a:ln>
+        </p:spPr>
+        <p:style>
+          <a:lnRef idx="1">
+            <a:schemeClr val="accent1"/>
+          </a:lnRef>
+          <a:fillRef idx="0">
+            <a:schemeClr val="accent1"/>
+          </a:fillRef>
+          <a:effectRef idx="0">
+            <a:schemeClr val="accent1"/>
+          </a:effectRef>
+          <a:fontRef idx="minor">
+            <a:schemeClr val="tx1"/>
+          </a:fontRef>
+        </p:style>
+      </p:cxnSp>
+      <p:sp>
+        <p:nvSpPr>
+          <p:cNvPr id="22" name="TextBox 21">
+            <a:extLst>
+              <a:ext uri="{FF2B5EF4-FFF2-40B4-BE49-F238E27FC236}">
+                <a16:creationId xmlns:a16="http://schemas.microsoft.com/office/drawing/2014/main" id="{CCAEA407-5531-4C13-B9D4-7A65974C4191}"/>
+              </a:ext>
+            </a:extLst>
+          </p:cNvPr>
+          <p:cNvSpPr txBox="1"/>
+          <p:nvPr/>
+        </p:nvSpPr>
+        <p:spPr>
+          <a:xfrm>
+            <a:off x="6459049" y="5882142"/>
+            <a:ext cx="1010324" cy="584775"/>
+          </a:xfrm>
+          <a:prstGeom prst="rect">
+            <a:avLst/>
+          </a:prstGeom>
+          <a:noFill/>
+        </p:spPr>
+        <p:txBody>
+          <a:bodyPr wrap="square" rtlCol="0">
+            <a:spAutoFit/>
+          </a:bodyPr>
+          <a:lstStyle/>
+          <a:p>
+            <a:pPr algn="ctr"/>
+            <a:r>
+              <a:rPr lang="en-US" sz="3200" i="1" dirty="0"/>
+              <a:t>T</a:t>
+            </a:r>
+          </a:p>
+        </p:txBody>
+      </p:sp>
+      <p:sp>
+        <p:nvSpPr>
+          <p:cNvPr id="34" name="Oval 33">
+            <a:extLst>
+              <a:ext uri="{FF2B5EF4-FFF2-40B4-BE49-F238E27FC236}">
+                <a16:creationId xmlns:a16="http://schemas.microsoft.com/office/drawing/2014/main" id="{9BC27C14-9A57-4744-A04E-7B5E0E7B5DB5}"/>
+              </a:ext>
+            </a:extLst>
+          </p:cNvPr>
+          <p:cNvSpPr/>
+          <p:nvPr/>
+        </p:nvSpPr>
+        <p:spPr>
+          <a:xfrm>
+            <a:off x="6896922" y="4949043"/>
+            <a:ext cx="182880" cy="182880"/>
+          </a:xfrm>
+          <a:prstGeom prst="ellipse">
+            <a:avLst/>
+          </a:prstGeom>
+          <a:solidFill>
+            <a:srgbClr val="FF0000"/>
+          </a:solidFill>
+          <a:ln w="19050">
+            <a:solidFill>
+              <a:schemeClr val="tx1"/>
+            </a:solidFill>
+          </a:ln>
+        </p:spPr>
+        <p:style>
+          <a:lnRef idx="2">
+            <a:schemeClr val="accent1">
+              <a:shade val="50000"/>
+            </a:schemeClr>
+          </a:lnRef>
+          <a:fillRef idx="1">
+            <a:schemeClr val="accent1"/>
+          </a:fillRef>
+          <a:effectRef idx="0">
+            <a:schemeClr val="accent1"/>
+          </a:effectRef>
+          <a:fontRef idx="minor">
+            <a:schemeClr val="lt1"/>
+          </a:fontRef>
+        </p:style>
+        <p:txBody>
+          <a:bodyPr rtlCol="0" anchor="ctr"/>
+          <a:lstStyle/>
+          <a:p>
+            <a:pPr algn="ctr"/>
+            <a:endParaRPr lang="en-US"/>
+          </a:p>
+        </p:txBody>
+      </p:sp>
+      <p:cxnSp>
+        <p:nvCxnSpPr>
+          <p:cNvPr id="35" name="Straight Arrow Connector 34">
+            <a:extLst>
+              <a:ext uri="{FF2B5EF4-FFF2-40B4-BE49-F238E27FC236}">
+                <a16:creationId xmlns:a16="http://schemas.microsoft.com/office/drawing/2014/main" id="{68D73023-C850-45EB-ABEA-16442D268BD1}"/>
+              </a:ext>
+            </a:extLst>
+          </p:cNvPr>
+          <p:cNvCxnSpPr/>
+          <p:nvPr/>
+        </p:nvCxnSpPr>
+        <p:spPr>
+          <a:xfrm flipV="1">
+            <a:off x="4790187" y="3062166"/>
+            <a:ext cx="2087809" cy="926192"/>
+          </a:xfrm>
+          <a:prstGeom prst="straightConnector1">
+            <a:avLst/>
+          </a:prstGeom>
+          <a:ln w="19050">
+            <a:solidFill>
+              <a:schemeClr val="tx1"/>
+            </a:solidFill>
+            <a:headEnd type="none"/>
+            <a:tailEnd type="stealth" w="lg" len="lg"/>
+          </a:ln>
+        </p:spPr>
+        <p:style>
+          <a:lnRef idx="1">
+            <a:schemeClr val="accent1"/>
+          </a:lnRef>
+          <a:fillRef idx="0">
+            <a:schemeClr val="accent1"/>
+          </a:fillRef>
+          <a:effectRef idx="0">
+            <a:schemeClr val="accent1"/>
+          </a:effectRef>
+          <a:fontRef idx="minor">
+            <a:schemeClr val="tx1"/>
+          </a:fontRef>
+        </p:style>
+      </p:cxnSp>
+      <p:cxnSp>
+        <p:nvCxnSpPr>
+          <p:cNvPr id="36" name="Straight Arrow Connector 35">
+            <a:extLst>
+              <a:ext uri="{FF2B5EF4-FFF2-40B4-BE49-F238E27FC236}">
+                <a16:creationId xmlns:a16="http://schemas.microsoft.com/office/drawing/2014/main" id="{BFACD10E-652F-4E61-8883-E947C66E689A}"/>
+              </a:ext>
+            </a:extLst>
+          </p:cNvPr>
+          <p:cNvCxnSpPr>
+            <a:cxnSpLocks/>
+          </p:cNvCxnSpPr>
+          <p:nvPr/>
+        </p:nvCxnSpPr>
+        <p:spPr>
+          <a:xfrm>
+            <a:off x="4803804" y="4084684"/>
+            <a:ext cx="2087809" cy="926192"/>
+          </a:xfrm>
+          <a:prstGeom prst="straightConnector1">
+            <a:avLst/>
+          </a:prstGeom>
+          <a:ln w="19050">
+            <a:solidFill>
+              <a:schemeClr val="tx1"/>
+            </a:solidFill>
+            <a:headEnd type="none"/>
+            <a:tailEnd type="stealth" w="lg" len="lg"/>
+          </a:ln>
+        </p:spPr>
+        <p:style>
+          <a:lnRef idx="1">
+            <a:schemeClr val="accent1"/>
+          </a:lnRef>
+          <a:fillRef idx="0">
+            <a:schemeClr val="accent1"/>
+          </a:fillRef>
+          <a:effectRef idx="0">
+            <a:schemeClr val="accent1"/>
+          </a:effectRef>
+          <a:fontRef idx="minor">
+            <a:schemeClr val="tx1"/>
+          </a:fontRef>
+        </p:style>
+      </p:cxnSp>
+      <p:sp>
+        <p:nvSpPr>
+          <p:cNvPr id="37" name="TextBox 36">
+            <a:extLst>
+              <a:ext uri="{FF2B5EF4-FFF2-40B4-BE49-F238E27FC236}">
+                <a16:creationId xmlns:a16="http://schemas.microsoft.com/office/drawing/2014/main" id="{A8BF88D5-71BB-4FF6-BE89-992DF81722CD}"/>
+              </a:ext>
+            </a:extLst>
+          </p:cNvPr>
+          <p:cNvSpPr txBox="1"/>
+          <p:nvPr/>
+        </p:nvSpPr>
+        <p:spPr>
+          <a:xfrm>
+            <a:off x="7088855" y="531768"/>
+            <a:ext cx="1140739" cy="523220"/>
+          </a:xfrm>
+          <a:prstGeom prst="rect">
+            <a:avLst/>
+          </a:prstGeom>
+          <a:noFill/>
+        </p:spPr>
+        <p:txBody>
+          <a:bodyPr wrap="square" rtlCol="0">
+            <a:spAutoFit/>
+          </a:bodyPr>
+          <a:lstStyle/>
+          <a:p>
+            <a:r>
+              <a:rPr lang="en-US" sz="2800" i="1" dirty="0"/>
+              <a:t>u</a:t>
+            </a:r>
+            <a:r>
+              <a:rPr lang="en-US" sz="2800" i="1" baseline="30000" dirty="0"/>
+              <a:t>2</a:t>
+            </a:r>
+            <a:r>
+              <a:rPr lang="en-US" sz="2800" i="1" dirty="0"/>
+              <a:t> S</a:t>
+            </a:r>
+            <a:r>
+              <a:rPr lang="en-US" sz="2800" i="1" baseline="-25000" dirty="0"/>
+              <a:t>0</a:t>
+            </a:r>
+          </a:p>
+        </p:txBody>
+      </p:sp>
+      <p:sp>
+        <p:nvSpPr>
+          <p:cNvPr id="38" name="TextBox 37">
+            <a:extLst>
+              <a:ext uri="{FF2B5EF4-FFF2-40B4-BE49-F238E27FC236}">
+                <a16:creationId xmlns:a16="http://schemas.microsoft.com/office/drawing/2014/main" id="{529AC212-8987-49B4-BF4E-97B6D57F9A83}"/>
+              </a:ext>
+            </a:extLst>
+          </p:cNvPr>
+          <p:cNvSpPr txBox="1"/>
+          <p:nvPr/>
+        </p:nvSpPr>
+        <p:spPr>
+          <a:xfrm>
+            <a:off x="7088854" y="2503559"/>
+            <a:ext cx="1140739" cy="523220"/>
+          </a:xfrm>
+          <a:prstGeom prst="rect">
+            <a:avLst/>
+          </a:prstGeom>
+          <a:noFill/>
+        </p:spPr>
+        <p:txBody>
+          <a:bodyPr wrap="square" rtlCol="0">
+            <a:spAutoFit/>
+          </a:bodyPr>
+          <a:lstStyle/>
+          <a:p>
+            <a:r>
+              <a:rPr lang="en-US" sz="2800" i="1" dirty="0"/>
+              <a:t>u d S</a:t>
+            </a:r>
+            <a:r>
+              <a:rPr lang="en-US" sz="2800" i="1" baseline="-25000" dirty="0"/>
+              <a:t>0</a:t>
+            </a:r>
+          </a:p>
+        </p:txBody>
+      </p:sp>
+      <p:sp>
+        <p:nvSpPr>
+          <p:cNvPr id="39" name="TextBox 38">
+            <a:extLst>
+              <a:ext uri="{FF2B5EF4-FFF2-40B4-BE49-F238E27FC236}">
+                <a16:creationId xmlns:a16="http://schemas.microsoft.com/office/drawing/2014/main" id="{FE4FBC1D-D2D6-434F-9B84-C292009DC383}"/>
+              </a:ext>
+            </a:extLst>
+          </p:cNvPr>
+          <p:cNvSpPr txBox="1"/>
+          <p:nvPr/>
+        </p:nvSpPr>
+        <p:spPr>
+          <a:xfrm>
+            <a:off x="7088854" y="4550225"/>
+            <a:ext cx="1140739" cy="523220"/>
+          </a:xfrm>
+          <a:prstGeom prst="rect">
+            <a:avLst/>
+          </a:prstGeom>
+          <a:noFill/>
+        </p:spPr>
+        <p:txBody>
+          <a:bodyPr wrap="square" rtlCol="0">
+            <a:spAutoFit/>
+          </a:bodyPr>
+          <a:lstStyle/>
+          <a:p>
+            <a:r>
+              <a:rPr lang="en-US" sz="2800" i="1" dirty="0"/>
+              <a:t>d</a:t>
+            </a:r>
+            <a:r>
+              <a:rPr lang="en-US" sz="2800" i="1" baseline="30000" dirty="0"/>
+              <a:t>2</a:t>
+            </a:r>
+            <a:r>
+              <a:rPr lang="en-US" sz="2800" i="1" dirty="0"/>
+              <a:t> S</a:t>
+            </a:r>
+            <a:r>
+              <a:rPr lang="en-US" sz="2800" i="1" baseline="-25000" dirty="0"/>
+              <a:t>0</a:t>
+            </a:r>
+          </a:p>
+        </p:txBody>
+      </p:sp>
+      <p:sp>
+        <p:nvSpPr>
+          <p:cNvPr id="40" name="TextBox 39">
+            <a:extLst>
+              <a:ext uri="{FF2B5EF4-FFF2-40B4-BE49-F238E27FC236}">
+                <a16:creationId xmlns:a16="http://schemas.microsoft.com/office/drawing/2014/main" id="{49B35E0D-851E-46D9-81B3-612DB9EC2A30}"/>
+              </a:ext>
+            </a:extLst>
+          </p:cNvPr>
+          <p:cNvSpPr txBox="1"/>
+          <p:nvPr/>
+        </p:nvSpPr>
+        <p:spPr>
+          <a:xfrm>
+            <a:off x="5490061" y="1018229"/>
+            <a:ext cx="462709" cy="523220"/>
+          </a:xfrm>
+          <a:prstGeom prst="rect">
+            <a:avLst/>
+          </a:prstGeom>
+          <a:noFill/>
+        </p:spPr>
+        <p:txBody>
+          <a:bodyPr wrap="square" rtlCol="0">
+            <a:spAutoFit/>
+          </a:bodyPr>
+          <a:lstStyle/>
+          <a:p>
+            <a:r>
+              <a:rPr lang="en-US" sz="2800" i="1" dirty="0"/>
+              <a:t>p</a:t>
+            </a:r>
+          </a:p>
+        </p:txBody>
+      </p:sp>
+      <p:sp>
+        <p:nvSpPr>
+          <p:cNvPr id="41" name="TextBox 40">
+            <a:extLst>
+              <a:ext uri="{FF2B5EF4-FFF2-40B4-BE49-F238E27FC236}">
+                <a16:creationId xmlns:a16="http://schemas.microsoft.com/office/drawing/2014/main" id="{056249A1-4992-4F32-A5F8-765CC738957C}"/>
+              </a:ext>
+            </a:extLst>
+          </p:cNvPr>
+          <p:cNvSpPr txBox="1"/>
+          <p:nvPr/>
+        </p:nvSpPr>
+        <p:spPr>
+          <a:xfrm>
+            <a:off x="5440801" y="3041378"/>
+            <a:ext cx="462709" cy="523220"/>
+          </a:xfrm>
+          <a:prstGeom prst="rect">
+            <a:avLst/>
+          </a:prstGeom>
+          <a:noFill/>
+        </p:spPr>
+        <p:txBody>
+          <a:bodyPr wrap="square" rtlCol="0">
+            <a:spAutoFit/>
+          </a:bodyPr>
+          <a:lstStyle/>
+          <a:p>
+            <a:r>
+              <a:rPr lang="en-US" sz="2800" i="1" dirty="0"/>
+              <a:t>p</a:t>
+            </a:r>
+          </a:p>
+        </p:txBody>
+      </p:sp>
+      <p:sp>
+        <p:nvSpPr>
+          <p:cNvPr id="42" name="TextBox 41">
+            <a:extLst>
+              <a:ext uri="{FF2B5EF4-FFF2-40B4-BE49-F238E27FC236}">
+                <a16:creationId xmlns:a16="http://schemas.microsoft.com/office/drawing/2014/main" id="{08000BEA-1E65-4BA8-A589-95665345A41F}"/>
+              </a:ext>
+            </a:extLst>
+          </p:cNvPr>
+          <p:cNvSpPr txBox="1"/>
+          <p:nvPr/>
+        </p:nvSpPr>
+        <p:spPr>
+          <a:xfrm>
+            <a:off x="5664854" y="2010657"/>
+            <a:ext cx="1050293" cy="523220"/>
+          </a:xfrm>
+          <a:prstGeom prst="rect">
+            <a:avLst/>
+          </a:prstGeom>
+          <a:noFill/>
+        </p:spPr>
+        <p:txBody>
+          <a:bodyPr wrap="square" rtlCol="0">
+            <a:spAutoFit/>
+          </a:bodyPr>
+          <a:lstStyle/>
+          <a:p>
+            <a:r>
+              <a:rPr lang="en-US" sz="2800" dirty="0"/>
+              <a:t>1 −</a:t>
+            </a:r>
+            <a:r>
+              <a:rPr lang="en-US" sz="2800" i="1" dirty="0"/>
+              <a:t> p</a:t>
+            </a:r>
+          </a:p>
+        </p:txBody>
+      </p:sp>
+      <p:sp>
+        <p:nvSpPr>
+          <p:cNvPr id="43" name="TextBox 42">
+            <a:extLst>
+              <a:ext uri="{FF2B5EF4-FFF2-40B4-BE49-F238E27FC236}">
+                <a16:creationId xmlns:a16="http://schemas.microsoft.com/office/drawing/2014/main" id="{66D66A4F-DB79-4968-BD37-4DD40D8833B0}"/>
+              </a:ext>
+            </a:extLst>
+          </p:cNvPr>
+          <p:cNvSpPr txBox="1"/>
+          <p:nvPr/>
+        </p:nvSpPr>
+        <p:spPr>
+          <a:xfrm>
+            <a:off x="5721415" y="4068784"/>
+            <a:ext cx="1050293" cy="523220"/>
+          </a:xfrm>
+          <a:prstGeom prst="rect">
+            <a:avLst/>
+          </a:prstGeom>
+          <a:noFill/>
+        </p:spPr>
+        <p:txBody>
+          <a:bodyPr wrap="square" rtlCol="0">
+            <a:spAutoFit/>
+          </a:bodyPr>
+          <a:lstStyle/>
+          <a:p>
+            <a:r>
+              <a:rPr lang="en-US" sz="2800" dirty="0"/>
+              <a:t>1 −</a:t>
+            </a:r>
+            <a:r>
+              <a:rPr lang="en-US" sz="2800" i="1" dirty="0"/>
+              <a:t> p</a:t>
+            </a:r>
+          </a:p>
+        </p:txBody>
+      </p:sp>
+      <p:sp>
+        <p:nvSpPr>
+          <p:cNvPr id="44" name="TextBox 43">
+            <a:extLst>
+              <a:ext uri="{FF2B5EF4-FFF2-40B4-BE49-F238E27FC236}">
+                <a16:creationId xmlns:a16="http://schemas.microsoft.com/office/drawing/2014/main" id="{315DCDE9-5CE7-44A9-A8EA-B44D9E3DF463}"/>
+              </a:ext>
+            </a:extLst>
+          </p:cNvPr>
+          <p:cNvSpPr txBox="1"/>
+          <p:nvPr/>
+        </p:nvSpPr>
+        <p:spPr>
+          <a:xfrm>
+            <a:off x="1830333" y="3055204"/>
+            <a:ext cx="703266" cy="523220"/>
+          </a:xfrm>
+          <a:prstGeom prst="rect">
+            <a:avLst/>
+          </a:prstGeom>
+          <a:noFill/>
+        </p:spPr>
+        <p:txBody>
+          <a:bodyPr wrap="square" rtlCol="0">
+            <a:spAutoFit/>
+          </a:bodyPr>
+          <a:lstStyle/>
+          <a:p>
+            <a:r>
+              <a:rPr lang="en-US" sz="2800" i="1" dirty="0"/>
+              <a:t>f</a:t>
+            </a:r>
+            <a:endParaRPr lang="en-US" sz="2800" i="1" baseline="-25000" dirty="0"/>
+          </a:p>
+        </p:txBody>
+      </p:sp>
+      <p:sp>
+        <p:nvSpPr>
+          <p:cNvPr id="45" name="TextBox 44">
+            <a:extLst>
+              <a:ext uri="{FF2B5EF4-FFF2-40B4-BE49-F238E27FC236}">
+                <a16:creationId xmlns:a16="http://schemas.microsoft.com/office/drawing/2014/main" id="{AE2EC077-779A-4EE3-8326-DB824F9FF6FE}"/>
+              </a:ext>
+            </a:extLst>
+          </p:cNvPr>
+          <p:cNvSpPr txBox="1"/>
+          <p:nvPr/>
+        </p:nvSpPr>
+        <p:spPr>
+          <a:xfrm>
+            <a:off x="4207386" y="4670677"/>
+            <a:ext cx="703266" cy="523220"/>
+          </a:xfrm>
+          <a:prstGeom prst="rect">
+            <a:avLst/>
+          </a:prstGeom>
+          <a:noFill/>
+        </p:spPr>
+        <p:txBody>
+          <a:bodyPr wrap="square" rtlCol="0">
+            <a:spAutoFit/>
+          </a:bodyPr>
+          <a:lstStyle/>
+          <a:p>
+            <a:r>
+              <a:rPr lang="en-US" sz="2800" i="1" dirty="0"/>
+              <a:t>f</a:t>
+            </a:r>
+            <a:r>
+              <a:rPr lang="en-US" sz="2800" i="1" baseline="-25000" dirty="0"/>
+              <a:t>d</a:t>
+            </a:r>
+          </a:p>
+        </p:txBody>
+      </p:sp>
+      <p:sp>
+        <p:nvSpPr>
+          <p:cNvPr id="46" name="TextBox 45">
+            <a:extLst>
+              <a:ext uri="{FF2B5EF4-FFF2-40B4-BE49-F238E27FC236}">
+                <a16:creationId xmlns:a16="http://schemas.microsoft.com/office/drawing/2014/main" id="{52B15580-D061-4425-8F09-71319B38C055}"/>
+              </a:ext>
+            </a:extLst>
+          </p:cNvPr>
+          <p:cNvSpPr txBox="1"/>
+          <p:nvPr/>
+        </p:nvSpPr>
+        <p:spPr>
+          <a:xfrm>
+            <a:off x="4064907" y="1544089"/>
+            <a:ext cx="703266" cy="523220"/>
+          </a:xfrm>
+          <a:prstGeom prst="rect">
+            <a:avLst/>
+          </a:prstGeom>
+          <a:noFill/>
+        </p:spPr>
+        <p:txBody>
+          <a:bodyPr wrap="square" rtlCol="0">
+            <a:spAutoFit/>
+          </a:bodyPr>
+          <a:lstStyle/>
+          <a:p>
+            <a:r>
+              <a:rPr lang="en-US" sz="2800" i="1" dirty="0"/>
+              <a:t>f</a:t>
+            </a:r>
+            <a:r>
+              <a:rPr lang="en-US" sz="2800" i="1" baseline="-25000" dirty="0"/>
+              <a:t>u</a:t>
+            </a:r>
+          </a:p>
+        </p:txBody>
+      </p:sp>
+      <p:sp>
+        <p:nvSpPr>
+          <p:cNvPr id="47" name="TextBox 46">
+            <a:extLst>
+              <a:ext uri="{FF2B5EF4-FFF2-40B4-BE49-F238E27FC236}">
+                <a16:creationId xmlns:a16="http://schemas.microsoft.com/office/drawing/2014/main" id="{A8B2CAA5-37FB-423A-B62C-AB59550B6691}"/>
+              </a:ext>
+            </a:extLst>
+          </p:cNvPr>
+          <p:cNvSpPr txBox="1"/>
+          <p:nvPr/>
+        </p:nvSpPr>
+        <p:spPr>
+          <a:xfrm>
+            <a:off x="7117740" y="1018229"/>
+            <a:ext cx="703266" cy="523220"/>
+          </a:xfrm>
+          <a:prstGeom prst="rect">
+            <a:avLst/>
+          </a:prstGeom>
+          <a:noFill/>
+        </p:spPr>
+        <p:txBody>
+          <a:bodyPr wrap="square" rtlCol="0">
+            <a:spAutoFit/>
+          </a:bodyPr>
+          <a:lstStyle/>
+          <a:p>
+            <a:r>
+              <a:rPr lang="en-US" sz="2800" i="1" dirty="0"/>
+              <a:t>f</a:t>
+            </a:r>
+            <a:r>
+              <a:rPr lang="en-US" sz="2800" i="1" baseline="-25000" dirty="0"/>
+              <a:t>uu</a:t>
+            </a:r>
+          </a:p>
+        </p:txBody>
+      </p:sp>
+      <p:sp>
+        <p:nvSpPr>
+          <p:cNvPr id="48" name="TextBox 47">
+            <a:extLst>
+              <a:ext uri="{FF2B5EF4-FFF2-40B4-BE49-F238E27FC236}">
+                <a16:creationId xmlns:a16="http://schemas.microsoft.com/office/drawing/2014/main" id="{367DFCCA-6142-4C0A-83F1-48BD41BAF1C4}"/>
+              </a:ext>
+            </a:extLst>
+          </p:cNvPr>
+          <p:cNvSpPr txBox="1"/>
+          <p:nvPr/>
+        </p:nvSpPr>
+        <p:spPr>
+          <a:xfrm>
+            <a:off x="7073345" y="3016749"/>
+            <a:ext cx="703266" cy="523220"/>
+          </a:xfrm>
+          <a:prstGeom prst="rect">
+            <a:avLst/>
+          </a:prstGeom>
+          <a:noFill/>
+        </p:spPr>
+        <p:txBody>
+          <a:bodyPr wrap="square" rtlCol="0">
+            <a:spAutoFit/>
+          </a:bodyPr>
+          <a:lstStyle/>
+          <a:p>
+            <a:r>
+              <a:rPr lang="en-US" sz="2800" i="1" dirty="0"/>
+              <a:t>f</a:t>
+            </a:r>
+            <a:r>
+              <a:rPr lang="en-US" sz="2800" i="1" baseline="-25000" dirty="0"/>
+              <a:t>ud</a:t>
+            </a:r>
+          </a:p>
+        </p:txBody>
+      </p:sp>
+      <p:sp>
+        <p:nvSpPr>
+          <p:cNvPr id="49" name="TextBox 48">
+            <a:extLst>
+              <a:ext uri="{FF2B5EF4-FFF2-40B4-BE49-F238E27FC236}">
+                <a16:creationId xmlns:a16="http://schemas.microsoft.com/office/drawing/2014/main" id="{E1143C85-D6C1-4B7D-BA30-956B67CDB89E}"/>
+              </a:ext>
+            </a:extLst>
+          </p:cNvPr>
+          <p:cNvSpPr txBox="1"/>
+          <p:nvPr/>
+        </p:nvSpPr>
+        <p:spPr>
+          <a:xfrm>
+            <a:off x="7117740" y="4984221"/>
+            <a:ext cx="703266" cy="523220"/>
+          </a:xfrm>
+          <a:prstGeom prst="rect">
+            <a:avLst/>
+          </a:prstGeom>
+          <a:noFill/>
+        </p:spPr>
+        <p:txBody>
+          <a:bodyPr wrap="square" rtlCol="0">
+            <a:spAutoFit/>
+          </a:bodyPr>
+          <a:lstStyle/>
+          <a:p>
+            <a:r>
+              <a:rPr lang="en-US" sz="2800" i="1" dirty="0"/>
+              <a:t>f</a:t>
+            </a:r>
+            <a:r>
+              <a:rPr lang="en-US" sz="2800" i="1" baseline="-25000" dirty="0"/>
+              <a:t>dd</a:t>
+            </a:r>
+          </a:p>
+        </p:txBody>
+      </p:sp>
+    </p:spTree>
+    <p:extLst>
+      <p:ext uri="{BB962C8B-B14F-4D97-AF65-F5344CB8AC3E}">
+        <p14:creationId xmlns:p14="http://schemas.microsoft.com/office/powerpoint/2010/main" val="4188939023"/>
       </p:ext>
     </p:extLst>
   </p:cSld>

</xml_diff>

<commit_message>
n-step eur pricer, also with different r and sigma
</commit_message>
<xml_diff>
--- a/img/binom.pptx
+++ b/img/binom.pptx
@@ -7,6 +7,7 @@
   <p:sldIdLst>
     <p:sldId id="256" r:id="rId2"/>
     <p:sldId id="258" r:id="rId3"/>
+    <p:sldId id="259" r:id="rId4"/>
   </p:sldIdLst>
   <p:sldSz cx="12192000" cy="6858000"/>
   <p:notesSz cx="6858000" cy="9144000"/>
@@ -260,7 +261,7 @@
           <a:p>
             <a:fld id="{43C63E5C-259F-4767-9F32-E9A25171A77E}" type="datetimeFigureOut">
               <a:rPr lang="en-US" smtClean="0"/>
-              <a:t>12/29/2020</a:t>
+              <a:t>12/30/2020</a:t>
             </a:fld>
             <a:endParaRPr lang="en-US"/>
           </a:p>
@@ -458,7 +459,7 @@
           <a:p>
             <a:fld id="{43C63E5C-259F-4767-9F32-E9A25171A77E}" type="datetimeFigureOut">
               <a:rPr lang="en-US" smtClean="0"/>
-              <a:t>12/29/2020</a:t>
+              <a:t>12/30/2020</a:t>
             </a:fld>
             <a:endParaRPr lang="en-US"/>
           </a:p>
@@ -666,7 +667,7 @@
           <a:p>
             <a:fld id="{43C63E5C-259F-4767-9F32-E9A25171A77E}" type="datetimeFigureOut">
               <a:rPr lang="en-US" smtClean="0"/>
-              <a:t>12/29/2020</a:t>
+              <a:t>12/30/2020</a:t>
             </a:fld>
             <a:endParaRPr lang="en-US"/>
           </a:p>
@@ -864,7 +865,7 @@
           <a:p>
             <a:fld id="{43C63E5C-259F-4767-9F32-E9A25171A77E}" type="datetimeFigureOut">
               <a:rPr lang="en-US" smtClean="0"/>
-              <a:t>12/29/2020</a:t>
+              <a:t>12/30/2020</a:t>
             </a:fld>
             <a:endParaRPr lang="en-US"/>
           </a:p>
@@ -1139,7 +1140,7 @@
           <a:p>
             <a:fld id="{43C63E5C-259F-4767-9F32-E9A25171A77E}" type="datetimeFigureOut">
               <a:rPr lang="en-US" smtClean="0"/>
-              <a:t>12/29/2020</a:t>
+              <a:t>12/30/2020</a:t>
             </a:fld>
             <a:endParaRPr lang="en-US"/>
           </a:p>
@@ -1404,7 +1405,7 @@
           <a:p>
             <a:fld id="{43C63E5C-259F-4767-9F32-E9A25171A77E}" type="datetimeFigureOut">
               <a:rPr lang="en-US" smtClean="0"/>
-              <a:t>12/29/2020</a:t>
+              <a:t>12/30/2020</a:t>
             </a:fld>
             <a:endParaRPr lang="en-US"/>
           </a:p>
@@ -1816,7 +1817,7 @@
           <a:p>
             <a:fld id="{43C63E5C-259F-4767-9F32-E9A25171A77E}" type="datetimeFigureOut">
               <a:rPr lang="en-US" smtClean="0"/>
-              <a:t>12/29/2020</a:t>
+              <a:t>12/30/2020</a:t>
             </a:fld>
             <a:endParaRPr lang="en-US"/>
           </a:p>
@@ -1957,7 +1958,7 @@
           <a:p>
             <a:fld id="{43C63E5C-259F-4767-9F32-E9A25171A77E}" type="datetimeFigureOut">
               <a:rPr lang="en-US" smtClean="0"/>
-              <a:t>12/29/2020</a:t>
+              <a:t>12/30/2020</a:t>
             </a:fld>
             <a:endParaRPr lang="en-US"/>
           </a:p>
@@ -2070,7 +2071,7 @@
           <a:p>
             <a:fld id="{43C63E5C-259F-4767-9F32-E9A25171A77E}" type="datetimeFigureOut">
               <a:rPr lang="en-US" smtClean="0"/>
-              <a:t>12/29/2020</a:t>
+              <a:t>12/30/2020</a:t>
             </a:fld>
             <a:endParaRPr lang="en-US"/>
           </a:p>
@@ -2381,7 +2382,7 @@
           <a:p>
             <a:fld id="{43C63E5C-259F-4767-9F32-E9A25171A77E}" type="datetimeFigureOut">
               <a:rPr lang="en-US" smtClean="0"/>
-              <a:t>12/29/2020</a:t>
+              <a:t>12/30/2020</a:t>
             </a:fld>
             <a:endParaRPr lang="en-US"/>
           </a:p>
@@ -2669,7 +2670,7 @@
           <a:p>
             <a:fld id="{43C63E5C-259F-4767-9F32-E9A25171A77E}" type="datetimeFigureOut">
               <a:rPr lang="en-US" smtClean="0"/>
-              <a:t>12/29/2020</a:t>
+              <a:t>12/30/2020</a:t>
             </a:fld>
             <a:endParaRPr lang="en-US"/>
           </a:p>
@@ -2910,7 +2911,7 @@
           <a:p>
             <a:fld id="{43C63E5C-259F-4767-9F32-E9A25171A77E}" type="datetimeFigureOut">
               <a:rPr lang="en-US" smtClean="0"/>
-              <a:t>12/29/2020</a:t>
+              <a:t>12/30/2020</a:t>
             </a:fld>
             <a:endParaRPr lang="en-US"/>
           </a:p>
@@ -5881,6 +5882,4164 @@
 </p:sld>
 </file>
 
+<file path=ppt/slides/slide3.xml><?xml version="1.0" encoding="utf-8"?>
+<p:sld xmlns:a="http://schemas.openxmlformats.org/drawingml/2006/main" xmlns:r="http://schemas.openxmlformats.org/officeDocument/2006/relationships" xmlns:p="http://schemas.openxmlformats.org/presentationml/2006/main">
+  <p:cSld>
+    <p:spTree>
+      <p:nvGrpSpPr>
+        <p:cNvPr id="1" name=""/>
+        <p:cNvGrpSpPr/>
+        <p:nvPr/>
+      </p:nvGrpSpPr>
+      <p:grpSpPr>
+        <a:xfrm>
+          <a:off x="0" y="0"/>
+          <a:ext cx="0" cy="0"/>
+          <a:chOff x="0" y="0"/>
+          <a:chExt cx="0" cy="0"/>
+        </a:xfrm>
+      </p:grpSpPr>
+      <p:cxnSp>
+        <p:nvCxnSpPr>
+          <p:cNvPr id="96" name="Straight Arrow Connector 95">
+            <a:extLst>
+              <a:ext uri="{FF2B5EF4-FFF2-40B4-BE49-F238E27FC236}">
+                <a16:creationId xmlns:a16="http://schemas.microsoft.com/office/drawing/2014/main" id="{921B8DAC-EBB2-4567-9642-12E74FB690A2}"/>
+              </a:ext>
+            </a:extLst>
+          </p:cNvPr>
+          <p:cNvCxnSpPr>
+            <a:cxnSpLocks/>
+          </p:cNvCxnSpPr>
+          <p:nvPr/>
+        </p:nvCxnSpPr>
+        <p:spPr>
+          <a:xfrm>
+            <a:off x="5495919" y="2449416"/>
+            <a:ext cx="466600" cy="181810"/>
+          </a:xfrm>
+          <a:prstGeom prst="straightConnector1">
+            <a:avLst/>
+          </a:prstGeom>
+          <a:ln w="19050">
+            <a:solidFill>
+              <a:schemeClr val="tx1"/>
+            </a:solidFill>
+            <a:headEnd type="none"/>
+            <a:tailEnd type="stealth" w="lg" len="lg"/>
+          </a:ln>
+        </p:spPr>
+        <p:style>
+          <a:lnRef idx="1">
+            <a:schemeClr val="accent1"/>
+          </a:lnRef>
+          <a:fillRef idx="0">
+            <a:schemeClr val="accent1"/>
+          </a:fillRef>
+          <a:effectRef idx="0">
+            <a:schemeClr val="accent1"/>
+          </a:effectRef>
+          <a:fontRef idx="minor">
+            <a:schemeClr val="tx1"/>
+          </a:fontRef>
+        </p:style>
+      </p:cxnSp>
+      <p:cxnSp>
+        <p:nvCxnSpPr>
+          <p:cNvPr id="63" name="Straight Arrow Connector 62">
+            <a:extLst>
+              <a:ext uri="{FF2B5EF4-FFF2-40B4-BE49-F238E27FC236}">
+                <a16:creationId xmlns:a16="http://schemas.microsoft.com/office/drawing/2014/main" id="{F846548B-1DA8-4717-87BB-4C6C09F2169D}"/>
+              </a:ext>
+            </a:extLst>
+          </p:cNvPr>
+          <p:cNvCxnSpPr>
+            <a:cxnSpLocks/>
+          </p:cNvCxnSpPr>
+          <p:nvPr/>
+        </p:nvCxnSpPr>
+        <p:spPr>
+          <a:xfrm>
+            <a:off x="4339373" y="3814184"/>
+            <a:ext cx="986628" cy="382767"/>
+          </a:xfrm>
+          <a:prstGeom prst="straightConnector1">
+            <a:avLst/>
+          </a:prstGeom>
+          <a:ln w="19050">
+            <a:solidFill>
+              <a:schemeClr val="tx1"/>
+            </a:solidFill>
+            <a:headEnd type="none"/>
+            <a:tailEnd type="stealth" w="lg" len="lg"/>
+          </a:ln>
+        </p:spPr>
+        <p:style>
+          <a:lnRef idx="1">
+            <a:schemeClr val="accent1"/>
+          </a:lnRef>
+          <a:fillRef idx="0">
+            <a:schemeClr val="accent1"/>
+          </a:fillRef>
+          <a:effectRef idx="0">
+            <a:schemeClr val="accent1"/>
+          </a:effectRef>
+          <a:fontRef idx="minor">
+            <a:schemeClr val="tx1"/>
+          </a:fontRef>
+        </p:style>
+      </p:cxnSp>
+      <p:cxnSp>
+        <p:nvCxnSpPr>
+          <p:cNvPr id="64" name="Straight Arrow Connector 63">
+            <a:extLst>
+              <a:ext uri="{FF2B5EF4-FFF2-40B4-BE49-F238E27FC236}">
+                <a16:creationId xmlns:a16="http://schemas.microsoft.com/office/drawing/2014/main" id="{24AE1269-3562-4F7E-AF8C-35BF36BFCC0C}"/>
+              </a:ext>
+            </a:extLst>
+          </p:cNvPr>
+          <p:cNvCxnSpPr>
+            <a:cxnSpLocks/>
+          </p:cNvCxnSpPr>
+          <p:nvPr/>
+        </p:nvCxnSpPr>
+        <p:spPr>
+          <a:xfrm flipV="1">
+            <a:off x="4339373" y="3360702"/>
+            <a:ext cx="986628" cy="382767"/>
+          </a:xfrm>
+          <a:prstGeom prst="straightConnector1">
+            <a:avLst/>
+          </a:prstGeom>
+          <a:ln w="19050">
+            <a:solidFill>
+              <a:schemeClr val="tx1"/>
+            </a:solidFill>
+            <a:headEnd type="none"/>
+            <a:tailEnd type="stealth" w="lg" len="lg"/>
+          </a:ln>
+        </p:spPr>
+        <p:style>
+          <a:lnRef idx="1">
+            <a:schemeClr val="accent1"/>
+          </a:lnRef>
+          <a:fillRef idx="0">
+            <a:schemeClr val="accent1"/>
+          </a:fillRef>
+          <a:effectRef idx="0">
+            <a:schemeClr val="accent1"/>
+          </a:effectRef>
+          <a:fontRef idx="minor">
+            <a:schemeClr val="tx1"/>
+          </a:fontRef>
+        </p:style>
+      </p:cxnSp>
+      <p:sp>
+        <p:nvSpPr>
+          <p:cNvPr id="65" name="Oval 64">
+            <a:extLst>
+              <a:ext uri="{FF2B5EF4-FFF2-40B4-BE49-F238E27FC236}">
+                <a16:creationId xmlns:a16="http://schemas.microsoft.com/office/drawing/2014/main" id="{8609C585-1740-488B-8677-D9AF0A53B615}"/>
+              </a:ext>
+            </a:extLst>
+          </p:cNvPr>
+          <p:cNvSpPr/>
+          <p:nvPr/>
+        </p:nvSpPr>
+        <p:spPr>
+          <a:xfrm>
+            <a:off x="5326001" y="4132609"/>
+            <a:ext cx="182880" cy="182880"/>
+          </a:xfrm>
+          <a:prstGeom prst="ellipse">
+            <a:avLst/>
+          </a:prstGeom>
+          <a:solidFill>
+            <a:srgbClr val="FF0000"/>
+          </a:solidFill>
+          <a:ln w="19050">
+            <a:solidFill>
+              <a:schemeClr val="tx1"/>
+            </a:solidFill>
+          </a:ln>
+        </p:spPr>
+        <p:style>
+          <a:lnRef idx="2">
+            <a:schemeClr val="accent1">
+              <a:shade val="50000"/>
+            </a:schemeClr>
+          </a:lnRef>
+          <a:fillRef idx="1">
+            <a:schemeClr val="accent1"/>
+          </a:fillRef>
+          <a:effectRef idx="0">
+            <a:schemeClr val="accent1"/>
+          </a:effectRef>
+          <a:fontRef idx="minor">
+            <a:schemeClr val="lt1"/>
+          </a:fontRef>
+        </p:style>
+        <p:txBody>
+          <a:bodyPr rtlCol="0" anchor="ctr"/>
+          <a:lstStyle/>
+          <a:p>
+            <a:pPr algn="ctr"/>
+            <a:r>
+              <a:rPr lang="en-US" dirty="0"/>
+              <a:t> </a:t>
+            </a:r>
+          </a:p>
+        </p:txBody>
+      </p:sp>
+      <p:cxnSp>
+        <p:nvCxnSpPr>
+          <p:cNvPr id="55" name="Straight Arrow Connector 54">
+            <a:extLst>
+              <a:ext uri="{FF2B5EF4-FFF2-40B4-BE49-F238E27FC236}">
+                <a16:creationId xmlns:a16="http://schemas.microsoft.com/office/drawing/2014/main" id="{050E600B-C127-49A6-824F-76D10C17D2E8}"/>
+              </a:ext>
+            </a:extLst>
+          </p:cNvPr>
+          <p:cNvCxnSpPr>
+            <a:cxnSpLocks/>
+          </p:cNvCxnSpPr>
+          <p:nvPr/>
+        </p:nvCxnSpPr>
+        <p:spPr>
+          <a:xfrm>
+            <a:off x="4339672" y="2911927"/>
+            <a:ext cx="986628" cy="382767"/>
+          </a:xfrm>
+          <a:prstGeom prst="straightConnector1">
+            <a:avLst/>
+          </a:prstGeom>
+          <a:ln w="19050">
+            <a:solidFill>
+              <a:schemeClr val="tx1"/>
+            </a:solidFill>
+            <a:headEnd type="none"/>
+            <a:tailEnd type="stealth" w="lg" len="lg"/>
+          </a:ln>
+        </p:spPr>
+        <p:style>
+          <a:lnRef idx="1">
+            <a:schemeClr val="accent1"/>
+          </a:lnRef>
+          <a:fillRef idx="0">
+            <a:schemeClr val="accent1"/>
+          </a:fillRef>
+          <a:effectRef idx="0">
+            <a:schemeClr val="accent1"/>
+          </a:effectRef>
+          <a:fontRef idx="minor">
+            <a:schemeClr val="tx1"/>
+          </a:fontRef>
+        </p:style>
+      </p:cxnSp>
+      <p:cxnSp>
+        <p:nvCxnSpPr>
+          <p:cNvPr id="56" name="Straight Arrow Connector 55">
+            <a:extLst>
+              <a:ext uri="{FF2B5EF4-FFF2-40B4-BE49-F238E27FC236}">
+                <a16:creationId xmlns:a16="http://schemas.microsoft.com/office/drawing/2014/main" id="{27695C95-F2B7-40C1-9840-F98829A6712D}"/>
+              </a:ext>
+            </a:extLst>
+          </p:cNvPr>
+          <p:cNvCxnSpPr>
+            <a:cxnSpLocks/>
+          </p:cNvCxnSpPr>
+          <p:nvPr/>
+        </p:nvCxnSpPr>
+        <p:spPr>
+          <a:xfrm flipV="1">
+            <a:off x="4339672" y="2458445"/>
+            <a:ext cx="986628" cy="382767"/>
+          </a:xfrm>
+          <a:prstGeom prst="straightConnector1">
+            <a:avLst/>
+          </a:prstGeom>
+          <a:ln w="19050">
+            <a:solidFill>
+              <a:schemeClr val="tx1"/>
+            </a:solidFill>
+            <a:headEnd type="none"/>
+            <a:tailEnd type="stealth" w="lg" len="lg"/>
+          </a:ln>
+        </p:spPr>
+        <p:style>
+          <a:lnRef idx="1">
+            <a:schemeClr val="accent1"/>
+          </a:lnRef>
+          <a:fillRef idx="0">
+            <a:schemeClr val="accent1"/>
+          </a:fillRef>
+          <a:effectRef idx="0">
+            <a:schemeClr val="accent1"/>
+          </a:effectRef>
+          <a:fontRef idx="minor">
+            <a:schemeClr val="tx1"/>
+          </a:fontRef>
+        </p:style>
+      </p:cxnSp>
+      <p:sp>
+        <p:nvSpPr>
+          <p:cNvPr id="57" name="Oval 56">
+            <a:extLst>
+              <a:ext uri="{FF2B5EF4-FFF2-40B4-BE49-F238E27FC236}">
+                <a16:creationId xmlns:a16="http://schemas.microsoft.com/office/drawing/2014/main" id="{40387A7D-ADC9-4739-B9E9-6B1B17192065}"/>
+              </a:ext>
+            </a:extLst>
+          </p:cNvPr>
+          <p:cNvSpPr/>
+          <p:nvPr/>
+        </p:nvSpPr>
+        <p:spPr>
+          <a:xfrm>
+            <a:off x="5326300" y="2339967"/>
+            <a:ext cx="182880" cy="182880"/>
+          </a:xfrm>
+          <a:prstGeom prst="ellipse">
+            <a:avLst/>
+          </a:prstGeom>
+          <a:solidFill>
+            <a:srgbClr val="FF0000"/>
+          </a:solidFill>
+          <a:ln w="19050">
+            <a:solidFill>
+              <a:schemeClr val="tx1"/>
+            </a:solidFill>
+          </a:ln>
+        </p:spPr>
+        <p:style>
+          <a:lnRef idx="2">
+            <a:schemeClr val="accent1">
+              <a:shade val="50000"/>
+            </a:schemeClr>
+          </a:lnRef>
+          <a:fillRef idx="1">
+            <a:schemeClr val="accent1"/>
+          </a:fillRef>
+          <a:effectRef idx="0">
+            <a:schemeClr val="accent1"/>
+          </a:effectRef>
+          <a:fontRef idx="minor">
+            <a:schemeClr val="lt1"/>
+          </a:fontRef>
+        </p:style>
+        <p:txBody>
+          <a:bodyPr rtlCol="0" anchor="ctr"/>
+          <a:lstStyle/>
+          <a:p>
+            <a:pPr algn="ctr"/>
+            <a:r>
+              <a:rPr lang="en-US" dirty="0"/>
+              <a:t> </a:t>
+            </a:r>
+          </a:p>
+        </p:txBody>
+      </p:sp>
+      <p:sp>
+        <p:nvSpPr>
+          <p:cNvPr id="58" name="Oval 57">
+            <a:extLst>
+              <a:ext uri="{FF2B5EF4-FFF2-40B4-BE49-F238E27FC236}">
+                <a16:creationId xmlns:a16="http://schemas.microsoft.com/office/drawing/2014/main" id="{92388DBC-0108-4DA5-8AD0-D7E37816E85A}"/>
+              </a:ext>
+            </a:extLst>
+          </p:cNvPr>
+          <p:cNvSpPr/>
+          <p:nvPr/>
+        </p:nvSpPr>
+        <p:spPr>
+          <a:xfrm>
+            <a:off x="5326300" y="3230352"/>
+            <a:ext cx="182880" cy="182880"/>
+          </a:xfrm>
+          <a:prstGeom prst="ellipse">
+            <a:avLst/>
+          </a:prstGeom>
+          <a:solidFill>
+            <a:srgbClr val="FF0000"/>
+          </a:solidFill>
+          <a:ln w="19050">
+            <a:solidFill>
+              <a:schemeClr val="tx1"/>
+            </a:solidFill>
+          </a:ln>
+        </p:spPr>
+        <p:style>
+          <a:lnRef idx="2">
+            <a:schemeClr val="accent1">
+              <a:shade val="50000"/>
+            </a:schemeClr>
+          </a:lnRef>
+          <a:fillRef idx="1">
+            <a:schemeClr val="accent1"/>
+          </a:fillRef>
+          <a:effectRef idx="0">
+            <a:schemeClr val="accent1"/>
+          </a:effectRef>
+          <a:fontRef idx="minor">
+            <a:schemeClr val="lt1"/>
+          </a:fontRef>
+        </p:style>
+        <p:txBody>
+          <a:bodyPr rtlCol="0" anchor="ctr"/>
+          <a:lstStyle/>
+          <a:p>
+            <a:pPr algn="ctr"/>
+            <a:r>
+              <a:rPr lang="en-US" dirty="0"/>
+              <a:t> </a:t>
+            </a:r>
+          </a:p>
+        </p:txBody>
+      </p:sp>
+      <p:cxnSp>
+        <p:nvCxnSpPr>
+          <p:cNvPr id="50" name="Straight Arrow Connector 49">
+            <a:extLst>
+              <a:ext uri="{FF2B5EF4-FFF2-40B4-BE49-F238E27FC236}">
+                <a16:creationId xmlns:a16="http://schemas.microsoft.com/office/drawing/2014/main" id="{706976C0-499D-4AC7-ADE2-444EA0331FCD}"/>
+              </a:ext>
+            </a:extLst>
+          </p:cNvPr>
+          <p:cNvCxnSpPr>
+            <a:cxnSpLocks/>
+          </p:cNvCxnSpPr>
+          <p:nvPr/>
+        </p:nvCxnSpPr>
+        <p:spPr>
+          <a:xfrm>
+            <a:off x="3177307" y="3373645"/>
+            <a:ext cx="986628" cy="382767"/>
+          </a:xfrm>
+          <a:prstGeom prst="straightConnector1">
+            <a:avLst/>
+          </a:prstGeom>
+          <a:ln w="19050">
+            <a:solidFill>
+              <a:schemeClr val="tx1"/>
+            </a:solidFill>
+            <a:headEnd type="none"/>
+            <a:tailEnd type="stealth" w="lg" len="lg"/>
+          </a:ln>
+        </p:spPr>
+        <p:style>
+          <a:lnRef idx="1">
+            <a:schemeClr val="accent1"/>
+          </a:lnRef>
+          <a:fillRef idx="0">
+            <a:schemeClr val="accent1"/>
+          </a:fillRef>
+          <a:effectRef idx="0">
+            <a:schemeClr val="accent1"/>
+          </a:effectRef>
+          <a:fontRef idx="minor">
+            <a:schemeClr val="tx1"/>
+          </a:fontRef>
+        </p:style>
+      </p:cxnSp>
+      <p:sp>
+        <p:nvSpPr>
+          <p:cNvPr id="4" name="Oval 3">
+            <a:extLst>
+              <a:ext uri="{FF2B5EF4-FFF2-40B4-BE49-F238E27FC236}">
+                <a16:creationId xmlns:a16="http://schemas.microsoft.com/office/drawing/2014/main" id="{26DCC042-A305-4636-848B-E860521205B4}"/>
+              </a:ext>
+            </a:extLst>
+          </p:cNvPr>
+          <p:cNvSpPr/>
+          <p:nvPr/>
+        </p:nvSpPr>
+        <p:spPr>
+          <a:xfrm>
+            <a:off x="3012697" y="3251591"/>
+            <a:ext cx="182880" cy="182880"/>
+          </a:xfrm>
+          <a:prstGeom prst="ellipse">
+            <a:avLst/>
+          </a:prstGeom>
+          <a:solidFill>
+            <a:srgbClr val="FF0000"/>
+          </a:solidFill>
+          <a:ln w="19050">
+            <a:solidFill>
+              <a:schemeClr val="tx1"/>
+            </a:solidFill>
+          </a:ln>
+        </p:spPr>
+        <p:style>
+          <a:lnRef idx="2">
+            <a:schemeClr val="accent1">
+              <a:shade val="50000"/>
+            </a:schemeClr>
+          </a:lnRef>
+          <a:fillRef idx="1">
+            <a:schemeClr val="accent1"/>
+          </a:fillRef>
+          <a:effectRef idx="0">
+            <a:schemeClr val="accent1"/>
+          </a:effectRef>
+          <a:fontRef idx="minor">
+            <a:schemeClr val="lt1"/>
+          </a:fontRef>
+        </p:style>
+        <p:txBody>
+          <a:bodyPr rtlCol="0" anchor="ctr"/>
+          <a:lstStyle/>
+          <a:p>
+            <a:pPr algn="ctr"/>
+            <a:r>
+              <a:rPr lang="en-US" dirty="0"/>
+              <a:t> </a:t>
+            </a:r>
+          </a:p>
+        </p:txBody>
+      </p:sp>
+      <p:cxnSp>
+        <p:nvCxnSpPr>
+          <p:cNvPr id="8" name="Straight Arrow Connector 7">
+            <a:extLst>
+              <a:ext uri="{FF2B5EF4-FFF2-40B4-BE49-F238E27FC236}">
+                <a16:creationId xmlns:a16="http://schemas.microsoft.com/office/drawing/2014/main" id="{5AF06C3D-F1E2-4D94-B80C-95EF03716846}"/>
+              </a:ext>
+            </a:extLst>
+          </p:cNvPr>
+          <p:cNvCxnSpPr>
+            <a:cxnSpLocks/>
+          </p:cNvCxnSpPr>
+          <p:nvPr/>
+        </p:nvCxnSpPr>
+        <p:spPr>
+          <a:xfrm flipV="1">
+            <a:off x="3177307" y="2920163"/>
+            <a:ext cx="986628" cy="382767"/>
+          </a:xfrm>
+          <a:prstGeom prst="straightConnector1">
+            <a:avLst/>
+          </a:prstGeom>
+          <a:ln w="19050">
+            <a:solidFill>
+              <a:schemeClr val="tx1"/>
+            </a:solidFill>
+            <a:headEnd type="none"/>
+            <a:tailEnd type="stealth" w="lg" len="lg"/>
+          </a:ln>
+        </p:spPr>
+        <p:style>
+          <a:lnRef idx="1">
+            <a:schemeClr val="accent1"/>
+          </a:lnRef>
+          <a:fillRef idx="0">
+            <a:schemeClr val="accent1"/>
+          </a:fillRef>
+          <a:effectRef idx="0">
+            <a:schemeClr val="accent1"/>
+          </a:effectRef>
+          <a:fontRef idx="minor">
+            <a:schemeClr val="tx1"/>
+          </a:fontRef>
+        </p:style>
+      </p:cxnSp>
+      <p:cxnSp>
+        <p:nvCxnSpPr>
+          <p:cNvPr id="15" name="Straight Arrow Connector 14">
+            <a:extLst>
+              <a:ext uri="{FF2B5EF4-FFF2-40B4-BE49-F238E27FC236}">
+                <a16:creationId xmlns:a16="http://schemas.microsoft.com/office/drawing/2014/main" id="{AD981B75-5837-4F9B-8688-108E3B5FD4D1}"/>
+              </a:ext>
+            </a:extLst>
+          </p:cNvPr>
+          <p:cNvCxnSpPr>
+            <a:cxnSpLocks/>
+          </p:cNvCxnSpPr>
+          <p:nvPr/>
+        </p:nvCxnSpPr>
+        <p:spPr>
+          <a:xfrm>
+            <a:off x="2571538" y="5985228"/>
+            <a:ext cx="5669280" cy="0"/>
+          </a:xfrm>
+          <a:prstGeom prst="straightConnector1">
+            <a:avLst/>
+          </a:prstGeom>
+          <a:ln w="19050">
+            <a:solidFill>
+              <a:schemeClr val="tx1"/>
+            </a:solidFill>
+            <a:prstDash val="solid"/>
+            <a:headEnd type="none"/>
+            <a:tailEnd type="stealth" w="lg" len="lg"/>
+          </a:ln>
+        </p:spPr>
+        <p:style>
+          <a:lnRef idx="1">
+            <a:schemeClr val="accent1"/>
+          </a:lnRef>
+          <a:fillRef idx="0">
+            <a:schemeClr val="accent1"/>
+          </a:fillRef>
+          <a:effectRef idx="0">
+            <a:schemeClr val="accent1"/>
+          </a:effectRef>
+          <a:fontRef idx="minor">
+            <a:schemeClr val="tx1"/>
+          </a:fontRef>
+        </p:style>
+      </p:cxnSp>
+      <p:cxnSp>
+        <p:nvCxnSpPr>
+          <p:cNvPr id="18" name="Straight Arrow Connector 17">
+            <a:extLst>
+              <a:ext uri="{FF2B5EF4-FFF2-40B4-BE49-F238E27FC236}">
+                <a16:creationId xmlns:a16="http://schemas.microsoft.com/office/drawing/2014/main" id="{E0158F23-E0AA-4CB1-BC65-ADE8F238313D}"/>
+              </a:ext>
+            </a:extLst>
+          </p:cNvPr>
+          <p:cNvCxnSpPr>
+            <a:cxnSpLocks/>
+          </p:cNvCxnSpPr>
+          <p:nvPr/>
+        </p:nvCxnSpPr>
+        <p:spPr>
+          <a:xfrm>
+            <a:off x="3115087" y="5904802"/>
+            <a:ext cx="0" cy="163430"/>
+          </a:xfrm>
+          <a:prstGeom prst="straightConnector1">
+            <a:avLst/>
+          </a:prstGeom>
+          <a:ln w="19050">
+            <a:solidFill>
+              <a:schemeClr val="tx1"/>
+            </a:solidFill>
+            <a:headEnd type="none"/>
+            <a:tailEnd type="none" w="lg" len="lg"/>
+          </a:ln>
+        </p:spPr>
+        <p:style>
+          <a:lnRef idx="1">
+            <a:schemeClr val="accent1"/>
+          </a:lnRef>
+          <a:fillRef idx="0">
+            <a:schemeClr val="accent1"/>
+          </a:fillRef>
+          <a:effectRef idx="0">
+            <a:schemeClr val="accent1"/>
+          </a:effectRef>
+          <a:fontRef idx="minor">
+            <a:schemeClr val="tx1"/>
+          </a:fontRef>
+        </p:style>
+      </p:cxnSp>
+      <p:sp>
+        <p:nvSpPr>
+          <p:cNvPr id="51" name="Oval 50">
+            <a:extLst>
+              <a:ext uri="{FF2B5EF4-FFF2-40B4-BE49-F238E27FC236}">
+                <a16:creationId xmlns:a16="http://schemas.microsoft.com/office/drawing/2014/main" id="{2ED5ED02-F765-4AEC-A8AF-F9A077D634B2}"/>
+              </a:ext>
+            </a:extLst>
+          </p:cNvPr>
+          <p:cNvSpPr/>
+          <p:nvPr/>
+        </p:nvSpPr>
+        <p:spPr>
+          <a:xfrm>
+            <a:off x="4163935" y="2801685"/>
+            <a:ext cx="182880" cy="182880"/>
+          </a:xfrm>
+          <a:prstGeom prst="ellipse">
+            <a:avLst/>
+          </a:prstGeom>
+          <a:solidFill>
+            <a:srgbClr val="FF0000"/>
+          </a:solidFill>
+          <a:ln w="19050">
+            <a:solidFill>
+              <a:schemeClr val="tx1"/>
+            </a:solidFill>
+          </a:ln>
+        </p:spPr>
+        <p:style>
+          <a:lnRef idx="2">
+            <a:schemeClr val="accent1">
+              <a:shade val="50000"/>
+            </a:schemeClr>
+          </a:lnRef>
+          <a:fillRef idx="1">
+            <a:schemeClr val="accent1"/>
+          </a:fillRef>
+          <a:effectRef idx="0">
+            <a:schemeClr val="accent1"/>
+          </a:effectRef>
+          <a:fontRef idx="minor">
+            <a:schemeClr val="lt1"/>
+          </a:fontRef>
+        </p:style>
+        <p:txBody>
+          <a:bodyPr rtlCol="0" anchor="ctr"/>
+          <a:lstStyle/>
+          <a:p>
+            <a:pPr algn="ctr"/>
+            <a:r>
+              <a:rPr lang="en-US" dirty="0"/>
+              <a:t> </a:t>
+            </a:r>
+          </a:p>
+        </p:txBody>
+      </p:sp>
+      <p:sp>
+        <p:nvSpPr>
+          <p:cNvPr id="52" name="Oval 51">
+            <a:extLst>
+              <a:ext uri="{FF2B5EF4-FFF2-40B4-BE49-F238E27FC236}">
+                <a16:creationId xmlns:a16="http://schemas.microsoft.com/office/drawing/2014/main" id="{60EDF6DB-9A19-45BF-B072-6B3BE40F44C5}"/>
+              </a:ext>
+            </a:extLst>
+          </p:cNvPr>
+          <p:cNvSpPr/>
+          <p:nvPr/>
+        </p:nvSpPr>
+        <p:spPr>
+          <a:xfrm>
+            <a:off x="4163935" y="3692070"/>
+            <a:ext cx="182880" cy="182880"/>
+          </a:xfrm>
+          <a:prstGeom prst="ellipse">
+            <a:avLst/>
+          </a:prstGeom>
+          <a:solidFill>
+            <a:srgbClr val="FF0000"/>
+          </a:solidFill>
+          <a:ln w="19050">
+            <a:solidFill>
+              <a:schemeClr val="tx1"/>
+            </a:solidFill>
+          </a:ln>
+        </p:spPr>
+        <p:style>
+          <a:lnRef idx="2">
+            <a:schemeClr val="accent1">
+              <a:shade val="50000"/>
+            </a:schemeClr>
+          </a:lnRef>
+          <a:fillRef idx="1">
+            <a:schemeClr val="accent1"/>
+          </a:fillRef>
+          <a:effectRef idx="0">
+            <a:schemeClr val="accent1"/>
+          </a:effectRef>
+          <a:fontRef idx="minor">
+            <a:schemeClr val="lt1"/>
+          </a:fontRef>
+        </p:style>
+        <p:txBody>
+          <a:bodyPr rtlCol="0" anchor="ctr"/>
+          <a:lstStyle/>
+          <a:p>
+            <a:pPr algn="ctr"/>
+            <a:r>
+              <a:rPr lang="en-US" dirty="0"/>
+              <a:t> </a:t>
+            </a:r>
+          </a:p>
+        </p:txBody>
+      </p:sp>
+      <p:cxnSp>
+        <p:nvCxnSpPr>
+          <p:cNvPr id="53" name="Straight Arrow Connector 52">
+            <a:extLst>
+              <a:ext uri="{FF2B5EF4-FFF2-40B4-BE49-F238E27FC236}">
+                <a16:creationId xmlns:a16="http://schemas.microsoft.com/office/drawing/2014/main" id="{28BD1359-291C-44B6-B571-2FB70776139F}"/>
+              </a:ext>
+            </a:extLst>
+          </p:cNvPr>
+          <p:cNvCxnSpPr>
+            <a:cxnSpLocks/>
+          </p:cNvCxnSpPr>
+          <p:nvPr/>
+        </p:nvCxnSpPr>
+        <p:spPr>
+          <a:xfrm>
+            <a:off x="4243945" y="5903440"/>
+            <a:ext cx="0" cy="163430"/>
+          </a:xfrm>
+          <a:prstGeom prst="straightConnector1">
+            <a:avLst/>
+          </a:prstGeom>
+          <a:ln w="19050">
+            <a:solidFill>
+              <a:schemeClr val="tx1"/>
+            </a:solidFill>
+            <a:headEnd type="none"/>
+            <a:tailEnd type="none" w="lg" len="lg"/>
+          </a:ln>
+        </p:spPr>
+        <p:style>
+          <a:lnRef idx="1">
+            <a:schemeClr val="accent1"/>
+          </a:lnRef>
+          <a:fillRef idx="0">
+            <a:schemeClr val="accent1"/>
+          </a:fillRef>
+          <a:effectRef idx="0">
+            <a:schemeClr val="accent1"/>
+          </a:effectRef>
+          <a:fontRef idx="minor">
+            <a:schemeClr val="tx1"/>
+          </a:fontRef>
+        </p:style>
+      </p:cxnSp>
+      <mc:AlternateContent xmlns:mc="http://schemas.openxmlformats.org/markup-compatibility/2006">
+        <mc:Choice xmlns:a14="http://schemas.microsoft.com/office/drawing/2010/main" Requires="a14">
+          <p:sp>
+            <p:nvSpPr>
+              <p:cNvPr id="54" name="TextBox 53">
+                <a:extLst>
+                  <a:ext uri="{FF2B5EF4-FFF2-40B4-BE49-F238E27FC236}">
+                    <a16:creationId xmlns:a16="http://schemas.microsoft.com/office/drawing/2014/main" id="{8E2C9C95-F4D6-4DAA-A9CD-26F36E5EBD4B}"/>
+                  </a:ext>
+                </a:extLst>
+              </p:cNvPr>
+              <p:cNvSpPr txBox="1"/>
+              <p:nvPr/>
+            </p:nvSpPr>
+            <p:spPr>
+              <a:xfrm>
+                <a:off x="4073684" y="6120330"/>
+                <a:ext cx="402292" cy="610873"/>
+              </a:xfrm>
+              <a:prstGeom prst="rect">
+                <a:avLst/>
+              </a:prstGeom>
+              <a:noFill/>
+            </p:spPr>
+            <p:txBody>
+              <a:bodyPr wrap="square" rtlCol="0">
+                <a:spAutoFit/>
+              </a:bodyPr>
+              <a:lstStyle/>
+              <a:p>
+                <a:pPr algn="ctr"/>
+                <a14:m>
+                  <m:oMathPara xmlns:m="http://schemas.openxmlformats.org/officeDocument/2006/math">
+                    <m:oMathParaPr>
+                      <m:jc m:val="centerGroup"/>
+                    </m:oMathParaPr>
+                    <m:oMath xmlns:m="http://schemas.openxmlformats.org/officeDocument/2006/math">
+                      <m:f>
+                        <m:fPr>
+                          <m:ctrlPr>
+                            <a:rPr lang="en-US" i="1" smtClean="0">
+                              <a:latin typeface="Cambria Math" panose="02040503050406030204" pitchFamily="18" charset="0"/>
+                            </a:rPr>
+                          </m:ctrlPr>
+                        </m:fPr>
+                        <m:num>
+                          <m:r>
+                            <a:rPr lang="en-US" b="0" i="1" smtClean="0">
+                              <a:latin typeface="Cambria Math" panose="02040503050406030204" pitchFamily="18" charset="0"/>
+                            </a:rPr>
+                            <m:t>𝑇</m:t>
+                          </m:r>
+                        </m:num>
+                        <m:den>
+                          <m:r>
+                            <a:rPr lang="en-US" b="0" i="1" smtClean="0">
+                              <a:latin typeface="Cambria Math" panose="02040503050406030204" pitchFamily="18" charset="0"/>
+                            </a:rPr>
+                            <m:t>𝑛</m:t>
+                          </m:r>
+                        </m:den>
+                      </m:f>
+                    </m:oMath>
+                  </m:oMathPara>
+                </a14:m>
+                <a:endParaRPr lang="en-US" i="1" dirty="0"/>
+              </a:p>
+            </p:txBody>
+          </p:sp>
+        </mc:Choice>
+        <mc:Fallback>
+          <p:sp>
+            <p:nvSpPr>
+              <p:cNvPr id="54" name="TextBox 53">
+                <a:extLst>
+                  <a:ext uri="{FF2B5EF4-FFF2-40B4-BE49-F238E27FC236}">
+                    <a16:creationId xmlns:a16="http://schemas.microsoft.com/office/drawing/2014/main" id="{8E2C9C95-F4D6-4DAA-A9CD-26F36E5EBD4B}"/>
+                  </a:ext>
+                </a:extLst>
+              </p:cNvPr>
+              <p:cNvSpPr txBox="1">
+                <a:spLocks noRot="1" noChangeAspect="1" noMove="1" noResize="1" noEditPoints="1" noAdjustHandles="1" noChangeArrowheads="1" noChangeShapeType="1" noTextEdit="1"/>
+              </p:cNvSpPr>
+              <p:nvPr/>
+            </p:nvSpPr>
+            <p:spPr>
+              <a:xfrm>
+                <a:off x="4073684" y="6120330"/>
+                <a:ext cx="402292" cy="610873"/>
+              </a:xfrm>
+              <a:prstGeom prst="rect">
+                <a:avLst/>
+              </a:prstGeom>
+              <a:blipFill>
+                <a:blip r:embed="rId2"/>
+                <a:stretch>
+                  <a:fillRect/>
+                </a:stretch>
+              </a:blipFill>
+            </p:spPr>
+            <p:txBody>
+              <a:bodyPr/>
+              <a:lstStyle/>
+              <a:p>
+                <a:r>
+                  <a:rPr lang="en-US">
+                    <a:noFill/>
+                  </a:rPr>
+                  <a:t> </a:t>
+                </a:r>
+              </a:p>
+            </p:txBody>
+          </p:sp>
+        </mc:Fallback>
+      </mc:AlternateContent>
+      <p:cxnSp>
+        <p:nvCxnSpPr>
+          <p:cNvPr id="66" name="Straight Arrow Connector 65">
+            <a:extLst>
+              <a:ext uri="{FF2B5EF4-FFF2-40B4-BE49-F238E27FC236}">
+                <a16:creationId xmlns:a16="http://schemas.microsoft.com/office/drawing/2014/main" id="{CC53DEDB-3BDF-417C-BE29-9E1F4FF4B6C8}"/>
+              </a:ext>
+            </a:extLst>
+          </p:cNvPr>
+          <p:cNvCxnSpPr>
+            <a:cxnSpLocks/>
+          </p:cNvCxnSpPr>
+          <p:nvPr/>
+        </p:nvCxnSpPr>
+        <p:spPr>
+          <a:xfrm>
+            <a:off x="5414506" y="5915959"/>
+            <a:ext cx="0" cy="163430"/>
+          </a:xfrm>
+          <a:prstGeom prst="straightConnector1">
+            <a:avLst/>
+          </a:prstGeom>
+          <a:ln w="19050">
+            <a:solidFill>
+              <a:schemeClr val="tx1"/>
+            </a:solidFill>
+            <a:headEnd type="none"/>
+            <a:tailEnd type="none" w="lg" len="lg"/>
+          </a:ln>
+        </p:spPr>
+        <p:style>
+          <a:lnRef idx="1">
+            <a:schemeClr val="accent1"/>
+          </a:lnRef>
+          <a:fillRef idx="0">
+            <a:schemeClr val="accent1"/>
+          </a:fillRef>
+          <a:effectRef idx="0">
+            <a:schemeClr val="accent1"/>
+          </a:effectRef>
+          <a:fontRef idx="minor">
+            <a:schemeClr val="tx1"/>
+          </a:fontRef>
+        </p:style>
+      </p:cxnSp>
+      <mc:AlternateContent xmlns:mc="http://schemas.openxmlformats.org/markup-compatibility/2006">
+        <mc:Choice xmlns:a14="http://schemas.microsoft.com/office/drawing/2010/main" Requires="a14">
+          <p:sp>
+            <p:nvSpPr>
+              <p:cNvPr id="67" name="TextBox 66">
+                <a:extLst>
+                  <a:ext uri="{FF2B5EF4-FFF2-40B4-BE49-F238E27FC236}">
+                    <a16:creationId xmlns:a16="http://schemas.microsoft.com/office/drawing/2014/main" id="{66065491-FC9C-4393-A968-095AD2B55DA0}"/>
+                  </a:ext>
+                </a:extLst>
+              </p:cNvPr>
+              <p:cNvSpPr txBox="1"/>
+              <p:nvPr/>
+            </p:nvSpPr>
+            <p:spPr>
+              <a:xfrm>
+                <a:off x="5242885" y="6120330"/>
+                <a:ext cx="402292" cy="610873"/>
+              </a:xfrm>
+              <a:prstGeom prst="rect">
+                <a:avLst/>
+              </a:prstGeom>
+              <a:noFill/>
+            </p:spPr>
+            <p:txBody>
+              <a:bodyPr wrap="square" rtlCol="0">
+                <a:spAutoFit/>
+              </a:bodyPr>
+              <a:lstStyle/>
+              <a:p>
+                <a:pPr algn="ctr"/>
+                <a14:m>
+                  <m:oMathPara xmlns:m="http://schemas.openxmlformats.org/officeDocument/2006/math">
+                    <m:oMathParaPr>
+                      <m:jc m:val="centerGroup"/>
+                    </m:oMathParaPr>
+                    <m:oMath xmlns:m="http://schemas.openxmlformats.org/officeDocument/2006/math">
+                      <m:f>
+                        <m:fPr>
+                          <m:ctrlPr>
+                            <a:rPr lang="en-US" i="1" smtClean="0">
+                              <a:latin typeface="Cambria Math" panose="02040503050406030204" pitchFamily="18" charset="0"/>
+                            </a:rPr>
+                          </m:ctrlPr>
+                        </m:fPr>
+                        <m:num>
+                          <m:r>
+                            <a:rPr lang="en-US" b="0" i="1" smtClean="0">
+                              <a:latin typeface="Cambria Math" panose="02040503050406030204" pitchFamily="18" charset="0"/>
+                            </a:rPr>
+                            <m:t>2 </m:t>
+                          </m:r>
+                          <m:r>
+                            <a:rPr lang="en-US" b="0" i="1" smtClean="0">
+                              <a:latin typeface="Cambria Math" panose="02040503050406030204" pitchFamily="18" charset="0"/>
+                            </a:rPr>
+                            <m:t>𝑇</m:t>
+                          </m:r>
+                        </m:num>
+                        <m:den>
+                          <m:r>
+                            <a:rPr lang="en-US" b="0" i="1" smtClean="0">
+                              <a:latin typeface="Cambria Math" panose="02040503050406030204" pitchFamily="18" charset="0"/>
+                            </a:rPr>
+                            <m:t>𝑛</m:t>
+                          </m:r>
+                        </m:den>
+                      </m:f>
+                    </m:oMath>
+                  </m:oMathPara>
+                </a14:m>
+                <a:endParaRPr lang="en-US" i="1" dirty="0"/>
+              </a:p>
+            </p:txBody>
+          </p:sp>
+        </mc:Choice>
+        <mc:Fallback>
+          <p:sp>
+            <p:nvSpPr>
+              <p:cNvPr id="67" name="TextBox 66">
+                <a:extLst>
+                  <a:ext uri="{FF2B5EF4-FFF2-40B4-BE49-F238E27FC236}">
+                    <a16:creationId xmlns:a16="http://schemas.microsoft.com/office/drawing/2014/main" id="{66065491-FC9C-4393-A968-095AD2B55DA0}"/>
+                  </a:ext>
+                </a:extLst>
+              </p:cNvPr>
+              <p:cNvSpPr txBox="1">
+                <a:spLocks noRot="1" noChangeAspect="1" noMove="1" noResize="1" noEditPoints="1" noAdjustHandles="1" noChangeArrowheads="1" noChangeShapeType="1" noTextEdit="1"/>
+              </p:cNvSpPr>
+              <p:nvPr/>
+            </p:nvSpPr>
+            <p:spPr>
+              <a:xfrm>
+                <a:off x="5242885" y="6120330"/>
+                <a:ext cx="402292" cy="610873"/>
+              </a:xfrm>
+              <a:prstGeom prst="rect">
+                <a:avLst/>
+              </a:prstGeom>
+              <a:blipFill>
+                <a:blip r:embed="rId3"/>
+                <a:stretch>
+                  <a:fillRect/>
+                </a:stretch>
+              </a:blipFill>
+            </p:spPr>
+            <p:txBody>
+              <a:bodyPr/>
+              <a:lstStyle/>
+              <a:p>
+                <a:r>
+                  <a:rPr lang="en-US">
+                    <a:noFill/>
+                  </a:rPr>
+                  <a:t> </a:t>
+                </a:r>
+              </a:p>
+            </p:txBody>
+          </p:sp>
+        </mc:Fallback>
+      </mc:AlternateContent>
+      <p:sp>
+        <p:nvSpPr>
+          <p:cNvPr id="68" name="Oval 67">
+            <a:extLst>
+              <a:ext uri="{FF2B5EF4-FFF2-40B4-BE49-F238E27FC236}">
+                <a16:creationId xmlns:a16="http://schemas.microsoft.com/office/drawing/2014/main" id="{0C11B6EE-3073-4349-A8D0-2C956E4C60A8}"/>
+              </a:ext>
+            </a:extLst>
+          </p:cNvPr>
+          <p:cNvSpPr/>
+          <p:nvPr/>
+        </p:nvSpPr>
+        <p:spPr>
+          <a:xfrm>
+            <a:off x="7418096" y="5022994"/>
+            <a:ext cx="182880" cy="182880"/>
+          </a:xfrm>
+          <a:prstGeom prst="ellipse">
+            <a:avLst/>
+          </a:prstGeom>
+          <a:solidFill>
+            <a:srgbClr val="FF0000"/>
+          </a:solidFill>
+          <a:ln w="19050">
+            <a:solidFill>
+              <a:schemeClr val="tx1"/>
+            </a:solidFill>
+          </a:ln>
+        </p:spPr>
+        <p:style>
+          <a:lnRef idx="2">
+            <a:schemeClr val="accent1">
+              <a:shade val="50000"/>
+            </a:schemeClr>
+          </a:lnRef>
+          <a:fillRef idx="1">
+            <a:schemeClr val="accent1"/>
+          </a:fillRef>
+          <a:effectRef idx="0">
+            <a:schemeClr val="accent1"/>
+          </a:effectRef>
+          <a:fontRef idx="minor">
+            <a:schemeClr val="lt1"/>
+          </a:fontRef>
+        </p:style>
+        <p:txBody>
+          <a:bodyPr rtlCol="0" anchor="ctr"/>
+          <a:lstStyle/>
+          <a:p>
+            <a:pPr algn="ctr"/>
+            <a:r>
+              <a:rPr lang="en-US" dirty="0"/>
+              <a:t> </a:t>
+            </a:r>
+          </a:p>
+        </p:txBody>
+      </p:sp>
+      <p:sp>
+        <p:nvSpPr>
+          <p:cNvPr id="70" name="Oval 69">
+            <a:extLst>
+              <a:ext uri="{FF2B5EF4-FFF2-40B4-BE49-F238E27FC236}">
+                <a16:creationId xmlns:a16="http://schemas.microsoft.com/office/drawing/2014/main" id="{C52A0049-7F10-4D0D-A779-100868BB17C8}"/>
+              </a:ext>
+            </a:extLst>
+          </p:cNvPr>
+          <p:cNvSpPr/>
+          <p:nvPr/>
+        </p:nvSpPr>
+        <p:spPr>
+          <a:xfrm>
+            <a:off x="7418395" y="3605734"/>
+            <a:ext cx="182880" cy="182880"/>
+          </a:xfrm>
+          <a:prstGeom prst="ellipse">
+            <a:avLst/>
+          </a:prstGeom>
+          <a:solidFill>
+            <a:srgbClr val="FF0000"/>
+          </a:solidFill>
+          <a:ln w="19050">
+            <a:solidFill>
+              <a:schemeClr val="tx1"/>
+            </a:solidFill>
+          </a:ln>
+        </p:spPr>
+        <p:style>
+          <a:lnRef idx="2">
+            <a:schemeClr val="accent1">
+              <a:shade val="50000"/>
+            </a:schemeClr>
+          </a:lnRef>
+          <a:fillRef idx="1">
+            <a:schemeClr val="accent1"/>
+          </a:fillRef>
+          <a:effectRef idx="0">
+            <a:schemeClr val="accent1"/>
+          </a:effectRef>
+          <a:fontRef idx="minor">
+            <a:schemeClr val="lt1"/>
+          </a:fontRef>
+        </p:style>
+        <p:txBody>
+          <a:bodyPr rtlCol="0" anchor="ctr"/>
+          <a:lstStyle/>
+          <a:p>
+            <a:pPr algn="ctr"/>
+            <a:r>
+              <a:rPr lang="en-US" dirty="0"/>
+              <a:t> </a:t>
+            </a:r>
+          </a:p>
+        </p:txBody>
+      </p:sp>
+      <p:sp>
+        <p:nvSpPr>
+          <p:cNvPr id="71" name="Oval 70">
+            <a:extLst>
+              <a:ext uri="{FF2B5EF4-FFF2-40B4-BE49-F238E27FC236}">
+                <a16:creationId xmlns:a16="http://schemas.microsoft.com/office/drawing/2014/main" id="{88F204DD-41AC-4AF0-B759-546DED115A53}"/>
+              </a:ext>
+            </a:extLst>
+          </p:cNvPr>
+          <p:cNvSpPr/>
+          <p:nvPr/>
+        </p:nvSpPr>
+        <p:spPr>
+          <a:xfrm>
+            <a:off x="7418096" y="1455645"/>
+            <a:ext cx="182880" cy="182880"/>
+          </a:xfrm>
+          <a:prstGeom prst="ellipse">
+            <a:avLst/>
+          </a:prstGeom>
+          <a:solidFill>
+            <a:srgbClr val="FF0000"/>
+          </a:solidFill>
+          <a:ln w="19050">
+            <a:solidFill>
+              <a:schemeClr val="tx1"/>
+            </a:solidFill>
+          </a:ln>
+        </p:spPr>
+        <p:style>
+          <a:lnRef idx="2">
+            <a:schemeClr val="accent1">
+              <a:shade val="50000"/>
+            </a:schemeClr>
+          </a:lnRef>
+          <a:fillRef idx="1">
+            <a:schemeClr val="accent1"/>
+          </a:fillRef>
+          <a:effectRef idx="0">
+            <a:schemeClr val="accent1"/>
+          </a:effectRef>
+          <a:fontRef idx="minor">
+            <a:schemeClr val="lt1"/>
+          </a:fontRef>
+        </p:style>
+        <p:txBody>
+          <a:bodyPr rtlCol="0" anchor="ctr"/>
+          <a:lstStyle/>
+          <a:p>
+            <a:pPr algn="ctr"/>
+            <a:r>
+              <a:rPr lang="en-US" dirty="0"/>
+              <a:t> </a:t>
+            </a:r>
+          </a:p>
+        </p:txBody>
+      </p:sp>
+      <p:sp>
+        <p:nvSpPr>
+          <p:cNvPr id="72" name="Oval 71">
+            <a:extLst>
+              <a:ext uri="{FF2B5EF4-FFF2-40B4-BE49-F238E27FC236}">
+                <a16:creationId xmlns:a16="http://schemas.microsoft.com/office/drawing/2014/main" id="{4254AE40-85FF-4C71-83A2-5378A96DE953}"/>
+              </a:ext>
+            </a:extLst>
+          </p:cNvPr>
+          <p:cNvSpPr/>
+          <p:nvPr/>
+        </p:nvSpPr>
+        <p:spPr>
+          <a:xfrm>
+            <a:off x="7418096" y="2030724"/>
+            <a:ext cx="182880" cy="182880"/>
+          </a:xfrm>
+          <a:prstGeom prst="ellipse">
+            <a:avLst/>
+          </a:prstGeom>
+          <a:solidFill>
+            <a:srgbClr val="FF0000"/>
+          </a:solidFill>
+          <a:ln w="19050">
+            <a:solidFill>
+              <a:schemeClr val="tx1"/>
+            </a:solidFill>
+          </a:ln>
+        </p:spPr>
+        <p:style>
+          <a:lnRef idx="2">
+            <a:schemeClr val="accent1">
+              <a:shade val="50000"/>
+            </a:schemeClr>
+          </a:lnRef>
+          <a:fillRef idx="1">
+            <a:schemeClr val="accent1"/>
+          </a:fillRef>
+          <a:effectRef idx="0">
+            <a:schemeClr val="accent1"/>
+          </a:effectRef>
+          <a:fontRef idx="minor">
+            <a:schemeClr val="lt1"/>
+          </a:fontRef>
+        </p:style>
+        <p:txBody>
+          <a:bodyPr rtlCol="0" anchor="ctr"/>
+          <a:lstStyle/>
+          <a:p>
+            <a:pPr algn="ctr"/>
+            <a:r>
+              <a:rPr lang="en-US" dirty="0"/>
+              <a:t> </a:t>
+            </a:r>
+          </a:p>
+        </p:txBody>
+      </p:sp>
+      <p:cxnSp>
+        <p:nvCxnSpPr>
+          <p:cNvPr id="73" name="Straight Arrow Connector 72">
+            <a:extLst>
+              <a:ext uri="{FF2B5EF4-FFF2-40B4-BE49-F238E27FC236}">
+                <a16:creationId xmlns:a16="http://schemas.microsoft.com/office/drawing/2014/main" id="{97929BB3-BA43-4259-8E91-8E5BEBC9F1DA}"/>
+              </a:ext>
+            </a:extLst>
+          </p:cNvPr>
+          <p:cNvCxnSpPr>
+            <a:cxnSpLocks/>
+          </p:cNvCxnSpPr>
+          <p:nvPr/>
+        </p:nvCxnSpPr>
+        <p:spPr>
+          <a:xfrm>
+            <a:off x="7509835" y="5906230"/>
+            <a:ext cx="0" cy="163430"/>
+          </a:xfrm>
+          <a:prstGeom prst="straightConnector1">
+            <a:avLst/>
+          </a:prstGeom>
+          <a:ln w="19050">
+            <a:solidFill>
+              <a:schemeClr val="tx1"/>
+            </a:solidFill>
+            <a:headEnd type="none"/>
+            <a:tailEnd type="none" w="lg" len="lg"/>
+          </a:ln>
+        </p:spPr>
+        <p:style>
+          <a:lnRef idx="1">
+            <a:schemeClr val="accent1"/>
+          </a:lnRef>
+          <a:fillRef idx="0">
+            <a:schemeClr val="accent1"/>
+          </a:fillRef>
+          <a:effectRef idx="0">
+            <a:schemeClr val="accent1"/>
+          </a:effectRef>
+          <a:fontRef idx="minor">
+            <a:schemeClr val="tx1"/>
+          </a:fontRef>
+        </p:style>
+      </p:cxnSp>
+      <mc:AlternateContent xmlns:mc="http://schemas.openxmlformats.org/markup-compatibility/2006">
+        <mc:Choice xmlns:a14="http://schemas.microsoft.com/office/drawing/2010/main" Requires="a14">
+          <p:sp>
+            <p:nvSpPr>
+              <p:cNvPr id="75" name="TextBox 74">
+                <a:extLst>
+                  <a:ext uri="{FF2B5EF4-FFF2-40B4-BE49-F238E27FC236}">
+                    <a16:creationId xmlns:a16="http://schemas.microsoft.com/office/drawing/2014/main" id="{1BB22211-E37C-46B1-993D-812FC61CAFC3}"/>
+                  </a:ext>
+                </a:extLst>
+              </p:cNvPr>
+              <p:cNvSpPr txBox="1"/>
+              <p:nvPr/>
+            </p:nvSpPr>
+            <p:spPr>
+              <a:xfrm>
+                <a:off x="7347300" y="6095299"/>
+                <a:ext cx="402292" cy="369332"/>
+              </a:xfrm>
+              <a:prstGeom prst="rect">
+                <a:avLst/>
+              </a:prstGeom>
+              <a:noFill/>
+            </p:spPr>
+            <p:txBody>
+              <a:bodyPr wrap="square" rtlCol="0">
+                <a:spAutoFit/>
+              </a:bodyPr>
+              <a:lstStyle/>
+              <a:p>
+                <a:pPr algn="ctr"/>
+                <a14:m>
+                  <m:oMathPara xmlns:m="http://schemas.openxmlformats.org/officeDocument/2006/math">
+                    <m:oMathParaPr>
+                      <m:jc m:val="centerGroup"/>
+                    </m:oMathParaPr>
+                    <m:oMath xmlns:m="http://schemas.openxmlformats.org/officeDocument/2006/math">
+                      <m:r>
+                        <a:rPr lang="en-US" i="1">
+                          <a:latin typeface="Cambria Math" panose="02040503050406030204" pitchFamily="18" charset="0"/>
+                        </a:rPr>
+                        <m:t>𝑇</m:t>
+                      </m:r>
+                    </m:oMath>
+                  </m:oMathPara>
+                </a14:m>
+                <a:endParaRPr lang="en-US" i="1" dirty="0"/>
+              </a:p>
+            </p:txBody>
+          </p:sp>
+        </mc:Choice>
+        <mc:Fallback>
+          <p:sp>
+            <p:nvSpPr>
+              <p:cNvPr id="75" name="TextBox 74">
+                <a:extLst>
+                  <a:ext uri="{FF2B5EF4-FFF2-40B4-BE49-F238E27FC236}">
+                    <a16:creationId xmlns:a16="http://schemas.microsoft.com/office/drawing/2014/main" id="{1BB22211-E37C-46B1-993D-812FC61CAFC3}"/>
+                  </a:ext>
+                </a:extLst>
+              </p:cNvPr>
+              <p:cNvSpPr txBox="1">
+                <a:spLocks noRot="1" noChangeAspect="1" noMove="1" noResize="1" noEditPoints="1" noAdjustHandles="1" noChangeArrowheads="1" noChangeShapeType="1" noTextEdit="1"/>
+              </p:cNvSpPr>
+              <p:nvPr/>
+            </p:nvSpPr>
+            <p:spPr>
+              <a:xfrm>
+                <a:off x="7347300" y="6095299"/>
+                <a:ext cx="402292" cy="369332"/>
+              </a:xfrm>
+              <a:prstGeom prst="rect">
+                <a:avLst/>
+              </a:prstGeom>
+              <a:blipFill>
+                <a:blip r:embed="rId4"/>
+                <a:stretch>
+                  <a:fillRect/>
+                </a:stretch>
+              </a:blipFill>
+            </p:spPr>
+            <p:txBody>
+              <a:bodyPr/>
+              <a:lstStyle/>
+              <a:p>
+                <a:r>
+                  <a:rPr lang="en-US">
+                    <a:noFill/>
+                  </a:rPr>
+                  <a:t> </a:t>
+                </a:r>
+              </a:p>
+            </p:txBody>
+          </p:sp>
+        </mc:Fallback>
+      </mc:AlternateContent>
+      <mc:AlternateContent xmlns:mc="http://schemas.openxmlformats.org/markup-compatibility/2006">
+        <mc:Choice xmlns:a14="http://schemas.microsoft.com/office/drawing/2010/main" Requires="a14">
+          <p:sp>
+            <p:nvSpPr>
+              <p:cNvPr id="76" name="TextBox 75">
+                <a:extLst>
+                  <a:ext uri="{FF2B5EF4-FFF2-40B4-BE49-F238E27FC236}">
+                    <a16:creationId xmlns:a16="http://schemas.microsoft.com/office/drawing/2014/main" id="{13D61740-CB83-49E4-904F-1A7A71778763}"/>
+                  </a:ext>
+                </a:extLst>
+              </p:cNvPr>
+              <p:cNvSpPr txBox="1"/>
+              <p:nvPr/>
+            </p:nvSpPr>
+            <p:spPr>
+              <a:xfrm>
+                <a:off x="2765384" y="6095299"/>
+                <a:ext cx="781213" cy="369332"/>
+              </a:xfrm>
+              <a:prstGeom prst="rect">
+                <a:avLst/>
+              </a:prstGeom>
+              <a:noFill/>
+            </p:spPr>
+            <p:txBody>
+              <a:bodyPr wrap="square" rtlCol="0">
+                <a:spAutoFit/>
+              </a:bodyPr>
+              <a:lstStyle/>
+              <a:p>
+                <a:pPr algn="ctr"/>
+                <a14:m>
+                  <m:oMathPara xmlns:m="http://schemas.openxmlformats.org/officeDocument/2006/math">
+                    <m:oMathParaPr>
+                      <m:jc m:val="centerGroup"/>
+                    </m:oMathParaPr>
+                    <m:oMath xmlns:m="http://schemas.openxmlformats.org/officeDocument/2006/math">
+                      <m:r>
+                        <a:rPr lang="en-US" b="0" i="1" smtClean="0">
+                          <a:latin typeface="Cambria Math" panose="02040503050406030204" pitchFamily="18" charset="0"/>
+                        </a:rPr>
+                        <m:t>𝑡</m:t>
+                      </m:r>
+                      <m:r>
+                        <a:rPr lang="en-US" b="0" i="1" smtClean="0">
+                          <a:latin typeface="Cambria Math" panose="02040503050406030204" pitchFamily="18" charset="0"/>
+                        </a:rPr>
+                        <m:t>=0</m:t>
+                      </m:r>
+                    </m:oMath>
+                  </m:oMathPara>
+                </a14:m>
+                <a:endParaRPr lang="en-US" i="1" dirty="0"/>
+              </a:p>
+            </p:txBody>
+          </p:sp>
+        </mc:Choice>
+        <mc:Fallback>
+          <p:sp>
+            <p:nvSpPr>
+              <p:cNvPr id="76" name="TextBox 75">
+                <a:extLst>
+                  <a:ext uri="{FF2B5EF4-FFF2-40B4-BE49-F238E27FC236}">
+                    <a16:creationId xmlns:a16="http://schemas.microsoft.com/office/drawing/2014/main" id="{13D61740-CB83-49E4-904F-1A7A71778763}"/>
+                  </a:ext>
+                </a:extLst>
+              </p:cNvPr>
+              <p:cNvSpPr txBox="1">
+                <a:spLocks noRot="1" noChangeAspect="1" noMove="1" noResize="1" noEditPoints="1" noAdjustHandles="1" noChangeArrowheads="1" noChangeShapeType="1" noTextEdit="1"/>
+              </p:cNvSpPr>
+              <p:nvPr/>
+            </p:nvSpPr>
+            <p:spPr>
+              <a:xfrm>
+                <a:off x="2765384" y="6095299"/>
+                <a:ext cx="781213" cy="369332"/>
+              </a:xfrm>
+              <a:prstGeom prst="rect">
+                <a:avLst/>
+              </a:prstGeom>
+              <a:blipFill>
+                <a:blip r:embed="rId5"/>
+                <a:stretch>
+                  <a:fillRect/>
+                </a:stretch>
+              </a:blipFill>
+            </p:spPr>
+            <p:txBody>
+              <a:bodyPr/>
+              <a:lstStyle/>
+              <a:p>
+                <a:r>
+                  <a:rPr lang="en-US">
+                    <a:noFill/>
+                  </a:rPr>
+                  <a:t> </a:t>
+                </a:r>
+              </a:p>
+            </p:txBody>
+          </p:sp>
+        </mc:Fallback>
+      </mc:AlternateContent>
+      <p:sp>
+        <p:nvSpPr>
+          <p:cNvPr id="3" name="TextBox 2">
+            <a:extLst>
+              <a:ext uri="{FF2B5EF4-FFF2-40B4-BE49-F238E27FC236}">
+                <a16:creationId xmlns:a16="http://schemas.microsoft.com/office/drawing/2014/main" id="{D33A1EEF-3BA9-4343-B9E7-86C6A8113413}"/>
+              </a:ext>
+            </a:extLst>
+          </p:cNvPr>
+          <p:cNvSpPr txBox="1"/>
+          <p:nvPr/>
+        </p:nvSpPr>
+        <p:spPr>
+          <a:xfrm>
+            <a:off x="2948500" y="5227240"/>
+            <a:ext cx="2828780" cy="369332"/>
+          </a:xfrm>
+          <a:prstGeom prst="rect">
+            <a:avLst/>
+          </a:prstGeom>
+          <a:noFill/>
+        </p:spPr>
+        <p:txBody>
+          <a:bodyPr wrap="square" rtlCol="0">
+            <a:spAutoFit/>
+          </a:bodyPr>
+          <a:lstStyle/>
+          <a:p>
+            <a:r>
+              <a:rPr lang="en-US" dirty="0"/>
+              <a:t>Step number (tree level)</a:t>
+            </a:r>
+          </a:p>
+        </p:txBody>
+      </p:sp>
+      <p:sp>
+        <p:nvSpPr>
+          <p:cNvPr id="82" name="TextBox 81">
+            <a:extLst>
+              <a:ext uri="{FF2B5EF4-FFF2-40B4-BE49-F238E27FC236}">
+                <a16:creationId xmlns:a16="http://schemas.microsoft.com/office/drawing/2014/main" id="{3B59A14E-91EB-4DFC-B77C-D23FA045B190}"/>
+              </a:ext>
+            </a:extLst>
+          </p:cNvPr>
+          <p:cNvSpPr txBox="1"/>
+          <p:nvPr/>
+        </p:nvSpPr>
+        <p:spPr>
+          <a:xfrm>
+            <a:off x="6157459" y="5546410"/>
+            <a:ext cx="811215" cy="369332"/>
+          </a:xfrm>
+          <a:prstGeom prst="rect">
+            <a:avLst/>
+          </a:prstGeom>
+          <a:noFill/>
+        </p:spPr>
+        <p:txBody>
+          <a:bodyPr wrap="square" rtlCol="0">
+            <a:spAutoFit/>
+          </a:bodyPr>
+          <a:lstStyle/>
+          <a:p>
+            <a:pPr algn="ctr"/>
+            <a:r>
+              <a:rPr lang="en-US" dirty="0"/>
+              <a:t>. . .</a:t>
+            </a:r>
+          </a:p>
+        </p:txBody>
+      </p:sp>
+      <p:sp>
+        <p:nvSpPr>
+          <p:cNvPr id="83" name="TextBox 82">
+            <a:extLst>
+              <a:ext uri="{FF2B5EF4-FFF2-40B4-BE49-F238E27FC236}">
+                <a16:creationId xmlns:a16="http://schemas.microsoft.com/office/drawing/2014/main" id="{3FC294E0-E71B-461E-8D71-2646B167C62A}"/>
+              </a:ext>
+            </a:extLst>
+          </p:cNvPr>
+          <p:cNvSpPr txBox="1"/>
+          <p:nvPr/>
+        </p:nvSpPr>
+        <p:spPr>
+          <a:xfrm>
+            <a:off x="8260536" y="400787"/>
+            <a:ext cx="1344386" cy="646331"/>
+          </a:xfrm>
+          <a:prstGeom prst="rect">
+            <a:avLst/>
+          </a:prstGeom>
+          <a:noFill/>
+        </p:spPr>
+        <p:txBody>
+          <a:bodyPr wrap="square" rtlCol="0">
+            <a:spAutoFit/>
+          </a:bodyPr>
+          <a:lstStyle/>
+          <a:p>
+            <a:r>
+              <a:rPr lang="en-US" dirty="0"/>
+              <a:t>Stock price</a:t>
+            </a:r>
+          </a:p>
+          <a:p>
+            <a:r>
+              <a:rPr lang="en-US" dirty="0"/>
+              <a:t>at maturity</a:t>
+            </a:r>
+          </a:p>
+        </p:txBody>
+      </p:sp>
+      <p:sp>
+        <p:nvSpPr>
+          <p:cNvPr id="84" name="TextBox 83">
+            <a:extLst>
+              <a:ext uri="{FF2B5EF4-FFF2-40B4-BE49-F238E27FC236}">
+                <a16:creationId xmlns:a16="http://schemas.microsoft.com/office/drawing/2014/main" id="{8E6D2B05-78DB-416C-BED2-8FA1268E0BEF}"/>
+              </a:ext>
+            </a:extLst>
+          </p:cNvPr>
+          <p:cNvSpPr txBox="1"/>
+          <p:nvPr/>
+        </p:nvSpPr>
+        <p:spPr>
+          <a:xfrm>
+            <a:off x="9897722" y="419189"/>
+            <a:ext cx="1344386" cy="646331"/>
+          </a:xfrm>
+          <a:prstGeom prst="rect">
+            <a:avLst/>
+          </a:prstGeom>
+          <a:noFill/>
+        </p:spPr>
+        <p:txBody>
+          <a:bodyPr wrap="square" rtlCol="0">
+            <a:spAutoFit/>
+          </a:bodyPr>
+          <a:lstStyle/>
+          <a:p>
+            <a:r>
+              <a:rPr lang="en-US" dirty="0"/>
+              <a:t>Probability of this node</a:t>
+            </a:r>
+          </a:p>
+        </p:txBody>
+      </p:sp>
+      <p:sp>
+        <p:nvSpPr>
+          <p:cNvPr id="85" name="TextBox 84">
+            <a:extLst>
+              <a:ext uri="{FF2B5EF4-FFF2-40B4-BE49-F238E27FC236}">
+                <a16:creationId xmlns:a16="http://schemas.microsoft.com/office/drawing/2014/main" id="{9EC3F895-B752-4B62-8029-FF051EF4A2B2}"/>
+              </a:ext>
+            </a:extLst>
+          </p:cNvPr>
+          <p:cNvSpPr txBox="1"/>
+          <p:nvPr/>
+        </p:nvSpPr>
+        <p:spPr>
+          <a:xfrm rot="5400000">
+            <a:off x="7154864" y="2692065"/>
+            <a:ext cx="811215" cy="369332"/>
+          </a:xfrm>
+          <a:prstGeom prst="rect">
+            <a:avLst/>
+          </a:prstGeom>
+          <a:noFill/>
+        </p:spPr>
+        <p:txBody>
+          <a:bodyPr wrap="square" rtlCol="0">
+            <a:spAutoFit/>
+          </a:bodyPr>
+          <a:lstStyle/>
+          <a:p>
+            <a:pPr algn="ctr"/>
+            <a:r>
+              <a:rPr lang="en-US" dirty="0"/>
+              <a:t>. . .</a:t>
+            </a:r>
+          </a:p>
+        </p:txBody>
+      </p:sp>
+      <p:sp>
+        <p:nvSpPr>
+          <p:cNvPr id="86" name="TextBox 85">
+            <a:extLst>
+              <a:ext uri="{FF2B5EF4-FFF2-40B4-BE49-F238E27FC236}">
+                <a16:creationId xmlns:a16="http://schemas.microsoft.com/office/drawing/2014/main" id="{4D514536-26B6-4BE0-893C-0538A8DECF78}"/>
+              </a:ext>
+            </a:extLst>
+          </p:cNvPr>
+          <p:cNvSpPr txBox="1"/>
+          <p:nvPr/>
+        </p:nvSpPr>
+        <p:spPr>
+          <a:xfrm rot="5400000">
+            <a:off x="7149614" y="4168772"/>
+            <a:ext cx="811215" cy="369332"/>
+          </a:xfrm>
+          <a:prstGeom prst="rect">
+            <a:avLst/>
+          </a:prstGeom>
+          <a:noFill/>
+        </p:spPr>
+        <p:txBody>
+          <a:bodyPr wrap="square" rtlCol="0">
+            <a:spAutoFit/>
+          </a:bodyPr>
+          <a:lstStyle/>
+          <a:p>
+            <a:pPr algn="ctr"/>
+            <a:r>
+              <a:rPr lang="en-US" dirty="0"/>
+              <a:t>. . .</a:t>
+            </a:r>
+          </a:p>
+        </p:txBody>
+      </p:sp>
+      <p:sp>
+        <p:nvSpPr>
+          <p:cNvPr id="87" name="TextBox 86">
+            <a:extLst>
+              <a:ext uri="{FF2B5EF4-FFF2-40B4-BE49-F238E27FC236}">
+                <a16:creationId xmlns:a16="http://schemas.microsoft.com/office/drawing/2014/main" id="{82105614-EA30-4CE2-A82E-6A46E0836E40}"/>
+              </a:ext>
+            </a:extLst>
+          </p:cNvPr>
+          <p:cNvSpPr txBox="1"/>
+          <p:nvPr/>
+        </p:nvSpPr>
+        <p:spPr>
+          <a:xfrm>
+            <a:off x="6868455" y="400787"/>
+            <a:ext cx="1099281" cy="646331"/>
+          </a:xfrm>
+          <a:prstGeom prst="rect">
+            <a:avLst/>
+          </a:prstGeom>
+          <a:noFill/>
+        </p:spPr>
+        <p:txBody>
+          <a:bodyPr wrap="square" rtlCol="0">
+            <a:spAutoFit/>
+          </a:bodyPr>
+          <a:lstStyle/>
+          <a:p>
+            <a:r>
+              <a:rPr lang="en-US" dirty="0"/>
+              <a:t>Index of</a:t>
+            </a:r>
+          </a:p>
+          <a:p>
+            <a:r>
+              <a:rPr lang="en-US" dirty="0"/>
+              <a:t>end node</a:t>
+            </a:r>
+          </a:p>
+        </p:txBody>
+      </p:sp>
+      <p:sp>
+        <p:nvSpPr>
+          <p:cNvPr id="88" name="TextBox 87">
+            <a:extLst>
+              <a:ext uri="{FF2B5EF4-FFF2-40B4-BE49-F238E27FC236}">
+                <a16:creationId xmlns:a16="http://schemas.microsoft.com/office/drawing/2014/main" id="{6C7B7A49-BA9A-4670-99A4-0684C85B7442}"/>
+              </a:ext>
+            </a:extLst>
+          </p:cNvPr>
+          <p:cNvSpPr txBox="1"/>
+          <p:nvPr/>
+        </p:nvSpPr>
+        <p:spPr>
+          <a:xfrm>
+            <a:off x="7587715" y="1366979"/>
+            <a:ext cx="324914" cy="376792"/>
+          </a:xfrm>
+          <a:prstGeom prst="rect">
+            <a:avLst/>
+          </a:prstGeom>
+          <a:noFill/>
+        </p:spPr>
+        <p:txBody>
+          <a:bodyPr wrap="square" rtlCol="0">
+            <a:spAutoFit/>
+          </a:bodyPr>
+          <a:lstStyle/>
+          <a:p>
+            <a:pPr algn="ctr"/>
+            <a:r>
+              <a:rPr lang="en-US" dirty="0"/>
+              <a:t>0</a:t>
+            </a:r>
+          </a:p>
+        </p:txBody>
+      </p:sp>
+      <p:sp>
+        <p:nvSpPr>
+          <p:cNvPr id="89" name="TextBox 88">
+            <a:extLst>
+              <a:ext uri="{FF2B5EF4-FFF2-40B4-BE49-F238E27FC236}">
+                <a16:creationId xmlns:a16="http://schemas.microsoft.com/office/drawing/2014/main" id="{51B53929-2ACD-454E-BF9F-E07BC044561D}"/>
+              </a:ext>
+            </a:extLst>
+          </p:cNvPr>
+          <p:cNvSpPr txBox="1"/>
+          <p:nvPr/>
+        </p:nvSpPr>
+        <p:spPr>
+          <a:xfrm>
+            <a:off x="7587715" y="1939731"/>
+            <a:ext cx="324914" cy="376792"/>
+          </a:xfrm>
+          <a:prstGeom prst="rect">
+            <a:avLst/>
+          </a:prstGeom>
+          <a:noFill/>
+        </p:spPr>
+        <p:txBody>
+          <a:bodyPr wrap="square" rtlCol="0">
+            <a:spAutoFit/>
+          </a:bodyPr>
+          <a:lstStyle/>
+          <a:p>
+            <a:pPr algn="ctr"/>
+            <a:r>
+              <a:rPr lang="en-US" dirty="0"/>
+              <a:t>1</a:t>
+            </a:r>
+          </a:p>
+        </p:txBody>
+      </p:sp>
+      <p:sp>
+        <p:nvSpPr>
+          <p:cNvPr id="90" name="TextBox 89">
+            <a:extLst>
+              <a:ext uri="{FF2B5EF4-FFF2-40B4-BE49-F238E27FC236}">
+                <a16:creationId xmlns:a16="http://schemas.microsoft.com/office/drawing/2014/main" id="{CBA031A8-09DD-49C6-8670-7E8481C5B0AC}"/>
+              </a:ext>
+            </a:extLst>
+          </p:cNvPr>
+          <p:cNvSpPr txBox="1"/>
+          <p:nvPr/>
+        </p:nvSpPr>
+        <p:spPr>
+          <a:xfrm>
+            <a:off x="7587715" y="3509124"/>
+            <a:ext cx="324914" cy="376792"/>
+          </a:xfrm>
+          <a:prstGeom prst="rect">
+            <a:avLst/>
+          </a:prstGeom>
+          <a:noFill/>
+        </p:spPr>
+        <p:txBody>
+          <a:bodyPr wrap="square" rtlCol="0">
+            <a:spAutoFit/>
+          </a:bodyPr>
+          <a:lstStyle/>
+          <a:p>
+            <a:pPr algn="ctr"/>
+            <a:r>
+              <a:rPr lang="en-US" dirty="0"/>
+              <a:t>k</a:t>
+            </a:r>
+          </a:p>
+        </p:txBody>
+      </p:sp>
+      <p:sp>
+        <p:nvSpPr>
+          <p:cNvPr id="91" name="TextBox 90">
+            <a:extLst>
+              <a:ext uri="{FF2B5EF4-FFF2-40B4-BE49-F238E27FC236}">
+                <a16:creationId xmlns:a16="http://schemas.microsoft.com/office/drawing/2014/main" id="{53A15121-7BEF-45F0-82AB-C07D0ED0E620}"/>
+              </a:ext>
+            </a:extLst>
+          </p:cNvPr>
+          <p:cNvSpPr txBox="1"/>
+          <p:nvPr/>
+        </p:nvSpPr>
+        <p:spPr>
+          <a:xfrm>
+            <a:off x="7587715" y="4923135"/>
+            <a:ext cx="324914" cy="376792"/>
+          </a:xfrm>
+          <a:prstGeom prst="rect">
+            <a:avLst/>
+          </a:prstGeom>
+          <a:noFill/>
+        </p:spPr>
+        <p:txBody>
+          <a:bodyPr wrap="square" rtlCol="0">
+            <a:spAutoFit/>
+          </a:bodyPr>
+          <a:lstStyle/>
+          <a:p>
+            <a:pPr algn="ctr"/>
+            <a:r>
+              <a:rPr lang="en-US" dirty="0"/>
+              <a:t>n</a:t>
+            </a:r>
+          </a:p>
+        </p:txBody>
+      </p:sp>
+      <p:sp>
+        <p:nvSpPr>
+          <p:cNvPr id="92" name="TextBox 91">
+            <a:extLst>
+              <a:ext uri="{FF2B5EF4-FFF2-40B4-BE49-F238E27FC236}">
+                <a16:creationId xmlns:a16="http://schemas.microsoft.com/office/drawing/2014/main" id="{6EED21AD-8B23-44BE-B3EE-D7E6D970418A}"/>
+              </a:ext>
+            </a:extLst>
+          </p:cNvPr>
+          <p:cNvSpPr txBox="1"/>
+          <p:nvPr/>
+        </p:nvSpPr>
+        <p:spPr>
+          <a:xfrm>
+            <a:off x="6157458" y="2830344"/>
+            <a:ext cx="811215" cy="369332"/>
+          </a:xfrm>
+          <a:prstGeom prst="rect">
+            <a:avLst/>
+          </a:prstGeom>
+          <a:noFill/>
+        </p:spPr>
+        <p:txBody>
+          <a:bodyPr wrap="square" rtlCol="0">
+            <a:spAutoFit/>
+          </a:bodyPr>
+          <a:lstStyle/>
+          <a:p>
+            <a:pPr algn="ctr"/>
+            <a:r>
+              <a:rPr lang="en-US" dirty="0"/>
+              <a:t>. . .</a:t>
+            </a:r>
+          </a:p>
+        </p:txBody>
+      </p:sp>
+      <p:cxnSp>
+        <p:nvCxnSpPr>
+          <p:cNvPr id="95" name="Straight Arrow Connector 94">
+            <a:extLst>
+              <a:ext uri="{FF2B5EF4-FFF2-40B4-BE49-F238E27FC236}">
+                <a16:creationId xmlns:a16="http://schemas.microsoft.com/office/drawing/2014/main" id="{005A26F4-56BD-4399-A11E-637965718D6D}"/>
+              </a:ext>
+            </a:extLst>
+          </p:cNvPr>
+          <p:cNvCxnSpPr>
+            <a:cxnSpLocks/>
+          </p:cNvCxnSpPr>
+          <p:nvPr/>
+        </p:nvCxnSpPr>
+        <p:spPr>
+          <a:xfrm flipV="1">
+            <a:off x="5495919" y="2210702"/>
+            <a:ext cx="466600" cy="181810"/>
+          </a:xfrm>
+          <a:prstGeom prst="straightConnector1">
+            <a:avLst/>
+          </a:prstGeom>
+          <a:ln w="19050">
+            <a:solidFill>
+              <a:schemeClr val="tx1"/>
+            </a:solidFill>
+            <a:headEnd type="none"/>
+            <a:tailEnd type="stealth" w="lg" len="lg"/>
+          </a:ln>
+        </p:spPr>
+        <p:style>
+          <a:lnRef idx="1">
+            <a:schemeClr val="accent1"/>
+          </a:lnRef>
+          <a:fillRef idx="0">
+            <a:schemeClr val="accent1"/>
+          </a:fillRef>
+          <a:effectRef idx="0">
+            <a:schemeClr val="accent1"/>
+          </a:effectRef>
+          <a:fontRef idx="minor">
+            <a:schemeClr val="tx1"/>
+          </a:fontRef>
+        </p:style>
+      </p:cxnSp>
+      <p:cxnSp>
+        <p:nvCxnSpPr>
+          <p:cNvPr id="97" name="Straight Arrow Connector 96">
+            <a:extLst>
+              <a:ext uri="{FF2B5EF4-FFF2-40B4-BE49-F238E27FC236}">
+                <a16:creationId xmlns:a16="http://schemas.microsoft.com/office/drawing/2014/main" id="{B4067D6E-3DCC-4764-B080-EE2288F3AF60}"/>
+              </a:ext>
+            </a:extLst>
+          </p:cNvPr>
+          <p:cNvCxnSpPr>
+            <a:cxnSpLocks/>
+          </p:cNvCxnSpPr>
+          <p:nvPr/>
+        </p:nvCxnSpPr>
+        <p:spPr>
+          <a:xfrm>
+            <a:off x="5499833" y="3351483"/>
+            <a:ext cx="466600" cy="181810"/>
+          </a:xfrm>
+          <a:prstGeom prst="straightConnector1">
+            <a:avLst/>
+          </a:prstGeom>
+          <a:ln w="19050">
+            <a:solidFill>
+              <a:schemeClr val="tx1"/>
+            </a:solidFill>
+            <a:headEnd type="none"/>
+            <a:tailEnd type="stealth" w="lg" len="lg"/>
+          </a:ln>
+        </p:spPr>
+        <p:style>
+          <a:lnRef idx="1">
+            <a:schemeClr val="accent1"/>
+          </a:lnRef>
+          <a:fillRef idx="0">
+            <a:schemeClr val="accent1"/>
+          </a:fillRef>
+          <a:effectRef idx="0">
+            <a:schemeClr val="accent1"/>
+          </a:effectRef>
+          <a:fontRef idx="minor">
+            <a:schemeClr val="tx1"/>
+          </a:fontRef>
+        </p:style>
+      </p:cxnSp>
+      <p:cxnSp>
+        <p:nvCxnSpPr>
+          <p:cNvPr id="98" name="Straight Arrow Connector 97">
+            <a:extLst>
+              <a:ext uri="{FF2B5EF4-FFF2-40B4-BE49-F238E27FC236}">
+                <a16:creationId xmlns:a16="http://schemas.microsoft.com/office/drawing/2014/main" id="{5AC0FF32-3456-48D1-AEC3-AC676C21F87C}"/>
+              </a:ext>
+            </a:extLst>
+          </p:cNvPr>
+          <p:cNvCxnSpPr>
+            <a:cxnSpLocks/>
+          </p:cNvCxnSpPr>
+          <p:nvPr/>
+        </p:nvCxnSpPr>
+        <p:spPr>
+          <a:xfrm flipV="1">
+            <a:off x="5499833" y="3112769"/>
+            <a:ext cx="466600" cy="181810"/>
+          </a:xfrm>
+          <a:prstGeom prst="straightConnector1">
+            <a:avLst/>
+          </a:prstGeom>
+          <a:ln w="19050">
+            <a:solidFill>
+              <a:schemeClr val="tx1"/>
+            </a:solidFill>
+            <a:headEnd type="none"/>
+            <a:tailEnd type="stealth" w="lg" len="lg"/>
+          </a:ln>
+        </p:spPr>
+        <p:style>
+          <a:lnRef idx="1">
+            <a:schemeClr val="accent1"/>
+          </a:lnRef>
+          <a:fillRef idx="0">
+            <a:schemeClr val="accent1"/>
+          </a:fillRef>
+          <a:effectRef idx="0">
+            <a:schemeClr val="accent1"/>
+          </a:effectRef>
+          <a:fontRef idx="minor">
+            <a:schemeClr val="tx1"/>
+          </a:fontRef>
+        </p:style>
+      </p:cxnSp>
+      <p:cxnSp>
+        <p:nvCxnSpPr>
+          <p:cNvPr id="99" name="Straight Arrow Connector 98">
+            <a:extLst>
+              <a:ext uri="{FF2B5EF4-FFF2-40B4-BE49-F238E27FC236}">
+                <a16:creationId xmlns:a16="http://schemas.microsoft.com/office/drawing/2014/main" id="{7C58509A-7308-45C0-A90D-B5EF0D015F27}"/>
+              </a:ext>
+            </a:extLst>
+          </p:cNvPr>
+          <p:cNvCxnSpPr>
+            <a:cxnSpLocks/>
+          </p:cNvCxnSpPr>
+          <p:nvPr/>
+        </p:nvCxnSpPr>
+        <p:spPr>
+          <a:xfrm>
+            <a:off x="5508881" y="4255855"/>
+            <a:ext cx="466600" cy="181810"/>
+          </a:xfrm>
+          <a:prstGeom prst="straightConnector1">
+            <a:avLst/>
+          </a:prstGeom>
+          <a:ln w="19050">
+            <a:solidFill>
+              <a:schemeClr val="tx1"/>
+            </a:solidFill>
+            <a:headEnd type="none"/>
+            <a:tailEnd type="stealth" w="lg" len="lg"/>
+          </a:ln>
+        </p:spPr>
+        <p:style>
+          <a:lnRef idx="1">
+            <a:schemeClr val="accent1"/>
+          </a:lnRef>
+          <a:fillRef idx="0">
+            <a:schemeClr val="accent1"/>
+          </a:fillRef>
+          <a:effectRef idx="0">
+            <a:schemeClr val="accent1"/>
+          </a:effectRef>
+          <a:fontRef idx="minor">
+            <a:schemeClr val="tx1"/>
+          </a:fontRef>
+        </p:style>
+      </p:cxnSp>
+      <p:cxnSp>
+        <p:nvCxnSpPr>
+          <p:cNvPr id="100" name="Straight Arrow Connector 99">
+            <a:extLst>
+              <a:ext uri="{FF2B5EF4-FFF2-40B4-BE49-F238E27FC236}">
+                <a16:creationId xmlns:a16="http://schemas.microsoft.com/office/drawing/2014/main" id="{D25E7CA5-E4DF-49FB-A2BF-E074F2415748}"/>
+              </a:ext>
+            </a:extLst>
+          </p:cNvPr>
+          <p:cNvCxnSpPr>
+            <a:cxnSpLocks/>
+          </p:cNvCxnSpPr>
+          <p:nvPr/>
+        </p:nvCxnSpPr>
+        <p:spPr>
+          <a:xfrm flipV="1">
+            <a:off x="5508881" y="4017141"/>
+            <a:ext cx="466600" cy="181810"/>
+          </a:xfrm>
+          <a:prstGeom prst="straightConnector1">
+            <a:avLst/>
+          </a:prstGeom>
+          <a:ln w="19050">
+            <a:solidFill>
+              <a:schemeClr val="tx1"/>
+            </a:solidFill>
+            <a:headEnd type="none"/>
+            <a:tailEnd type="stealth" w="lg" len="lg"/>
+          </a:ln>
+        </p:spPr>
+        <p:style>
+          <a:lnRef idx="1">
+            <a:schemeClr val="accent1"/>
+          </a:lnRef>
+          <a:fillRef idx="0">
+            <a:schemeClr val="accent1"/>
+          </a:fillRef>
+          <a:effectRef idx="0">
+            <a:schemeClr val="accent1"/>
+          </a:effectRef>
+          <a:fontRef idx="minor">
+            <a:schemeClr val="tx1"/>
+          </a:fontRef>
+        </p:style>
+      </p:cxnSp>
+      <mc:AlternateContent xmlns:mc="http://schemas.openxmlformats.org/markup-compatibility/2006">
+        <mc:Choice xmlns:a14="http://schemas.microsoft.com/office/drawing/2010/main" Requires="a14">
+          <p:sp>
+            <p:nvSpPr>
+              <p:cNvPr id="101" name="TextBox 100">
+                <a:extLst>
+                  <a:ext uri="{FF2B5EF4-FFF2-40B4-BE49-F238E27FC236}">
+                    <a16:creationId xmlns:a16="http://schemas.microsoft.com/office/drawing/2014/main" id="{3ACD88B2-D3B4-4AB7-A86D-EB8EE0134F54}"/>
+                  </a:ext>
+                </a:extLst>
+              </p:cNvPr>
+              <p:cNvSpPr txBox="1"/>
+              <p:nvPr/>
+            </p:nvSpPr>
+            <p:spPr>
+              <a:xfrm>
+                <a:off x="8731583" y="1358666"/>
+                <a:ext cx="402292" cy="369332"/>
+              </a:xfrm>
+              <a:prstGeom prst="rect">
+                <a:avLst/>
+              </a:prstGeom>
+              <a:noFill/>
+            </p:spPr>
+            <p:txBody>
+              <a:bodyPr wrap="square" rtlCol="0">
+                <a:spAutoFit/>
+              </a:bodyPr>
+              <a:lstStyle/>
+              <a:p>
+                <a:pPr algn="ctr"/>
+                <a14:m>
+                  <m:oMathPara xmlns:m="http://schemas.openxmlformats.org/officeDocument/2006/math">
+                    <m:oMathParaPr>
+                      <m:jc m:val="centerGroup"/>
+                    </m:oMathParaPr>
+                    <m:oMath xmlns:m="http://schemas.openxmlformats.org/officeDocument/2006/math">
+                      <m:sSup>
+                        <m:sSupPr>
+                          <m:ctrlPr>
+                            <a:rPr lang="en-US" i="1" smtClean="0">
+                              <a:latin typeface="Cambria Math" panose="02040503050406030204" pitchFamily="18" charset="0"/>
+                            </a:rPr>
+                          </m:ctrlPr>
+                        </m:sSupPr>
+                        <m:e>
+                          <m:r>
+                            <a:rPr lang="en-US" b="0" i="1" smtClean="0">
+                              <a:latin typeface="Cambria Math" panose="02040503050406030204" pitchFamily="18" charset="0"/>
+                            </a:rPr>
+                            <m:t>𝑢</m:t>
+                          </m:r>
+                        </m:e>
+                        <m:sup>
+                          <m:r>
+                            <a:rPr lang="en-US" b="0" i="1" smtClean="0">
+                              <a:latin typeface="Cambria Math" panose="02040503050406030204" pitchFamily="18" charset="0"/>
+                            </a:rPr>
+                            <m:t>𝑛</m:t>
+                          </m:r>
+                        </m:sup>
+                      </m:sSup>
+                      <m:sSub>
+                        <m:sSubPr>
+                          <m:ctrlPr>
+                            <a:rPr lang="en-US" b="0" i="1" smtClean="0">
+                              <a:latin typeface="Cambria Math" panose="02040503050406030204" pitchFamily="18" charset="0"/>
+                            </a:rPr>
+                          </m:ctrlPr>
+                        </m:sSubPr>
+                        <m:e>
+                          <m:r>
+                            <a:rPr lang="en-US" b="0" i="1" smtClean="0">
+                              <a:latin typeface="Cambria Math" panose="02040503050406030204" pitchFamily="18" charset="0"/>
+                            </a:rPr>
+                            <m:t> </m:t>
+                          </m:r>
+                          <m:r>
+                            <a:rPr lang="en-US" b="0" i="1" smtClean="0">
+                              <a:latin typeface="Cambria Math" panose="02040503050406030204" pitchFamily="18" charset="0"/>
+                            </a:rPr>
+                            <m:t>𝑆</m:t>
+                          </m:r>
+                        </m:e>
+                        <m:sub>
+                          <m:r>
+                            <a:rPr lang="en-US" b="0" i="1" smtClean="0">
+                              <a:latin typeface="Cambria Math" panose="02040503050406030204" pitchFamily="18" charset="0"/>
+                            </a:rPr>
+                            <m:t>0</m:t>
+                          </m:r>
+                        </m:sub>
+                      </m:sSub>
+                    </m:oMath>
+                  </m:oMathPara>
+                </a14:m>
+                <a:endParaRPr lang="en-US" i="1" dirty="0"/>
+              </a:p>
+            </p:txBody>
+          </p:sp>
+        </mc:Choice>
+        <mc:Fallback>
+          <p:sp>
+            <p:nvSpPr>
+              <p:cNvPr id="101" name="TextBox 100">
+                <a:extLst>
+                  <a:ext uri="{FF2B5EF4-FFF2-40B4-BE49-F238E27FC236}">
+                    <a16:creationId xmlns:a16="http://schemas.microsoft.com/office/drawing/2014/main" id="{3ACD88B2-D3B4-4AB7-A86D-EB8EE0134F54}"/>
+                  </a:ext>
+                </a:extLst>
+              </p:cNvPr>
+              <p:cNvSpPr txBox="1">
+                <a:spLocks noRot="1" noChangeAspect="1" noMove="1" noResize="1" noEditPoints="1" noAdjustHandles="1" noChangeArrowheads="1" noChangeShapeType="1" noTextEdit="1"/>
+              </p:cNvSpPr>
+              <p:nvPr/>
+            </p:nvSpPr>
+            <p:spPr>
+              <a:xfrm>
+                <a:off x="8731583" y="1358666"/>
+                <a:ext cx="402292" cy="369332"/>
+              </a:xfrm>
+              <a:prstGeom prst="rect">
+                <a:avLst/>
+              </a:prstGeom>
+              <a:blipFill>
+                <a:blip r:embed="rId6"/>
+                <a:stretch>
+                  <a:fillRect l="-36364" r="-21212"/>
+                </a:stretch>
+              </a:blipFill>
+            </p:spPr>
+            <p:txBody>
+              <a:bodyPr/>
+              <a:lstStyle/>
+              <a:p>
+                <a:r>
+                  <a:rPr lang="en-US">
+                    <a:noFill/>
+                  </a:rPr>
+                  <a:t> </a:t>
+                </a:r>
+              </a:p>
+            </p:txBody>
+          </p:sp>
+        </mc:Fallback>
+      </mc:AlternateContent>
+      <mc:AlternateContent xmlns:mc="http://schemas.openxmlformats.org/markup-compatibility/2006">
+        <mc:Choice xmlns:a14="http://schemas.microsoft.com/office/drawing/2010/main" Requires="a14">
+          <p:sp>
+            <p:nvSpPr>
+              <p:cNvPr id="102" name="TextBox 101">
+                <a:extLst>
+                  <a:ext uri="{FF2B5EF4-FFF2-40B4-BE49-F238E27FC236}">
+                    <a16:creationId xmlns:a16="http://schemas.microsoft.com/office/drawing/2014/main" id="{D4CFC4ED-0B1B-4D1B-9210-EAA84D2F77C2}"/>
+                  </a:ext>
+                </a:extLst>
+              </p:cNvPr>
+              <p:cNvSpPr txBox="1"/>
+              <p:nvPr/>
+            </p:nvSpPr>
+            <p:spPr>
+              <a:xfrm>
+                <a:off x="8731583" y="1932275"/>
+                <a:ext cx="402292" cy="369332"/>
+              </a:xfrm>
+              <a:prstGeom prst="rect">
+                <a:avLst/>
+              </a:prstGeom>
+              <a:noFill/>
+            </p:spPr>
+            <p:txBody>
+              <a:bodyPr wrap="square" rtlCol="0">
+                <a:spAutoFit/>
+              </a:bodyPr>
+              <a:lstStyle/>
+              <a:p>
+                <a:pPr algn="ctr"/>
+                <a14:m>
+                  <m:oMathPara xmlns:m="http://schemas.openxmlformats.org/officeDocument/2006/math">
+                    <m:oMathParaPr>
+                      <m:jc m:val="centerGroup"/>
+                    </m:oMathParaPr>
+                    <m:oMath xmlns:m="http://schemas.openxmlformats.org/officeDocument/2006/math">
+                      <m:sSup>
+                        <m:sSupPr>
+                          <m:ctrlPr>
+                            <a:rPr lang="en-US" i="1" smtClean="0">
+                              <a:latin typeface="Cambria Math" panose="02040503050406030204" pitchFamily="18" charset="0"/>
+                            </a:rPr>
+                          </m:ctrlPr>
+                        </m:sSupPr>
+                        <m:e>
+                          <m:r>
+                            <a:rPr lang="en-US" b="0" i="1" smtClean="0">
+                              <a:latin typeface="Cambria Math" panose="02040503050406030204" pitchFamily="18" charset="0"/>
+                            </a:rPr>
+                            <m:t>𝑢</m:t>
+                          </m:r>
+                        </m:e>
+                        <m:sup>
+                          <m:r>
+                            <a:rPr lang="en-US" b="0" i="1" smtClean="0">
+                              <a:latin typeface="Cambria Math" panose="02040503050406030204" pitchFamily="18" charset="0"/>
+                            </a:rPr>
+                            <m:t>𝑛</m:t>
+                          </m:r>
+                          <m:r>
+                            <a:rPr lang="en-US" b="0" i="1" smtClean="0">
+                              <a:latin typeface="Cambria Math" panose="02040503050406030204" pitchFamily="18" charset="0"/>
+                            </a:rPr>
+                            <m:t>−1</m:t>
+                          </m:r>
+                        </m:sup>
+                      </m:sSup>
+                      <m:r>
+                        <a:rPr lang="en-US" b="0" i="1" smtClean="0">
+                          <a:latin typeface="Cambria Math" panose="02040503050406030204" pitchFamily="18" charset="0"/>
+                        </a:rPr>
+                        <m:t> </m:t>
+                      </m:r>
+                      <m:r>
+                        <a:rPr lang="en-US" b="0" i="1" smtClean="0">
+                          <a:latin typeface="Cambria Math" panose="02040503050406030204" pitchFamily="18" charset="0"/>
+                        </a:rPr>
+                        <m:t>𝑑</m:t>
+                      </m:r>
+                      <m:sSub>
+                        <m:sSubPr>
+                          <m:ctrlPr>
+                            <a:rPr lang="en-US" b="0" i="1" smtClean="0">
+                              <a:latin typeface="Cambria Math" panose="02040503050406030204" pitchFamily="18" charset="0"/>
+                            </a:rPr>
+                          </m:ctrlPr>
+                        </m:sSubPr>
+                        <m:e>
+                          <m:r>
+                            <a:rPr lang="en-US" b="0" i="1" smtClean="0">
+                              <a:latin typeface="Cambria Math" panose="02040503050406030204" pitchFamily="18" charset="0"/>
+                            </a:rPr>
+                            <m:t> </m:t>
+                          </m:r>
+                          <m:r>
+                            <a:rPr lang="en-US" b="0" i="1" smtClean="0">
+                              <a:latin typeface="Cambria Math" panose="02040503050406030204" pitchFamily="18" charset="0"/>
+                            </a:rPr>
+                            <m:t>𝑆</m:t>
+                          </m:r>
+                        </m:e>
+                        <m:sub>
+                          <m:r>
+                            <a:rPr lang="en-US" b="0" i="1" smtClean="0">
+                              <a:latin typeface="Cambria Math" panose="02040503050406030204" pitchFamily="18" charset="0"/>
+                            </a:rPr>
+                            <m:t>0</m:t>
+                          </m:r>
+                        </m:sub>
+                      </m:sSub>
+                    </m:oMath>
+                  </m:oMathPara>
+                </a14:m>
+                <a:endParaRPr lang="en-US" i="1" dirty="0"/>
+              </a:p>
+            </p:txBody>
+          </p:sp>
+        </mc:Choice>
+        <mc:Fallback>
+          <p:sp>
+            <p:nvSpPr>
+              <p:cNvPr id="102" name="TextBox 101">
+                <a:extLst>
+                  <a:ext uri="{FF2B5EF4-FFF2-40B4-BE49-F238E27FC236}">
+                    <a16:creationId xmlns:a16="http://schemas.microsoft.com/office/drawing/2014/main" id="{D4CFC4ED-0B1B-4D1B-9210-EAA84D2F77C2}"/>
+                  </a:ext>
+                </a:extLst>
+              </p:cNvPr>
+              <p:cNvSpPr txBox="1">
+                <a:spLocks noRot="1" noChangeAspect="1" noMove="1" noResize="1" noEditPoints="1" noAdjustHandles="1" noChangeArrowheads="1" noChangeShapeType="1" noTextEdit="1"/>
+              </p:cNvSpPr>
+              <p:nvPr/>
+            </p:nvSpPr>
+            <p:spPr>
+              <a:xfrm>
+                <a:off x="8731583" y="1932275"/>
+                <a:ext cx="402292" cy="369332"/>
+              </a:xfrm>
+              <a:prstGeom prst="rect">
+                <a:avLst/>
+              </a:prstGeom>
+              <a:blipFill>
+                <a:blip r:embed="rId7"/>
+                <a:stretch>
+                  <a:fillRect l="-86364" r="-71212"/>
+                </a:stretch>
+              </a:blipFill>
+            </p:spPr>
+            <p:txBody>
+              <a:bodyPr/>
+              <a:lstStyle/>
+              <a:p>
+                <a:r>
+                  <a:rPr lang="en-US">
+                    <a:noFill/>
+                  </a:rPr>
+                  <a:t> </a:t>
+                </a:r>
+              </a:p>
+            </p:txBody>
+          </p:sp>
+        </mc:Fallback>
+      </mc:AlternateContent>
+      <mc:AlternateContent xmlns:mc="http://schemas.openxmlformats.org/markup-compatibility/2006">
+        <mc:Choice xmlns:a14="http://schemas.microsoft.com/office/drawing/2010/main" Requires="a14">
+          <p:sp>
+            <p:nvSpPr>
+              <p:cNvPr id="103" name="TextBox 102">
+                <a:extLst>
+                  <a:ext uri="{FF2B5EF4-FFF2-40B4-BE49-F238E27FC236}">
+                    <a16:creationId xmlns:a16="http://schemas.microsoft.com/office/drawing/2014/main" id="{5467CDA6-808A-4035-AA11-0AC0FCB40CEB}"/>
+                  </a:ext>
+                </a:extLst>
+              </p:cNvPr>
+              <p:cNvSpPr txBox="1"/>
+              <p:nvPr/>
+            </p:nvSpPr>
+            <p:spPr>
+              <a:xfrm>
+                <a:off x="8731583" y="3502779"/>
+                <a:ext cx="402292" cy="374270"/>
+              </a:xfrm>
+              <a:prstGeom prst="rect">
+                <a:avLst/>
+              </a:prstGeom>
+              <a:noFill/>
+            </p:spPr>
+            <p:txBody>
+              <a:bodyPr wrap="square" rtlCol="0">
+                <a:spAutoFit/>
+              </a:bodyPr>
+              <a:lstStyle/>
+              <a:p>
+                <a:pPr algn="ctr"/>
+                <a14:m>
+                  <m:oMathPara xmlns:m="http://schemas.openxmlformats.org/officeDocument/2006/math">
+                    <m:oMathParaPr>
+                      <m:jc m:val="centerGroup"/>
+                    </m:oMathParaPr>
+                    <m:oMath xmlns:m="http://schemas.openxmlformats.org/officeDocument/2006/math">
+                      <m:sSup>
+                        <m:sSupPr>
+                          <m:ctrlPr>
+                            <a:rPr lang="en-US" i="1" smtClean="0">
+                              <a:latin typeface="Cambria Math" panose="02040503050406030204" pitchFamily="18" charset="0"/>
+                            </a:rPr>
+                          </m:ctrlPr>
+                        </m:sSupPr>
+                        <m:e>
+                          <m:r>
+                            <a:rPr lang="en-US" b="0" i="1" smtClean="0">
+                              <a:latin typeface="Cambria Math" panose="02040503050406030204" pitchFamily="18" charset="0"/>
+                            </a:rPr>
+                            <m:t>𝑢</m:t>
+                          </m:r>
+                        </m:e>
+                        <m:sup>
+                          <m:r>
+                            <a:rPr lang="en-US" b="0" i="1" smtClean="0">
+                              <a:latin typeface="Cambria Math" panose="02040503050406030204" pitchFamily="18" charset="0"/>
+                            </a:rPr>
+                            <m:t>𝑛</m:t>
+                          </m:r>
+                          <m:r>
+                            <a:rPr lang="en-US" b="0" i="1" smtClean="0">
+                              <a:latin typeface="Cambria Math" panose="02040503050406030204" pitchFamily="18" charset="0"/>
+                            </a:rPr>
+                            <m:t>−</m:t>
+                          </m:r>
+                          <m:r>
+                            <a:rPr lang="en-US" b="0" i="1" smtClean="0">
+                              <a:latin typeface="Cambria Math" panose="02040503050406030204" pitchFamily="18" charset="0"/>
+                            </a:rPr>
+                            <m:t>𝑘</m:t>
+                          </m:r>
+                        </m:sup>
+                      </m:sSup>
+                      <m:r>
+                        <a:rPr lang="en-US" b="0" i="1" smtClean="0">
+                          <a:latin typeface="Cambria Math" panose="02040503050406030204" pitchFamily="18" charset="0"/>
+                        </a:rPr>
+                        <m:t> </m:t>
+                      </m:r>
+                      <m:sSup>
+                        <m:sSupPr>
+                          <m:ctrlPr>
+                            <a:rPr lang="en-US" b="0" i="1" smtClean="0">
+                              <a:latin typeface="Cambria Math" panose="02040503050406030204" pitchFamily="18" charset="0"/>
+                            </a:rPr>
+                          </m:ctrlPr>
+                        </m:sSupPr>
+                        <m:e>
+                          <m:r>
+                            <a:rPr lang="en-US" b="0" i="1" smtClean="0">
+                              <a:latin typeface="Cambria Math" panose="02040503050406030204" pitchFamily="18" charset="0"/>
+                            </a:rPr>
+                            <m:t>𝑑</m:t>
+                          </m:r>
+                        </m:e>
+                        <m:sup>
+                          <m:r>
+                            <a:rPr lang="en-US" b="0" i="1" smtClean="0">
+                              <a:latin typeface="Cambria Math" panose="02040503050406030204" pitchFamily="18" charset="0"/>
+                            </a:rPr>
+                            <m:t>𝑘</m:t>
+                          </m:r>
+                        </m:sup>
+                      </m:sSup>
+                      <m:sSub>
+                        <m:sSubPr>
+                          <m:ctrlPr>
+                            <a:rPr lang="en-US" b="0" i="1" smtClean="0">
+                              <a:latin typeface="Cambria Math" panose="02040503050406030204" pitchFamily="18" charset="0"/>
+                            </a:rPr>
+                          </m:ctrlPr>
+                        </m:sSubPr>
+                        <m:e>
+                          <m:r>
+                            <a:rPr lang="en-US" b="0" i="1" smtClean="0">
+                              <a:latin typeface="Cambria Math" panose="02040503050406030204" pitchFamily="18" charset="0"/>
+                            </a:rPr>
+                            <m:t> </m:t>
+                          </m:r>
+                          <m:r>
+                            <a:rPr lang="en-US" b="0" i="1" smtClean="0">
+                              <a:latin typeface="Cambria Math" panose="02040503050406030204" pitchFamily="18" charset="0"/>
+                            </a:rPr>
+                            <m:t>𝑆</m:t>
+                          </m:r>
+                        </m:e>
+                        <m:sub>
+                          <m:r>
+                            <a:rPr lang="en-US" b="0" i="1" smtClean="0">
+                              <a:latin typeface="Cambria Math" panose="02040503050406030204" pitchFamily="18" charset="0"/>
+                            </a:rPr>
+                            <m:t>0</m:t>
+                          </m:r>
+                        </m:sub>
+                      </m:sSub>
+                    </m:oMath>
+                  </m:oMathPara>
+                </a14:m>
+                <a:endParaRPr lang="en-US" i="1" dirty="0"/>
+              </a:p>
+            </p:txBody>
+          </p:sp>
+        </mc:Choice>
+        <mc:Fallback>
+          <p:sp>
+            <p:nvSpPr>
+              <p:cNvPr id="103" name="TextBox 102">
+                <a:extLst>
+                  <a:ext uri="{FF2B5EF4-FFF2-40B4-BE49-F238E27FC236}">
+                    <a16:creationId xmlns:a16="http://schemas.microsoft.com/office/drawing/2014/main" id="{5467CDA6-808A-4035-AA11-0AC0FCB40CEB}"/>
+                  </a:ext>
+                </a:extLst>
+              </p:cNvPr>
+              <p:cNvSpPr txBox="1">
+                <a:spLocks noRot="1" noChangeAspect="1" noMove="1" noResize="1" noEditPoints="1" noAdjustHandles="1" noChangeArrowheads="1" noChangeShapeType="1" noTextEdit="1"/>
+              </p:cNvSpPr>
+              <p:nvPr/>
+            </p:nvSpPr>
+            <p:spPr>
+              <a:xfrm>
+                <a:off x="8731583" y="3502779"/>
+                <a:ext cx="402292" cy="374270"/>
+              </a:xfrm>
+              <a:prstGeom prst="rect">
+                <a:avLst/>
+              </a:prstGeom>
+              <a:blipFill>
+                <a:blip r:embed="rId8"/>
+                <a:stretch>
+                  <a:fillRect l="-103030" r="-89394"/>
+                </a:stretch>
+              </a:blipFill>
+            </p:spPr>
+            <p:txBody>
+              <a:bodyPr/>
+              <a:lstStyle/>
+              <a:p>
+                <a:r>
+                  <a:rPr lang="en-US">
+                    <a:noFill/>
+                  </a:rPr>
+                  <a:t> </a:t>
+                </a:r>
+              </a:p>
+            </p:txBody>
+          </p:sp>
+        </mc:Fallback>
+      </mc:AlternateContent>
+      <mc:AlternateContent xmlns:mc="http://schemas.openxmlformats.org/markup-compatibility/2006">
+        <mc:Choice xmlns:a14="http://schemas.microsoft.com/office/drawing/2010/main" Requires="a14">
+          <p:sp>
+            <p:nvSpPr>
+              <p:cNvPr id="105" name="TextBox 104">
+                <a:extLst>
+                  <a:ext uri="{FF2B5EF4-FFF2-40B4-BE49-F238E27FC236}">
+                    <a16:creationId xmlns:a16="http://schemas.microsoft.com/office/drawing/2014/main" id="{5BDCF380-2359-4F85-B73C-2249FA0438F7}"/>
+                  </a:ext>
+                </a:extLst>
+              </p:cNvPr>
+              <p:cNvSpPr txBox="1"/>
+              <p:nvPr/>
+            </p:nvSpPr>
+            <p:spPr>
+              <a:xfrm>
+                <a:off x="2750008" y="5566632"/>
+                <a:ext cx="781213" cy="369332"/>
+              </a:xfrm>
+              <a:prstGeom prst="rect">
+                <a:avLst/>
+              </a:prstGeom>
+              <a:noFill/>
+            </p:spPr>
+            <p:txBody>
+              <a:bodyPr wrap="square" rtlCol="0">
+                <a:spAutoFit/>
+              </a:bodyPr>
+              <a:lstStyle/>
+              <a:p>
+                <a:pPr algn="ctr"/>
+                <a14:m>
+                  <m:oMathPara xmlns:m="http://schemas.openxmlformats.org/officeDocument/2006/math">
+                    <m:oMathParaPr>
+                      <m:jc m:val="centerGroup"/>
+                    </m:oMathParaPr>
+                    <m:oMath xmlns:m="http://schemas.openxmlformats.org/officeDocument/2006/math">
+                      <m:r>
+                        <a:rPr lang="en-US" b="0" i="1" smtClean="0">
+                          <a:latin typeface="Cambria Math" panose="02040503050406030204" pitchFamily="18" charset="0"/>
+                        </a:rPr>
+                        <m:t>0</m:t>
+                      </m:r>
+                    </m:oMath>
+                  </m:oMathPara>
+                </a14:m>
+                <a:endParaRPr lang="en-US" i="1" dirty="0"/>
+              </a:p>
+            </p:txBody>
+          </p:sp>
+        </mc:Choice>
+        <mc:Fallback>
+          <p:sp>
+            <p:nvSpPr>
+              <p:cNvPr id="105" name="TextBox 104">
+                <a:extLst>
+                  <a:ext uri="{FF2B5EF4-FFF2-40B4-BE49-F238E27FC236}">
+                    <a16:creationId xmlns:a16="http://schemas.microsoft.com/office/drawing/2014/main" id="{5BDCF380-2359-4F85-B73C-2249FA0438F7}"/>
+                  </a:ext>
+                </a:extLst>
+              </p:cNvPr>
+              <p:cNvSpPr txBox="1">
+                <a:spLocks noRot="1" noChangeAspect="1" noMove="1" noResize="1" noEditPoints="1" noAdjustHandles="1" noChangeArrowheads="1" noChangeShapeType="1" noTextEdit="1"/>
+              </p:cNvSpPr>
+              <p:nvPr/>
+            </p:nvSpPr>
+            <p:spPr>
+              <a:xfrm>
+                <a:off x="2750008" y="5566632"/>
+                <a:ext cx="781213" cy="369332"/>
+              </a:xfrm>
+              <a:prstGeom prst="rect">
+                <a:avLst/>
+              </a:prstGeom>
+              <a:blipFill>
+                <a:blip r:embed="rId9"/>
+                <a:stretch>
+                  <a:fillRect/>
+                </a:stretch>
+              </a:blipFill>
+            </p:spPr>
+            <p:txBody>
+              <a:bodyPr/>
+              <a:lstStyle/>
+              <a:p>
+                <a:r>
+                  <a:rPr lang="en-US">
+                    <a:noFill/>
+                  </a:rPr>
+                  <a:t> </a:t>
+                </a:r>
+              </a:p>
+            </p:txBody>
+          </p:sp>
+        </mc:Fallback>
+      </mc:AlternateContent>
+      <mc:AlternateContent xmlns:mc="http://schemas.openxmlformats.org/markup-compatibility/2006">
+        <mc:Choice xmlns:a14="http://schemas.microsoft.com/office/drawing/2010/main" Requires="a14">
+          <p:sp>
+            <p:nvSpPr>
+              <p:cNvPr id="106" name="TextBox 105">
+                <a:extLst>
+                  <a:ext uri="{FF2B5EF4-FFF2-40B4-BE49-F238E27FC236}">
+                    <a16:creationId xmlns:a16="http://schemas.microsoft.com/office/drawing/2014/main" id="{BA60E54C-D3A0-4D7D-9A45-71A6145E9249}"/>
+                  </a:ext>
+                </a:extLst>
+              </p:cNvPr>
+              <p:cNvSpPr txBox="1"/>
+              <p:nvPr/>
+            </p:nvSpPr>
+            <p:spPr>
+              <a:xfrm>
+                <a:off x="3878277" y="5566632"/>
+                <a:ext cx="781213" cy="369332"/>
+              </a:xfrm>
+              <a:prstGeom prst="rect">
+                <a:avLst/>
+              </a:prstGeom>
+              <a:noFill/>
+            </p:spPr>
+            <p:txBody>
+              <a:bodyPr wrap="square" rtlCol="0">
+                <a:spAutoFit/>
+              </a:bodyPr>
+              <a:lstStyle/>
+              <a:p>
+                <a:pPr algn="ctr"/>
+                <a14:m>
+                  <m:oMathPara xmlns:m="http://schemas.openxmlformats.org/officeDocument/2006/math">
+                    <m:oMathParaPr>
+                      <m:jc m:val="centerGroup"/>
+                    </m:oMathParaPr>
+                    <m:oMath xmlns:m="http://schemas.openxmlformats.org/officeDocument/2006/math">
+                      <m:r>
+                        <a:rPr lang="en-US" b="0" i="1" smtClean="0">
+                          <a:latin typeface="Cambria Math" panose="02040503050406030204" pitchFamily="18" charset="0"/>
+                        </a:rPr>
+                        <m:t>1</m:t>
+                      </m:r>
+                    </m:oMath>
+                  </m:oMathPara>
+                </a14:m>
+                <a:endParaRPr lang="en-US" i="1" dirty="0"/>
+              </a:p>
+            </p:txBody>
+          </p:sp>
+        </mc:Choice>
+        <mc:Fallback>
+          <p:sp>
+            <p:nvSpPr>
+              <p:cNvPr id="106" name="TextBox 105">
+                <a:extLst>
+                  <a:ext uri="{FF2B5EF4-FFF2-40B4-BE49-F238E27FC236}">
+                    <a16:creationId xmlns:a16="http://schemas.microsoft.com/office/drawing/2014/main" id="{BA60E54C-D3A0-4D7D-9A45-71A6145E9249}"/>
+                  </a:ext>
+                </a:extLst>
+              </p:cNvPr>
+              <p:cNvSpPr txBox="1">
+                <a:spLocks noRot="1" noChangeAspect="1" noMove="1" noResize="1" noEditPoints="1" noAdjustHandles="1" noChangeArrowheads="1" noChangeShapeType="1" noTextEdit="1"/>
+              </p:cNvSpPr>
+              <p:nvPr/>
+            </p:nvSpPr>
+            <p:spPr>
+              <a:xfrm>
+                <a:off x="3878277" y="5566632"/>
+                <a:ext cx="781213" cy="369332"/>
+              </a:xfrm>
+              <a:prstGeom prst="rect">
+                <a:avLst/>
+              </a:prstGeom>
+              <a:blipFill>
+                <a:blip r:embed="rId10"/>
+                <a:stretch>
+                  <a:fillRect/>
+                </a:stretch>
+              </a:blipFill>
+            </p:spPr>
+            <p:txBody>
+              <a:bodyPr/>
+              <a:lstStyle/>
+              <a:p>
+                <a:r>
+                  <a:rPr lang="en-US">
+                    <a:noFill/>
+                  </a:rPr>
+                  <a:t> </a:t>
+                </a:r>
+              </a:p>
+            </p:txBody>
+          </p:sp>
+        </mc:Fallback>
+      </mc:AlternateContent>
+      <mc:AlternateContent xmlns:mc="http://schemas.openxmlformats.org/markup-compatibility/2006">
+        <mc:Choice xmlns:a14="http://schemas.microsoft.com/office/drawing/2010/main" Requires="a14">
+          <p:sp>
+            <p:nvSpPr>
+              <p:cNvPr id="108" name="TextBox 107">
+                <a:extLst>
+                  <a:ext uri="{FF2B5EF4-FFF2-40B4-BE49-F238E27FC236}">
+                    <a16:creationId xmlns:a16="http://schemas.microsoft.com/office/drawing/2014/main" id="{D5DD2994-0AF0-4DE9-872F-21A12F734FAB}"/>
+                  </a:ext>
+                </a:extLst>
+              </p:cNvPr>
+              <p:cNvSpPr txBox="1"/>
+              <p:nvPr/>
+            </p:nvSpPr>
+            <p:spPr>
+              <a:xfrm>
+                <a:off x="5043527" y="5555481"/>
+                <a:ext cx="781213" cy="369332"/>
+              </a:xfrm>
+              <a:prstGeom prst="rect">
+                <a:avLst/>
+              </a:prstGeom>
+              <a:noFill/>
+            </p:spPr>
+            <p:txBody>
+              <a:bodyPr wrap="square" rtlCol="0">
+                <a:spAutoFit/>
+              </a:bodyPr>
+              <a:lstStyle/>
+              <a:p>
+                <a:pPr algn="ctr"/>
+                <a14:m>
+                  <m:oMathPara xmlns:m="http://schemas.openxmlformats.org/officeDocument/2006/math">
+                    <m:oMathParaPr>
+                      <m:jc m:val="centerGroup"/>
+                    </m:oMathParaPr>
+                    <m:oMath xmlns:m="http://schemas.openxmlformats.org/officeDocument/2006/math">
+                      <m:r>
+                        <a:rPr lang="en-US" b="0" i="1" smtClean="0">
+                          <a:latin typeface="Cambria Math" panose="02040503050406030204" pitchFamily="18" charset="0"/>
+                        </a:rPr>
+                        <m:t>2</m:t>
+                      </m:r>
+                    </m:oMath>
+                  </m:oMathPara>
+                </a14:m>
+                <a:endParaRPr lang="en-US" i="1" dirty="0"/>
+              </a:p>
+            </p:txBody>
+          </p:sp>
+        </mc:Choice>
+        <mc:Fallback>
+          <p:sp>
+            <p:nvSpPr>
+              <p:cNvPr id="108" name="TextBox 107">
+                <a:extLst>
+                  <a:ext uri="{FF2B5EF4-FFF2-40B4-BE49-F238E27FC236}">
+                    <a16:creationId xmlns:a16="http://schemas.microsoft.com/office/drawing/2014/main" id="{D5DD2994-0AF0-4DE9-872F-21A12F734FAB}"/>
+                  </a:ext>
+                </a:extLst>
+              </p:cNvPr>
+              <p:cNvSpPr txBox="1">
+                <a:spLocks noRot="1" noChangeAspect="1" noMove="1" noResize="1" noEditPoints="1" noAdjustHandles="1" noChangeArrowheads="1" noChangeShapeType="1" noTextEdit="1"/>
+              </p:cNvSpPr>
+              <p:nvPr/>
+            </p:nvSpPr>
+            <p:spPr>
+              <a:xfrm>
+                <a:off x="5043527" y="5555481"/>
+                <a:ext cx="781213" cy="369332"/>
+              </a:xfrm>
+              <a:prstGeom prst="rect">
+                <a:avLst/>
+              </a:prstGeom>
+              <a:blipFill>
+                <a:blip r:embed="rId11"/>
+                <a:stretch>
+                  <a:fillRect/>
+                </a:stretch>
+              </a:blipFill>
+            </p:spPr>
+            <p:txBody>
+              <a:bodyPr/>
+              <a:lstStyle/>
+              <a:p>
+                <a:r>
+                  <a:rPr lang="en-US">
+                    <a:noFill/>
+                  </a:rPr>
+                  <a:t> </a:t>
+                </a:r>
+              </a:p>
+            </p:txBody>
+          </p:sp>
+        </mc:Fallback>
+      </mc:AlternateContent>
+      <mc:AlternateContent xmlns:mc="http://schemas.openxmlformats.org/markup-compatibility/2006">
+        <mc:Choice xmlns:a14="http://schemas.microsoft.com/office/drawing/2010/main" Requires="a14">
+          <p:sp>
+            <p:nvSpPr>
+              <p:cNvPr id="109" name="TextBox 108">
+                <a:extLst>
+                  <a:ext uri="{FF2B5EF4-FFF2-40B4-BE49-F238E27FC236}">
+                    <a16:creationId xmlns:a16="http://schemas.microsoft.com/office/drawing/2014/main" id="{1A737F3A-24A9-4125-80C8-B7C5AA97551C}"/>
+                  </a:ext>
+                </a:extLst>
+              </p:cNvPr>
+              <p:cNvSpPr txBox="1"/>
+              <p:nvPr/>
+            </p:nvSpPr>
+            <p:spPr>
+              <a:xfrm>
+                <a:off x="7140338" y="5543783"/>
+                <a:ext cx="781213" cy="369332"/>
+              </a:xfrm>
+              <a:prstGeom prst="rect">
+                <a:avLst/>
+              </a:prstGeom>
+              <a:noFill/>
+            </p:spPr>
+            <p:txBody>
+              <a:bodyPr wrap="square" rtlCol="0">
+                <a:spAutoFit/>
+              </a:bodyPr>
+              <a:lstStyle/>
+              <a:p>
+                <a:pPr algn="ctr"/>
+                <a14:m>
+                  <m:oMathPara xmlns:m="http://schemas.openxmlformats.org/officeDocument/2006/math">
+                    <m:oMathParaPr>
+                      <m:jc m:val="centerGroup"/>
+                    </m:oMathParaPr>
+                    <m:oMath xmlns:m="http://schemas.openxmlformats.org/officeDocument/2006/math">
+                      <m:r>
+                        <a:rPr lang="en-US" b="0" i="1" smtClean="0">
+                          <a:latin typeface="Cambria Math" panose="02040503050406030204" pitchFamily="18" charset="0"/>
+                        </a:rPr>
+                        <m:t>𝑛</m:t>
+                      </m:r>
+                    </m:oMath>
+                  </m:oMathPara>
+                </a14:m>
+                <a:endParaRPr lang="en-US" i="1" dirty="0"/>
+              </a:p>
+            </p:txBody>
+          </p:sp>
+        </mc:Choice>
+        <mc:Fallback>
+          <p:sp>
+            <p:nvSpPr>
+              <p:cNvPr id="109" name="TextBox 108">
+                <a:extLst>
+                  <a:ext uri="{FF2B5EF4-FFF2-40B4-BE49-F238E27FC236}">
+                    <a16:creationId xmlns:a16="http://schemas.microsoft.com/office/drawing/2014/main" id="{1A737F3A-24A9-4125-80C8-B7C5AA97551C}"/>
+                  </a:ext>
+                </a:extLst>
+              </p:cNvPr>
+              <p:cNvSpPr txBox="1">
+                <a:spLocks noRot="1" noChangeAspect="1" noMove="1" noResize="1" noEditPoints="1" noAdjustHandles="1" noChangeArrowheads="1" noChangeShapeType="1" noTextEdit="1"/>
+              </p:cNvSpPr>
+              <p:nvPr/>
+            </p:nvSpPr>
+            <p:spPr>
+              <a:xfrm>
+                <a:off x="7140338" y="5543783"/>
+                <a:ext cx="781213" cy="369332"/>
+              </a:xfrm>
+              <a:prstGeom prst="rect">
+                <a:avLst/>
+              </a:prstGeom>
+              <a:blipFill>
+                <a:blip r:embed="rId12"/>
+                <a:stretch>
+                  <a:fillRect/>
+                </a:stretch>
+              </a:blipFill>
+            </p:spPr>
+            <p:txBody>
+              <a:bodyPr/>
+              <a:lstStyle/>
+              <a:p>
+                <a:r>
+                  <a:rPr lang="en-US">
+                    <a:noFill/>
+                  </a:rPr>
+                  <a:t> </a:t>
+                </a:r>
+              </a:p>
+            </p:txBody>
+          </p:sp>
+        </mc:Fallback>
+      </mc:AlternateContent>
+      <mc:AlternateContent xmlns:mc="http://schemas.openxmlformats.org/markup-compatibility/2006">
+        <mc:Choice xmlns:a14="http://schemas.microsoft.com/office/drawing/2010/main" Requires="a14">
+          <p:sp>
+            <p:nvSpPr>
+              <p:cNvPr id="110" name="TextBox 109">
+                <a:extLst>
+                  <a:ext uri="{FF2B5EF4-FFF2-40B4-BE49-F238E27FC236}">
+                    <a16:creationId xmlns:a16="http://schemas.microsoft.com/office/drawing/2014/main" id="{DE304294-EA00-4C14-9ED7-9045BDDA07F0}"/>
+                  </a:ext>
+                </a:extLst>
+              </p:cNvPr>
+              <p:cNvSpPr txBox="1"/>
+              <p:nvPr/>
+            </p:nvSpPr>
+            <p:spPr>
+              <a:xfrm>
+                <a:off x="8731583" y="4925657"/>
+                <a:ext cx="402292" cy="374270"/>
+              </a:xfrm>
+              <a:prstGeom prst="rect">
+                <a:avLst/>
+              </a:prstGeom>
+              <a:noFill/>
+            </p:spPr>
+            <p:txBody>
+              <a:bodyPr wrap="square" rtlCol="0">
+                <a:spAutoFit/>
+              </a:bodyPr>
+              <a:lstStyle/>
+              <a:p>
+                <a:pPr algn="ctr"/>
+                <a14:m>
+                  <m:oMathPara xmlns:m="http://schemas.openxmlformats.org/officeDocument/2006/math">
+                    <m:oMathParaPr>
+                      <m:jc m:val="centerGroup"/>
+                    </m:oMathParaPr>
+                    <m:oMath xmlns:m="http://schemas.openxmlformats.org/officeDocument/2006/math">
+                      <m:sSup>
+                        <m:sSupPr>
+                          <m:ctrlPr>
+                            <a:rPr lang="en-US" b="0" i="1" smtClean="0">
+                              <a:latin typeface="Cambria Math" panose="02040503050406030204" pitchFamily="18" charset="0"/>
+                            </a:rPr>
+                          </m:ctrlPr>
+                        </m:sSupPr>
+                        <m:e>
+                          <m:r>
+                            <a:rPr lang="en-US" b="0" i="1" smtClean="0">
+                              <a:latin typeface="Cambria Math" panose="02040503050406030204" pitchFamily="18" charset="0"/>
+                            </a:rPr>
+                            <m:t>𝑑</m:t>
+                          </m:r>
+                        </m:e>
+                        <m:sup>
+                          <m:r>
+                            <a:rPr lang="en-US" b="0" i="1" smtClean="0">
+                              <a:latin typeface="Cambria Math" panose="02040503050406030204" pitchFamily="18" charset="0"/>
+                            </a:rPr>
+                            <m:t>𝑛</m:t>
+                          </m:r>
+                        </m:sup>
+                      </m:sSup>
+                      <m:sSub>
+                        <m:sSubPr>
+                          <m:ctrlPr>
+                            <a:rPr lang="en-US" b="0" i="1" smtClean="0">
+                              <a:latin typeface="Cambria Math" panose="02040503050406030204" pitchFamily="18" charset="0"/>
+                            </a:rPr>
+                          </m:ctrlPr>
+                        </m:sSubPr>
+                        <m:e>
+                          <m:r>
+                            <a:rPr lang="en-US" b="0" i="1" smtClean="0">
+                              <a:latin typeface="Cambria Math" panose="02040503050406030204" pitchFamily="18" charset="0"/>
+                            </a:rPr>
+                            <m:t> </m:t>
+                          </m:r>
+                          <m:r>
+                            <a:rPr lang="en-US" b="0" i="1" smtClean="0">
+                              <a:latin typeface="Cambria Math" panose="02040503050406030204" pitchFamily="18" charset="0"/>
+                            </a:rPr>
+                            <m:t>𝑆</m:t>
+                          </m:r>
+                        </m:e>
+                        <m:sub>
+                          <m:r>
+                            <a:rPr lang="en-US" b="0" i="1" smtClean="0">
+                              <a:latin typeface="Cambria Math" panose="02040503050406030204" pitchFamily="18" charset="0"/>
+                            </a:rPr>
+                            <m:t>0</m:t>
+                          </m:r>
+                        </m:sub>
+                      </m:sSub>
+                    </m:oMath>
+                  </m:oMathPara>
+                </a14:m>
+                <a:endParaRPr lang="en-US" i="1" dirty="0"/>
+              </a:p>
+            </p:txBody>
+          </p:sp>
+        </mc:Choice>
+        <mc:Fallback>
+          <p:sp>
+            <p:nvSpPr>
+              <p:cNvPr id="110" name="TextBox 109">
+                <a:extLst>
+                  <a:ext uri="{FF2B5EF4-FFF2-40B4-BE49-F238E27FC236}">
+                    <a16:creationId xmlns:a16="http://schemas.microsoft.com/office/drawing/2014/main" id="{DE304294-EA00-4C14-9ED7-9045BDDA07F0}"/>
+                  </a:ext>
+                </a:extLst>
+              </p:cNvPr>
+              <p:cNvSpPr txBox="1">
+                <a:spLocks noRot="1" noChangeAspect="1" noMove="1" noResize="1" noEditPoints="1" noAdjustHandles="1" noChangeArrowheads="1" noChangeShapeType="1" noTextEdit="1"/>
+              </p:cNvSpPr>
+              <p:nvPr/>
+            </p:nvSpPr>
+            <p:spPr>
+              <a:xfrm>
+                <a:off x="8731583" y="4925657"/>
+                <a:ext cx="402292" cy="374270"/>
+              </a:xfrm>
+              <a:prstGeom prst="rect">
+                <a:avLst/>
+              </a:prstGeom>
+              <a:blipFill>
+                <a:blip r:embed="rId13"/>
+                <a:stretch>
+                  <a:fillRect l="-42424" r="-21212"/>
+                </a:stretch>
+              </a:blipFill>
+            </p:spPr>
+            <p:txBody>
+              <a:bodyPr/>
+              <a:lstStyle/>
+              <a:p>
+                <a:r>
+                  <a:rPr lang="en-US">
+                    <a:noFill/>
+                  </a:rPr>
+                  <a:t> </a:t>
+                </a:r>
+              </a:p>
+            </p:txBody>
+          </p:sp>
+        </mc:Fallback>
+      </mc:AlternateContent>
+      <mc:AlternateContent xmlns:mc="http://schemas.openxmlformats.org/markup-compatibility/2006">
+        <mc:Choice xmlns:a14="http://schemas.microsoft.com/office/drawing/2010/main" Requires="a14">
+          <p:sp>
+            <p:nvSpPr>
+              <p:cNvPr id="111" name="TextBox 110">
+                <a:extLst>
+                  <a:ext uri="{FF2B5EF4-FFF2-40B4-BE49-F238E27FC236}">
+                    <a16:creationId xmlns:a16="http://schemas.microsoft.com/office/drawing/2014/main" id="{D45AE55E-89AA-4036-842A-516F6F152B5C}"/>
+                  </a:ext>
+                </a:extLst>
+              </p:cNvPr>
+              <p:cNvSpPr txBox="1"/>
+              <p:nvPr/>
+            </p:nvSpPr>
+            <p:spPr>
+              <a:xfrm>
+                <a:off x="10368769" y="1370709"/>
+                <a:ext cx="402292" cy="369332"/>
+              </a:xfrm>
+              <a:prstGeom prst="rect">
+                <a:avLst/>
+              </a:prstGeom>
+              <a:noFill/>
+            </p:spPr>
+            <p:txBody>
+              <a:bodyPr wrap="square" rtlCol="0">
+                <a:spAutoFit/>
+              </a:bodyPr>
+              <a:lstStyle/>
+              <a:p>
+                <a:pPr algn="ctr"/>
+                <a14:m>
+                  <m:oMathPara xmlns:m="http://schemas.openxmlformats.org/officeDocument/2006/math">
+                    <m:oMathParaPr>
+                      <m:jc m:val="centerGroup"/>
+                    </m:oMathParaPr>
+                    <m:oMath xmlns:m="http://schemas.openxmlformats.org/officeDocument/2006/math">
+                      <m:sSup>
+                        <m:sSupPr>
+                          <m:ctrlPr>
+                            <a:rPr lang="en-US" i="1" smtClean="0">
+                              <a:latin typeface="Cambria Math" panose="02040503050406030204" pitchFamily="18" charset="0"/>
+                            </a:rPr>
+                          </m:ctrlPr>
+                        </m:sSupPr>
+                        <m:e>
+                          <m:r>
+                            <a:rPr lang="en-US" b="0" i="1" smtClean="0">
+                              <a:latin typeface="Cambria Math" panose="02040503050406030204" pitchFamily="18" charset="0"/>
+                            </a:rPr>
+                            <m:t>𝑝</m:t>
+                          </m:r>
+                        </m:e>
+                        <m:sup>
+                          <m:r>
+                            <a:rPr lang="en-US" b="0" i="1" smtClean="0">
+                              <a:latin typeface="Cambria Math" panose="02040503050406030204" pitchFamily="18" charset="0"/>
+                            </a:rPr>
+                            <m:t>𝑛</m:t>
+                          </m:r>
+                        </m:sup>
+                      </m:sSup>
+                    </m:oMath>
+                  </m:oMathPara>
+                </a14:m>
+                <a:endParaRPr lang="en-US" i="1" dirty="0"/>
+              </a:p>
+            </p:txBody>
+          </p:sp>
+        </mc:Choice>
+        <mc:Fallback>
+          <p:sp>
+            <p:nvSpPr>
+              <p:cNvPr id="111" name="TextBox 110">
+                <a:extLst>
+                  <a:ext uri="{FF2B5EF4-FFF2-40B4-BE49-F238E27FC236}">
+                    <a16:creationId xmlns:a16="http://schemas.microsoft.com/office/drawing/2014/main" id="{D45AE55E-89AA-4036-842A-516F6F152B5C}"/>
+                  </a:ext>
+                </a:extLst>
+              </p:cNvPr>
+              <p:cNvSpPr txBox="1">
+                <a:spLocks noRot="1" noChangeAspect="1" noMove="1" noResize="1" noEditPoints="1" noAdjustHandles="1" noChangeArrowheads="1" noChangeShapeType="1" noTextEdit="1"/>
+              </p:cNvSpPr>
+              <p:nvPr/>
+            </p:nvSpPr>
+            <p:spPr>
+              <a:xfrm>
+                <a:off x="10368769" y="1370709"/>
+                <a:ext cx="402292" cy="369332"/>
+              </a:xfrm>
+              <a:prstGeom prst="rect">
+                <a:avLst/>
+              </a:prstGeom>
+              <a:blipFill>
+                <a:blip r:embed="rId14"/>
+                <a:stretch>
+                  <a:fillRect l="-9091" b="-6667"/>
+                </a:stretch>
+              </a:blipFill>
+            </p:spPr>
+            <p:txBody>
+              <a:bodyPr/>
+              <a:lstStyle/>
+              <a:p>
+                <a:r>
+                  <a:rPr lang="en-US">
+                    <a:noFill/>
+                  </a:rPr>
+                  <a:t> </a:t>
+                </a:r>
+              </a:p>
+            </p:txBody>
+          </p:sp>
+        </mc:Fallback>
+      </mc:AlternateContent>
+      <mc:AlternateContent xmlns:mc="http://schemas.openxmlformats.org/markup-compatibility/2006">
+        <mc:Choice xmlns:a14="http://schemas.microsoft.com/office/drawing/2010/main" Requires="a14">
+          <p:sp>
+            <p:nvSpPr>
+              <p:cNvPr id="112" name="TextBox 111">
+                <a:extLst>
+                  <a:ext uri="{FF2B5EF4-FFF2-40B4-BE49-F238E27FC236}">
+                    <a16:creationId xmlns:a16="http://schemas.microsoft.com/office/drawing/2014/main" id="{033F5ADF-1061-4CCD-A306-AFEAA120E480}"/>
+                  </a:ext>
+                </a:extLst>
+              </p:cNvPr>
+              <p:cNvSpPr txBox="1"/>
+              <p:nvPr/>
+            </p:nvSpPr>
+            <p:spPr>
+              <a:xfrm>
+                <a:off x="9526670" y="1932275"/>
+                <a:ext cx="2219498" cy="369332"/>
+              </a:xfrm>
+              <a:prstGeom prst="rect">
+                <a:avLst/>
+              </a:prstGeom>
+              <a:noFill/>
+            </p:spPr>
+            <p:txBody>
+              <a:bodyPr wrap="square" rtlCol="0">
+                <a:spAutoFit/>
+              </a:bodyPr>
+              <a:lstStyle/>
+              <a:p>
+                <a:pPr algn="ctr"/>
+                <a14:m>
+                  <m:oMathPara xmlns:m="http://schemas.openxmlformats.org/officeDocument/2006/math">
+                    <m:oMathParaPr>
+                      <m:jc m:val="centerGroup"/>
+                    </m:oMathParaPr>
+                    <m:oMath xmlns:m="http://schemas.openxmlformats.org/officeDocument/2006/math">
+                      <m:r>
+                        <a:rPr lang="en-US" b="0" i="1" smtClean="0">
+                          <a:latin typeface="Cambria Math" panose="02040503050406030204" pitchFamily="18" charset="0"/>
+                        </a:rPr>
+                        <m:t>𝑛</m:t>
+                      </m:r>
+                      <m:sSup>
+                        <m:sSupPr>
+                          <m:ctrlPr>
+                            <a:rPr lang="en-US" i="1" smtClean="0">
+                              <a:latin typeface="Cambria Math" panose="02040503050406030204" pitchFamily="18" charset="0"/>
+                            </a:rPr>
+                          </m:ctrlPr>
+                        </m:sSupPr>
+                        <m:e>
+                          <m:r>
+                            <a:rPr lang="en-US" b="0" i="1" smtClean="0">
+                              <a:latin typeface="Cambria Math" panose="02040503050406030204" pitchFamily="18" charset="0"/>
+                            </a:rPr>
+                            <m:t> </m:t>
+                          </m:r>
+                          <m:r>
+                            <a:rPr lang="en-US" b="0" i="1" smtClean="0">
+                              <a:latin typeface="Cambria Math" panose="02040503050406030204" pitchFamily="18" charset="0"/>
+                            </a:rPr>
+                            <m:t>𝑝</m:t>
+                          </m:r>
+                        </m:e>
+                        <m:sup>
+                          <m:r>
+                            <a:rPr lang="en-US" b="0" i="1" smtClean="0">
+                              <a:latin typeface="Cambria Math" panose="02040503050406030204" pitchFamily="18" charset="0"/>
+                            </a:rPr>
+                            <m:t>𝑛</m:t>
+                          </m:r>
+                          <m:r>
+                            <a:rPr lang="en-US" b="0" i="1" smtClean="0">
+                              <a:latin typeface="Cambria Math" panose="02040503050406030204" pitchFamily="18" charset="0"/>
+                            </a:rPr>
+                            <m:t>−1</m:t>
+                          </m:r>
+                        </m:sup>
+                      </m:sSup>
+                      <m:r>
+                        <a:rPr lang="en-US" b="0" i="1" smtClean="0">
+                          <a:latin typeface="Cambria Math" panose="02040503050406030204" pitchFamily="18" charset="0"/>
+                        </a:rPr>
+                        <m:t> </m:t>
+                      </m:r>
+                      <m:d>
+                        <m:dPr>
+                          <m:ctrlPr>
+                            <a:rPr lang="en-US" b="0" i="1" smtClean="0">
+                              <a:latin typeface="Cambria Math" panose="02040503050406030204" pitchFamily="18" charset="0"/>
+                            </a:rPr>
+                          </m:ctrlPr>
+                        </m:dPr>
+                        <m:e>
+                          <m:r>
+                            <a:rPr lang="en-US" b="0" i="1" smtClean="0">
+                              <a:latin typeface="Cambria Math" panose="02040503050406030204" pitchFamily="18" charset="0"/>
+                            </a:rPr>
+                            <m:t>1−</m:t>
+                          </m:r>
+                          <m:r>
+                            <a:rPr lang="en-US" b="0" i="1" smtClean="0">
+                              <a:latin typeface="Cambria Math" panose="02040503050406030204" pitchFamily="18" charset="0"/>
+                            </a:rPr>
+                            <m:t>𝑝</m:t>
+                          </m:r>
+                        </m:e>
+                      </m:d>
+                    </m:oMath>
+                  </m:oMathPara>
+                </a14:m>
+                <a:endParaRPr lang="en-US" i="1" dirty="0"/>
+              </a:p>
+            </p:txBody>
+          </p:sp>
+        </mc:Choice>
+        <mc:Fallback>
+          <p:sp>
+            <p:nvSpPr>
+              <p:cNvPr id="112" name="TextBox 111">
+                <a:extLst>
+                  <a:ext uri="{FF2B5EF4-FFF2-40B4-BE49-F238E27FC236}">
+                    <a16:creationId xmlns:a16="http://schemas.microsoft.com/office/drawing/2014/main" id="{033F5ADF-1061-4CCD-A306-AFEAA120E480}"/>
+                  </a:ext>
+                </a:extLst>
+              </p:cNvPr>
+              <p:cNvSpPr txBox="1">
+                <a:spLocks noRot="1" noChangeAspect="1" noMove="1" noResize="1" noEditPoints="1" noAdjustHandles="1" noChangeArrowheads="1" noChangeShapeType="1" noTextEdit="1"/>
+              </p:cNvSpPr>
+              <p:nvPr/>
+            </p:nvSpPr>
+            <p:spPr>
+              <a:xfrm>
+                <a:off x="9526670" y="1932275"/>
+                <a:ext cx="2219498" cy="369332"/>
+              </a:xfrm>
+              <a:prstGeom prst="rect">
+                <a:avLst/>
+              </a:prstGeom>
+              <a:blipFill>
+                <a:blip r:embed="rId15"/>
+                <a:stretch>
+                  <a:fillRect b="-4918"/>
+                </a:stretch>
+              </a:blipFill>
+            </p:spPr>
+            <p:txBody>
+              <a:bodyPr/>
+              <a:lstStyle/>
+              <a:p>
+                <a:r>
+                  <a:rPr lang="en-US">
+                    <a:noFill/>
+                  </a:rPr>
+                  <a:t> </a:t>
+                </a:r>
+              </a:p>
+            </p:txBody>
+          </p:sp>
+        </mc:Fallback>
+      </mc:AlternateContent>
+      <mc:AlternateContent xmlns:mc="http://schemas.openxmlformats.org/markup-compatibility/2006">
+        <mc:Choice xmlns:a14="http://schemas.microsoft.com/office/drawing/2010/main" Requires="a14">
+          <p:sp>
+            <p:nvSpPr>
+              <p:cNvPr id="113" name="TextBox 112">
+                <a:extLst>
+                  <a:ext uri="{FF2B5EF4-FFF2-40B4-BE49-F238E27FC236}">
+                    <a16:creationId xmlns:a16="http://schemas.microsoft.com/office/drawing/2014/main" id="{0EE8C6CE-1E99-403C-BC2E-C89B51964F59}"/>
+                  </a:ext>
+                </a:extLst>
+              </p:cNvPr>
+              <p:cNvSpPr txBox="1"/>
+              <p:nvPr/>
+            </p:nvSpPr>
+            <p:spPr>
+              <a:xfrm>
+                <a:off x="9543296" y="3412900"/>
+                <a:ext cx="2213706" cy="462050"/>
+              </a:xfrm>
+              <a:prstGeom prst="rect">
+                <a:avLst/>
+              </a:prstGeom>
+              <a:noFill/>
+            </p:spPr>
+            <p:txBody>
+              <a:bodyPr wrap="square" rtlCol="0">
+                <a:spAutoFit/>
+              </a:bodyPr>
+              <a:lstStyle/>
+              <a:p>
+                <a:pPr algn="ctr"/>
+                <a14:m>
+                  <m:oMathPara xmlns:m="http://schemas.openxmlformats.org/officeDocument/2006/math">
+                    <m:oMathParaPr>
+                      <m:jc m:val="centerGroup"/>
+                    </m:oMathParaPr>
+                    <m:oMath xmlns:m="http://schemas.openxmlformats.org/officeDocument/2006/math">
+                      <m:d>
+                        <m:dPr>
+                          <m:ctrlPr>
+                            <a:rPr lang="en-US" sz="1600" b="0" i="1" smtClean="0">
+                              <a:latin typeface="Cambria Math" panose="02040503050406030204" pitchFamily="18" charset="0"/>
+                            </a:rPr>
+                          </m:ctrlPr>
+                        </m:dPr>
+                        <m:e>
+                          <m:eqArr>
+                            <m:eqArrPr>
+                              <m:ctrlPr>
+                                <a:rPr lang="en-US" sz="1600" b="0" i="1" smtClean="0">
+                                  <a:latin typeface="Cambria Math" panose="02040503050406030204" pitchFamily="18" charset="0"/>
+                                </a:rPr>
+                              </m:ctrlPr>
+                            </m:eqArrPr>
+                            <m:e>
+                              <m:r>
+                                <a:rPr lang="en-US" sz="1600" b="0" i="1" smtClean="0">
+                                  <a:latin typeface="Cambria Math" panose="02040503050406030204" pitchFamily="18" charset="0"/>
+                                </a:rPr>
+                                <m:t>𝑛</m:t>
+                              </m:r>
+                            </m:e>
+                            <m:e>
+                              <m:r>
+                                <a:rPr lang="en-US" sz="1600" b="0" i="1" smtClean="0">
+                                  <a:latin typeface="Cambria Math" panose="02040503050406030204" pitchFamily="18" charset="0"/>
+                                </a:rPr>
+                                <m:t>𝑘</m:t>
+                              </m:r>
+                            </m:e>
+                          </m:eqArr>
+                        </m:e>
+                      </m:d>
+                      <m:sSup>
+                        <m:sSupPr>
+                          <m:ctrlPr>
+                            <a:rPr lang="en-US" sz="1600" i="1" smtClean="0">
+                              <a:latin typeface="Cambria Math" panose="02040503050406030204" pitchFamily="18" charset="0"/>
+                            </a:rPr>
+                          </m:ctrlPr>
+                        </m:sSupPr>
+                        <m:e>
+                          <m:r>
+                            <a:rPr lang="en-US" sz="1600" b="0" i="1" smtClean="0">
+                              <a:latin typeface="Cambria Math" panose="02040503050406030204" pitchFamily="18" charset="0"/>
+                            </a:rPr>
+                            <m:t> </m:t>
+                          </m:r>
+                          <m:r>
+                            <a:rPr lang="en-US" sz="1600" b="0" i="1" smtClean="0">
+                              <a:latin typeface="Cambria Math" panose="02040503050406030204" pitchFamily="18" charset="0"/>
+                            </a:rPr>
+                            <m:t>𝑝</m:t>
+                          </m:r>
+                        </m:e>
+                        <m:sup>
+                          <m:r>
+                            <a:rPr lang="en-US" sz="1600" b="0" i="1" smtClean="0">
+                              <a:latin typeface="Cambria Math" panose="02040503050406030204" pitchFamily="18" charset="0"/>
+                            </a:rPr>
+                            <m:t>𝑛</m:t>
+                          </m:r>
+                          <m:r>
+                            <a:rPr lang="en-US" sz="1600" b="0" i="1" smtClean="0">
+                              <a:latin typeface="Cambria Math" panose="02040503050406030204" pitchFamily="18" charset="0"/>
+                            </a:rPr>
+                            <m:t>−</m:t>
+                          </m:r>
+                          <m:r>
+                            <a:rPr lang="en-US" sz="1600" b="0" i="1" smtClean="0">
+                              <a:latin typeface="Cambria Math" panose="02040503050406030204" pitchFamily="18" charset="0"/>
+                            </a:rPr>
+                            <m:t>𝑘</m:t>
+                          </m:r>
+                        </m:sup>
+                      </m:sSup>
+                      <m:r>
+                        <a:rPr lang="en-US" sz="1600" b="0" i="1" smtClean="0">
+                          <a:latin typeface="Cambria Math" panose="02040503050406030204" pitchFamily="18" charset="0"/>
+                        </a:rPr>
+                        <m:t> </m:t>
+                      </m:r>
+                      <m:sSup>
+                        <m:sSupPr>
+                          <m:ctrlPr>
+                            <a:rPr lang="en-US" sz="1600" b="0" i="1" smtClean="0">
+                              <a:latin typeface="Cambria Math" panose="02040503050406030204" pitchFamily="18" charset="0"/>
+                            </a:rPr>
+                          </m:ctrlPr>
+                        </m:sSupPr>
+                        <m:e>
+                          <m:d>
+                            <m:dPr>
+                              <m:ctrlPr>
+                                <a:rPr lang="en-US" sz="1600" b="0" i="1" smtClean="0">
+                                  <a:latin typeface="Cambria Math" panose="02040503050406030204" pitchFamily="18" charset="0"/>
+                                </a:rPr>
+                              </m:ctrlPr>
+                            </m:dPr>
+                            <m:e>
+                              <m:r>
+                                <a:rPr lang="en-US" sz="1600" b="0" i="1" smtClean="0">
+                                  <a:latin typeface="Cambria Math" panose="02040503050406030204" pitchFamily="18" charset="0"/>
+                                </a:rPr>
+                                <m:t>1−</m:t>
+                              </m:r>
+                              <m:r>
+                                <a:rPr lang="en-US" sz="1600" b="0" i="1" smtClean="0">
+                                  <a:latin typeface="Cambria Math" panose="02040503050406030204" pitchFamily="18" charset="0"/>
+                                </a:rPr>
+                                <m:t>𝑝</m:t>
+                              </m:r>
+                            </m:e>
+                          </m:d>
+                        </m:e>
+                        <m:sup>
+                          <m:r>
+                            <a:rPr lang="en-US" sz="1600" b="0" i="1" smtClean="0">
+                              <a:latin typeface="Cambria Math" panose="02040503050406030204" pitchFamily="18" charset="0"/>
+                            </a:rPr>
+                            <m:t>𝑘</m:t>
+                          </m:r>
+                        </m:sup>
+                      </m:sSup>
+                    </m:oMath>
+                  </m:oMathPara>
+                </a14:m>
+                <a:endParaRPr lang="en-US" sz="1600" i="1" dirty="0"/>
+              </a:p>
+            </p:txBody>
+          </p:sp>
+        </mc:Choice>
+        <mc:Fallback>
+          <p:sp>
+            <p:nvSpPr>
+              <p:cNvPr id="113" name="TextBox 112">
+                <a:extLst>
+                  <a:ext uri="{FF2B5EF4-FFF2-40B4-BE49-F238E27FC236}">
+                    <a16:creationId xmlns:a16="http://schemas.microsoft.com/office/drawing/2014/main" id="{0EE8C6CE-1E99-403C-BC2E-C89B51964F59}"/>
+                  </a:ext>
+                </a:extLst>
+              </p:cNvPr>
+              <p:cNvSpPr txBox="1">
+                <a:spLocks noRot="1" noChangeAspect="1" noMove="1" noResize="1" noEditPoints="1" noAdjustHandles="1" noChangeArrowheads="1" noChangeShapeType="1" noTextEdit="1"/>
+              </p:cNvSpPr>
+              <p:nvPr/>
+            </p:nvSpPr>
+            <p:spPr>
+              <a:xfrm>
+                <a:off x="9543296" y="3412900"/>
+                <a:ext cx="2213706" cy="462050"/>
+              </a:xfrm>
+              <a:prstGeom prst="rect">
+                <a:avLst/>
+              </a:prstGeom>
+              <a:blipFill>
+                <a:blip r:embed="rId16"/>
+                <a:stretch>
+                  <a:fillRect b="-3947"/>
+                </a:stretch>
+              </a:blipFill>
+            </p:spPr>
+            <p:txBody>
+              <a:bodyPr/>
+              <a:lstStyle/>
+              <a:p>
+                <a:r>
+                  <a:rPr lang="en-US">
+                    <a:noFill/>
+                  </a:rPr>
+                  <a:t> </a:t>
+                </a:r>
+              </a:p>
+            </p:txBody>
+          </p:sp>
+        </mc:Fallback>
+      </mc:AlternateContent>
+      <mc:AlternateContent xmlns:mc="http://schemas.openxmlformats.org/markup-compatibility/2006">
+        <mc:Choice xmlns:a14="http://schemas.microsoft.com/office/drawing/2010/main" Requires="a14">
+          <p:sp>
+            <p:nvSpPr>
+              <p:cNvPr id="114" name="TextBox 113">
+                <a:extLst>
+                  <a:ext uri="{FF2B5EF4-FFF2-40B4-BE49-F238E27FC236}">
+                    <a16:creationId xmlns:a16="http://schemas.microsoft.com/office/drawing/2014/main" id="{F9600520-B1A1-4195-B7BE-A08D922087EF}"/>
+                  </a:ext>
+                </a:extLst>
+              </p:cNvPr>
+              <p:cNvSpPr txBox="1"/>
+              <p:nvPr/>
+            </p:nvSpPr>
+            <p:spPr>
+              <a:xfrm>
+                <a:off x="9460166" y="4925657"/>
+                <a:ext cx="2213706" cy="374270"/>
+              </a:xfrm>
+              <a:prstGeom prst="rect">
+                <a:avLst/>
+              </a:prstGeom>
+              <a:noFill/>
+            </p:spPr>
+            <p:txBody>
+              <a:bodyPr wrap="square" rtlCol="0">
+                <a:spAutoFit/>
+              </a:bodyPr>
+              <a:lstStyle/>
+              <a:p>
+                <a:pPr algn="ctr"/>
+                <a14:m>
+                  <m:oMathPara xmlns:m="http://schemas.openxmlformats.org/officeDocument/2006/math">
+                    <m:oMathParaPr>
+                      <m:jc m:val="centerGroup"/>
+                    </m:oMathParaPr>
+                    <m:oMath xmlns:m="http://schemas.openxmlformats.org/officeDocument/2006/math">
+                      <m:sSup>
+                        <m:sSupPr>
+                          <m:ctrlPr>
+                            <a:rPr lang="en-US" b="0" i="1" smtClean="0">
+                              <a:latin typeface="Cambria Math" panose="02040503050406030204" pitchFamily="18" charset="0"/>
+                            </a:rPr>
+                          </m:ctrlPr>
+                        </m:sSupPr>
+                        <m:e>
+                          <m:d>
+                            <m:dPr>
+                              <m:ctrlPr>
+                                <a:rPr lang="en-US" b="0" i="1" smtClean="0">
+                                  <a:latin typeface="Cambria Math" panose="02040503050406030204" pitchFamily="18" charset="0"/>
+                                </a:rPr>
+                              </m:ctrlPr>
+                            </m:dPr>
+                            <m:e>
+                              <m:r>
+                                <a:rPr lang="en-US" b="0" i="1" smtClean="0">
+                                  <a:latin typeface="Cambria Math" panose="02040503050406030204" pitchFamily="18" charset="0"/>
+                                </a:rPr>
+                                <m:t>1−</m:t>
+                              </m:r>
+                              <m:r>
+                                <a:rPr lang="en-US" b="0" i="1" smtClean="0">
+                                  <a:latin typeface="Cambria Math" panose="02040503050406030204" pitchFamily="18" charset="0"/>
+                                </a:rPr>
+                                <m:t>𝑝</m:t>
+                              </m:r>
+                            </m:e>
+                          </m:d>
+                        </m:e>
+                        <m:sup>
+                          <m:r>
+                            <a:rPr lang="en-US" b="0" i="1" smtClean="0">
+                              <a:latin typeface="Cambria Math" panose="02040503050406030204" pitchFamily="18" charset="0"/>
+                            </a:rPr>
+                            <m:t>𝑛</m:t>
+                          </m:r>
+                        </m:sup>
+                      </m:sSup>
+                    </m:oMath>
+                  </m:oMathPara>
+                </a14:m>
+                <a:endParaRPr lang="en-US" i="1" dirty="0"/>
+              </a:p>
+            </p:txBody>
+          </p:sp>
+        </mc:Choice>
+        <mc:Fallback>
+          <p:sp>
+            <p:nvSpPr>
+              <p:cNvPr id="114" name="TextBox 113">
+                <a:extLst>
+                  <a:ext uri="{FF2B5EF4-FFF2-40B4-BE49-F238E27FC236}">
+                    <a16:creationId xmlns:a16="http://schemas.microsoft.com/office/drawing/2014/main" id="{F9600520-B1A1-4195-B7BE-A08D922087EF}"/>
+                  </a:ext>
+                </a:extLst>
+              </p:cNvPr>
+              <p:cNvSpPr txBox="1">
+                <a:spLocks noRot="1" noChangeAspect="1" noMove="1" noResize="1" noEditPoints="1" noAdjustHandles="1" noChangeArrowheads="1" noChangeShapeType="1" noTextEdit="1"/>
+              </p:cNvSpPr>
+              <p:nvPr/>
+            </p:nvSpPr>
+            <p:spPr>
+              <a:xfrm>
+                <a:off x="9460166" y="4925657"/>
+                <a:ext cx="2213706" cy="374270"/>
+              </a:xfrm>
+              <a:prstGeom prst="rect">
+                <a:avLst/>
+              </a:prstGeom>
+              <a:blipFill>
+                <a:blip r:embed="rId17"/>
+                <a:stretch>
+                  <a:fillRect b="-6557"/>
+                </a:stretch>
+              </a:blipFill>
+            </p:spPr>
+            <p:txBody>
+              <a:bodyPr/>
+              <a:lstStyle/>
+              <a:p>
+                <a:r>
+                  <a:rPr lang="en-US">
+                    <a:noFill/>
+                  </a:rPr>
+                  <a:t> </a:t>
+                </a:r>
+              </a:p>
+            </p:txBody>
+          </p:sp>
+        </mc:Fallback>
+      </mc:AlternateContent>
+      <mc:AlternateContent xmlns:mc="http://schemas.openxmlformats.org/markup-compatibility/2006">
+        <mc:Choice xmlns:a14="http://schemas.microsoft.com/office/drawing/2010/main" Requires="a14">
+          <p:sp>
+            <p:nvSpPr>
+              <p:cNvPr id="115" name="TextBox 114">
+                <a:extLst>
+                  <a:ext uri="{FF2B5EF4-FFF2-40B4-BE49-F238E27FC236}">
+                    <a16:creationId xmlns:a16="http://schemas.microsoft.com/office/drawing/2014/main" id="{759890E2-1157-4BAB-BC3B-3F42E3A5B2E0}"/>
+                  </a:ext>
+                </a:extLst>
+              </p:cNvPr>
+              <p:cNvSpPr txBox="1"/>
+              <p:nvPr/>
+            </p:nvSpPr>
+            <p:spPr>
+              <a:xfrm>
+                <a:off x="2902991" y="2790434"/>
+                <a:ext cx="402292" cy="369332"/>
+              </a:xfrm>
+              <a:prstGeom prst="rect">
+                <a:avLst/>
+              </a:prstGeom>
+              <a:noFill/>
+            </p:spPr>
+            <p:txBody>
+              <a:bodyPr wrap="square" rtlCol="0">
+                <a:spAutoFit/>
+              </a:bodyPr>
+              <a:lstStyle/>
+              <a:p>
+                <a:pPr algn="ctr"/>
+                <a14:m>
+                  <m:oMathPara xmlns:m="http://schemas.openxmlformats.org/officeDocument/2006/math">
+                    <m:oMathParaPr>
+                      <m:jc m:val="centerGroup"/>
+                    </m:oMathParaPr>
+                    <m:oMath xmlns:m="http://schemas.openxmlformats.org/officeDocument/2006/math">
+                      <m:sSub>
+                        <m:sSubPr>
+                          <m:ctrlPr>
+                            <a:rPr lang="en-US" b="0" i="1" smtClean="0">
+                              <a:latin typeface="Cambria Math" panose="02040503050406030204" pitchFamily="18" charset="0"/>
+                            </a:rPr>
+                          </m:ctrlPr>
+                        </m:sSubPr>
+                        <m:e>
+                          <m:r>
+                            <a:rPr lang="en-US" b="0" i="1" smtClean="0">
+                              <a:latin typeface="Cambria Math" panose="02040503050406030204" pitchFamily="18" charset="0"/>
+                            </a:rPr>
+                            <m:t> </m:t>
+                          </m:r>
+                          <m:r>
+                            <a:rPr lang="en-US" b="0" i="1" smtClean="0">
+                              <a:latin typeface="Cambria Math" panose="02040503050406030204" pitchFamily="18" charset="0"/>
+                            </a:rPr>
+                            <m:t>𝑆</m:t>
+                          </m:r>
+                        </m:e>
+                        <m:sub>
+                          <m:r>
+                            <a:rPr lang="en-US" b="0" i="1" smtClean="0">
+                              <a:latin typeface="Cambria Math" panose="02040503050406030204" pitchFamily="18" charset="0"/>
+                            </a:rPr>
+                            <m:t>0</m:t>
+                          </m:r>
+                        </m:sub>
+                      </m:sSub>
+                    </m:oMath>
+                  </m:oMathPara>
+                </a14:m>
+                <a:endParaRPr lang="en-US" i="1" dirty="0"/>
+              </a:p>
+            </p:txBody>
+          </p:sp>
+        </mc:Choice>
+        <mc:Fallback>
+          <p:sp>
+            <p:nvSpPr>
+              <p:cNvPr id="115" name="TextBox 114">
+                <a:extLst>
+                  <a:ext uri="{FF2B5EF4-FFF2-40B4-BE49-F238E27FC236}">
+                    <a16:creationId xmlns:a16="http://schemas.microsoft.com/office/drawing/2014/main" id="{759890E2-1157-4BAB-BC3B-3F42E3A5B2E0}"/>
+                  </a:ext>
+                </a:extLst>
+              </p:cNvPr>
+              <p:cNvSpPr txBox="1">
+                <a:spLocks noRot="1" noChangeAspect="1" noMove="1" noResize="1" noEditPoints="1" noAdjustHandles="1" noChangeArrowheads="1" noChangeShapeType="1" noTextEdit="1"/>
+              </p:cNvSpPr>
+              <p:nvPr/>
+            </p:nvSpPr>
+            <p:spPr>
+              <a:xfrm>
+                <a:off x="2902991" y="2790434"/>
+                <a:ext cx="402292" cy="369332"/>
+              </a:xfrm>
+              <a:prstGeom prst="rect">
+                <a:avLst/>
+              </a:prstGeom>
+              <a:blipFill>
+                <a:blip r:embed="rId18"/>
+                <a:stretch>
+                  <a:fillRect/>
+                </a:stretch>
+              </a:blipFill>
+            </p:spPr>
+            <p:txBody>
+              <a:bodyPr/>
+              <a:lstStyle/>
+              <a:p>
+                <a:r>
+                  <a:rPr lang="en-US">
+                    <a:noFill/>
+                  </a:rPr>
+                  <a:t> </a:t>
+                </a:r>
+              </a:p>
+            </p:txBody>
+          </p:sp>
+        </mc:Fallback>
+      </mc:AlternateContent>
+      <p:cxnSp>
+        <p:nvCxnSpPr>
+          <p:cNvPr id="117" name="Straight Arrow Connector 116">
+            <a:extLst>
+              <a:ext uri="{FF2B5EF4-FFF2-40B4-BE49-F238E27FC236}">
+                <a16:creationId xmlns:a16="http://schemas.microsoft.com/office/drawing/2014/main" id="{FB59F61E-303D-4FFF-B8A7-BECE37F1D4FC}"/>
+              </a:ext>
+            </a:extLst>
+          </p:cNvPr>
+          <p:cNvCxnSpPr>
+            <a:cxnSpLocks/>
+          </p:cNvCxnSpPr>
+          <p:nvPr/>
+        </p:nvCxnSpPr>
+        <p:spPr>
+          <a:xfrm flipH="1" flipV="1">
+            <a:off x="2571541" y="1724121"/>
+            <a:ext cx="0" cy="4267264"/>
+          </a:xfrm>
+          <a:prstGeom prst="straightConnector1">
+            <a:avLst/>
+          </a:prstGeom>
+          <a:ln w="19050">
+            <a:solidFill>
+              <a:schemeClr val="tx1"/>
+            </a:solidFill>
+            <a:prstDash val="solid"/>
+            <a:headEnd type="none"/>
+            <a:tailEnd type="stealth" w="lg" len="lg"/>
+          </a:ln>
+        </p:spPr>
+        <p:style>
+          <a:lnRef idx="1">
+            <a:schemeClr val="accent1"/>
+          </a:lnRef>
+          <a:fillRef idx="0">
+            <a:schemeClr val="accent1"/>
+          </a:fillRef>
+          <a:effectRef idx="0">
+            <a:schemeClr val="accent1"/>
+          </a:effectRef>
+          <a:fontRef idx="minor">
+            <a:schemeClr val="tx1"/>
+          </a:fontRef>
+        </p:style>
+      </p:cxnSp>
+      <mc:AlternateContent xmlns:mc="http://schemas.openxmlformats.org/markup-compatibility/2006">
+        <mc:Choice xmlns:a14="http://schemas.microsoft.com/office/drawing/2010/main" Requires="a14">
+          <p:sp>
+            <p:nvSpPr>
+              <p:cNvPr id="118" name="TextBox 117">
+                <a:extLst>
+                  <a:ext uri="{FF2B5EF4-FFF2-40B4-BE49-F238E27FC236}">
+                    <a16:creationId xmlns:a16="http://schemas.microsoft.com/office/drawing/2014/main" id="{61E988AF-3C4C-4FCC-B5B6-E43A6CFE1595}"/>
+                  </a:ext>
+                </a:extLst>
+              </p:cNvPr>
+              <p:cNvSpPr txBox="1"/>
+              <p:nvPr/>
+            </p:nvSpPr>
+            <p:spPr>
+              <a:xfrm>
+                <a:off x="2144597" y="1542269"/>
+                <a:ext cx="402292" cy="400110"/>
+              </a:xfrm>
+              <a:prstGeom prst="rect">
+                <a:avLst/>
+              </a:prstGeom>
+              <a:noFill/>
+            </p:spPr>
+            <p:txBody>
+              <a:bodyPr wrap="square" rtlCol="0">
+                <a:spAutoFit/>
+              </a:bodyPr>
+              <a:lstStyle/>
+              <a:p>
+                <a:pPr algn="ctr"/>
+                <a14:m>
+                  <m:oMathPara xmlns:m="http://schemas.openxmlformats.org/officeDocument/2006/math">
+                    <m:oMathParaPr>
+                      <m:jc m:val="centerGroup"/>
+                    </m:oMathParaPr>
+                    <m:oMath xmlns:m="http://schemas.openxmlformats.org/officeDocument/2006/math">
+                      <m:r>
+                        <a:rPr lang="en-US" sz="2000" b="0" i="1" smtClean="0">
+                          <a:latin typeface="Cambria Math" panose="02040503050406030204" pitchFamily="18" charset="0"/>
+                        </a:rPr>
+                        <m:t>𝑆</m:t>
+                      </m:r>
+                    </m:oMath>
+                  </m:oMathPara>
+                </a14:m>
+                <a:endParaRPr lang="en-US" sz="2000" i="1" dirty="0"/>
+              </a:p>
+            </p:txBody>
+          </p:sp>
+        </mc:Choice>
+        <mc:Fallback>
+          <p:sp>
+            <p:nvSpPr>
+              <p:cNvPr id="118" name="TextBox 117">
+                <a:extLst>
+                  <a:ext uri="{FF2B5EF4-FFF2-40B4-BE49-F238E27FC236}">
+                    <a16:creationId xmlns:a16="http://schemas.microsoft.com/office/drawing/2014/main" id="{61E988AF-3C4C-4FCC-B5B6-E43A6CFE1595}"/>
+                  </a:ext>
+                </a:extLst>
+              </p:cNvPr>
+              <p:cNvSpPr txBox="1">
+                <a:spLocks noRot="1" noChangeAspect="1" noMove="1" noResize="1" noEditPoints="1" noAdjustHandles="1" noChangeArrowheads="1" noChangeShapeType="1" noTextEdit="1"/>
+              </p:cNvSpPr>
+              <p:nvPr/>
+            </p:nvSpPr>
+            <p:spPr>
+              <a:xfrm>
+                <a:off x="2144597" y="1542269"/>
+                <a:ext cx="402292" cy="400110"/>
+              </a:xfrm>
+              <a:prstGeom prst="rect">
+                <a:avLst/>
+              </a:prstGeom>
+              <a:blipFill>
+                <a:blip r:embed="rId19"/>
+                <a:stretch>
+                  <a:fillRect/>
+                </a:stretch>
+              </a:blipFill>
+            </p:spPr>
+            <p:txBody>
+              <a:bodyPr/>
+              <a:lstStyle/>
+              <a:p>
+                <a:r>
+                  <a:rPr lang="en-US">
+                    <a:noFill/>
+                  </a:rPr>
+                  <a:t> </a:t>
+                </a:r>
+              </a:p>
+            </p:txBody>
+          </p:sp>
+        </mc:Fallback>
+      </mc:AlternateContent>
+    </p:spTree>
+    <p:extLst>
+      <p:ext uri="{BB962C8B-B14F-4D97-AF65-F5344CB8AC3E}">
+        <p14:creationId xmlns:p14="http://schemas.microsoft.com/office/powerpoint/2010/main" val="363530983"/>
+      </p:ext>
+    </p:extLst>
+  </p:cSld>
+  <p:clrMapOvr>
+    <a:masterClrMapping/>
+  </p:clrMapOvr>
+</p:sld>
+</file>
+
 <file path=ppt/theme/theme1.xml><?xml version="1.0" encoding="utf-8"?>
 <a:theme xmlns:a="http://schemas.openxmlformats.org/drawingml/2006/main" name="Office Theme">
   <a:themeElements>

</xml_diff>

<commit_message>
american option pricing with binom tree
</commit_message>
<xml_diff>
--- a/img/binom.pptx
+++ b/img/binom.pptx
@@ -8,6 +8,7 @@
     <p:sldId id="256" r:id="rId2"/>
     <p:sldId id="258" r:id="rId3"/>
     <p:sldId id="259" r:id="rId4"/>
+    <p:sldId id="260" r:id="rId5"/>
   </p:sldIdLst>
   <p:sldSz cx="12192000" cy="6858000"/>
   <p:notesSz cx="6858000" cy="9144000"/>
@@ -261,7 +262,7 @@
           <a:p>
             <a:fld id="{43C63E5C-259F-4767-9F32-E9A25171A77E}" type="datetimeFigureOut">
               <a:rPr lang="en-US" smtClean="0"/>
-              <a:t>12/30/2020</a:t>
+              <a:t>1/1/2021</a:t>
             </a:fld>
             <a:endParaRPr lang="en-US"/>
           </a:p>
@@ -459,7 +460,7 @@
           <a:p>
             <a:fld id="{43C63E5C-259F-4767-9F32-E9A25171A77E}" type="datetimeFigureOut">
               <a:rPr lang="en-US" smtClean="0"/>
-              <a:t>12/30/2020</a:t>
+              <a:t>1/1/2021</a:t>
             </a:fld>
             <a:endParaRPr lang="en-US"/>
           </a:p>
@@ -667,7 +668,7 @@
           <a:p>
             <a:fld id="{43C63E5C-259F-4767-9F32-E9A25171A77E}" type="datetimeFigureOut">
               <a:rPr lang="en-US" smtClean="0"/>
-              <a:t>12/30/2020</a:t>
+              <a:t>1/1/2021</a:t>
             </a:fld>
             <a:endParaRPr lang="en-US"/>
           </a:p>
@@ -865,7 +866,7 @@
           <a:p>
             <a:fld id="{43C63E5C-259F-4767-9F32-E9A25171A77E}" type="datetimeFigureOut">
               <a:rPr lang="en-US" smtClean="0"/>
-              <a:t>12/30/2020</a:t>
+              <a:t>1/1/2021</a:t>
             </a:fld>
             <a:endParaRPr lang="en-US"/>
           </a:p>
@@ -1140,7 +1141,7 @@
           <a:p>
             <a:fld id="{43C63E5C-259F-4767-9F32-E9A25171A77E}" type="datetimeFigureOut">
               <a:rPr lang="en-US" smtClean="0"/>
-              <a:t>12/30/2020</a:t>
+              <a:t>1/1/2021</a:t>
             </a:fld>
             <a:endParaRPr lang="en-US"/>
           </a:p>
@@ -1405,7 +1406,7 @@
           <a:p>
             <a:fld id="{43C63E5C-259F-4767-9F32-E9A25171A77E}" type="datetimeFigureOut">
               <a:rPr lang="en-US" smtClean="0"/>
-              <a:t>12/30/2020</a:t>
+              <a:t>1/1/2021</a:t>
             </a:fld>
             <a:endParaRPr lang="en-US"/>
           </a:p>
@@ -1817,7 +1818,7 @@
           <a:p>
             <a:fld id="{43C63E5C-259F-4767-9F32-E9A25171A77E}" type="datetimeFigureOut">
               <a:rPr lang="en-US" smtClean="0"/>
-              <a:t>12/30/2020</a:t>
+              <a:t>1/1/2021</a:t>
             </a:fld>
             <a:endParaRPr lang="en-US"/>
           </a:p>
@@ -1958,7 +1959,7 @@
           <a:p>
             <a:fld id="{43C63E5C-259F-4767-9F32-E9A25171A77E}" type="datetimeFigureOut">
               <a:rPr lang="en-US" smtClean="0"/>
-              <a:t>12/30/2020</a:t>
+              <a:t>1/1/2021</a:t>
             </a:fld>
             <a:endParaRPr lang="en-US"/>
           </a:p>
@@ -2071,7 +2072,7 @@
           <a:p>
             <a:fld id="{43C63E5C-259F-4767-9F32-E9A25171A77E}" type="datetimeFigureOut">
               <a:rPr lang="en-US" smtClean="0"/>
-              <a:t>12/30/2020</a:t>
+              <a:t>1/1/2021</a:t>
             </a:fld>
             <a:endParaRPr lang="en-US"/>
           </a:p>
@@ -2382,7 +2383,7 @@
           <a:p>
             <a:fld id="{43C63E5C-259F-4767-9F32-E9A25171A77E}" type="datetimeFigureOut">
               <a:rPr lang="en-US" smtClean="0"/>
-              <a:t>12/30/2020</a:t>
+              <a:t>1/1/2021</a:t>
             </a:fld>
             <a:endParaRPr lang="en-US"/>
           </a:p>
@@ -2670,7 +2671,7 @@
           <a:p>
             <a:fld id="{43C63E5C-259F-4767-9F32-E9A25171A77E}" type="datetimeFigureOut">
               <a:rPr lang="en-US" smtClean="0"/>
-              <a:t>12/30/2020</a:t>
+              <a:t>1/1/2021</a:t>
             </a:fld>
             <a:endParaRPr lang="en-US"/>
           </a:p>
@@ -2911,7 +2912,7 @@
           <a:p>
             <a:fld id="{43C63E5C-259F-4767-9F32-E9A25171A77E}" type="datetimeFigureOut">
               <a:rPr lang="en-US" smtClean="0"/>
-              <a:t>12/30/2020</a:t>
+              <a:t>1/1/2021</a:t>
             </a:fld>
             <a:endParaRPr lang="en-US"/>
           </a:p>
@@ -6692,8 +6693,8 @@
           </a:fontRef>
         </p:style>
       </p:cxnSp>
-      <mc:AlternateContent xmlns:mc="http://schemas.openxmlformats.org/markup-compatibility/2006">
-        <mc:Choice xmlns:a14="http://schemas.microsoft.com/office/drawing/2010/main" Requires="a14">
+      <mc:AlternateContent xmlns:mc="http://schemas.openxmlformats.org/markup-compatibility/2006" xmlns:a14="http://schemas.microsoft.com/office/drawing/2010/main">
+        <mc:Choice Requires="a14">
           <p:sp>
             <p:nvSpPr>
               <p:cNvPr id="54" name="TextBox 53">
@@ -6762,7 +6763,7 @@
             </p:txBody>
           </p:sp>
         </mc:Choice>
-        <mc:Fallback>
+        <mc:Fallback xmlns="">
           <p:sp>
             <p:nvSpPr>
               <p:cNvPr id="54" name="TextBox 53">
@@ -6852,8 +6853,8 @@
           </a:fontRef>
         </p:style>
       </p:cxnSp>
-      <mc:AlternateContent xmlns:mc="http://schemas.openxmlformats.org/markup-compatibility/2006">
-        <mc:Choice xmlns:a14="http://schemas.microsoft.com/office/drawing/2010/main" Requires="a14">
+      <mc:AlternateContent xmlns:mc="http://schemas.openxmlformats.org/markup-compatibility/2006" xmlns:a14="http://schemas.microsoft.com/office/drawing/2010/main">
+        <mc:Choice Requires="a14">
           <p:sp>
             <p:nvSpPr>
               <p:cNvPr id="67" name="TextBox 66">
@@ -6928,7 +6929,7 @@
             </p:txBody>
           </p:sp>
         </mc:Choice>
-        <mc:Fallback>
+        <mc:Fallback xmlns="">
           <p:sp>
             <p:nvSpPr>
               <p:cNvPr id="67" name="TextBox 66">
@@ -7246,8 +7247,8 @@
           </a:fontRef>
         </p:style>
       </p:cxnSp>
-      <mc:AlternateContent xmlns:mc="http://schemas.openxmlformats.org/markup-compatibility/2006">
-        <mc:Choice xmlns:a14="http://schemas.microsoft.com/office/drawing/2010/main" Requires="a14">
+      <mc:AlternateContent xmlns:mc="http://schemas.openxmlformats.org/markup-compatibility/2006" xmlns:a14="http://schemas.microsoft.com/office/drawing/2010/main">
+        <mc:Choice Requires="a14">
           <p:sp>
             <p:nvSpPr>
               <p:cNvPr id="75" name="TextBox 74">
@@ -7297,7 +7298,7 @@
             </p:txBody>
           </p:sp>
         </mc:Choice>
-        <mc:Fallback>
+        <mc:Fallback xmlns="">
           <p:sp>
             <p:nvSpPr>
               <p:cNvPr id="75" name="TextBox 74">
@@ -7342,8 +7343,8 @@
           </p:sp>
         </mc:Fallback>
       </mc:AlternateContent>
-      <mc:AlternateContent xmlns:mc="http://schemas.openxmlformats.org/markup-compatibility/2006">
-        <mc:Choice xmlns:a14="http://schemas.microsoft.com/office/drawing/2010/main" Requires="a14">
+      <mc:AlternateContent xmlns:mc="http://schemas.openxmlformats.org/markup-compatibility/2006" xmlns:a14="http://schemas.microsoft.com/office/drawing/2010/main">
+        <mc:Choice Requires="a14">
           <p:sp>
             <p:nvSpPr>
               <p:cNvPr id="76" name="TextBox 75">
@@ -7399,7 +7400,7 @@
             </p:txBody>
           </p:sp>
         </mc:Choice>
-        <mc:Fallback>
+        <mc:Fallback xmlns="">
           <p:sp>
             <p:nvSpPr>
               <p:cNvPr id="76" name="TextBox 75">
@@ -8109,8 +8110,8 @@
           </a:fontRef>
         </p:style>
       </p:cxnSp>
-      <mc:AlternateContent xmlns:mc="http://schemas.openxmlformats.org/markup-compatibility/2006">
-        <mc:Choice xmlns:a14="http://schemas.microsoft.com/office/drawing/2010/main" Requires="a14">
+      <mc:AlternateContent xmlns:mc="http://schemas.openxmlformats.org/markup-compatibility/2006" xmlns:a14="http://schemas.microsoft.com/office/drawing/2010/main">
+        <mc:Choice Requires="a14">
           <p:sp>
             <p:nvSpPr>
               <p:cNvPr id="101" name="TextBox 100">
@@ -8210,7 +8211,7 @@
             </p:txBody>
           </p:sp>
         </mc:Choice>
-        <mc:Fallback>
+        <mc:Fallback xmlns="">
           <p:sp>
             <p:nvSpPr>
               <p:cNvPr id="101" name="TextBox 100">
@@ -8255,8 +8256,8 @@
           </p:sp>
         </mc:Fallback>
       </mc:AlternateContent>
-      <mc:AlternateContent xmlns:mc="http://schemas.openxmlformats.org/markup-compatibility/2006">
-        <mc:Choice xmlns:a14="http://schemas.microsoft.com/office/drawing/2010/main" Requires="a14">
+      <mc:AlternateContent xmlns:mc="http://schemas.openxmlformats.org/markup-compatibility/2006" xmlns:a14="http://schemas.microsoft.com/office/drawing/2010/main">
+        <mc:Choice Requires="a14">
           <p:sp>
             <p:nvSpPr>
               <p:cNvPr id="102" name="TextBox 101">
@@ -8374,7 +8375,7 @@
             </p:txBody>
           </p:sp>
         </mc:Choice>
-        <mc:Fallback>
+        <mc:Fallback xmlns="">
           <p:sp>
             <p:nvSpPr>
               <p:cNvPr id="102" name="TextBox 101">
@@ -8419,8 +8420,8 @@
           </p:sp>
         </mc:Fallback>
       </mc:AlternateContent>
-      <mc:AlternateContent xmlns:mc="http://schemas.openxmlformats.org/markup-compatibility/2006">
-        <mc:Choice xmlns:a14="http://schemas.microsoft.com/office/drawing/2010/main" Requires="a14">
+      <mc:AlternateContent xmlns:mc="http://schemas.openxmlformats.org/markup-compatibility/2006" xmlns:a14="http://schemas.microsoft.com/office/drawing/2010/main">
+        <mc:Choice Requires="a14">
           <p:sp>
             <p:nvSpPr>
               <p:cNvPr id="103" name="TextBox 102">
@@ -8563,7 +8564,7 @@
             </p:txBody>
           </p:sp>
         </mc:Choice>
-        <mc:Fallback>
+        <mc:Fallback xmlns="">
           <p:sp>
             <p:nvSpPr>
               <p:cNvPr id="103" name="TextBox 102">
@@ -8608,8 +8609,8 @@
           </p:sp>
         </mc:Fallback>
       </mc:AlternateContent>
-      <mc:AlternateContent xmlns:mc="http://schemas.openxmlformats.org/markup-compatibility/2006">
-        <mc:Choice xmlns:a14="http://schemas.microsoft.com/office/drawing/2010/main" Requires="a14">
+      <mc:AlternateContent xmlns:mc="http://schemas.openxmlformats.org/markup-compatibility/2006" xmlns:a14="http://schemas.microsoft.com/office/drawing/2010/main">
+        <mc:Choice Requires="a14">
           <p:sp>
             <p:nvSpPr>
               <p:cNvPr id="105" name="TextBox 104">
@@ -8659,7 +8660,7 @@
             </p:txBody>
           </p:sp>
         </mc:Choice>
-        <mc:Fallback>
+        <mc:Fallback xmlns="">
           <p:sp>
             <p:nvSpPr>
               <p:cNvPr id="105" name="TextBox 104">
@@ -8704,8 +8705,8 @@
           </p:sp>
         </mc:Fallback>
       </mc:AlternateContent>
-      <mc:AlternateContent xmlns:mc="http://schemas.openxmlformats.org/markup-compatibility/2006">
-        <mc:Choice xmlns:a14="http://schemas.microsoft.com/office/drawing/2010/main" Requires="a14">
+      <mc:AlternateContent xmlns:mc="http://schemas.openxmlformats.org/markup-compatibility/2006" xmlns:a14="http://schemas.microsoft.com/office/drawing/2010/main">
+        <mc:Choice Requires="a14">
           <p:sp>
             <p:nvSpPr>
               <p:cNvPr id="106" name="TextBox 105">
@@ -8755,7 +8756,7 @@
             </p:txBody>
           </p:sp>
         </mc:Choice>
-        <mc:Fallback>
+        <mc:Fallback xmlns="">
           <p:sp>
             <p:nvSpPr>
               <p:cNvPr id="106" name="TextBox 105">
@@ -8800,8 +8801,8 @@
           </p:sp>
         </mc:Fallback>
       </mc:AlternateContent>
-      <mc:AlternateContent xmlns:mc="http://schemas.openxmlformats.org/markup-compatibility/2006">
-        <mc:Choice xmlns:a14="http://schemas.microsoft.com/office/drawing/2010/main" Requires="a14">
+      <mc:AlternateContent xmlns:mc="http://schemas.openxmlformats.org/markup-compatibility/2006" xmlns:a14="http://schemas.microsoft.com/office/drawing/2010/main">
+        <mc:Choice Requires="a14">
           <p:sp>
             <p:nvSpPr>
               <p:cNvPr id="108" name="TextBox 107">
@@ -8851,7 +8852,7 @@
             </p:txBody>
           </p:sp>
         </mc:Choice>
-        <mc:Fallback>
+        <mc:Fallback xmlns="">
           <p:sp>
             <p:nvSpPr>
               <p:cNvPr id="108" name="TextBox 107">
@@ -8896,8 +8897,8 @@
           </p:sp>
         </mc:Fallback>
       </mc:AlternateContent>
-      <mc:AlternateContent xmlns:mc="http://schemas.openxmlformats.org/markup-compatibility/2006">
-        <mc:Choice xmlns:a14="http://schemas.microsoft.com/office/drawing/2010/main" Requires="a14">
+      <mc:AlternateContent xmlns:mc="http://schemas.openxmlformats.org/markup-compatibility/2006" xmlns:a14="http://schemas.microsoft.com/office/drawing/2010/main">
+        <mc:Choice Requires="a14">
           <p:sp>
             <p:nvSpPr>
               <p:cNvPr id="109" name="TextBox 108">
@@ -8947,7 +8948,7 @@
             </p:txBody>
           </p:sp>
         </mc:Choice>
-        <mc:Fallback>
+        <mc:Fallback xmlns="">
           <p:sp>
             <p:nvSpPr>
               <p:cNvPr id="109" name="TextBox 108">
@@ -8992,8 +8993,8 @@
           </p:sp>
         </mc:Fallback>
       </mc:AlternateContent>
-      <mc:AlternateContent xmlns:mc="http://schemas.openxmlformats.org/markup-compatibility/2006">
-        <mc:Choice xmlns:a14="http://schemas.microsoft.com/office/drawing/2010/main" Requires="a14">
+      <mc:AlternateContent xmlns:mc="http://schemas.openxmlformats.org/markup-compatibility/2006" xmlns:a14="http://schemas.microsoft.com/office/drawing/2010/main">
+        <mc:Choice Requires="a14">
           <p:sp>
             <p:nvSpPr>
               <p:cNvPr id="110" name="TextBox 109">
@@ -9093,7 +9094,7 @@
             </p:txBody>
           </p:sp>
         </mc:Choice>
-        <mc:Fallback>
+        <mc:Fallback xmlns="">
           <p:sp>
             <p:nvSpPr>
               <p:cNvPr id="110" name="TextBox 109">
@@ -9138,8 +9139,8 @@
           </p:sp>
         </mc:Fallback>
       </mc:AlternateContent>
-      <mc:AlternateContent xmlns:mc="http://schemas.openxmlformats.org/markup-compatibility/2006">
-        <mc:Choice xmlns:a14="http://schemas.microsoft.com/office/drawing/2010/main" Requires="a14">
+      <mc:AlternateContent xmlns:mc="http://schemas.openxmlformats.org/markup-compatibility/2006" xmlns:a14="http://schemas.microsoft.com/office/drawing/2010/main">
+        <mc:Choice Requires="a14">
           <p:sp>
             <p:nvSpPr>
               <p:cNvPr id="111" name="TextBox 110">
@@ -9208,7 +9209,7 @@
             </p:txBody>
           </p:sp>
         </mc:Choice>
-        <mc:Fallback>
+        <mc:Fallback xmlns="">
           <p:sp>
             <p:nvSpPr>
               <p:cNvPr id="111" name="TextBox 110">
@@ -9253,8 +9254,8 @@
           </p:sp>
         </mc:Fallback>
       </mc:AlternateContent>
-      <mc:AlternateContent xmlns:mc="http://schemas.openxmlformats.org/markup-compatibility/2006">
-        <mc:Choice xmlns:a14="http://schemas.microsoft.com/office/drawing/2010/main" Requires="a14">
+      <mc:AlternateContent xmlns:mc="http://schemas.openxmlformats.org/markup-compatibility/2006" xmlns:a14="http://schemas.microsoft.com/office/drawing/2010/main">
+        <mc:Choice Requires="a14">
           <p:sp>
             <p:nvSpPr>
               <p:cNvPr id="112" name="TextBox 111">
@@ -9370,7 +9371,7 @@
             </p:txBody>
           </p:sp>
         </mc:Choice>
-        <mc:Fallback>
+        <mc:Fallback xmlns="">
           <p:sp>
             <p:nvSpPr>
               <p:cNvPr id="112" name="TextBox 111">
@@ -9415,8 +9416,8 @@
           </p:sp>
         </mc:Fallback>
       </mc:AlternateContent>
-      <mc:AlternateContent xmlns:mc="http://schemas.openxmlformats.org/markup-compatibility/2006">
-        <mc:Choice xmlns:a14="http://schemas.microsoft.com/office/drawing/2010/main" Requires="a14">
+      <mc:AlternateContent xmlns:mc="http://schemas.openxmlformats.org/markup-compatibility/2006" xmlns:a14="http://schemas.microsoft.com/office/drawing/2010/main">
+        <mc:Choice Requires="a14">
           <p:sp>
             <p:nvSpPr>
               <p:cNvPr id="113" name="TextBox 112">
@@ -9587,7 +9588,7 @@
             </p:txBody>
           </p:sp>
         </mc:Choice>
-        <mc:Fallback>
+        <mc:Fallback xmlns="">
           <p:sp>
             <p:nvSpPr>
               <p:cNvPr id="113" name="TextBox 112">
@@ -9632,8 +9633,8 @@
           </p:sp>
         </mc:Fallback>
       </mc:AlternateContent>
-      <mc:AlternateContent xmlns:mc="http://schemas.openxmlformats.org/markup-compatibility/2006">
-        <mc:Choice xmlns:a14="http://schemas.microsoft.com/office/drawing/2010/main" Requires="a14">
+      <mc:AlternateContent xmlns:mc="http://schemas.openxmlformats.org/markup-compatibility/2006" xmlns:a14="http://schemas.microsoft.com/office/drawing/2010/main">
+        <mc:Choice Requires="a14">
           <p:sp>
             <p:nvSpPr>
               <p:cNvPr id="114" name="TextBox 113">
@@ -9719,7 +9720,7 @@
             </p:txBody>
           </p:sp>
         </mc:Choice>
-        <mc:Fallback>
+        <mc:Fallback xmlns="">
           <p:sp>
             <p:nvSpPr>
               <p:cNvPr id="114" name="TextBox 113">
@@ -9764,8 +9765,8 @@
           </p:sp>
         </mc:Fallback>
       </mc:AlternateContent>
-      <mc:AlternateContent xmlns:mc="http://schemas.openxmlformats.org/markup-compatibility/2006">
-        <mc:Choice xmlns:a14="http://schemas.microsoft.com/office/drawing/2010/main" Requires="a14">
+      <mc:AlternateContent xmlns:mc="http://schemas.openxmlformats.org/markup-compatibility/2006" xmlns:a14="http://schemas.microsoft.com/office/drawing/2010/main">
+        <mc:Choice Requires="a14">
           <p:sp>
             <p:nvSpPr>
               <p:cNvPr id="115" name="TextBox 114">
@@ -9840,7 +9841,7 @@
             </p:txBody>
           </p:sp>
         </mc:Choice>
-        <mc:Fallback>
+        <mc:Fallback xmlns="">
           <p:sp>
             <p:nvSpPr>
               <p:cNvPr id="115" name="TextBox 114">
@@ -9931,8 +9932,8 @@
           </a:fontRef>
         </p:style>
       </p:cxnSp>
-      <mc:AlternateContent xmlns:mc="http://schemas.openxmlformats.org/markup-compatibility/2006">
-        <mc:Choice xmlns:a14="http://schemas.microsoft.com/office/drawing/2010/main" Requires="a14">
+      <mc:AlternateContent xmlns:mc="http://schemas.openxmlformats.org/markup-compatibility/2006" xmlns:a14="http://schemas.microsoft.com/office/drawing/2010/main">
+        <mc:Choice Requires="a14">
           <p:sp>
             <p:nvSpPr>
               <p:cNvPr id="118" name="TextBox 117">
@@ -9982,7 +9983,7 @@
             </p:txBody>
           </p:sp>
         </mc:Choice>
-        <mc:Fallback>
+        <mc:Fallback xmlns="">
           <p:sp>
             <p:nvSpPr>
               <p:cNvPr id="118" name="TextBox 117">
@@ -10031,6 +10032,2922 @@
     <p:extLst>
       <p:ext uri="{BB962C8B-B14F-4D97-AF65-F5344CB8AC3E}">
         <p14:creationId xmlns:p14="http://schemas.microsoft.com/office/powerpoint/2010/main" val="363530983"/>
+      </p:ext>
+    </p:extLst>
+  </p:cSld>
+  <p:clrMapOvr>
+    <a:masterClrMapping/>
+  </p:clrMapOvr>
+</p:sld>
+</file>
+
+<file path=ppt/slides/slide4.xml><?xml version="1.0" encoding="utf-8"?>
+<p:sld xmlns:a="http://schemas.openxmlformats.org/drawingml/2006/main" xmlns:r="http://schemas.openxmlformats.org/officeDocument/2006/relationships" xmlns:p="http://schemas.openxmlformats.org/presentationml/2006/main">
+  <p:cSld>
+    <p:spTree>
+      <p:nvGrpSpPr>
+        <p:cNvPr id="1" name=""/>
+        <p:cNvGrpSpPr/>
+        <p:nvPr/>
+      </p:nvGrpSpPr>
+      <p:grpSpPr>
+        <a:xfrm>
+          <a:off x="0" y="0"/>
+          <a:ext cx="0" cy="0"/>
+          <a:chOff x="0" y="0"/>
+          <a:chExt cx="0" cy="0"/>
+        </a:xfrm>
+      </p:grpSpPr>
+      <p:cxnSp>
+        <p:nvCxnSpPr>
+          <p:cNvPr id="9" name="Straight Arrow Connector 8">
+            <a:extLst>
+              <a:ext uri="{FF2B5EF4-FFF2-40B4-BE49-F238E27FC236}">
+                <a16:creationId xmlns:a16="http://schemas.microsoft.com/office/drawing/2014/main" id="{CBECB769-6FE1-42B6-A7FC-4BEB19CA4BAC}"/>
+              </a:ext>
+            </a:extLst>
+          </p:cNvPr>
+          <p:cNvCxnSpPr>
+            <a:cxnSpLocks/>
+          </p:cNvCxnSpPr>
+          <p:nvPr/>
+        </p:nvCxnSpPr>
+        <p:spPr>
+          <a:xfrm>
+            <a:off x="2503541" y="2420364"/>
+            <a:ext cx="2087809" cy="926192"/>
+          </a:xfrm>
+          <a:prstGeom prst="straightConnector1">
+            <a:avLst/>
+          </a:prstGeom>
+          <a:ln w="19050">
+            <a:solidFill>
+              <a:schemeClr val="tx1"/>
+            </a:solidFill>
+            <a:headEnd type="none"/>
+            <a:tailEnd type="stealth" w="lg" len="lg"/>
+          </a:ln>
+        </p:spPr>
+        <p:style>
+          <a:lnRef idx="1">
+            <a:schemeClr val="accent1"/>
+          </a:lnRef>
+          <a:fillRef idx="0">
+            <a:schemeClr val="accent1"/>
+          </a:fillRef>
+          <a:effectRef idx="0">
+            <a:schemeClr val="accent1"/>
+          </a:effectRef>
+          <a:fontRef idx="minor">
+            <a:schemeClr val="tx1"/>
+          </a:fontRef>
+        </p:style>
+      </p:cxnSp>
+      <p:cxnSp>
+        <p:nvCxnSpPr>
+          <p:cNvPr id="35" name="Straight Arrow Connector 34">
+            <a:extLst>
+              <a:ext uri="{FF2B5EF4-FFF2-40B4-BE49-F238E27FC236}">
+                <a16:creationId xmlns:a16="http://schemas.microsoft.com/office/drawing/2014/main" id="{68D73023-C850-45EB-ABEA-16442D268BD1}"/>
+              </a:ext>
+            </a:extLst>
+          </p:cNvPr>
+          <p:cNvCxnSpPr/>
+          <p:nvPr/>
+        </p:nvCxnSpPr>
+        <p:spPr>
+          <a:xfrm flipV="1">
+            <a:off x="4809041" y="2440000"/>
+            <a:ext cx="2087809" cy="926192"/>
+          </a:xfrm>
+          <a:prstGeom prst="straightConnector1">
+            <a:avLst/>
+          </a:prstGeom>
+          <a:ln w="19050">
+            <a:solidFill>
+              <a:schemeClr val="tx1"/>
+            </a:solidFill>
+            <a:headEnd type="none"/>
+            <a:tailEnd type="stealth" w="lg" len="lg"/>
+          </a:ln>
+        </p:spPr>
+        <p:style>
+          <a:lnRef idx="1">
+            <a:schemeClr val="accent1"/>
+          </a:lnRef>
+          <a:fillRef idx="0">
+            <a:schemeClr val="accent1"/>
+          </a:fillRef>
+          <a:effectRef idx="0">
+            <a:schemeClr val="accent1"/>
+          </a:effectRef>
+          <a:fontRef idx="minor">
+            <a:schemeClr val="tx1"/>
+          </a:fontRef>
+        </p:style>
+      </p:cxnSp>
+      <p:cxnSp>
+        <p:nvCxnSpPr>
+          <p:cNvPr id="36" name="Straight Arrow Connector 35">
+            <a:extLst>
+              <a:ext uri="{FF2B5EF4-FFF2-40B4-BE49-F238E27FC236}">
+                <a16:creationId xmlns:a16="http://schemas.microsoft.com/office/drawing/2014/main" id="{BFACD10E-652F-4E61-8883-E947C66E689A}"/>
+              </a:ext>
+            </a:extLst>
+          </p:cNvPr>
+          <p:cNvCxnSpPr>
+            <a:cxnSpLocks/>
+          </p:cNvCxnSpPr>
+          <p:nvPr/>
+        </p:nvCxnSpPr>
+        <p:spPr>
+          <a:xfrm>
+            <a:off x="4822658" y="3446753"/>
+            <a:ext cx="2087809" cy="926192"/>
+          </a:xfrm>
+          <a:prstGeom prst="straightConnector1">
+            <a:avLst/>
+          </a:prstGeom>
+          <a:ln w="19050">
+            <a:solidFill>
+              <a:schemeClr val="tx1"/>
+            </a:solidFill>
+            <a:headEnd type="none"/>
+            <a:tailEnd type="stealth" w="lg" len="lg"/>
+          </a:ln>
+        </p:spPr>
+        <p:style>
+          <a:lnRef idx="1">
+            <a:schemeClr val="accent1"/>
+          </a:lnRef>
+          <a:fillRef idx="0">
+            <a:schemeClr val="accent1"/>
+          </a:fillRef>
+          <a:effectRef idx="0">
+            <a:schemeClr val="accent1"/>
+          </a:effectRef>
+          <a:fontRef idx="minor">
+            <a:schemeClr val="tx1"/>
+          </a:fontRef>
+        </p:style>
+      </p:cxnSp>
+      <p:cxnSp>
+        <p:nvCxnSpPr>
+          <p:cNvPr id="31" name="Straight Arrow Connector 30">
+            <a:extLst>
+              <a:ext uri="{FF2B5EF4-FFF2-40B4-BE49-F238E27FC236}">
+                <a16:creationId xmlns:a16="http://schemas.microsoft.com/office/drawing/2014/main" id="{4D1F27BA-99AF-432B-A37D-9E5D537A2F3C}"/>
+              </a:ext>
+            </a:extLst>
+          </p:cNvPr>
+          <p:cNvCxnSpPr>
+            <a:cxnSpLocks/>
+          </p:cNvCxnSpPr>
+          <p:nvPr/>
+        </p:nvCxnSpPr>
+        <p:spPr>
+          <a:xfrm flipV="1">
+            <a:off x="4793414" y="1084660"/>
+            <a:ext cx="666241" cy="292608"/>
+          </a:xfrm>
+          <a:prstGeom prst="straightConnector1">
+            <a:avLst/>
+          </a:prstGeom>
+          <a:ln w="19050">
+            <a:solidFill>
+              <a:schemeClr val="tx1"/>
+            </a:solidFill>
+            <a:headEnd type="none"/>
+            <a:tailEnd type="stealth" w="lg" len="lg"/>
+          </a:ln>
+        </p:spPr>
+        <p:style>
+          <a:lnRef idx="1">
+            <a:schemeClr val="accent1"/>
+          </a:lnRef>
+          <a:fillRef idx="0">
+            <a:schemeClr val="accent1"/>
+          </a:fillRef>
+          <a:effectRef idx="0">
+            <a:schemeClr val="accent1"/>
+          </a:effectRef>
+          <a:fontRef idx="minor">
+            <a:schemeClr val="tx1"/>
+          </a:fontRef>
+        </p:style>
+      </p:cxnSp>
+      <p:sp>
+        <p:nvSpPr>
+          <p:cNvPr id="30" name="Oval 29">
+            <a:extLst>
+              <a:ext uri="{FF2B5EF4-FFF2-40B4-BE49-F238E27FC236}">
+                <a16:creationId xmlns:a16="http://schemas.microsoft.com/office/drawing/2014/main" id="{FB8EEC06-84EB-46C5-9659-FD3D740A95D0}"/>
+              </a:ext>
+            </a:extLst>
+          </p:cNvPr>
+          <p:cNvSpPr/>
+          <p:nvPr/>
+        </p:nvSpPr>
+        <p:spPr>
+          <a:xfrm>
+            <a:off x="6890722" y="2309699"/>
+            <a:ext cx="182880" cy="182880"/>
+          </a:xfrm>
+          <a:prstGeom prst="ellipse">
+            <a:avLst/>
+          </a:prstGeom>
+          <a:solidFill>
+            <a:schemeClr val="bg1">
+              <a:lumMod val="75000"/>
+            </a:schemeClr>
+          </a:solidFill>
+          <a:ln w="19050">
+            <a:solidFill>
+              <a:schemeClr val="tx1"/>
+            </a:solidFill>
+          </a:ln>
+        </p:spPr>
+        <p:style>
+          <a:lnRef idx="2">
+            <a:schemeClr val="accent1">
+              <a:shade val="50000"/>
+            </a:schemeClr>
+          </a:lnRef>
+          <a:fillRef idx="1">
+            <a:schemeClr val="accent1"/>
+          </a:fillRef>
+          <a:effectRef idx="0">
+            <a:schemeClr val="accent1"/>
+          </a:effectRef>
+          <a:fontRef idx="minor">
+            <a:schemeClr val="lt1"/>
+          </a:fontRef>
+        </p:style>
+        <p:txBody>
+          <a:bodyPr rtlCol="0" anchor="ctr"/>
+          <a:lstStyle/>
+          <a:p>
+            <a:pPr algn="ctr"/>
+            <a:endParaRPr lang="en-US"/>
+          </a:p>
+        </p:txBody>
+      </p:sp>
+      <p:cxnSp>
+        <p:nvCxnSpPr>
+          <p:cNvPr id="32" name="Straight Arrow Connector 31">
+            <a:extLst>
+              <a:ext uri="{FF2B5EF4-FFF2-40B4-BE49-F238E27FC236}">
+                <a16:creationId xmlns:a16="http://schemas.microsoft.com/office/drawing/2014/main" id="{AA7638EB-E0F3-4F60-8185-A5A8C1679512}"/>
+              </a:ext>
+            </a:extLst>
+          </p:cNvPr>
+          <p:cNvCxnSpPr>
+            <a:cxnSpLocks/>
+          </p:cNvCxnSpPr>
+          <p:nvPr/>
+        </p:nvCxnSpPr>
+        <p:spPr>
+          <a:xfrm>
+            <a:off x="4797604" y="1445340"/>
+            <a:ext cx="2087809" cy="926192"/>
+          </a:xfrm>
+          <a:prstGeom prst="straightConnector1">
+            <a:avLst/>
+          </a:prstGeom>
+          <a:ln w="19050">
+            <a:solidFill>
+              <a:schemeClr val="tx1"/>
+            </a:solidFill>
+            <a:headEnd type="none"/>
+            <a:tailEnd type="stealth" w="lg" len="lg"/>
+          </a:ln>
+        </p:spPr>
+        <p:style>
+          <a:lnRef idx="1">
+            <a:schemeClr val="accent1"/>
+          </a:lnRef>
+          <a:fillRef idx="0">
+            <a:schemeClr val="accent1"/>
+          </a:fillRef>
+          <a:effectRef idx="0">
+            <a:schemeClr val="accent1"/>
+          </a:effectRef>
+          <a:fontRef idx="minor">
+            <a:schemeClr val="tx1"/>
+          </a:fontRef>
+        </p:style>
+      </p:cxnSp>
+      <p:sp>
+        <p:nvSpPr>
+          <p:cNvPr id="4" name="Oval 3">
+            <a:extLst>
+              <a:ext uri="{FF2B5EF4-FFF2-40B4-BE49-F238E27FC236}">
+                <a16:creationId xmlns:a16="http://schemas.microsoft.com/office/drawing/2014/main" id="{26DCC042-A305-4636-848B-E860521205B4}"/>
+              </a:ext>
+            </a:extLst>
+          </p:cNvPr>
+          <p:cNvSpPr/>
+          <p:nvPr/>
+        </p:nvSpPr>
+        <p:spPr>
+          <a:xfrm>
+            <a:off x="2371942" y="2324613"/>
+            <a:ext cx="182880" cy="182880"/>
+          </a:xfrm>
+          <a:prstGeom prst="ellipse">
+            <a:avLst/>
+          </a:prstGeom>
+          <a:solidFill>
+            <a:schemeClr val="bg1">
+              <a:lumMod val="75000"/>
+            </a:schemeClr>
+          </a:solidFill>
+          <a:ln w="19050">
+            <a:solidFill>
+              <a:schemeClr val="tx1"/>
+            </a:solidFill>
+          </a:ln>
+        </p:spPr>
+        <p:style>
+          <a:lnRef idx="2">
+            <a:schemeClr val="accent1">
+              <a:shade val="50000"/>
+            </a:schemeClr>
+          </a:lnRef>
+          <a:fillRef idx="1">
+            <a:schemeClr val="accent1"/>
+          </a:fillRef>
+          <a:effectRef idx="0">
+            <a:schemeClr val="accent1"/>
+          </a:effectRef>
+          <a:fontRef idx="minor">
+            <a:schemeClr val="lt1"/>
+          </a:fontRef>
+        </p:style>
+        <p:txBody>
+          <a:bodyPr rtlCol="0" anchor="ctr"/>
+          <a:lstStyle/>
+          <a:p>
+            <a:pPr algn="ctr"/>
+            <a:r>
+              <a:rPr lang="en-US" dirty="0"/>
+              <a:t> </a:t>
+            </a:r>
+          </a:p>
+        </p:txBody>
+      </p:sp>
+      <p:sp>
+        <p:nvSpPr>
+          <p:cNvPr id="5" name="Oval 4">
+            <a:extLst>
+              <a:ext uri="{FF2B5EF4-FFF2-40B4-BE49-F238E27FC236}">
+                <a16:creationId xmlns:a16="http://schemas.microsoft.com/office/drawing/2014/main" id="{5B963A44-1212-4DA1-BAA9-60C5C6ACD120}"/>
+              </a:ext>
+            </a:extLst>
+          </p:cNvPr>
+          <p:cNvSpPr/>
+          <p:nvPr/>
+        </p:nvSpPr>
+        <p:spPr>
+          <a:xfrm>
+            <a:off x="4635588" y="1326944"/>
+            <a:ext cx="182880" cy="182880"/>
+          </a:xfrm>
+          <a:prstGeom prst="ellipse">
+            <a:avLst/>
+          </a:prstGeom>
+          <a:solidFill>
+            <a:schemeClr val="bg1">
+              <a:lumMod val="75000"/>
+            </a:schemeClr>
+          </a:solidFill>
+          <a:ln w="19050">
+            <a:solidFill>
+              <a:schemeClr val="tx1"/>
+            </a:solidFill>
+          </a:ln>
+        </p:spPr>
+        <p:style>
+          <a:lnRef idx="2">
+            <a:schemeClr val="accent1">
+              <a:shade val="50000"/>
+            </a:schemeClr>
+          </a:lnRef>
+          <a:fillRef idx="1">
+            <a:schemeClr val="accent1"/>
+          </a:fillRef>
+          <a:effectRef idx="0">
+            <a:schemeClr val="accent1"/>
+          </a:effectRef>
+          <a:fontRef idx="minor">
+            <a:schemeClr val="lt1"/>
+          </a:fontRef>
+        </p:style>
+        <p:txBody>
+          <a:bodyPr rtlCol="0" anchor="ctr"/>
+          <a:lstStyle/>
+          <a:p>
+            <a:pPr algn="ctr"/>
+            <a:endParaRPr lang="en-US"/>
+          </a:p>
+        </p:txBody>
+      </p:sp>
+      <p:sp>
+        <p:nvSpPr>
+          <p:cNvPr id="6" name="Oval 5">
+            <a:extLst>
+              <a:ext uri="{FF2B5EF4-FFF2-40B4-BE49-F238E27FC236}">
+                <a16:creationId xmlns:a16="http://schemas.microsoft.com/office/drawing/2014/main" id="{31B9E338-CD8D-4D22-84EE-0E20D9006755}"/>
+              </a:ext>
+            </a:extLst>
+          </p:cNvPr>
+          <p:cNvSpPr/>
+          <p:nvPr/>
+        </p:nvSpPr>
+        <p:spPr>
+          <a:xfrm>
+            <a:off x="4581225" y="3269319"/>
+            <a:ext cx="274320" cy="274320"/>
+          </a:xfrm>
+          <a:prstGeom prst="ellipse">
+            <a:avLst/>
+          </a:prstGeom>
+          <a:solidFill>
+            <a:srgbClr val="FF0000"/>
+          </a:solidFill>
+          <a:ln w="19050">
+            <a:solidFill>
+              <a:schemeClr val="tx1"/>
+            </a:solidFill>
+          </a:ln>
+        </p:spPr>
+        <p:style>
+          <a:lnRef idx="2">
+            <a:schemeClr val="accent1">
+              <a:shade val="50000"/>
+            </a:schemeClr>
+          </a:lnRef>
+          <a:fillRef idx="1">
+            <a:schemeClr val="accent1"/>
+          </a:fillRef>
+          <a:effectRef idx="0">
+            <a:schemeClr val="accent1"/>
+          </a:effectRef>
+          <a:fontRef idx="minor">
+            <a:schemeClr val="lt1"/>
+          </a:fontRef>
+        </p:style>
+        <p:txBody>
+          <a:bodyPr rtlCol="0" anchor="ctr"/>
+          <a:lstStyle/>
+          <a:p>
+            <a:pPr algn="ctr"/>
+            <a:endParaRPr lang="en-US"/>
+          </a:p>
+        </p:txBody>
+      </p:sp>
+      <p:cxnSp>
+        <p:nvCxnSpPr>
+          <p:cNvPr id="8" name="Straight Arrow Connector 7">
+            <a:extLst>
+              <a:ext uri="{FF2B5EF4-FFF2-40B4-BE49-F238E27FC236}">
+                <a16:creationId xmlns:a16="http://schemas.microsoft.com/office/drawing/2014/main" id="{5AF06C3D-F1E2-4D94-B80C-95EF03716846}"/>
+              </a:ext>
+            </a:extLst>
+          </p:cNvPr>
+          <p:cNvCxnSpPr/>
+          <p:nvPr/>
+        </p:nvCxnSpPr>
+        <p:spPr>
+          <a:xfrm flipV="1">
+            <a:off x="2541392" y="1445143"/>
+            <a:ext cx="2087809" cy="926192"/>
+          </a:xfrm>
+          <a:prstGeom prst="straightConnector1">
+            <a:avLst/>
+          </a:prstGeom>
+          <a:ln w="19050">
+            <a:solidFill>
+              <a:schemeClr val="tx1"/>
+            </a:solidFill>
+            <a:headEnd type="none"/>
+            <a:tailEnd type="stealth" w="lg" len="lg"/>
+          </a:ln>
+        </p:spPr>
+        <p:style>
+          <a:lnRef idx="1">
+            <a:schemeClr val="accent1"/>
+          </a:lnRef>
+          <a:fillRef idx="0">
+            <a:schemeClr val="accent1"/>
+          </a:fillRef>
+          <a:effectRef idx="0">
+            <a:schemeClr val="accent1"/>
+          </a:effectRef>
+          <a:fontRef idx="minor">
+            <a:schemeClr val="tx1"/>
+          </a:fontRef>
+        </p:style>
+      </p:cxnSp>
+      <p:cxnSp>
+        <p:nvCxnSpPr>
+          <p:cNvPr id="15" name="Straight Arrow Connector 14">
+            <a:extLst>
+              <a:ext uri="{FF2B5EF4-FFF2-40B4-BE49-F238E27FC236}">
+                <a16:creationId xmlns:a16="http://schemas.microsoft.com/office/drawing/2014/main" id="{AD981B75-5837-4F9B-8688-108E3B5FD4D1}"/>
+              </a:ext>
+            </a:extLst>
+          </p:cNvPr>
+          <p:cNvCxnSpPr>
+            <a:cxnSpLocks/>
+          </p:cNvCxnSpPr>
+          <p:nvPr/>
+        </p:nvCxnSpPr>
+        <p:spPr>
+          <a:xfrm>
+            <a:off x="1512141" y="5943404"/>
+            <a:ext cx="6766560" cy="0"/>
+          </a:xfrm>
+          <a:prstGeom prst="straightConnector1">
+            <a:avLst/>
+          </a:prstGeom>
+          <a:ln w="19050">
+            <a:solidFill>
+              <a:schemeClr val="tx1"/>
+            </a:solidFill>
+            <a:prstDash val="solid"/>
+            <a:headEnd type="none"/>
+            <a:tailEnd type="stealth" w="lg" len="lg"/>
+          </a:ln>
+        </p:spPr>
+        <p:style>
+          <a:lnRef idx="1">
+            <a:schemeClr val="accent1"/>
+          </a:lnRef>
+          <a:fillRef idx="0">
+            <a:schemeClr val="accent1"/>
+          </a:fillRef>
+          <a:effectRef idx="0">
+            <a:schemeClr val="accent1"/>
+          </a:effectRef>
+          <a:fontRef idx="minor">
+            <a:schemeClr val="tx1"/>
+          </a:fontRef>
+        </p:style>
+      </p:cxnSp>
+      <p:cxnSp>
+        <p:nvCxnSpPr>
+          <p:cNvPr id="18" name="Straight Arrow Connector 17">
+            <a:extLst>
+              <a:ext uri="{FF2B5EF4-FFF2-40B4-BE49-F238E27FC236}">
+                <a16:creationId xmlns:a16="http://schemas.microsoft.com/office/drawing/2014/main" id="{E0158F23-E0AA-4CB1-BC65-ADE8F238313D}"/>
+              </a:ext>
+            </a:extLst>
+          </p:cNvPr>
+          <p:cNvCxnSpPr>
+            <a:cxnSpLocks/>
+          </p:cNvCxnSpPr>
+          <p:nvPr/>
+        </p:nvCxnSpPr>
+        <p:spPr>
+          <a:xfrm>
+            <a:off x="2455478" y="5862978"/>
+            <a:ext cx="0" cy="163430"/>
+          </a:xfrm>
+          <a:prstGeom prst="straightConnector1">
+            <a:avLst/>
+          </a:prstGeom>
+          <a:ln w="19050">
+            <a:solidFill>
+              <a:schemeClr val="tx1"/>
+            </a:solidFill>
+            <a:headEnd type="none"/>
+            <a:tailEnd type="none" w="lg" len="lg"/>
+          </a:ln>
+        </p:spPr>
+        <p:style>
+          <a:lnRef idx="1">
+            <a:schemeClr val="accent1"/>
+          </a:lnRef>
+          <a:fillRef idx="0">
+            <a:schemeClr val="accent1"/>
+          </a:fillRef>
+          <a:effectRef idx="0">
+            <a:schemeClr val="accent1"/>
+          </a:effectRef>
+          <a:fontRef idx="minor">
+            <a:schemeClr val="tx1"/>
+          </a:fontRef>
+        </p:style>
+      </p:cxnSp>
+      <p:cxnSp>
+        <p:nvCxnSpPr>
+          <p:cNvPr id="21" name="Straight Arrow Connector 20">
+            <a:extLst>
+              <a:ext uri="{FF2B5EF4-FFF2-40B4-BE49-F238E27FC236}">
+                <a16:creationId xmlns:a16="http://schemas.microsoft.com/office/drawing/2014/main" id="{CD00731D-758B-4644-BED7-984A84B92606}"/>
+              </a:ext>
+            </a:extLst>
+          </p:cNvPr>
+          <p:cNvCxnSpPr>
+            <a:cxnSpLocks/>
+          </p:cNvCxnSpPr>
+          <p:nvPr/>
+        </p:nvCxnSpPr>
+        <p:spPr>
+          <a:xfrm>
+            <a:off x="4709639" y="5861689"/>
+            <a:ext cx="0" cy="163430"/>
+          </a:xfrm>
+          <a:prstGeom prst="straightConnector1">
+            <a:avLst/>
+          </a:prstGeom>
+          <a:ln w="19050">
+            <a:solidFill>
+              <a:schemeClr val="tx1"/>
+            </a:solidFill>
+            <a:headEnd type="none"/>
+            <a:tailEnd type="none" w="lg" len="lg"/>
+          </a:ln>
+        </p:spPr>
+        <p:style>
+          <a:lnRef idx="1">
+            <a:schemeClr val="accent1"/>
+          </a:lnRef>
+          <a:fillRef idx="0">
+            <a:schemeClr val="accent1"/>
+          </a:fillRef>
+          <a:effectRef idx="0">
+            <a:schemeClr val="accent1"/>
+          </a:effectRef>
+          <a:fontRef idx="minor">
+            <a:schemeClr val="tx1"/>
+          </a:fontRef>
+        </p:style>
+      </p:cxnSp>
+      <p:cxnSp>
+        <p:nvCxnSpPr>
+          <p:cNvPr id="25" name="Straight Arrow Connector 24">
+            <a:extLst>
+              <a:ext uri="{FF2B5EF4-FFF2-40B4-BE49-F238E27FC236}">
+                <a16:creationId xmlns:a16="http://schemas.microsoft.com/office/drawing/2014/main" id="{031A609E-1C85-4C8F-89AA-71C8AC4C0308}"/>
+              </a:ext>
+            </a:extLst>
+          </p:cNvPr>
+          <p:cNvCxnSpPr>
+            <a:cxnSpLocks/>
+          </p:cNvCxnSpPr>
+          <p:nvPr/>
+        </p:nvCxnSpPr>
+        <p:spPr>
+          <a:xfrm flipH="1" flipV="1">
+            <a:off x="1516389" y="906914"/>
+            <a:ext cx="0" cy="5029200"/>
+          </a:xfrm>
+          <a:prstGeom prst="straightConnector1">
+            <a:avLst/>
+          </a:prstGeom>
+          <a:ln w="19050">
+            <a:solidFill>
+              <a:schemeClr val="tx1"/>
+            </a:solidFill>
+            <a:prstDash val="solid"/>
+            <a:headEnd type="none"/>
+            <a:tailEnd type="stealth" w="lg" len="lg"/>
+          </a:ln>
+        </p:spPr>
+        <p:style>
+          <a:lnRef idx="1">
+            <a:schemeClr val="accent1"/>
+          </a:lnRef>
+          <a:fillRef idx="0">
+            <a:schemeClr val="accent1"/>
+          </a:fillRef>
+          <a:effectRef idx="0">
+            <a:schemeClr val="accent1"/>
+          </a:effectRef>
+          <a:fontRef idx="minor">
+            <a:schemeClr val="tx1"/>
+          </a:fontRef>
+        </p:style>
+      </p:cxnSp>
+      <p:cxnSp>
+        <p:nvCxnSpPr>
+          <p:cNvPr id="20" name="Straight Arrow Connector 19">
+            <a:extLst>
+              <a:ext uri="{FF2B5EF4-FFF2-40B4-BE49-F238E27FC236}">
+                <a16:creationId xmlns:a16="http://schemas.microsoft.com/office/drawing/2014/main" id="{506BE813-689C-49FE-A5A2-800D9F510320}"/>
+              </a:ext>
+            </a:extLst>
+          </p:cNvPr>
+          <p:cNvCxnSpPr>
+            <a:cxnSpLocks/>
+          </p:cNvCxnSpPr>
+          <p:nvPr/>
+        </p:nvCxnSpPr>
+        <p:spPr>
+          <a:xfrm>
+            <a:off x="6964211" y="5853835"/>
+            <a:ext cx="0" cy="163430"/>
+          </a:xfrm>
+          <a:prstGeom prst="straightConnector1">
+            <a:avLst/>
+          </a:prstGeom>
+          <a:ln w="19050">
+            <a:solidFill>
+              <a:schemeClr val="tx1"/>
+            </a:solidFill>
+            <a:headEnd type="none"/>
+            <a:tailEnd type="none" w="lg" len="lg"/>
+          </a:ln>
+        </p:spPr>
+        <p:style>
+          <a:lnRef idx="1">
+            <a:schemeClr val="accent1"/>
+          </a:lnRef>
+          <a:fillRef idx="0">
+            <a:schemeClr val="accent1"/>
+          </a:fillRef>
+          <a:effectRef idx="0">
+            <a:schemeClr val="accent1"/>
+          </a:effectRef>
+          <a:fontRef idx="minor">
+            <a:schemeClr val="tx1"/>
+          </a:fontRef>
+        </p:style>
+      </p:cxnSp>
+      <p:sp>
+        <p:nvSpPr>
+          <p:cNvPr id="34" name="Oval 33">
+            <a:extLst>
+              <a:ext uri="{FF2B5EF4-FFF2-40B4-BE49-F238E27FC236}">
+                <a16:creationId xmlns:a16="http://schemas.microsoft.com/office/drawing/2014/main" id="{9BC27C14-9A57-4744-A04E-7B5E0E7B5DB5}"/>
+              </a:ext>
+            </a:extLst>
+          </p:cNvPr>
+          <p:cNvSpPr/>
+          <p:nvPr/>
+        </p:nvSpPr>
+        <p:spPr>
+          <a:xfrm>
+            <a:off x="6915776" y="4326877"/>
+            <a:ext cx="182880" cy="182880"/>
+          </a:xfrm>
+          <a:prstGeom prst="ellipse">
+            <a:avLst/>
+          </a:prstGeom>
+          <a:solidFill>
+            <a:schemeClr val="bg1">
+              <a:lumMod val="75000"/>
+            </a:schemeClr>
+          </a:solidFill>
+          <a:ln w="19050">
+            <a:solidFill>
+              <a:schemeClr val="tx1"/>
+            </a:solidFill>
+          </a:ln>
+        </p:spPr>
+        <p:style>
+          <a:lnRef idx="2">
+            <a:schemeClr val="accent1">
+              <a:shade val="50000"/>
+            </a:schemeClr>
+          </a:lnRef>
+          <a:fillRef idx="1">
+            <a:schemeClr val="accent1"/>
+          </a:fillRef>
+          <a:effectRef idx="0">
+            <a:schemeClr val="accent1"/>
+          </a:effectRef>
+          <a:fontRef idx="minor">
+            <a:schemeClr val="lt1"/>
+          </a:fontRef>
+        </p:style>
+        <p:txBody>
+          <a:bodyPr rtlCol="0" anchor="ctr"/>
+          <a:lstStyle/>
+          <a:p>
+            <a:pPr algn="ctr"/>
+            <a:endParaRPr lang="en-US"/>
+          </a:p>
+        </p:txBody>
+      </p:sp>
+      <mc:AlternateContent xmlns:mc="http://schemas.openxmlformats.org/markup-compatibility/2006" xmlns:a14="http://schemas.microsoft.com/office/drawing/2010/main">
+        <mc:Choice Requires="a14">
+          <p:sp>
+            <p:nvSpPr>
+              <p:cNvPr id="48" name="TextBox 47">
+                <a:extLst>
+                  <a:ext uri="{FF2B5EF4-FFF2-40B4-BE49-F238E27FC236}">
+                    <a16:creationId xmlns:a16="http://schemas.microsoft.com/office/drawing/2014/main" id="{367DFCCA-6142-4C0A-83F1-48BD41BAF1C4}"/>
+                  </a:ext>
+                </a:extLst>
+              </p:cNvPr>
+              <p:cNvSpPr txBox="1"/>
+              <p:nvPr/>
+            </p:nvSpPr>
+            <p:spPr>
+              <a:xfrm>
+                <a:off x="7073344" y="2309219"/>
+                <a:ext cx="4140552" cy="461665"/>
+              </a:xfrm>
+              <a:prstGeom prst="rect">
+                <a:avLst/>
+              </a:prstGeom>
+              <a:noFill/>
+            </p:spPr>
+            <p:txBody>
+              <a:bodyPr wrap="square" rtlCol="0">
+                <a:spAutoFit/>
+              </a:bodyPr>
+              <a:lstStyle/>
+              <a:p>
+                <a:pPr/>
+                <a14:m>
+                  <m:oMathPara xmlns:m="http://schemas.openxmlformats.org/officeDocument/2006/math">
+                    <m:oMathParaPr>
+                      <m:jc m:val="left"/>
+                    </m:oMathParaPr>
+                    <m:oMath xmlns:m="http://schemas.openxmlformats.org/officeDocument/2006/math">
+                      <m:sSub>
+                        <m:sSubPr>
+                          <m:ctrlPr>
+                            <a:rPr lang="en-US" sz="2400" b="0" i="1" smtClean="0">
+                              <a:latin typeface="Cambria Math" panose="02040503050406030204" pitchFamily="18" charset="0"/>
+                            </a:rPr>
+                          </m:ctrlPr>
+                        </m:sSubPr>
+                        <m:e>
+                          <m:r>
+                            <a:rPr lang="en-US" sz="2400" b="0" i="1" smtClean="0">
+                              <a:latin typeface="Cambria Math" panose="02040503050406030204" pitchFamily="18" charset="0"/>
+                            </a:rPr>
+                            <m:t>𝑓</m:t>
+                          </m:r>
+                        </m:e>
+                        <m:sub>
+                          <m:r>
+                            <a:rPr lang="en-US" sz="2400" b="0" i="1" smtClean="0">
+                              <a:latin typeface="Cambria Math" panose="02040503050406030204" pitchFamily="18" charset="0"/>
+                            </a:rPr>
+                            <m:t>𝑢𝑑</m:t>
+                          </m:r>
+                        </m:sub>
+                      </m:sSub>
+                      <m:r>
+                        <a:rPr lang="en-US" sz="2400" b="0" i="1" smtClean="0">
+                          <a:latin typeface="Cambria Math" panose="02040503050406030204" pitchFamily="18" charset="0"/>
+                        </a:rPr>
+                        <m:t>=</m:t>
+                      </m:r>
+                      <m:r>
+                        <m:rPr>
+                          <m:sty m:val="p"/>
+                        </m:rPr>
+                        <a:rPr lang="en-US" sz="2400" b="0" i="0" smtClean="0">
+                          <a:latin typeface="Cambria Math" panose="02040503050406030204" pitchFamily="18" charset="0"/>
+                        </a:rPr>
+                        <m:t>max</m:t>
+                      </m:r>
+                      <m:r>
+                        <a:rPr lang="en-US" sz="2400" b="0" i="1" smtClean="0">
+                          <a:latin typeface="Cambria Math" panose="02040503050406030204" pitchFamily="18" charset="0"/>
+                        </a:rPr>
+                        <m:t>⁡(0,</m:t>
+                      </m:r>
+                      <m:sSub>
+                        <m:sSubPr>
+                          <m:ctrlPr>
+                            <a:rPr lang="en-US" sz="2400" i="1">
+                              <a:latin typeface="Cambria Math" panose="02040503050406030204" pitchFamily="18" charset="0"/>
+                            </a:rPr>
+                          </m:ctrlPr>
+                        </m:sSubPr>
+                        <m:e>
+                          <m:r>
+                            <a:rPr lang="en-US" sz="2400" b="0" i="1" smtClean="0">
+                              <a:latin typeface="Cambria Math" panose="02040503050406030204" pitchFamily="18" charset="0"/>
+                            </a:rPr>
+                            <m:t>𝐾</m:t>
+                          </m:r>
+                          <m:r>
+                            <a:rPr lang="en-US" sz="2400" b="0" i="1" smtClean="0">
+                              <a:latin typeface="Cambria Math" panose="02040503050406030204" pitchFamily="18" charset="0"/>
+                            </a:rPr>
+                            <m:t>−</m:t>
+                          </m:r>
+                          <m:r>
+                            <a:rPr lang="en-US" sz="2400" i="1">
+                              <a:latin typeface="Cambria Math" panose="02040503050406030204" pitchFamily="18" charset="0"/>
+                            </a:rPr>
+                            <m:t>𝑆</m:t>
+                          </m:r>
+                        </m:e>
+                        <m:sub>
+                          <m:r>
+                            <a:rPr lang="en-US" sz="2400" i="1">
+                              <a:latin typeface="Cambria Math" panose="02040503050406030204" pitchFamily="18" charset="0"/>
+                            </a:rPr>
+                            <m:t>𝑢𝑑</m:t>
+                          </m:r>
+                        </m:sub>
+                      </m:sSub>
+                      <m:r>
+                        <a:rPr lang="en-US" sz="2400" b="0" i="1" smtClean="0">
+                          <a:latin typeface="Cambria Math" panose="02040503050406030204" pitchFamily="18" charset="0"/>
+                        </a:rPr>
+                        <m:t>)</m:t>
+                      </m:r>
+                    </m:oMath>
+                  </m:oMathPara>
+                </a14:m>
+                <a:endParaRPr lang="en-US" sz="2400" i="1" dirty="0"/>
+              </a:p>
+            </p:txBody>
+          </p:sp>
+        </mc:Choice>
+        <mc:Fallback xmlns="">
+          <p:sp>
+            <p:nvSpPr>
+              <p:cNvPr id="48" name="TextBox 47">
+                <a:extLst>
+                  <a:ext uri="{FF2B5EF4-FFF2-40B4-BE49-F238E27FC236}">
+                    <a16:creationId xmlns:a16="http://schemas.microsoft.com/office/drawing/2014/main" id="{367DFCCA-6142-4C0A-83F1-48BD41BAF1C4}"/>
+                  </a:ext>
+                </a:extLst>
+              </p:cNvPr>
+              <p:cNvSpPr txBox="1">
+                <a:spLocks noRot="1" noChangeAspect="1" noMove="1" noResize="1" noEditPoints="1" noAdjustHandles="1" noChangeArrowheads="1" noChangeShapeType="1" noTextEdit="1"/>
+              </p:cNvSpPr>
+              <p:nvPr/>
+            </p:nvSpPr>
+            <p:spPr>
+              <a:xfrm>
+                <a:off x="7073344" y="2309219"/>
+                <a:ext cx="4140552" cy="461665"/>
+              </a:xfrm>
+              <a:prstGeom prst="rect">
+                <a:avLst/>
+              </a:prstGeom>
+              <a:blipFill>
+                <a:blip r:embed="rId2"/>
+                <a:stretch>
+                  <a:fillRect l="-1176" b="-17105"/>
+                </a:stretch>
+              </a:blipFill>
+            </p:spPr>
+            <p:txBody>
+              <a:bodyPr/>
+              <a:lstStyle/>
+              <a:p>
+                <a:r>
+                  <a:rPr lang="en-US">
+                    <a:noFill/>
+                  </a:rPr>
+                  <a:t> </a:t>
+                </a:r>
+              </a:p>
+            </p:txBody>
+          </p:sp>
+        </mc:Fallback>
+      </mc:AlternateContent>
+      <mc:AlternateContent xmlns:mc="http://schemas.openxmlformats.org/markup-compatibility/2006" xmlns:a14="http://schemas.microsoft.com/office/drawing/2010/main">
+        <mc:Choice Requires="a14">
+          <p:sp>
+            <p:nvSpPr>
+              <p:cNvPr id="50" name="TextBox 49">
+                <a:extLst>
+                  <a:ext uri="{FF2B5EF4-FFF2-40B4-BE49-F238E27FC236}">
+                    <a16:creationId xmlns:a16="http://schemas.microsoft.com/office/drawing/2014/main" id="{169136C8-BC32-49C3-BD14-133F3F224A6C}"/>
+                  </a:ext>
+                </a:extLst>
+              </p:cNvPr>
+              <p:cNvSpPr txBox="1"/>
+              <p:nvPr/>
+            </p:nvSpPr>
+            <p:spPr>
+              <a:xfrm>
+                <a:off x="7059742" y="4370465"/>
+                <a:ext cx="4140552" cy="461665"/>
+              </a:xfrm>
+              <a:prstGeom prst="rect">
+                <a:avLst/>
+              </a:prstGeom>
+              <a:noFill/>
+            </p:spPr>
+            <p:txBody>
+              <a:bodyPr wrap="square" rtlCol="0">
+                <a:spAutoFit/>
+              </a:bodyPr>
+              <a:lstStyle/>
+              <a:p>
+                <a:pPr/>
+                <a14:m>
+                  <m:oMathPara xmlns:m="http://schemas.openxmlformats.org/officeDocument/2006/math">
+                    <m:oMathParaPr>
+                      <m:jc m:val="left"/>
+                    </m:oMathParaPr>
+                    <m:oMath xmlns:m="http://schemas.openxmlformats.org/officeDocument/2006/math">
+                      <m:sSub>
+                        <m:sSubPr>
+                          <m:ctrlPr>
+                            <a:rPr lang="en-US" sz="2400" b="0" i="1" smtClean="0">
+                              <a:latin typeface="Cambria Math" panose="02040503050406030204" pitchFamily="18" charset="0"/>
+                            </a:rPr>
+                          </m:ctrlPr>
+                        </m:sSubPr>
+                        <m:e>
+                          <m:r>
+                            <a:rPr lang="en-US" sz="2400" b="0" i="1" smtClean="0">
+                              <a:latin typeface="Cambria Math" panose="02040503050406030204" pitchFamily="18" charset="0"/>
+                            </a:rPr>
+                            <m:t>𝑓</m:t>
+                          </m:r>
+                        </m:e>
+                        <m:sub>
+                          <m:r>
+                            <a:rPr lang="en-US" sz="2400" b="0" i="1" smtClean="0">
+                              <a:latin typeface="Cambria Math" panose="02040503050406030204" pitchFamily="18" charset="0"/>
+                            </a:rPr>
+                            <m:t>𝑑𝑑</m:t>
+                          </m:r>
+                        </m:sub>
+                      </m:sSub>
+                      <m:r>
+                        <a:rPr lang="en-US" sz="2400" b="0" i="1" smtClean="0">
+                          <a:latin typeface="Cambria Math" panose="02040503050406030204" pitchFamily="18" charset="0"/>
+                        </a:rPr>
+                        <m:t>=</m:t>
+                      </m:r>
+                      <m:r>
+                        <m:rPr>
+                          <m:sty m:val="p"/>
+                        </m:rPr>
+                        <a:rPr lang="en-US" sz="2400" b="0" i="0" smtClean="0">
+                          <a:latin typeface="Cambria Math" panose="02040503050406030204" pitchFamily="18" charset="0"/>
+                        </a:rPr>
+                        <m:t>max</m:t>
+                      </m:r>
+                      <m:r>
+                        <a:rPr lang="en-US" sz="2400" b="0" i="1" smtClean="0">
+                          <a:latin typeface="Cambria Math" panose="02040503050406030204" pitchFamily="18" charset="0"/>
+                        </a:rPr>
+                        <m:t>⁡(0,</m:t>
+                      </m:r>
+                      <m:sSub>
+                        <m:sSubPr>
+                          <m:ctrlPr>
+                            <a:rPr lang="en-US" sz="2400" i="1">
+                              <a:latin typeface="Cambria Math" panose="02040503050406030204" pitchFamily="18" charset="0"/>
+                            </a:rPr>
+                          </m:ctrlPr>
+                        </m:sSubPr>
+                        <m:e>
+                          <m:r>
+                            <a:rPr lang="en-US" sz="2400" b="0" i="1" smtClean="0">
+                              <a:latin typeface="Cambria Math" panose="02040503050406030204" pitchFamily="18" charset="0"/>
+                            </a:rPr>
+                            <m:t>𝐾</m:t>
+                          </m:r>
+                          <m:r>
+                            <a:rPr lang="en-US" sz="2400" b="0" i="1" smtClean="0">
+                              <a:latin typeface="Cambria Math" panose="02040503050406030204" pitchFamily="18" charset="0"/>
+                            </a:rPr>
+                            <m:t>−</m:t>
+                          </m:r>
+                          <m:r>
+                            <a:rPr lang="en-US" sz="2400" i="1">
+                              <a:latin typeface="Cambria Math" panose="02040503050406030204" pitchFamily="18" charset="0"/>
+                            </a:rPr>
+                            <m:t>𝑆</m:t>
+                          </m:r>
+                        </m:e>
+                        <m:sub>
+                          <m:r>
+                            <a:rPr lang="en-US" sz="2400" i="1">
+                              <a:latin typeface="Cambria Math" panose="02040503050406030204" pitchFamily="18" charset="0"/>
+                            </a:rPr>
+                            <m:t>𝑑𝑑</m:t>
+                          </m:r>
+                        </m:sub>
+                      </m:sSub>
+                      <m:r>
+                        <a:rPr lang="en-US" sz="2400" b="0" i="1" smtClean="0">
+                          <a:latin typeface="Cambria Math" panose="02040503050406030204" pitchFamily="18" charset="0"/>
+                        </a:rPr>
+                        <m:t>)</m:t>
+                      </m:r>
+                    </m:oMath>
+                  </m:oMathPara>
+                </a14:m>
+                <a:endParaRPr lang="en-US" sz="2400" i="1" dirty="0"/>
+              </a:p>
+            </p:txBody>
+          </p:sp>
+        </mc:Choice>
+        <mc:Fallback xmlns="">
+          <p:sp>
+            <p:nvSpPr>
+              <p:cNvPr id="50" name="TextBox 49">
+                <a:extLst>
+                  <a:ext uri="{FF2B5EF4-FFF2-40B4-BE49-F238E27FC236}">
+                    <a16:creationId xmlns:a16="http://schemas.microsoft.com/office/drawing/2014/main" id="{169136C8-BC32-49C3-BD14-133F3F224A6C}"/>
+                  </a:ext>
+                </a:extLst>
+              </p:cNvPr>
+              <p:cNvSpPr txBox="1">
+                <a:spLocks noRot="1" noChangeAspect="1" noMove="1" noResize="1" noEditPoints="1" noAdjustHandles="1" noChangeArrowheads="1" noChangeShapeType="1" noTextEdit="1"/>
+              </p:cNvSpPr>
+              <p:nvPr/>
+            </p:nvSpPr>
+            <p:spPr>
+              <a:xfrm>
+                <a:off x="7059742" y="4370465"/>
+                <a:ext cx="4140552" cy="461665"/>
+              </a:xfrm>
+              <a:prstGeom prst="rect">
+                <a:avLst/>
+              </a:prstGeom>
+              <a:blipFill>
+                <a:blip r:embed="rId3"/>
+                <a:stretch>
+                  <a:fillRect l="-1178" b="-17105"/>
+                </a:stretch>
+              </a:blipFill>
+            </p:spPr>
+            <p:txBody>
+              <a:bodyPr/>
+              <a:lstStyle/>
+              <a:p>
+                <a:r>
+                  <a:rPr lang="en-US">
+                    <a:noFill/>
+                  </a:rPr>
+                  <a:t> </a:t>
+                </a:r>
+              </a:p>
+            </p:txBody>
+          </p:sp>
+        </mc:Fallback>
+      </mc:AlternateContent>
+      <mc:AlternateContent xmlns:mc="http://schemas.openxmlformats.org/markup-compatibility/2006" xmlns:a14="http://schemas.microsoft.com/office/drawing/2010/main">
+        <mc:Choice Requires="a14">
+          <p:sp>
+            <p:nvSpPr>
+              <p:cNvPr id="52" name="TextBox 51">
+                <a:extLst>
+                  <a:ext uri="{FF2B5EF4-FFF2-40B4-BE49-F238E27FC236}">
+                    <a16:creationId xmlns:a16="http://schemas.microsoft.com/office/drawing/2014/main" id="{AA8067CF-AF89-43C1-8E86-F42A2E12DD88}"/>
+                  </a:ext>
+                </a:extLst>
+              </p:cNvPr>
+              <p:cNvSpPr txBox="1"/>
+              <p:nvPr/>
+            </p:nvSpPr>
+            <p:spPr>
+              <a:xfrm>
+                <a:off x="7046166" y="1835485"/>
+                <a:ext cx="2087809" cy="461665"/>
+              </a:xfrm>
+              <a:prstGeom prst="rect">
+                <a:avLst/>
+              </a:prstGeom>
+              <a:noFill/>
+            </p:spPr>
+            <p:txBody>
+              <a:bodyPr wrap="square" rtlCol="0">
+                <a:spAutoFit/>
+              </a:bodyPr>
+              <a:lstStyle/>
+              <a:p>
+                <a:pPr/>
+                <a14:m>
+                  <m:oMathPara xmlns:m="http://schemas.openxmlformats.org/officeDocument/2006/math">
+                    <m:oMathParaPr>
+                      <m:jc m:val="left"/>
+                    </m:oMathParaPr>
+                    <m:oMath xmlns:m="http://schemas.openxmlformats.org/officeDocument/2006/math">
+                      <m:sSub>
+                        <m:sSubPr>
+                          <m:ctrlPr>
+                            <a:rPr lang="en-US" sz="2400" b="0" i="1" smtClean="0">
+                              <a:latin typeface="Cambria Math" panose="02040503050406030204" pitchFamily="18" charset="0"/>
+                            </a:rPr>
+                          </m:ctrlPr>
+                        </m:sSubPr>
+                        <m:e>
+                          <m:r>
+                            <a:rPr lang="en-US" sz="2400" b="0" i="1" smtClean="0">
+                              <a:latin typeface="Cambria Math" panose="02040503050406030204" pitchFamily="18" charset="0"/>
+                            </a:rPr>
+                            <m:t>𝑆</m:t>
+                          </m:r>
+                        </m:e>
+                        <m:sub>
+                          <m:r>
+                            <a:rPr lang="en-US" sz="2400" b="0" i="1" smtClean="0">
+                              <a:latin typeface="Cambria Math" panose="02040503050406030204" pitchFamily="18" charset="0"/>
+                            </a:rPr>
+                            <m:t>𝑢𝑑</m:t>
+                          </m:r>
+                        </m:sub>
+                      </m:sSub>
+                      <m:r>
+                        <a:rPr lang="en-US" sz="2400" i="1">
+                          <a:latin typeface="Cambria Math" panose="02040503050406030204" pitchFamily="18" charset="0"/>
+                        </a:rPr>
+                        <m:t>=</m:t>
+                      </m:r>
+                      <m:r>
+                        <a:rPr lang="en-US" sz="2400" i="1">
+                          <a:latin typeface="Cambria Math" panose="02040503050406030204" pitchFamily="18" charset="0"/>
+                        </a:rPr>
+                        <m:t>𝑢𝑑</m:t>
+                      </m:r>
+                      <m:sSub>
+                        <m:sSubPr>
+                          <m:ctrlPr>
+                            <a:rPr lang="en-US" sz="2400" i="1">
+                              <a:latin typeface="Cambria Math" panose="02040503050406030204" pitchFamily="18" charset="0"/>
+                            </a:rPr>
+                          </m:ctrlPr>
+                        </m:sSubPr>
+                        <m:e>
+                          <m:r>
+                            <a:rPr lang="en-US" sz="2400" i="1">
+                              <a:latin typeface="Cambria Math" panose="02040503050406030204" pitchFamily="18" charset="0"/>
+                            </a:rPr>
+                            <m:t>𝑆</m:t>
+                          </m:r>
+                        </m:e>
+                        <m:sub>
+                          <m:r>
+                            <a:rPr lang="en-US" sz="2400" i="1">
+                              <a:latin typeface="Cambria Math" panose="02040503050406030204" pitchFamily="18" charset="0"/>
+                            </a:rPr>
+                            <m:t>0</m:t>
+                          </m:r>
+                        </m:sub>
+                      </m:sSub>
+                    </m:oMath>
+                  </m:oMathPara>
+                </a14:m>
+                <a:endParaRPr lang="en-US" sz="2400" i="1" dirty="0"/>
+              </a:p>
+            </p:txBody>
+          </p:sp>
+        </mc:Choice>
+        <mc:Fallback xmlns="">
+          <p:sp>
+            <p:nvSpPr>
+              <p:cNvPr id="52" name="TextBox 51">
+                <a:extLst>
+                  <a:ext uri="{FF2B5EF4-FFF2-40B4-BE49-F238E27FC236}">
+                    <a16:creationId xmlns:a16="http://schemas.microsoft.com/office/drawing/2014/main" id="{AA8067CF-AF89-43C1-8E86-F42A2E12DD88}"/>
+                  </a:ext>
+                </a:extLst>
+              </p:cNvPr>
+              <p:cNvSpPr txBox="1">
+                <a:spLocks noRot="1" noChangeAspect="1" noMove="1" noResize="1" noEditPoints="1" noAdjustHandles="1" noChangeArrowheads="1" noChangeShapeType="1" noTextEdit="1"/>
+              </p:cNvSpPr>
+              <p:nvPr/>
+            </p:nvSpPr>
+            <p:spPr>
+              <a:xfrm>
+                <a:off x="7046166" y="1835485"/>
+                <a:ext cx="2087809" cy="461665"/>
+              </a:xfrm>
+              <a:prstGeom prst="rect">
+                <a:avLst/>
+              </a:prstGeom>
+              <a:blipFill>
+                <a:blip r:embed="rId4"/>
+                <a:stretch>
+                  <a:fillRect l="-877" b="-2632"/>
+                </a:stretch>
+              </a:blipFill>
+            </p:spPr>
+            <p:txBody>
+              <a:bodyPr/>
+              <a:lstStyle/>
+              <a:p>
+                <a:r>
+                  <a:rPr lang="en-US">
+                    <a:noFill/>
+                  </a:rPr>
+                  <a:t> </a:t>
+                </a:r>
+              </a:p>
+            </p:txBody>
+          </p:sp>
+        </mc:Fallback>
+      </mc:AlternateContent>
+      <mc:AlternateContent xmlns:mc="http://schemas.openxmlformats.org/markup-compatibility/2006" xmlns:a14="http://schemas.microsoft.com/office/drawing/2010/main">
+        <mc:Choice Requires="a14">
+          <p:sp>
+            <p:nvSpPr>
+              <p:cNvPr id="53" name="TextBox 52">
+                <a:extLst>
+                  <a:ext uri="{FF2B5EF4-FFF2-40B4-BE49-F238E27FC236}">
+                    <a16:creationId xmlns:a16="http://schemas.microsoft.com/office/drawing/2014/main" id="{F8CEC78B-E8D8-40CB-8939-F6AFD131A527}"/>
+                  </a:ext>
+                </a:extLst>
+              </p:cNvPr>
+              <p:cNvSpPr txBox="1"/>
+              <p:nvPr/>
+            </p:nvSpPr>
+            <p:spPr>
+              <a:xfrm>
+                <a:off x="7074447" y="3878645"/>
+                <a:ext cx="2087809" cy="461665"/>
+              </a:xfrm>
+              <a:prstGeom prst="rect">
+                <a:avLst/>
+              </a:prstGeom>
+              <a:noFill/>
+            </p:spPr>
+            <p:txBody>
+              <a:bodyPr wrap="square" rtlCol="0">
+                <a:spAutoFit/>
+              </a:bodyPr>
+              <a:lstStyle/>
+              <a:p>
+                <a:pPr/>
+                <a14:m>
+                  <m:oMathPara xmlns:m="http://schemas.openxmlformats.org/officeDocument/2006/math">
+                    <m:oMathParaPr>
+                      <m:jc m:val="left"/>
+                    </m:oMathParaPr>
+                    <m:oMath xmlns:m="http://schemas.openxmlformats.org/officeDocument/2006/math">
+                      <m:sSub>
+                        <m:sSubPr>
+                          <m:ctrlPr>
+                            <a:rPr lang="en-US" sz="2400" b="0" i="1" smtClean="0">
+                              <a:latin typeface="Cambria Math" panose="02040503050406030204" pitchFamily="18" charset="0"/>
+                            </a:rPr>
+                          </m:ctrlPr>
+                        </m:sSubPr>
+                        <m:e>
+                          <m:r>
+                            <a:rPr lang="en-US" sz="2400" b="0" i="1" smtClean="0">
+                              <a:latin typeface="Cambria Math" panose="02040503050406030204" pitchFamily="18" charset="0"/>
+                            </a:rPr>
+                            <m:t>𝑆</m:t>
+                          </m:r>
+                        </m:e>
+                        <m:sub>
+                          <m:r>
+                            <a:rPr lang="en-US" sz="2400" b="0" i="1" smtClean="0">
+                              <a:latin typeface="Cambria Math" panose="02040503050406030204" pitchFamily="18" charset="0"/>
+                            </a:rPr>
+                            <m:t>𝑑𝑑</m:t>
+                          </m:r>
+                        </m:sub>
+                      </m:sSub>
+                      <m:r>
+                        <a:rPr lang="en-US" sz="2400" b="0" i="1" smtClean="0">
+                          <a:latin typeface="Cambria Math" panose="02040503050406030204" pitchFamily="18" charset="0"/>
+                        </a:rPr>
+                        <m:t>=</m:t>
+                      </m:r>
+                      <m:sSup>
+                        <m:sSupPr>
+                          <m:ctrlPr>
+                            <a:rPr lang="en-US" sz="2400" i="1">
+                              <a:latin typeface="Cambria Math" panose="02040503050406030204" pitchFamily="18" charset="0"/>
+                            </a:rPr>
+                          </m:ctrlPr>
+                        </m:sSupPr>
+                        <m:e>
+                          <m:r>
+                            <a:rPr lang="en-US" sz="2400" i="1">
+                              <a:latin typeface="Cambria Math" panose="02040503050406030204" pitchFamily="18" charset="0"/>
+                            </a:rPr>
+                            <m:t>𝑑</m:t>
+                          </m:r>
+                        </m:e>
+                        <m:sup>
+                          <m:r>
+                            <a:rPr lang="en-US" sz="2400" i="1">
+                              <a:latin typeface="Cambria Math" panose="02040503050406030204" pitchFamily="18" charset="0"/>
+                            </a:rPr>
+                            <m:t>2</m:t>
+                          </m:r>
+                        </m:sup>
+                      </m:sSup>
+                      <m:sSub>
+                        <m:sSubPr>
+                          <m:ctrlPr>
+                            <a:rPr lang="en-US" sz="2400" i="1">
+                              <a:latin typeface="Cambria Math" panose="02040503050406030204" pitchFamily="18" charset="0"/>
+                            </a:rPr>
+                          </m:ctrlPr>
+                        </m:sSubPr>
+                        <m:e>
+                          <m:r>
+                            <a:rPr lang="en-US" sz="2400" i="1">
+                              <a:latin typeface="Cambria Math" panose="02040503050406030204" pitchFamily="18" charset="0"/>
+                            </a:rPr>
+                            <m:t>𝑆</m:t>
+                          </m:r>
+                        </m:e>
+                        <m:sub>
+                          <m:r>
+                            <a:rPr lang="en-US" sz="2400" i="1">
+                              <a:latin typeface="Cambria Math" panose="02040503050406030204" pitchFamily="18" charset="0"/>
+                            </a:rPr>
+                            <m:t>0</m:t>
+                          </m:r>
+                        </m:sub>
+                      </m:sSub>
+                    </m:oMath>
+                  </m:oMathPara>
+                </a14:m>
+                <a:endParaRPr lang="en-US" sz="2400" i="1" dirty="0"/>
+              </a:p>
+            </p:txBody>
+          </p:sp>
+        </mc:Choice>
+        <mc:Fallback xmlns="">
+          <p:sp>
+            <p:nvSpPr>
+              <p:cNvPr id="53" name="TextBox 52">
+                <a:extLst>
+                  <a:ext uri="{FF2B5EF4-FFF2-40B4-BE49-F238E27FC236}">
+                    <a16:creationId xmlns:a16="http://schemas.microsoft.com/office/drawing/2014/main" id="{F8CEC78B-E8D8-40CB-8939-F6AFD131A527}"/>
+                  </a:ext>
+                </a:extLst>
+              </p:cNvPr>
+              <p:cNvSpPr txBox="1">
+                <a:spLocks noRot="1" noChangeAspect="1" noMove="1" noResize="1" noEditPoints="1" noAdjustHandles="1" noChangeArrowheads="1" noChangeShapeType="1" noTextEdit="1"/>
+              </p:cNvSpPr>
+              <p:nvPr/>
+            </p:nvSpPr>
+            <p:spPr>
+              <a:xfrm>
+                <a:off x="7074447" y="3878645"/>
+                <a:ext cx="2087809" cy="461665"/>
+              </a:xfrm>
+              <a:prstGeom prst="rect">
+                <a:avLst/>
+              </a:prstGeom>
+              <a:blipFill>
+                <a:blip r:embed="rId5"/>
+                <a:stretch>
+                  <a:fillRect l="-877" b="-2632"/>
+                </a:stretch>
+              </a:blipFill>
+            </p:spPr>
+            <p:txBody>
+              <a:bodyPr/>
+              <a:lstStyle/>
+              <a:p>
+                <a:r>
+                  <a:rPr lang="en-US">
+                    <a:noFill/>
+                  </a:rPr>
+                  <a:t> </a:t>
+                </a:r>
+              </a:p>
+            </p:txBody>
+          </p:sp>
+        </mc:Fallback>
+      </mc:AlternateContent>
+      <mc:AlternateContent xmlns:mc="http://schemas.openxmlformats.org/markup-compatibility/2006" xmlns:a14="http://schemas.microsoft.com/office/drawing/2010/main">
+        <mc:Choice Requires="a14">
+          <p:sp>
+            <p:nvSpPr>
+              <p:cNvPr id="54" name="TextBox 53">
+                <a:extLst>
+                  <a:ext uri="{FF2B5EF4-FFF2-40B4-BE49-F238E27FC236}">
+                    <a16:creationId xmlns:a16="http://schemas.microsoft.com/office/drawing/2014/main" id="{05D49BFC-1E49-44F5-AB17-29F6535DECD1}"/>
+                  </a:ext>
+                </a:extLst>
+              </p:cNvPr>
+              <p:cNvSpPr txBox="1"/>
+              <p:nvPr/>
+            </p:nvSpPr>
+            <p:spPr>
+              <a:xfrm>
+                <a:off x="1682633" y="3377700"/>
+                <a:ext cx="4083680" cy="924292"/>
+              </a:xfrm>
+              <a:prstGeom prst="rect">
+                <a:avLst/>
+              </a:prstGeom>
+              <a:noFill/>
+            </p:spPr>
+            <p:txBody>
+              <a:bodyPr wrap="square" rtlCol="0">
+                <a:spAutoFit/>
+              </a:bodyPr>
+              <a:lstStyle/>
+              <a:p>
+                <a:pPr/>
+                <a14:m>
+                  <m:oMathPara xmlns:m="http://schemas.openxmlformats.org/officeDocument/2006/math">
+                    <m:oMathParaPr>
+                      <m:jc m:val="left"/>
+                    </m:oMathParaPr>
+                    <m:oMath xmlns:m="http://schemas.openxmlformats.org/officeDocument/2006/math">
+                      <m:sSub>
+                        <m:sSubPr>
+                          <m:ctrlPr>
+                            <a:rPr lang="en-US" sz="2400" b="0" i="1" smtClean="0">
+                              <a:latin typeface="Cambria Math" panose="02040503050406030204" pitchFamily="18" charset="0"/>
+                            </a:rPr>
+                          </m:ctrlPr>
+                        </m:sSubPr>
+                        <m:e>
+                          <m:r>
+                            <a:rPr lang="en-US" sz="2400" b="0" i="1" smtClean="0">
+                              <a:latin typeface="Cambria Math" panose="02040503050406030204" pitchFamily="18" charset="0"/>
+                            </a:rPr>
+                            <m:t>𝑆</m:t>
+                          </m:r>
+                        </m:e>
+                        <m:sub>
+                          <m:r>
+                            <a:rPr lang="en-US" sz="2400" b="0" i="1" smtClean="0">
+                              <a:latin typeface="Cambria Math" panose="02040503050406030204" pitchFamily="18" charset="0"/>
+                            </a:rPr>
+                            <m:t>𝑑</m:t>
+                          </m:r>
+                        </m:sub>
+                      </m:sSub>
+                      <m:r>
+                        <a:rPr lang="en-US" sz="2400" i="1">
+                          <a:latin typeface="Cambria Math" panose="02040503050406030204" pitchFamily="18" charset="0"/>
+                        </a:rPr>
+                        <m:t>=</m:t>
+                      </m:r>
+                      <m:r>
+                        <a:rPr lang="en-US" sz="2400" i="1">
+                          <a:latin typeface="Cambria Math" panose="02040503050406030204" pitchFamily="18" charset="0"/>
+                        </a:rPr>
+                        <m:t>𝑑</m:t>
+                      </m:r>
+                      <m:sSub>
+                        <m:sSubPr>
+                          <m:ctrlPr>
+                            <a:rPr lang="en-US" sz="2400" i="1">
+                              <a:latin typeface="Cambria Math" panose="02040503050406030204" pitchFamily="18" charset="0"/>
+                            </a:rPr>
+                          </m:ctrlPr>
+                        </m:sSubPr>
+                        <m:e>
+                          <m:r>
+                            <a:rPr lang="en-US" sz="2400" i="1">
+                              <a:latin typeface="Cambria Math" panose="02040503050406030204" pitchFamily="18" charset="0"/>
+                            </a:rPr>
+                            <m:t>𝑆</m:t>
+                          </m:r>
+                        </m:e>
+                        <m:sub>
+                          <m:r>
+                            <a:rPr lang="en-US" sz="2400" i="1">
+                              <a:latin typeface="Cambria Math" panose="02040503050406030204" pitchFamily="18" charset="0"/>
+                            </a:rPr>
+                            <m:t>0</m:t>
+                          </m:r>
+                        </m:sub>
+                      </m:sSub>
+                    </m:oMath>
+                  </m:oMathPara>
+                </a14:m>
+                <a:endParaRPr lang="en-US" sz="2400" i="1" dirty="0"/>
+              </a:p>
+              <a:p>
+                <a:pPr/>
+                <a14:m>
+                  <m:oMathPara xmlns:m="http://schemas.openxmlformats.org/officeDocument/2006/math">
+                    <m:oMathParaPr>
+                      <m:jc m:val="left"/>
+                    </m:oMathParaPr>
+                    <m:oMath xmlns:m="http://schemas.openxmlformats.org/officeDocument/2006/math">
+                      <m:sSub>
+                        <m:sSubPr>
+                          <m:ctrlPr>
+                            <a:rPr lang="en-US" sz="2400" b="0" i="1" smtClean="0">
+                              <a:latin typeface="Cambria Math" panose="02040503050406030204" pitchFamily="18" charset="0"/>
+                            </a:rPr>
+                          </m:ctrlPr>
+                        </m:sSubPr>
+                        <m:e>
+                          <m:r>
+                            <a:rPr lang="en-US" sz="2400" b="0" i="1" smtClean="0">
+                              <a:latin typeface="Cambria Math" panose="02040503050406030204" pitchFamily="18" charset="0"/>
+                            </a:rPr>
+                            <m:t>𝑓</m:t>
+                          </m:r>
+                        </m:e>
+                        <m:sub>
+                          <m:r>
+                            <a:rPr lang="en-US" sz="2400" b="0" i="1" smtClean="0">
+                              <a:latin typeface="Cambria Math" panose="02040503050406030204" pitchFamily="18" charset="0"/>
+                            </a:rPr>
+                            <m:t>𝑑</m:t>
+                          </m:r>
+                        </m:sub>
+                      </m:sSub>
+                      <m:r>
+                        <a:rPr lang="en-US" sz="2400" i="1" smtClean="0">
+                          <a:latin typeface="Cambria Math" panose="02040503050406030204" pitchFamily="18" charset="0"/>
+                        </a:rPr>
+                        <m:t>=</m:t>
+                      </m:r>
+                      <m:r>
+                        <m:rPr>
+                          <m:sty m:val="p"/>
+                        </m:rPr>
+                        <a:rPr lang="en-US" sz="2400" b="0" i="0" smtClean="0">
+                          <a:latin typeface="Cambria Math" panose="02040503050406030204" pitchFamily="18" charset="0"/>
+                        </a:rPr>
+                        <m:t>max</m:t>
+                      </m:r>
+                      <m:r>
+                        <a:rPr lang="en-US" sz="2400" b="0" i="1" smtClean="0">
+                          <a:latin typeface="Cambria Math" panose="02040503050406030204" pitchFamily="18" charset="0"/>
+                        </a:rPr>
+                        <m:t>⁡(</m:t>
+                      </m:r>
+                      <m:sSubSup>
+                        <m:sSubSupPr>
+                          <m:ctrlPr>
+                            <a:rPr lang="en-US" sz="2400" b="0" i="1" smtClean="0">
+                              <a:latin typeface="Cambria Math" panose="02040503050406030204" pitchFamily="18" charset="0"/>
+                            </a:rPr>
+                          </m:ctrlPr>
+                        </m:sSubSupPr>
+                        <m:e>
+                          <m:r>
+                            <a:rPr lang="en-US" sz="2400" b="0" i="1" smtClean="0">
+                              <a:latin typeface="Cambria Math" panose="02040503050406030204" pitchFamily="18" charset="0"/>
+                            </a:rPr>
+                            <m:t> </m:t>
+                          </m:r>
+                          <m:r>
+                            <a:rPr lang="en-US" sz="2400" b="0" i="1" smtClean="0">
+                              <a:latin typeface="Cambria Math" panose="02040503050406030204" pitchFamily="18" charset="0"/>
+                            </a:rPr>
+                            <m:t>𝑓</m:t>
+                          </m:r>
+                        </m:e>
+                        <m:sub>
+                          <m:r>
+                            <a:rPr lang="en-US" sz="2400" b="0" i="1" smtClean="0">
+                              <a:latin typeface="Cambria Math" panose="02040503050406030204" pitchFamily="18" charset="0"/>
+                            </a:rPr>
+                            <m:t>𝑑</m:t>
+                          </m:r>
+                        </m:sub>
+                        <m:sup>
+                          <m:d>
+                            <m:dPr>
+                              <m:ctrlPr>
+                                <a:rPr lang="en-US" sz="2400" b="0" i="1" smtClean="0">
+                                  <a:latin typeface="Cambria Math" panose="02040503050406030204" pitchFamily="18" charset="0"/>
+                                </a:rPr>
+                              </m:ctrlPr>
+                            </m:dPr>
+                            <m:e>
+                              <m:r>
+                                <a:rPr lang="en-US" sz="2400" b="0" i="1" smtClean="0">
+                                  <a:latin typeface="Cambria Math" panose="02040503050406030204" pitchFamily="18" charset="0"/>
+                                </a:rPr>
+                                <m:t>h𝑜𝑙𝑑</m:t>
+                              </m:r>
+                            </m:e>
+                          </m:d>
+                        </m:sup>
+                      </m:sSubSup>
+                      <m:r>
+                        <a:rPr lang="en-US" sz="2400" b="0" i="1" smtClean="0">
+                          <a:latin typeface="Cambria Math" panose="02040503050406030204" pitchFamily="18" charset="0"/>
+                        </a:rPr>
+                        <m:t>,</m:t>
+                      </m:r>
+                      <m:sSubSup>
+                        <m:sSubSupPr>
+                          <m:ctrlPr>
+                            <a:rPr lang="en-US" sz="2400" i="1">
+                              <a:latin typeface="Cambria Math" panose="02040503050406030204" pitchFamily="18" charset="0"/>
+                            </a:rPr>
+                          </m:ctrlPr>
+                        </m:sSubSupPr>
+                        <m:e>
+                          <m:r>
+                            <a:rPr lang="en-US" sz="2400" i="1">
+                              <a:latin typeface="Cambria Math" panose="02040503050406030204" pitchFamily="18" charset="0"/>
+                            </a:rPr>
+                            <m:t>𝑓</m:t>
+                          </m:r>
+                        </m:e>
+                        <m:sub>
+                          <m:r>
+                            <a:rPr lang="en-US" sz="2400" i="1">
+                              <a:latin typeface="Cambria Math" panose="02040503050406030204" pitchFamily="18" charset="0"/>
+                            </a:rPr>
+                            <m:t>𝑑</m:t>
+                          </m:r>
+                        </m:sub>
+                        <m:sup>
+                          <m:d>
+                            <m:dPr>
+                              <m:ctrlPr>
+                                <a:rPr lang="en-US" sz="2400" i="1">
+                                  <a:latin typeface="Cambria Math" panose="02040503050406030204" pitchFamily="18" charset="0"/>
+                                </a:rPr>
+                              </m:ctrlPr>
+                            </m:dPr>
+                            <m:e>
+                              <m:r>
+                                <a:rPr lang="en-US" sz="2400" b="0" i="1" smtClean="0">
+                                  <a:latin typeface="Cambria Math" panose="02040503050406030204" pitchFamily="18" charset="0"/>
+                                </a:rPr>
+                                <m:t>𝑒𝑥𝑒𝑟𝑐𝑖𝑠𝑒</m:t>
+                              </m:r>
+                            </m:e>
+                          </m:d>
+                        </m:sup>
+                      </m:sSubSup>
+                      <m:r>
+                        <a:rPr lang="en-US" sz="2400" b="0" i="1" smtClean="0">
+                          <a:latin typeface="Cambria Math" panose="02040503050406030204" pitchFamily="18" charset="0"/>
+                        </a:rPr>
+                        <m:t>)</m:t>
+                      </m:r>
+                    </m:oMath>
+                  </m:oMathPara>
+                </a14:m>
+                <a:endParaRPr lang="en-US" sz="2400" i="1" dirty="0"/>
+              </a:p>
+            </p:txBody>
+          </p:sp>
+        </mc:Choice>
+        <mc:Fallback xmlns="">
+          <p:sp>
+            <p:nvSpPr>
+              <p:cNvPr id="54" name="TextBox 53">
+                <a:extLst>
+                  <a:ext uri="{FF2B5EF4-FFF2-40B4-BE49-F238E27FC236}">
+                    <a16:creationId xmlns:a16="http://schemas.microsoft.com/office/drawing/2014/main" id="{05D49BFC-1E49-44F5-AB17-29F6535DECD1}"/>
+                  </a:ext>
+                </a:extLst>
+              </p:cNvPr>
+              <p:cNvSpPr txBox="1">
+                <a:spLocks noRot="1" noChangeAspect="1" noMove="1" noResize="1" noEditPoints="1" noAdjustHandles="1" noChangeArrowheads="1" noChangeShapeType="1" noTextEdit="1"/>
+              </p:cNvSpPr>
+              <p:nvPr/>
+            </p:nvSpPr>
+            <p:spPr>
+              <a:xfrm>
+                <a:off x="1682633" y="3377700"/>
+                <a:ext cx="4083680" cy="924292"/>
+              </a:xfrm>
+              <a:prstGeom prst="rect">
+                <a:avLst/>
+              </a:prstGeom>
+              <a:blipFill>
+                <a:blip r:embed="rId6"/>
+                <a:stretch>
+                  <a:fillRect l="-299"/>
+                </a:stretch>
+              </a:blipFill>
+            </p:spPr>
+            <p:txBody>
+              <a:bodyPr/>
+              <a:lstStyle/>
+              <a:p>
+                <a:r>
+                  <a:rPr lang="en-US">
+                    <a:noFill/>
+                  </a:rPr>
+                  <a:t> </a:t>
+                </a:r>
+              </a:p>
+            </p:txBody>
+          </p:sp>
+        </mc:Fallback>
+      </mc:AlternateContent>
+      <mc:AlternateContent xmlns:mc="http://schemas.openxmlformats.org/markup-compatibility/2006" xmlns:a14="http://schemas.microsoft.com/office/drawing/2010/main">
+        <mc:Choice Requires="a14">
+          <p:sp>
+            <p:nvSpPr>
+              <p:cNvPr id="56" name="TextBox 55">
+                <a:extLst>
+                  <a:ext uri="{FF2B5EF4-FFF2-40B4-BE49-F238E27FC236}">
+                    <a16:creationId xmlns:a16="http://schemas.microsoft.com/office/drawing/2014/main" id="{48845F09-3F5A-48AD-BA72-E8D2E0E424B9}"/>
+                  </a:ext>
+                </a:extLst>
+              </p:cNvPr>
+              <p:cNvSpPr txBox="1"/>
+              <p:nvPr/>
+            </p:nvSpPr>
+            <p:spPr>
+              <a:xfrm>
+                <a:off x="1657484" y="4440634"/>
+                <a:ext cx="5172845" cy="559769"/>
+              </a:xfrm>
+              <a:prstGeom prst="rect">
+                <a:avLst/>
+              </a:prstGeom>
+              <a:noFill/>
+            </p:spPr>
+            <p:txBody>
+              <a:bodyPr wrap="square" rtlCol="0">
+                <a:spAutoFit/>
+              </a:bodyPr>
+              <a:lstStyle/>
+              <a:p>
+                <a:pPr/>
+                <a14:m>
+                  <m:oMathPara xmlns:m="http://schemas.openxmlformats.org/officeDocument/2006/math">
+                    <m:oMathParaPr>
+                      <m:jc m:val="left"/>
+                    </m:oMathParaPr>
+                    <m:oMath xmlns:m="http://schemas.openxmlformats.org/officeDocument/2006/math">
+                      <m:sSubSup>
+                        <m:sSubSupPr>
+                          <m:ctrlPr>
+                            <a:rPr lang="en-US" sz="2400" b="0" i="1" smtClean="0">
+                              <a:latin typeface="Cambria Math" panose="02040503050406030204" pitchFamily="18" charset="0"/>
+                            </a:rPr>
+                          </m:ctrlPr>
+                        </m:sSubSupPr>
+                        <m:e>
+                          <m:r>
+                            <a:rPr lang="en-US" sz="2400" b="0" i="1" smtClean="0">
+                              <a:latin typeface="Cambria Math" panose="02040503050406030204" pitchFamily="18" charset="0"/>
+                            </a:rPr>
+                            <m:t>𝑓</m:t>
+                          </m:r>
+                        </m:e>
+                        <m:sub>
+                          <m:r>
+                            <a:rPr lang="en-US" sz="2400" b="0" i="1" smtClean="0">
+                              <a:latin typeface="Cambria Math" panose="02040503050406030204" pitchFamily="18" charset="0"/>
+                            </a:rPr>
+                            <m:t>𝑑</m:t>
+                          </m:r>
+                        </m:sub>
+                        <m:sup>
+                          <m:r>
+                            <a:rPr lang="en-US" sz="2400" b="0" i="1" smtClean="0">
+                              <a:latin typeface="Cambria Math" panose="02040503050406030204" pitchFamily="18" charset="0"/>
+                            </a:rPr>
+                            <m:t>(</m:t>
+                          </m:r>
+                          <m:r>
+                            <a:rPr lang="en-US" sz="2400" b="0" i="1" smtClean="0">
+                              <a:latin typeface="Cambria Math" panose="02040503050406030204" pitchFamily="18" charset="0"/>
+                            </a:rPr>
+                            <m:t>h𝑜𝑙𝑑</m:t>
+                          </m:r>
+                          <m:r>
+                            <a:rPr lang="en-US" sz="2400" b="0" i="1" smtClean="0">
+                              <a:latin typeface="Cambria Math" panose="02040503050406030204" pitchFamily="18" charset="0"/>
+                            </a:rPr>
+                            <m:t>)</m:t>
+                          </m:r>
+                        </m:sup>
+                      </m:sSubSup>
+                      <m:r>
+                        <a:rPr lang="en-US" sz="2400" b="0" i="1" smtClean="0">
+                          <a:latin typeface="Cambria Math" panose="02040503050406030204" pitchFamily="18" charset="0"/>
+                        </a:rPr>
+                        <m:t>=</m:t>
+                      </m:r>
+                      <m:sSup>
+                        <m:sSupPr>
+                          <m:ctrlPr>
+                            <a:rPr lang="en-US" sz="2400" b="0" i="1" smtClean="0">
+                              <a:latin typeface="Cambria Math" panose="02040503050406030204" pitchFamily="18" charset="0"/>
+                            </a:rPr>
+                          </m:ctrlPr>
+                        </m:sSupPr>
+                        <m:e>
+                          <m:r>
+                            <a:rPr lang="en-US" sz="2400" b="0" i="1" smtClean="0">
+                              <a:latin typeface="Cambria Math" panose="02040503050406030204" pitchFamily="18" charset="0"/>
+                            </a:rPr>
+                            <m:t>𝑒</m:t>
+                          </m:r>
+                        </m:e>
+                        <m:sup>
+                          <m:r>
+                            <a:rPr lang="en-US" sz="2400" b="0" i="1" smtClean="0">
+                              <a:latin typeface="Cambria Math" panose="02040503050406030204" pitchFamily="18" charset="0"/>
+                            </a:rPr>
+                            <m:t>−</m:t>
+                          </m:r>
+                          <m:f>
+                            <m:fPr>
+                              <m:type m:val="lin"/>
+                              <m:ctrlPr>
+                                <a:rPr lang="en-US" sz="2400" b="0" i="1" smtClean="0">
+                                  <a:latin typeface="Cambria Math" panose="02040503050406030204" pitchFamily="18" charset="0"/>
+                                </a:rPr>
+                              </m:ctrlPr>
+                            </m:fPr>
+                            <m:num>
+                              <m:r>
+                                <a:rPr lang="en-US" sz="2400" b="0" i="1" smtClean="0">
+                                  <a:latin typeface="Cambria Math" panose="02040503050406030204" pitchFamily="18" charset="0"/>
+                                </a:rPr>
+                                <m:t>𝑟</m:t>
+                              </m:r>
+                              <m:r>
+                                <a:rPr lang="en-US" sz="2400" b="0" i="1" smtClean="0">
+                                  <a:latin typeface="Cambria Math" panose="02040503050406030204" pitchFamily="18" charset="0"/>
+                                </a:rPr>
+                                <m:t> </m:t>
+                              </m:r>
+                              <m:r>
+                                <a:rPr lang="en-US" sz="2400" b="0" i="1" smtClean="0">
+                                  <a:latin typeface="Cambria Math" panose="02040503050406030204" pitchFamily="18" charset="0"/>
+                                </a:rPr>
+                                <m:t>𝑇</m:t>
+                              </m:r>
+                            </m:num>
+                            <m:den>
+                              <m:r>
+                                <a:rPr lang="en-US" sz="2400" b="0" i="1" smtClean="0">
+                                  <a:latin typeface="Cambria Math" panose="02040503050406030204" pitchFamily="18" charset="0"/>
+                                </a:rPr>
+                                <m:t>2</m:t>
+                              </m:r>
+                            </m:den>
+                          </m:f>
+                        </m:sup>
+                      </m:sSup>
+                      <m:r>
+                        <a:rPr lang="en-US" sz="2400" b="0" i="1" smtClean="0">
+                          <a:latin typeface="Cambria Math" panose="02040503050406030204" pitchFamily="18" charset="0"/>
+                        </a:rPr>
+                        <m:t> [ </m:t>
+                      </m:r>
+                      <m:r>
+                        <a:rPr lang="en-US" sz="2400" b="0" i="1" smtClean="0">
+                          <a:latin typeface="Cambria Math" panose="02040503050406030204" pitchFamily="18" charset="0"/>
+                        </a:rPr>
+                        <m:t>𝑝</m:t>
+                      </m:r>
+                      <m:sSub>
+                        <m:sSubPr>
+                          <m:ctrlPr>
+                            <a:rPr lang="en-US" sz="2400" b="0" i="1" smtClean="0">
+                              <a:latin typeface="Cambria Math" panose="02040503050406030204" pitchFamily="18" charset="0"/>
+                            </a:rPr>
+                          </m:ctrlPr>
+                        </m:sSubPr>
+                        <m:e>
+                          <m:r>
+                            <a:rPr lang="en-US" sz="2400" b="0" i="1" smtClean="0">
+                              <a:latin typeface="Cambria Math" panose="02040503050406030204" pitchFamily="18" charset="0"/>
+                            </a:rPr>
+                            <m:t>𝑓</m:t>
+                          </m:r>
+                        </m:e>
+                        <m:sub>
+                          <m:r>
+                            <a:rPr lang="en-US" sz="2400" b="0" i="1" smtClean="0">
+                              <a:latin typeface="Cambria Math" panose="02040503050406030204" pitchFamily="18" charset="0"/>
+                            </a:rPr>
+                            <m:t>𝑢𝑑</m:t>
+                          </m:r>
+                        </m:sub>
+                      </m:sSub>
+                      <m:r>
+                        <a:rPr lang="en-US" sz="2400" b="0" i="1" smtClean="0">
+                          <a:latin typeface="Cambria Math" panose="02040503050406030204" pitchFamily="18" charset="0"/>
+                        </a:rPr>
+                        <m:t>+</m:t>
+                      </m:r>
+                      <m:d>
+                        <m:dPr>
+                          <m:ctrlPr>
+                            <a:rPr lang="en-US" sz="2400" b="0" i="1" smtClean="0">
+                              <a:latin typeface="Cambria Math" panose="02040503050406030204" pitchFamily="18" charset="0"/>
+                            </a:rPr>
+                          </m:ctrlPr>
+                        </m:dPr>
+                        <m:e>
+                          <m:r>
+                            <a:rPr lang="en-US" sz="2400" b="0" i="1" smtClean="0">
+                              <a:latin typeface="Cambria Math" panose="02040503050406030204" pitchFamily="18" charset="0"/>
+                            </a:rPr>
+                            <m:t>1−</m:t>
+                          </m:r>
+                          <m:r>
+                            <a:rPr lang="en-US" sz="2400" b="0" i="1" smtClean="0">
+                              <a:latin typeface="Cambria Math" panose="02040503050406030204" pitchFamily="18" charset="0"/>
+                            </a:rPr>
+                            <m:t>𝑝</m:t>
+                          </m:r>
+                        </m:e>
+                      </m:d>
+                      <m:sSub>
+                        <m:sSubPr>
+                          <m:ctrlPr>
+                            <a:rPr lang="en-US" sz="2400" i="1">
+                              <a:latin typeface="Cambria Math" panose="02040503050406030204" pitchFamily="18" charset="0"/>
+                            </a:rPr>
+                          </m:ctrlPr>
+                        </m:sSubPr>
+                        <m:e>
+                          <m:r>
+                            <a:rPr lang="en-US" sz="2400" i="1">
+                              <a:latin typeface="Cambria Math" panose="02040503050406030204" pitchFamily="18" charset="0"/>
+                            </a:rPr>
+                            <m:t>𝑓</m:t>
+                          </m:r>
+                        </m:e>
+                        <m:sub>
+                          <m:r>
+                            <a:rPr lang="en-US" sz="2400" b="0" i="1" smtClean="0">
+                              <a:latin typeface="Cambria Math" panose="02040503050406030204" pitchFamily="18" charset="0"/>
+                            </a:rPr>
+                            <m:t>𝑑</m:t>
+                          </m:r>
+                          <m:r>
+                            <a:rPr lang="en-US" sz="2400" i="1">
+                              <a:latin typeface="Cambria Math" panose="02040503050406030204" pitchFamily="18" charset="0"/>
+                            </a:rPr>
+                            <m:t>𝑑</m:t>
+                          </m:r>
+                        </m:sub>
+                      </m:sSub>
+                      <m:r>
+                        <a:rPr lang="en-US" sz="2400" b="0" i="1" smtClean="0">
+                          <a:latin typeface="Cambria Math" panose="02040503050406030204" pitchFamily="18" charset="0"/>
+                        </a:rPr>
+                        <m:t> ]</m:t>
+                      </m:r>
+                    </m:oMath>
+                  </m:oMathPara>
+                </a14:m>
+                <a:endParaRPr lang="en-US" sz="2400" i="1" dirty="0"/>
+              </a:p>
+            </p:txBody>
+          </p:sp>
+        </mc:Choice>
+        <mc:Fallback xmlns="">
+          <p:sp>
+            <p:nvSpPr>
+              <p:cNvPr id="56" name="TextBox 55">
+                <a:extLst>
+                  <a:ext uri="{FF2B5EF4-FFF2-40B4-BE49-F238E27FC236}">
+                    <a16:creationId xmlns:a16="http://schemas.microsoft.com/office/drawing/2014/main" id="{48845F09-3F5A-48AD-BA72-E8D2E0E424B9}"/>
+                  </a:ext>
+                </a:extLst>
+              </p:cNvPr>
+              <p:cNvSpPr txBox="1">
+                <a:spLocks noRot="1" noChangeAspect="1" noMove="1" noResize="1" noEditPoints="1" noAdjustHandles="1" noChangeArrowheads="1" noChangeShapeType="1" noTextEdit="1"/>
+              </p:cNvSpPr>
+              <p:nvPr/>
+            </p:nvSpPr>
+            <p:spPr>
+              <a:xfrm>
+                <a:off x="1657484" y="4440634"/>
+                <a:ext cx="5172845" cy="559769"/>
+              </a:xfrm>
+              <a:prstGeom prst="rect">
+                <a:avLst/>
+              </a:prstGeom>
+              <a:blipFill>
+                <a:blip r:embed="rId7"/>
+                <a:stretch>
+                  <a:fillRect/>
+                </a:stretch>
+              </a:blipFill>
+            </p:spPr>
+            <p:txBody>
+              <a:bodyPr/>
+              <a:lstStyle/>
+              <a:p>
+                <a:r>
+                  <a:rPr lang="en-US">
+                    <a:noFill/>
+                  </a:rPr>
+                  <a:t> </a:t>
+                </a:r>
+              </a:p>
+            </p:txBody>
+          </p:sp>
+        </mc:Fallback>
+      </mc:AlternateContent>
+      <mc:AlternateContent xmlns:mc="http://schemas.openxmlformats.org/markup-compatibility/2006" xmlns:a14="http://schemas.microsoft.com/office/drawing/2010/main">
+        <mc:Choice Requires="a14">
+          <p:sp>
+            <p:nvSpPr>
+              <p:cNvPr id="57" name="TextBox 56">
+                <a:extLst>
+                  <a:ext uri="{FF2B5EF4-FFF2-40B4-BE49-F238E27FC236}">
+                    <a16:creationId xmlns:a16="http://schemas.microsoft.com/office/drawing/2014/main" id="{7FEC97CF-ECDD-4543-BDAF-20C8A8BC6182}"/>
+                  </a:ext>
+                </a:extLst>
+              </p:cNvPr>
+              <p:cNvSpPr txBox="1"/>
+              <p:nvPr/>
+            </p:nvSpPr>
+            <p:spPr>
+              <a:xfrm>
+                <a:off x="1645794" y="4985271"/>
+                <a:ext cx="4755588" cy="559769"/>
+              </a:xfrm>
+              <a:prstGeom prst="rect">
+                <a:avLst/>
+              </a:prstGeom>
+              <a:noFill/>
+            </p:spPr>
+            <p:txBody>
+              <a:bodyPr wrap="square" rtlCol="0">
+                <a:spAutoFit/>
+              </a:bodyPr>
+              <a:lstStyle/>
+              <a:p>
+                <a:pPr/>
+                <a14:m>
+                  <m:oMathPara xmlns:m="http://schemas.openxmlformats.org/officeDocument/2006/math">
+                    <m:oMathParaPr>
+                      <m:jc m:val="left"/>
+                    </m:oMathParaPr>
+                    <m:oMath xmlns:m="http://schemas.openxmlformats.org/officeDocument/2006/math">
+                      <m:sSubSup>
+                        <m:sSubSupPr>
+                          <m:ctrlPr>
+                            <a:rPr lang="en-US" sz="2400" b="0" i="1" smtClean="0">
+                              <a:latin typeface="Cambria Math" panose="02040503050406030204" pitchFamily="18" charset="0"/>
+                            </a:rPr>
+                          </m:ctrlPr>
+                        </m:sSubSupPr>
+                        <m:e>
+                          <m:r>
+                            <a:rPr lang="en-US" sz="2400" b="0" i="1" smtClean="0">
+                              <a:latin typeface="Cambria Math" panose="02040503050406030204" pitchFamily="18" charset="0"/>
+                            </a:rPr>
+                            <m:t>𝑓</m:t>
+                          </m:r>
+                        </m:e>
+                        <m:sub>
+                          <m:r>
+                            <a:rPr lang="en-US" sz="2400" b="0" i="1" smtClean="0">
+                              <a:latin typeface="Cambria Math" panose="02040503050406030204" pitchFamily="18" charset="0"/>
+                            </a:rPr>
+                            <m:t>𝑑</m:t>
+                          </m:r>
+                        </m:sub>
+                        <m:sup>
+                          <m:r>
+                            <a:rPr lang="en-US" sz="2400" b="0" i="1" smtClean="0">
+                              <a:latin typeface="Cambria Math" panose="02040503050406030204" pitchFamily="18" charset="0"/>
+                            </a:rPr>
+                            <m:t>(</m:t>
+                          </m:r>
+                          <m:r>
+                            <a:rPr lang="en-US" sz="2400" b="0" i="1" smtClean="0">
+                              <a:latin typeface="Cambria Math" panose="02040503050406030204" pitchFamily="18" charset="0"/>
+                            </a:rPr>
+                            <m:t>𝑒𝑥𝑒𝑟𝑐𝑖𝑠𝑒</m:t>
+                          </m:r>
+                          <m:r>
+                            <a:rPr lang="en-US" sz="2400" b="0" i="1" smtClean="0">
+                              <a:latin typeface="Cambria Math" panose="02040503050406030204" pitchFamily="18" charset="0"/>
+                            </a:rPr>
+                            <m:t>)</m:t>
+                          </m:r>
+                        </m:sup>
+                      </m:sSubSup>
+                      <m:r>
+                        <a:rPr lang="en-US" sz="2400" b="0" i="1" smtClean="0">
+                          <a:latin typeface="Cambria Math" panose="02040503050406030204" pitchFamily="18" charset="0"/>
+                        </a:rPr>
+                        <m:t>=</m:t>
+                      </m:r>
+                      <m:r>
+                        <m:rPr>
+                          <m:sty m:val="p"/>
+                        </m:rPr>
+                        <a:rPr lang="en-US" sz="2400" b="0" i="0" smtClean="0">
+                          <a:latin typeface="Cambria Math" panose="02040503050406030204" pitchFamily="18" charset="0"/>
+                        </a:rPr>
+                        <m:t>max</m:t>
+                      </m:r>
+                      <m:r>
+                        <a:rPr lang="en-US" sz="2400" b="0" i="1" smtClean="0">
+                          <a:latin typeface="Cambria Math" panose="02040503050406030204" pitchFamily="18" charset="0"/>
+                        </a:rPr>
+                        <m:t>⁡(0,</m:t>
+                      </m:r>
+                      <m:sSub>
+                        <m:sSubPr>
+                          <m:ctrlPr>
+                            <a:rPr lang="en-US" sz="2400" b="0" i="1" smtClean="0">
+                              <a:latin typeface="Cambria Math" panose="02040503050406030204" pitchFamily="18" charset="0"/>
+                            </a:rPr>
+                          </m:ctrlPr>
+                        </m:sSubPr>
+                        <m:e>
+                          <m:r>
+                            <a:rPr lang="en-US" sz="2400" b="0" i="1" smtClean="0">
+                              <a:latin typeface="Cambria Math" panose="02040503050406030204" pitchFamily="18" charset="0"/>
+                            </a:rPr>
+                            <m:t>𝐾</m:t>
+                          </m:r>
+                          <m:r>
+                            <a:rPr lang="en-US" sz="2400" b="0" i="1" smtClean="0">
+                              <a:latin typeface="Cambria Math" panose="02040503050406030204" pitchFamily="18" charset="0"/>
+                            </a:rPr>
+                            <m:t>−</m:t>
+                          </m:r>
+                          <m:r>
+                            <a:rPr lang="en-US" sz="2400" b="0" i="1" smtClean="0">
+                              <a:latin typeface="Cambria Math" panose="02040503050406030204" pitchFamily="18" charset="0"/>
+                            </a:rPr>
+                            <m:t>𝑆</m:t>
+                          </m:r>
+                        </m:e>
+                        <m:sub>
+                          <m:r>
+                            <a:rPr lang="en-US" sz="2400" b="0" i="1" smtClean="0">
+                              <a:latin typeface="Cambria Math" panose="02040503050406030204" pitchFamily="18" charset="0"/>
+                            </a:rPr>
+                            <m:t>𝑑</m:t>
+                          </m:r>
+                        </m:sub>
+                      </m:sSub>
+                      <m:r>
+                        <a:rPr lang="en-US" sz="2400" b="0" i="1" smtClean="0">
+                          <a:latin typeface="Cambria Math" panose="02040503050406030204" pitchFamily="18" charset="0"/>
+                        </a:rPr>
+                        <m:t>)</m:t>
+                      </m:r>
+                    </m:oMath>
+                  </m:oMathPara>
+                </a14:m>
+                <a:endParaRPr lang="en-US" sz="2400" i="1" dirty="0"/>
+              </a:p>
+            </p:txBody>
+          </p:sp>
+        </mc:Choice>
+        <mc:Fallback xmlns="">
+          <p:sp>
+            <p:nvSpPr>
+              <p:cNvPr id="57" name="TextBox 56">
+                <a:extLst>
+                  <a:ext uri="{FF2B5EF4-FFF2-40B4-BE49-F238E27FC236}">
+                    <a16:creationId xmlns:a16="http://schemas.microsoft.com/office/drawing/2014/main" id="{7FEC97CF-ECDD-4543-BDAF-20C8A8BC6182}"/>
+                  </a:ext>
+                </a:extLst>
+              </p:cNvPr>
+              <p:cNvSpPr txBox="1">
+                <a:spLocks noRot="1" noChangeAspect="1" noMove="1" noResize="1" noEditPoints="1" noAdjustHandles="1" noChangeArrowheads="1" noChangeShapeType="1" noTextEdit="1"/>
+              </p:cNvSpPr>
+              <p:nvPr/>
+            </p:nvSpPr>
+            <p:spPr>
+              <a:xfrm>
+                <a:off x="1645794" y="4985271"/>
+                <a:ext cx="4755588" cy="559769"/>
+              </a:xfrm>
+              <a:prstGeom prst="rect">
+                <a:avLst/>
+              </a:prstGeom>
+              <a:blipFill>
+                <a:blip r:embed="rId8"/>
+                <a:stretch>
+                  <a:fillRect/>
+                </a:stretch>
+              </a:blipFill>
+            </p:spPr>
+            <p:txBody>
+              <a:bodyPr/>
+              <a:lstStyle/>
+              <a:p>
+                <a:r>
+                  <a:rPr lang="en-US">
+                    <a:noFill/>
+                  </a:rPr>
+                  <a:t> </a:t>
+                </a:r>
+              </a:p>
+            </p:txBody>
+          </p:sp>
+        </mc:Fallback>
+      </mc:AlternateContent>
+      <mc:AlternateContent xmlns:mc="http://schemas.openxmlformats.org/markup-compatibility/2006" xmlns:a14="http://schemas.microsoft.com/office/drawing/2010/main">
+        <mc:Choice Requires="a14">
+          <p:sp>
+            <p:nvSpPr>
+              <p:cNvPr id="58" name="TextBox 57">
+                <a:extLst>
+                  <a:ext uri="{FF2B5EF4-FFF2-40B4-BE49-F238E27FC236}">
+                    <a16:creationId xmlns:a16="http://schemas.microsoft.com/office/drawing/2014/main" id="{E918F91C-817B-4596-8EA2-9669930A9A10}"/>
+                  </a:ext>
+                </a:extLst>
+              </p:cNvPr>
+              <p:cNvSpPr txBox="1"/>
+              <p:nvPr/>
+            </p:nvSpPr>
+            <p:spPr>
+              <a:xfrm>
+                <a:off x="5459927" y="2505211"/>
+                <a:ext cx="590916" cy="461665"/>
+              </a:xfrm>
+              <a:prstGeom prst="rect">
+                <a:avLst/>
+              </a:prstGeom>
+              <a:noFill/>
+            </p:spPr>
+            <p:txBody>
+              <a:bodyPr wrap="square" rtlCol="0">
+                <a:spAutoFit/>
+              </a:bodyPr>
+              <a:lstStyle/>
+              <a:p>
+                <a:pPr/>
+                <a14:m>
+                  <m:oMathPara xmlns:m="http://schemas.openxmlformats.org/officeDocument/2006/math">
+                    <m:oMathParaPr>
+                      <m:jc m:val="left"/>
+                    </m:oMathParaPr>
+                    <m:oMath xmlns:m="http://schemas.openxmlformats.org/officeDocument/2006/math">
+                      <m:r>
+                        <a:rPr lang="en-US" sz="2400" b="0" i="1" smtClean="0">
+                          <a:latin typeface="Cambria Math" panose="02040503050406030204" pitchFamily="18" charset="0"/>
+                        </a:rPr>
+                        <m:t>𝑝</m:t>
+                      </m:r>
+                    </m:oMath>
+                  </m:oMathPara>
+                </a14:m>
+                <a:endParaRPr lang="en-US" sz="2400" i="1" dirty="0"/>
+              </a:p>
+            </p:txBody>
+          </p:sp>
+        </mc:Choice>
+        <mc:Fallback xmlns="">
+          <p:sp>
+            <p:nvSpPr>
+              <p:cNvPr id="58" name="TextBox 57">
+                <a:extLst>
+                  <a:ext uri="{FF2B5EF4-FFF2-40B4-BE49-F238E27FC236}">
+                    <a16:creationId xmlns:a16="http://schemas.microsoft.com/office/drawing/2014/main" id="{E918F91C-817B-4596-8EA2-9669930A9A10}"/>
+                  </a:ext>
+                </a:extLst>
+              </p:cNvPr>
+              <p:cNvSpPr txBox="1">
+                <a:spLocks noRot="1" noChangeAspect="1" noMove="1" noResize="1" noEditPoints="1" noAdjustHandles="1" noChangeArrowheads="1" noChangeShapeType="1" noTextEdit="1"/>
+              </p:cNvSpPr>
+              <p:nvPr/>
+            </p:nvSpPr>
+            <p:spPr>
+              <a:xfrm>
+                <a:off x="5459927" y="2505211"/>
+                <a:ext cx="590916" cy="461665"/>
+              </a:xfrm>
+              <a:prstGeom prst="rect">
+                <a:avLst/>
+              </a:prstGeom>
+              <a:blipFill>
+                <a:blip r:embed="rId9"/>
+                <a:stretch>
+                  <a:fillRect l="-3093" b="-9211"/>
+                </a:stretch>
+              </a:blipFill>
+            </p:spPr>
+            <p:txBody>
+              <a:bodyPr/>
+              <a:lstStyle/>
+              <a:p>
+                <a:r>
+                  <a:rPr lang="en-US">
+                    <a:noFill/>
+                  </a:rPr>
+                  <a:t> </a:t>
+                </a:r>
+              </a:p>
+            </p:txBody>
+          </p:sp>
+        </mc:Fallback>
+      </mc:AlternateContent>
+      <mc:AlternateContent xmlns:mc="http://schemas.openxmlformats.org/markup-compatibility/2006" xmlns:a14="http://schemas.microsoft.com/office/drawing/2010/main">
+        <mc:Choice Requires="a14">
+          <p:sp>
+            <p:nvSpPr>
+              <p:cNvPr id="59" name="TextBox 58">
+                <a:extLst>
+                  <a:ext uri="{FF2B5EF4-FFF2-40B4-BE49-F238E27FC236}">
+                    <a16:creationId xmlns:a16="http://schemas.microsoft.com/office/drawing/2014/main" id="{73873099-9023-4DC8-B593-8D312BA76720}"/>
+                  </a:ext>
+                </a:extLst>
+              </p:cNvPr>
+              <p:cNvSpPr txBox="1"/>
+              <p:nvPr/>
+            </p:nvSpPr>
+            <p:spPr>
+              <a:xfrm>
+                <a:off x="5755385" y="3482806"/>
+                <a:ext cx="1074947" cy="461665"/>
+              </a:xfrm>
+              <a:prstGeom prst="rect">
+                <a:avLst/>
+              </a:prstGeom>
+              <a:noFill/>
+            </p:spPr>
+            <p:txBody>
+              <a:bodyPr wrap="square" rtlCol="0">
+                <a:spAutoFit/>
+              </a:bodyPr>
+              <a:lstStyle/>
+              <a:p>
+                <a:pPr/>
+                <a14:m>
+                  <m:oMathPara xmlns:m="http://schemas.openxmlformats.org/officeDocument/2006/math">
+                    <m:oMathParaPr>
+                      <m:jc m:val="left"/>
+                    </m:oMathParaPr>
+                    <m:oMath xmlns:m="http://schemas.openxmlformats.org/officeDocument/2006/math">
+                      <m:r>
+                        <a:rPr lang="en-US" sz="2400" b="0" i="1" smtClean="0">
+                          <a:latin typeface="Cambria Math" panose="02040503050406030204" pitchFamily="18" charset="0"/>
+                        </a:rPr>
+                        <m:t>1−</m:t>
+                      </m:r>
+                      <m:r>
+                        <a:rPr lang="en-US" sz="2400" b="0" i="1" smtClean="0">
+                          <a:latin typeface="Cambria Math" panose="02040503050406030204" pitchFamily="18" charset="0"/>
+                        </a:rPr>
+                        <m:t>𝑝</m:t>
+                      </m:r>
+                    </m:oMath>
+                  </m:oMathPara>
+                </a14:m>
+                <a:endParaRPr lang="en-US" sz="2400" i="1" dirty="0"/>
+              </a:p>
+            </p:txBody>
+          </p:sp>
+        </mc:Choice>
+        <mc:Fallback xmlns="">
+          <p:sp>
+            <p:nvSpPr>
+              <p:cNvPr id="59" name="TextBox 58">
+                <a:extLst>
+                  <a:ext uri="{FF2B5EF4-FFF2-40B4-BE49-F238E27FC236}">
+                    <a16:creationId xmlns:a16="http://schemas.microsoft.com/office/drawing/2014/main" id="{73873099-9023-4DC8-B593-8D312BA76720}"/>
+                  </a:ext>
+                </a:extLst>
+              </p:cNvPr>
+              <p:cNvSpPr txBox="1">
+                <a:spLocks noRot="1" noChangeAspect="1" noMove="1" noResize="1" noEditPoints="1" noAdjustHandles="1" noChangeArrowheads="1" noChangeShapeType="1" noTextEdit="1"/>
+              </p:cNvSpPr>
+              <p:nvPr/>
+            </p:nvSpPr>
+            <p:spPr>
+              <a:xfrm>
+                <a:off x="5755385" y="3482806"/>
+                <a:ext cx="1074947" cy="461665"/>
+              </a:xfrm>
+              <a:prstGeom prst="rect">
+                <a:avLst/>
+              </a:prstGeom>
+              <a:blipFill>
+                <a:blip r:embed="rId10"/>
+                <a:stretch>
+                  <a:fillRect l="-1136" b="-10526"/>
+                </a:stretch>
+              </a:blipFill>
+            </p:spPr>
+            <p:txBody>
+              <a:bodyPr/>
+              <a:lstStyle/>
+              <a:p>
+                <a:r>
+                  <a:rPr lang="en-US">
+                    <a:noFill/>
+                  </a:rPr>
+                  <a:t> </a:t>
+                </a:r>
+              </a:p>
+            </p:txBody>
+          </p:sp>
+        </mc:Fallback>
+      </mc:AlternateContent>
+      <mc:AlternateContent xmlns:mc="http://schemas.openxmlformats.org/markup-compatibility/2006" xmlns:a14="http://schemas.microsoft.com/office/drawing/2010/main">
+        <mc:Choice Requires="a14">
+          <p:sp>
+            <p:nvSpPr>
+              <p:cNvPr id="60" name="TextBox 59">
+                <a:extLst>
+                  <a:ext uri="{FF2B5EF4-FFF2-40B4-BE49-F238E27FC236}">
+                    <a16:creationId xmlns:a16="http://schemas.microsoft.com/office/drawing/2014/main" id="{46B6A375-4BDF-481C-AB1F-979FEF96B9BE}"/>
+                  </a:ext>
+                </a:extLst>
+              </p:cNvPr>
+              <p:cNvSpPr txBox="1"/>
+              <p:nvPr/>
+            </p:nvSpPr>
+            <p:spPr>
+              <a:xfrm>
+                <a:off x="1054878" y="764599"/>
+                <a:ext cx="590916" cy="461665"/>
+              </a:xfrm>
+              <a:prstGeom prst="rect">
+                <a:avLst/>
+              </a:prstGeom>
+              <a:noFill/>
+            </p:spPr>
+            <p:txBody>
+              <a:bodyPr wrap="square" rtlCol="0">
+                <a:spAutoFit/>
+              </a:bodyPr>
+              <a:lstStyle/>
+              <a:p>
+                <a:pPr/>
+                <a14:m>
+                  <m:oMathPara xmlns:m="http://schemas.openxmlformats.org/officeDocument/2006/math">
+                    <m:oMathParaPr>
+                      <m:jc m:val="left"/>
+                    </m:oMathParaPr>
+                    <m:oMath xmlns:m="http://schemas.openxmlformats.org/officeDocument/2006/math">
+                      <m:r>
+                        <a:rPr lang="en-US" sz="2400" b="0" i="1" smtClean="0">
+                          <a:latin typeface="Cambria Math" panose="02040503050406030204" pitchFamily="18" charset="0"/>
+                        </a:rPr>
+                        <m:t>𝑆</m:t>
+                      </m:r>
+                    </m:oMath>
+                  </m:oMathPara>
+                </a14:m>
+                <a:endParaRPr lang="en-US" sz="2400" i="1" dirty="0"/>
+              </a:p>
+            </p:txBody>
+          </p:sp>
+        </mc:Choice>
+        <mc:Fallback xmlns="">
+          <p:sp>
+            <p:nvSpPr>
+              <p:cNvPr id="60" name="TextBox 59">
+                <a:extLst>
+                  <a:ext uri="{FF2B5EF4-FFF2-40B4-BE49-F238E27FC236}">
+                    <a16:creationId xmlns:a16="http://schemas.microsoft.com/office/drawing/2014/main" id="{46B6A375-4BDF-481C-AB1F-979FEF96B9BE}"/>
+                  </a:ext>
+                </a:extLst>
+              </p:cNvPr>
+              <p:cNvSpPr txBox="1">
+                <a:spLocks noRot="1" noChangeAspect="1" noMove="1" noResize="1" noEditPoints="1" noAdjustHandles="1" noChangeArrowheads="1" noChangeShapeType="1" noTextEdit="1"/>
+              </p:cNvSpPr>
+              <p:nvPr/>
+            </p:nvSpPr>
+            <p:spPr>
+              <a:xfrm>
+                <a:off x="1054878" y="764599"/>
+                <a:ext cx="590916" cy="461665"/>
+              </a:xfrm>
+              <a:prstGeom prst="rect">
+                <a:avLst/>
+              </a:prstGeom>
+              <a:blipFill>
+                <a:blip r:embed="rId11"/>
+                <a:stretch>
+                  <a:fillRect l="-2062"/>
+                </a:stretch>
+              </a:blipFill>
+            </p:spPr>
+            <p:txBody>
+              <a:bodyPr/>
+              <a:lstStyle/>
+              <a:p>
+                <a:r>
+                  <a:rPr lang="en-US">
+                    <a:noFill/>
+                  </a:rPr>
+                  <a:t> </a:t>
+                </a:r>
+              </a:p>
+            </p:txBody>
+          </p:sp>
+        </mc:Fallback>
+      </mc:AlternateContent>
+      <mc:AlternateContent xmlns:mc="http://schemas.openxmlformats.org/markup-compatibility/2006" xmlns:a14="http://schemas.microsoft.com/office/drawing/2010/main">
+        <mc:Choice Requires="a14">
+          <p:sp>
+            <p:nvSpPr>
+              <p:cNvPr id="61" name="TextBox 60">
+                <a:extLst>
+                  <a:ext uri="{FF2B5EF4-FFF2-40B4-BE49-F238E27FC236}">
+                    <a16:creationId xmlns:a16="http://schemas.microsoft.com/office/drawing/2014/main" id="{D02AC166-8D07-4EA9-A780-194A702D37AA}"/>
+                  </a:ext>
+                </a:extLst>
+              </p:cNvPr>
+              <p:cNvSpPr txBox="1"/>
+              <p:nvPr/>
+            </p:nvSpPr>
+            <p:spPr>
+              <a:xfrm>
+                <a:off x="1948441" y="5997830"/>
+                <a:ext cx="1080382" cy="461665"/>
+              </a:xfrm>
+              <a:prstGeom prst="rect">
+                <a:avLst/>
+              </a:prstGeom>
+              <a:noFill/>
+            </p:spPr>
+            <p:txBody>
+              <a:bodyPr wrap="square" rtlCol="0">
+                <a:spAutoFit/>
+              </a:bodyPr>
+              <a:lstStyle/>
+              <a:p>
+                <a:pPr/>
+                <a14:m>
+                  <m:oMathPara xmlns:m="http://schemas.openxmlformats.org/officeDocument/2006/math">
+                    <m:oMathParaPr>
+                      <m:jc m:val="center"/>
+                    </m:oMathParaPr>
+                    <m:oMath xmlns:m="http://schemas.openxmlformats.org/officeDocument/2006/math">
+                      <m:r>
+                        <a:rPr lang="en-US" sz="2400" b="0" i="1" smtClean="0">
+                          <a:latin typeface="Cambria Math" panose="02040503050406030204" pitchFamily="18" charset="0"/>
+                        </a:rPr>
+                        <m:t>𝑡</m:t>
+                      </m:r>
+                      <m:r>
+                        <a:rPr lang="en-US" sz="2400" b="0" i="1" smtClean="0">
+                          <a:latin typeface="Cambria Math" panose="02040503050406030204" pitchFamily="18" charset="0"/>
+                        </a:rPr>
+                        <m:t>=0</m:t>
+                      </m:r>
+                    </m:oMath>
+                  </m:oMathPara>
+                </a14:m>
+                <a:endParaRPr lang="en-US" sz="2400" i="1" dirty="0"/>
+              </a:p>
+            </p:txBody>
+          </p:sp>
+        </mc:Choice>
+        <mc:Fallback xmlns="">
+          <p:sp>
+            <p:nvSpPr>
+              <p:cNvPr id="61" name="TextBox 60">
+                <a:extLst>
+                  <a:ext uri="{FF2B5EF4-FFF2-40B4-BE49-F238E27FC236}">
+                    <a16:creationId xmlns:a16="http://schemas.microsoft.com/office/drawing/2014/main" id="{D02AC166-8D07-4EA9-A780-194A702D37AA}"/>
+                  </a:ext>
+                </a:extLst>
+              </p:cNvPr>
+              <p:cNvSpPr txBox="1">
+                <a:spLocks noRot="1" noChangeAspect="1" noMove="1" noResize="1" noEditPoints="1" noAdjustHandles="1" noChangeArrowheads="1" noChangeShapeType="1" noTextEdit="1"/>
+              </p:cNvSpPr>
+              <p:nvPr/>
+            </p:nvSpPr>
+            <p:spPr>
+              <a:xfrm>
+                <a:off x="1948441" y="5997830"/>
+                <a:ext cx="1080382" cy="461665"/>
+              </a:xfrm>
+              <a:prstGeom prst="rect">
+                <a:avLst/>
+              </a:prstGeom>
+              <a:blipFill>
+                <a:blip r:embed="rId12"/>
+                <a:stretch>
+                  <a:fillRect/>
+                </a:stretch>
+              </a:blipFill>
+            </p:spPr>
+            <p:txBody>
+              <a:bodyPr/>
+              <a:lstStyle/>
+              <a:p>
+                <a:r>
+                  <a:rPr lang="en-US">
+                    <a:noFill/>
+                  </a:rPr>
+                  <a:t> </a:t>
+                </a:r>
+              </a:p>
+            </p:txBody>
+          </p:sp>
+        </mc:Fallback>
+      </mc:AlternateContent>
+      <mc:AlternateContent xmlns:mc="http://schemas.openxmlformats.org/markup-compatibility/2006" xmlns:a14="http://schemas.microsoft.com/office/drawing/2010/main">
+        <mc:Choice Requires="a14">
+          <p:sp>
+            <p:nvSpPr>
+              <p:cNvPr id="62" name="TextBox 61">
+                <a:extLst>
+                  <a:ext uri="{FF2B5EF4-FFF2-40B4-BE49-F238E27FC236}">
+                    <a16:creationId xmlns:a16="http://schemas.microsoft.com/office/drawing/2014/main" id="{D0DFEFC6-C97D-44A0-A5E6-A63BB996291C}"/>
+                  </a:ext>
+                </a:extLst>
+              </p:cNvPr>
+              <p:cNvSpPr txBox="1"/>
+              <p:nvPr/>
+            </p:nvSpPr>
+            <p:spPr>
+              <a:xfrm>
+                <a:off x="4177410" y="6022526"/>
+                <a:ext cx="1080382" cy="461665"/>
+              </a:xfrm>
+              <a:prstGeom prst="rect">
+                <a:avLst/>
+              </a:prstGeom>
+              <a:noFill/>
+            </p:spPr>
+            <p:txBody>
+              <a:bodyPr wrap="square" rtlCol="0">
+                <a:spAutoFit/>
+              </a:bodyPr>
+              <a:lstStyle/>
+              <a:p>
+                <a:pPr/>
+                <a14:m>
+                  <m:oMathPara xmlns:m="http://schemas.openxmlformats.org/officeDocument/2006/math">
+                    <m:oMathParaPr>
+                      <m:jc m:val="center"/>
+                    </m:oMathParaPr>
+                    <m:oMath xmlns:m="http://schemas.openxmlformats.org/officeDocument/2006/math">
+                      <m:f>
+                        <m:fPr>
+                          <m:type m:val="lin"/>
+                          <m:ctrlPr>
+                            <a:rPr lang="en-US" sz="2400" b="0" i="1" smtClean="0">
+                              <a:latin typeface="Cambria Math" panose="02040503050406030204" pitchFamily="18" charset="0"/>
+                            </a:rPr>
+                          </m:ctrlPr>
+                        </m:fPr>
+                        <m:num>
+                          <m:r>
+                            <a:rPr lang="en-US" sz="2400" b="0" i="1" smtClean="0">
+                              <a:latin typeface="Cambria Math" panose="02040503050406030204" pitchFamily="18" charset="0"/>
+                            </a:rPr>
+                            <m:t>𝑇</m:t>
+                          </m:r>
+                        </m:num>
+                        <m:den>
+                          <m:r>
+                            <a:rPr lang="en-US" sz="2400" b="0" i="1" smtClean="0">
+                              <a:latin typeface="Cambria Math" panose="02040503050406030204" pitchFamily="18" charset="0"/>
+                            </a:rPr>
+                            <m:t>2</m:t>
+                          </m:r>
+                        </m:den>
+                      </m:f>
+                    </m:oMath>
+                  </m:oMathPara>
+                </a14:m>
+                <a:endParaRPr lang="en-US" sz="2400" i="1" dirty="0"/>
+              </a:p>
+            </p:txBody>
+          </p:sp>
+        </mc:Choice>
+        <mc:Fallback xmlns="">
+          <p:sp>
+            <p:nvSpPr>
+              <p:cNvPr id="62" name="TextBox 61">
+                <a:extLst>
+                  <a:ext uri="{FF2B5EF4-FFF2-40B4-BE49-F238E27FC236}">
+                    <a16:creationId xmlns:a16="http://schemas.microsoft.com/office/drawing/2014/main" id="{D0DFEFC6-C97D-44A0-A5E6-A63BB996291C}"/>
+                  </a:ext>
+                </a:extLst>
+              </p:cNvPr>
+              <p:cNvSpPr txBox="1">
+                <a:spLocks noRot="1" noChangeAspect="1" noMove="1" noResize="1" noEditPoints="1" noAdjustHandles="1" noChangeArrowheads="1" noChangeShapeType="1" noTextEdit="1"/>
+              </p:cNvSpPr>
+              <p:nvPr/>
+            </p:nvSpPr>
+            <p:spPr>
+              <a:xfrm>
+                <a:off x="4177410" y="6022526"/>
+                <a:ext cx="1080382" cy="461665"/>
+              </a:xfrm>
+              <a:prstGeom prst="rect">
+                <a:avLst/>
+              </a:prstGeom>
+              <a:blipFill>
+                <a:blip r:embed="rId13"/>
+                <a:stretch>
+                  <a:fillRect l="-7345" t="-125000" r="-49153" b="-190789"/>
+                </a:stretch>
+              </a:blipFill>
+            </p:spPr>
+            <p:txBody>
+              <a:bodyPr/>
+              <a:lstStyle/>
+              <a:p>
+                <a:r>
+                  <a:rPr lang="en-US">
+                    <a:noFill/>
+                  </a:rPr>
+                  <a:t> </a:t>
+                </a:r>
+              </a:p>
+            </p:txBody>
+          </p:sp>
+        </mc:Fallback>
+      </mc:AlternateContent>
+      <mc:AlternateContent xmlns:mc="http://schemas.openxmlformats.org/markup-compatibility/2006" xmlns:a14="http://schemas.microsoft.com/office/drawing/2010/main">
+        <mc:Choice Requires="a14">
+          <p:sp>
+            <p:nvSpPr>
+              <p:cNvPr id="63" name="TextBox 62">
+                <a:extLst>
+                  <a:ext uri="{FF2B5EF4-FFF2-40B4-BE49-F238E27FC236}">
+                    <a16:creationId xmlns:a16="http://schemas.microsoft.com/office/drawing/2014/main" id="{50F98BF5-FC59-46DB-8E8D-5822D9CC3B34}"/>
+                  </a:ext>
+                </a:extLst>
+              </p:cNvPr>
+              <p:cNvSpPr txBox="1"/>
+              <p:nvPr/>
+            </p:nvSpPr>
+            <p:spPr>
+              <a:xfrm>
+                <a:off x="6441971" y="6032974"/>
+                <a:ext cx="1080382" cy="461665"/>
+              </a:xfrm>
+              <a:prstGeom prst="rect">
+                <a:avLst/>
+              </a:prstGeom>
+              <a:noFill/>
+            </p:spPr>
+            <p:txBody>
+              <a:bodyPr wrap="square" rtlCol="0">
+                <a:spAutoFit/>
+              </a:bodyPr>
+              <a:lstStyle/>
+              <a:p>
+                <a:pPr/>
+                <a14:m>
+                  <m:oMathPara xmlns:m="http://schemas.openxmlformats.org/officeDocument/2006/math">
+                    <m:oMathParaPr>
+                      <m:jc m:val="center"/>
+                    </m:oMathParaPr>
+                    <m:oMath xmlns:m="http://schemas.openxmlformats.org/officeDocument/2006/math">
+                      <m:r>
+                        <a:rPr lang="en-US" sz="2400" b="0" i="1" smtClean="0">
+                          <a:latin typeface="Cambria Math" panose="02040503050406030204" pitchFamily="18" charset="0"/>
+                        </a:rPr>
+                        <m:t>𝑇</m:t>
+                      </m:r>
+                    </m:oMath>
+                  </m:oMathPara>
+                </a14:m>
+                <a:endParaRPr lang="en-US" sz="2400" i="1" dirty="0"/>
+              </a:p>
+            </p:txBody>
+          </p:sp>
+        </mc:Choice>
+        <mc:Fallback xmlns="">
+          <p:sp>
+            <p:nvSpPr>
+              <p:cNvPr id="63" name="TextBox 62">
+                <a:extLst>
+                  <a:ext uri="{FF2B5EF4-FFF2-40B4-BE49-F238E27FC236}">
+                    <a16:creationId xmlns:a16="http://schemas.microsoft.com/office/drawing/2014/main" id="{50F98BF5-FC59-46DB-8E8D-5822D9CC3B34}"/>
+                  </a:ext>
+                </a:extLst>
+              </p:cNvPr>
+              <p:cNvSpPr txBox="1">
+                <a:spLocks noRot="1" noChangeAspect="1" noMove="1" noResize="1" noEditPoints="1" noAdjustHandles="1" noChangeArrowheads="1" noChangeShapeType="1" noTextEdit="1"/>
+              </p:cNvSpPr>
+              <p:nvPr/>
+            </p:nvSpPr>
+            <p:spPr>
+              <a:xfrm>
+                <a:off x="6441971" y="6032974"/>
+                <a:ext cx="1080382" cy="461665"/>
+              </a:xfrm>
+              <a:prstGeom prst="rect">
+                <a:avLst/>
+              </a:prstGeom>
+              <a:blipFill>
+                <a:blip r:embed="rId14"/>
+                <a:stretch>
+                  <a:fillRect/>
+                </a:stretch>
+              </a:blipFill>
+            </p:spPr>
+            <p:txBody>
+              <a:bodyPr/>
+              <a:lstStyle/>
+              <a:p>
+                <a:r>
+                  <a:rPr lang="en-US">
+                    <a:noFill/>
+                  </a:rPr>
+                  <a:t> </a:t>
+                </a:r>
+              </a:p>
+            </p:txBody>
+          </p:sp>
+        </mc:Fallback>
+      </mc:AlternateContent>
+    </p:spTree>
+    <p:extLst>
+      <p:ext uri="{BB962C8B-B14F-4D97-AF65-F5344CB8AC3E}">
+        <p14:creationId xmlns:p14="http://schemas.microsoft.com/office/powerpoint/2010/main" val="1196268207"/>
       </p:ext>
     </p:extLst>
   </p:cSld>

</xml_diff>

<commit_message>
updates to binomial tree topics mainly
</commit_message>
<xml_diff>
--- a/img/binom.pptx
+++ b/img/binom.pptx
@@ -262,7 +262,7 @@
           <a:p>
             <a:fld id="{43C63E5C-259F-4767-9F32-E9A25171A77E}" type="datetimeFigureOut">
               <a:rPr lang="en-US" smtClean="0"/>
-              <a:t>1/1/2021</a:t>
+              <a:t>12/17/2021</a:t>
             </a:fld>
             <a:endParaRPr lang="en-US"/>
           </a:p>
@@ -460,7 +460,7 @@
           <a:p>
             <a:fld id="{43C63E5C-259F-4767-9F32-E9A25171A77E}" type="datetimeFigureOut">
               <a:rPr lang="en-US" smtClean="0"/>
-              <a:t>1/1/2021</a:t>
+              <a:t>12/17/2021</a:t>
             </a:fld>
             <a:endParaRPr lang="en-US"/>
           </a:p>
@@ -668,7 +668,7 @@
           <a:p>
             <a:fld id="{43C63E5C-259F-4767-9F32-E9A25171A77E}" type="datetimeFigureOut">
               <a:rPr lang="en-US" smtClean="0"/>
-              <a:t>1/1/2021</a:t>
+              <a:t>12/17/2021</a:t>
             </a:fld>
             <a:endParaRPr lang="en-US"/>
           </a:p>
@@ -866,7 +866,7 @@
           <a:p>
             <a:fld id="{43C63E5C-259F-4767-9F32-E9A25171A77E}" type="datetimeFigureOut">
               <a:rPr lang="en-US" smtClean="0"/>
-              <a:t>1/1/2021</a:t>
+              <a:t>12/17/2021</a:t>
             </a:fld>
             <a:endParaRPr lang="en-US"/>
           </a:p>
@@ -1141,7 +1141,7 @@
           <a:p>
             <a:fld id="{43C63E5C-259F-4767-9F32-E9A25171A77E}" type="datetimeFigureOut">
               <a:rPr lang="en-US" smtClean="0"/>
-              <a:t>1/1/2021</a:t>
+              <a:t>12/17/2021</a:t>
             </a:fld>
             <a:endParaRPr lang="en-US"/>
           </a:p>
@@ -1406,7 +1406,7 @@
           <a:p>
             <a:fld id="{43C63E5C-259F-4767-9F32-E9A25171A77E}" type="datetimeFigureOut">
               <a:rPr lang="en-US" smtClean="0"/>
-              <a:t>1/1/2021</a:t>
+              <a:t>12/17/2021</a:t>
             </a:fld>
             <a:endParaRPr lang="en-US"/>
           </a:p>
@@ -1818,7 +1818,7 @@
           <a:p>
             <a:fld id="{43C63E5C-259F-4767-9F32-E9A25171A77E}" type="datetimeFigureOut">
               <a:rPr lang="en-US" smtClean="0"/>
-              <a:t>1/1/2021</a:t>
+              <a:t>12/17/2021</a:t>
             </a:fld>
             <a:endParaRPr lang="en-US"/>
           </a:p>
@@ -1959,7 +1959,7 @@
           <a:p>
             <a:fld id="{43C63E5C-259F-4767-9F32-E9A25171A77E}" type="datetimeFigureOut">
               <a:rPr lang="en-US" smtClean="0"/>
-              <a:t>1/1/2021</a:t>
+              <a:t>12/17/2021</a:t>
             </a:fld>
             <a:endParaRPr lang="en-US"/>
           </a:p>
@@ -2072,7 +2072,7 @@
           <a:p>
             <a:fld id="{43C63E5C-259F-4767-9F32-E9A25171A77E}" type="datetimeFigureOut">
               <a:rPr lang="en-US" smtClean="0"/>
-              <a:t>1/1/2021</a:t>
+              <a:t>12/17/2021</a:t>
             </a:fld>
             <a:endParaRPr lang="en-US"/>
           </a:p>
@@ -2383,7 +2383,7 @@
           <a:p>
             <a:fld id="{43C63E5C-259F-4767-9F32-E9A25171A77E}" type="datetimeFigureOut">
               <a:rPr lang="en-US" smtClean="0"/>
-              <a:t>1/1/2021</a:t>
+              <a:t>12/17/2021</a:t>
             </a:fld>
             <a:endParaRPr lang="en-US"/>
           </a:p>
@@ -2671,7 +2671,7 @@
           <a:p>
             <a:fld id="{43C63E5C-259F-4767-9F32-E9A25171A77E}" type="datetimeFigureOut">
               <a:rPr lang="en-US" smtClean="0"/>
-              <a:t>1/1/2021</a:t>
+              <a:t>12/17/2021</a:t>
             </a:fld>
             <a:endParaRPr lang="en-US"/>
           </a:p>
@@ -2912,7 +2912,7 @@
           <a:p>
             <a:fld id="{43C63E5C-259F-4767-9F32-E9A25171A77E}" type="datetimeFigureOut">
               <a:rPr lang="en-US" smtClean="0"/>
-              <a:t>1/1/2021</a:t>
+              <a:t>12/17/2021</a:t>
             </a:fld>
             <a:endParaRPr lang="en-US"/>
           </a:p>
@@ -3631,7 +3631,7 @@
         </p:nvSpPr>
         <p:spPr>
           <a:xfrm>
-            <a:off x="3100929" y="2368311"/>
+            <a:off x="2325894" y="2830187"/>
             <a:ext cx="1050293" cy="584775"/>
           </a:xfrm>
           <a:prstGeom prst="rect">
@@ -3670,7 +3670,7 @@
         </p:nvSpPr>
         <p:spPr>
           <a:xfrm>
-            <a:off x="1266940" y="1874976"/>
+            <a:off x="1273118" y="2004725"/>
             <a:ext cx="703266" cy="584775"/>
           </a:xfrm>
           <a:prstGeom prst="rect">
@@ -3685,11 +3685,11 @@
           <a:lstStyle/>
           <a:p>
             <a:r>
-              <a:rPr lang="en-US" sz="3200" i="1" dirty="0"/>
+              <a:rPr lang="en-US" sz="3200" b="1" i="1" dirty="0"/>
               <a:t>S</a:t>
             </a:r>
             <a:r>
-              <a:rPr lang="en-US" sz="3200" i="1" baseline="-25000" dirty="0"/>
+              <a:rPr lang="en-US" sz="3200" b="1" i="1" baseline="-25000" dirty="0"/>
               <a:t>0</a:t>
             </a:r>
           </a:p>
@@ -3709,7 +3709,7 @@
         </p:nvSpPr>
         <p:spPr>
           <a:xfrm>
-            <a:off x="4340489" y="804721"/>
+            <a:off x="4371379" y="1008607"/>
             <a:ext cx="894336" cy="584775"/>
           </a:xfrm>
           <a:prstGeom prst="rect">
@@ -3724,11 +3724,11 @@
           <a:lstStyle/>
           <a:p>
             <a:r>
-              <a:rPr lang="en-US" sz="3200" i="1" dirty="0"/>
+              <a:rPr lang="en-US" sz="3200" b="1" i="1" dirty="0"/>
               <a:t>u S</a:t>
             </a:r>
             <a:r>
-              <a:rPr lang="en-US" sz="3200" i="1" baseline="-25000" dirty="0"/>
+              <a:rPr lang="en-US" sz="3200" b="1" i="1" baseline="-25000" dirty="0"/>
               <a:t>0</a:t>
             </a:r>
           </a:p>
@@ -3748,7 +3748,7 @@
         </p:nvSpPr>
         <p:spPr>
           <a:xfrm>
-            <a:off x="4340489" y="2838078"/>
+            <a:off x="4371379" y="3029601"/>
             <a:ext cx="894336" cy="584775"/>
           </a:xfrm>
           <a:prstGeom prst="rect">
@@ -3763,11 +3763,11 @@
           <a:lstStyle/>
           <a:p>
             <a:r>
-              <a:rPr lang="en-US" sz="3200" i="1" dirty="0"/>
+              <a:rPr lang="en-US" sz="3200" b="1" i="1" dirty="0"/>
               <a:t>d S</a:t>
             </a:r>
             <a:r>
-              <a:rPr lang="en-US" sz="3200" i="1" baseline="-25000" dirty="0"/>
+              <a:rPr lang="en-US" sz="3200" b="1" i="1" baseline="-25000" dirty="0"/>
               <a:t>0</a:t>
             </a:r>
           </a:p>
@@ -4076,7 +4076,7 @@
         </p:nvSpPr>
         <p:spPr>
           <a:xfrm>
-            <a:off x="1286700" y="2457947"/>
+            <a:off x="1286700" y="1407626"/>
             <a:ext cx="703266" cy="584775"/>
           </a:xfrm>
           <a:prstGeom prst="rect">
@@ -4112,7 +4112,7 @@
         </p:nvSpPr>
         <p:spPr>
           <a:xfrm>
-            <a:off x="4396191" y="1344767"/>
+            <a:off x="4377657" y="411826"/>
             <a:ext cx="703266" cy="584775"/>
           </a:xfrm>
           <a:prstGeom prst="rect">
@@ -4151,7 +4151,7 @@
         </p:nvSpPr>
         <p:spPr>
           <a:xfrm>
-            <a:off x="4360099" y="3346111"/>
+            <a:off x="4378633" y="2444064"/>
             <a:ext cx="703266" cy="584775"/>
           </a:xfrm>
           <a:prstGeom prst="rect">
@@ -4669,7 +4669,7 @@
         </p:nvSpPr>
         <p:spPr>
           <a:xfrm>
-            <a:off x="3382786" y="1977740"/>
+            <a:off x="3212089" y="2055348"/>
             <a:ext cx="462709" cy="523220"/>
           </a:xfrm>
           <a:prstGeom prst="rect">
@@ -4704,7 +4704,7 @@
         </p:nvSpPr>
         <p:spPr>
           <a:xfrm>
-            <a:off x="3335087" y="3015967"/>
+            <a:off x="2857639" y="3546482"/>
             <a:ext cx="1050293" cy="523220"/>
           </a:xfrm>
           <a:prstGeom prst="rect">
@@ -4743,7 +4743,7 @@
         </p:nvSpPr>
         <p:spPr>
           <a:xfrm>
-            <a:off x="1816618" y="2451558"/>
+            <a:off x="1822798" y="2717226"/>
             <a:ext cx="703266" cy="523220"/>
           </a:xfrm>
           <a:prstGeom prst="rect">
@@ -4758,11 +4758,11 @@
           <a:lstStyle/>
           <a:p>
             <a:r>
-              <a:rPr lang="en-US" sz="2800" i="1" dirty="0"/>
+              <a:rPr lang="en-US" sz="2800" b="1" i="1" dirty="0"/>
               <a:t>S</a:t>
             </a:r>
             <a:r>
-              <a:rPr lang="en-US" sz="2800" i="1" baseline="-25000" dirty="0"/>
+              <a:rPr lang="en-US" sz="2800" b="1" i="1" baseline="-25000" dirty="0"/>
               <a:t>0</a:t>
             </a:r>
           </a:p>
@@ -4782,7 +4782,7 @@
         </p:nvSpPr>
         <p:spPr>
           <a:xfrm>
-            <a:off x="4064907" y="1096316"/>
+            <a:off x="4256437" y="1374342"/>
             <a:ext cx="894336" cy="523220"/>
           </a:xfrm>
           <a:prstGeom prst="rect">
@@ -4797,11 +4797,11 @@
           <a:lstStyle/>
           <a:p>
             <a:r>
-              <a:rPr lang="en-US" sz="2800" i="1" dirty="0"/>
+              <a:rPr lang="en-US" sz="2800" b="1" i="1" dirty="0"/>
               <a:t>u S</a:t>
             </a:r>
             <a:r>
-              <a:rPr lang="en-US" sz="2800" i="1" baseline="-25000" dirty="0"/>
+              <a:rPr lang="en-US" sz="2800" b="1" i="1" baseline="-25000" dirty="0"/>
               <a:t>0</a:t>
             </a:r>
           </a:p>
@@ -4821,7 +4821,7 @@
         </p:nvSpPr>
         <p:spPr>
           <a:xfrm>
-            <a:off x="4174405" y="4175870"/>
+            <a:off x="4259106" y="3352764"/>
             <a:ext cx="894336" cy="523220"/>
           </a:xfrm>
           <a:prstGeom prst="rect">
@@ -4836,11 +4836,11 @@
           <a:lstStyle/>
           <a:p>
             <a:r>
-              <a:rPr lang="en-US" sz="2800" i="1" dirty="0"/>
+              <a:rPr lang="en-US" sz="2800" b="1" i="1" dirty="0"/>
               <a:t>d S</a:t>
             </a:r>
             <a:r>
-              <a:rPr lang="en-US" sz="2800" i="1" baseline="-25000" dirty="0"/>
+              <a:rPr lang="en-US" sz="2800" b="1" i="1" baseline="-25000" dirty="0"/>
               <a:t>0</a:t>
             </a:r>
           </a:p>
@@ -5372,7 +5372,7 @@
         </p:nvSpPr>
         <p:spPr>
           <a:xfrm>
-            <a:off x="7088855" y="531768"/>
+            <a:off x="7079802" y="716864"/>
             <a:ext cx="1140739" cy="523220"/>
           </a:xfrm>
           <a:prstGeom prst="rect">
@@ -5387,19 +5387,23 @@
           <a:lstStyle/>
           <a:p>
             <a:r>
-              <a:rPr lang="en-US" sz="2800" i="1" dirty="0"/>
+              <a:rPr lang="en-US" sz="2800" b="1" i="1" dirty="0"/>
               <a:t>u</a:t>
             </a:r>
             <a:r>
-              <a:rPr lang="en-US" sz="2800" i="1" baseline="30000" dirty="0"/>
+              <a:rPr lang="en-US" sz="1000" b="1" i="1" dirty="0"/>
+              <a:t> </a:t>
+            </a:r>
+            <a:r>
+              <a:rPr lang="en-US" sz="2800" b="1" i="1" baseline="30000" dirty="0"/>
               <a:t>2</a:t>
             </a:r>
             <a:r>
-              <a:rPr lang="en-US" sz="2800" i="1" dirty="0"/>
+              <a:rPr lang="en-US" sz="2800" b="1" i="1" dirty="0"/>
               <a:t> S</a:t>
             </a:r>
             <a:r>
-              <a:rPr lang="en-US" sz="2800" i="1" baseline="-25000" dirty="0"/>
+              <a:rPr lang="en-US" sz="2800" b="1" i="1" baseline="-25000" dirty="0"/>
               <a:t>0</a:t>
             </a:r>
           </a:p>
@@ -5419,7 +5423,7 @@
         </p:nvSpPr>
         <p:spPr>
           <a:xfrm>
-            <a:off x="7088854" y="2503559"/>
+            <a:off x="7101210" y="2719805"/>
             <a:ext cx="1140739" cy="523220"/>
           </a:xfrm>
           <a:prstGeom prst="rect">
@@ -5434,11 +5438,11 @@
           <a:lstStyle/>
           <a:p>
             <a:r>
-              <a:rPr lang="en-US" sz="2800" i="1" dirty="0"/>
+              <a:rPr lang="en-US" sz="2800" b="1" i="1" dirty="0"/>
               <a:t>u d S</a:t>
             </a:r>
             <a:r>
-              <a:rPr lang="en-US" sz="2800" i="1" baseline="-25000" dirty="0"/>
+              <a:rPr lang="en-US" sz="2800" b="1" i="1" baseline="-25000" dirty="0"/>
               <a:t>0</a:t>
             </a:r>
           </a:p>
@@ -5458,7 +5462,7 @@
         </p:nvSpPr>
         <p:spPr>
           <a:xfrm>
-            <a:off x="7088854" y="4550225"/>
+            <a:off x="7134768" y="4755391"/>
             <a:ext cx="1140739" cy="523220"/>
           </a:xfrm>
           <a:prstGeom prst="rect">
@@ -5473,19 +5477,23 @@
           <a:lstStyle/>
           <a:p>
             <a:r>
-              <a:rPr lang="en-US" sz="2800" i="1" dirty="0"/>
+              <a:rPr lang="en-US" sz="2800" b="1" i="1" dirty="0"/>
               <a:t>d</a:t>
             </a:r>
             <a:r>
-              <a:rPr lang="en-US" sz="2800" i="1" baseline="30000" dirty="0"/>
+              <a:rPr lang="en-US" sz="1000" b="1" i="1" dirty="0"/>
+              <a:t> </a:t>
+            </a:r>
+            <a:r>
+              <a:rPr lang="en-US" sz="2800" b="1" i="1" baseline="30000" dirty="0"/>
               <a:t>2</a:t>
             </a:r>
             <a:r>
-              <a:rPr lang="en-US" sz="2800" i="1" dirty="0"/>
+              <a:rPr lang="en-US" sz="2800" b="1" i="1" dirty="0"/>
               <a:t> S</a:t>
             </a:r>
             <a:r>
-              <a:rPr lang="en-US" sz="2800" i="1" baseline="-25000" dirty="0"/>
+              <a:rPr lang="en-US" sz="2800" b="1" i="1" baseline="-25000" dirty="0"/>
               <a:t>0</a:t>
             </a:r>
           </a:p>
@@ -5540,7 +5548,7 @@
         </p:nvSpPr>
         <p:spPr>
           <a:xfrm>
-            <a:off x="5440801" y="3041378"/>
+            <a:off x="5911470" y="3388302"/>
             <a:ext cx="462709" cy="523220"/>
           </a:xfrm>
           <a:prstGeom prst="rect">
@@ -5614,7 +5622,7 @@
         </p:nvSpPr>
         <p:spPr>
           <a:xfrm>
-            <a:off x="5721415" y="4068784"/>
+            <a:off x="5231684" y="4568082"/>
             <a:ext cx="1050293" cy="523220"/>
           </a:xfrm>
           <a:prstGeom prst="rect">
@@ -5653,7 +5661,7 @@
         </p:nvSpPr>
         <p:spPr>
           <a:xfrm>
-            <a:off x="1830333" y="3055204"/>
+            <a:off x="1842691" y="2208773"/>
             <a:ext cx="703266" cy="523220"/>
           </a:xfrm>
           <a:prstGeom prst="rect">
@@ -5689,7 +5697,7 @@
         </p:nvSpPr>
         <p:spPr>
           <a:xfrm>
-            <a:off x="4207386" y="4670677"/>
+            <a:off x="4287713" y="2828217"/>
             <a:ext cx="703266" cy="523220"/>
           </a:xfrm>
           <a:prstGeom prst="rect">
@@ -5728,7 +5736,7 @@
         </p:nvSpPr>
         <p:spPr>
           <a:xfrm>
-            <a:off x="4064907" y="1544089"/>
+            <a:off x="4300168" y="852627"/>
             <a:ext cx="703266" cy="523220"/>
           </a:xfrm>
           <a:prstGeom prst="rect">
@@ -5767,7 +5775,7 @@
         </p:nvSpPr>
         <p:spPr>
           <a:xfrm>
-            <a:off x="7117740" y="1018229"/>
+            <a:off x="7102233" y="177935"/>
             <a:ext cx="703266" cy="523220"/>
           </a:xfrm>
           <a:prstGeom prst="rect">
@@ -5806,7 +5814,7 @@
         </p:nvSpPr>
         <p:spPr>
           <a:xfrm>
-            <a:off x="7073345" y="3016749"/>
+            <a:off x="7135188" y="2231156"/>
             <a:ext cx="703266" cy="523220"/>
           </a:xfrm>
           <a:prstGeom prst="rect">
@@ -5845,7 +5853,7 @@
         </p:nvSpPr>
         <p:spPr>
           <a:xfrm>
-            <a:off x="7117740" y="4984221"/>
+            <a:off x="7179037" y="4265351"/>
             <a:ext cx="703266" cy="523220"/>
           </a:xfrm>
           <a:prstGeom prst="rect">

</xml_diff>